<commit_message>
Removed nodeJs ttimeline, now using custom one and fixed compilation errors
</commit_message>
<xml_diff>
--- a/TeamEJJ.pptx
+++ b/TeamEJJ.pptx
@@ -5,10 +5,10 @@
     <p:sldMasterId id="2147483660" r:id="rId1"/>
   </p:sldMasterIdLst>
   <p:notesMasterIdLst>
-    <p:notesMasterId r:id="rId11"/>
+    <p:notesMasterId r:id="rId12"/>
   </p:notesMasterIdLst>
   <p:handoutMasterIdLst>
-    <p:handoutMasterId r:id="rId12"/>
+    <p:handoutMasterId r:id="rId13"/>
   </p:handoutMasterIdLst>
   <p:sldIdLst>
     <p:sldId id="256" r:id="rId2"/>
@@ -17,9 +17,10 @@
     <p:sldId id="264" r:id="rId5"/>
     <p:sldId id="262" r:id="rId6"/>
     <p:sldId id="263" r:id="rId7"/>
-    <p:sldId id="259" r:id="rId8"/>
-    <p:sldId id="260" r:id="rId9"/>
-    <p:sldId id="261" r:id="rId10"/>
+    <p:sldId id="265" r:id="rId8"/>
+    <p:sldId id="259" r:id="rId9"/>
+    <p:sldId id="260" r:id="rId10"/>
+    <p:sldId id="261" r:id="rId11"/>
   </p:sldIdLst>
   <p:sldSz cx="12192000" cy="6858000"/>
   <p:notesSz cx="6858000" cy="9144000"/>
@@ -3721,6 +3722,117 @@
 </p:sld>
 </file>
 
+<file path=ppt/slides/slide10.xml><?xml version="1.0" encoding="utf-8"?>
+<p:sld xmlns:a="http://schemas.openxmlformats.org/drawingml/2006/main" xmlns:r="http://schemas.openxmlformats.org/officeDocument/2006/relationships" xmlns:p="http://schemas.openxmlformats.org/presentationml/2006/main">
+  <p:cSld>
+    <p:spTree>
+      <p:nvGrpSpPr>
+        <p:cNvPr id="1" name=""/>
+        <p:cNvGrpSpPr/>
+        <p:nvPr/>
+      </p:nvGrpSpPr>
+      <p:grpSpPr>
+        <a:xfrm>
+          <a:off x="0" y="0"/>
+          <a:ext cx="0" cy="0"/>
+          <a:chOff x="0" y="0"/>
+          <a:chExt cx="0" cy="0"/>
+        </a:xfrm>
+      </p:grpSpPr>
+      <p:sp>
+        <p:nvSpPr>
+          <p:cNvPr id="2" name="Title 1">
+            <a:extLst>
+              <a:ext uri="{FF2B5EF4-FFF2-40B4-BE49-F238E27FC236}">
+                <a16:creationId xmlns:a16="http://schemas.microsoft.com/office/drawing/2014/main" id="{3FDE549A-A251-42BB-AA2B-69B6DD7BB2C5}"/>
+              </a:ext>
+            </a:extLst>
+          </p:cNvPr>
+          <p:cNvSpPr>
+            <a:spLocks noGrp="1"/>
+          </p:cNvSpPr>
+          <p:nvPr>
+            <p:ph type="title"/>
+          </p:nvPr>
+        </p:nvSpPr>
+        <p:spPr/>
+        <p:txBody>
+          <a:bodyPr/>
+          <a:lstStyle/>
+          <a:p>
+            <a:endParaRPr lang="en-US"/>
+          </a:p>
+        </p:txBody>
+      </p:sp>
+      <p:sp>
+        <p:nvSpPr>
+          <p:cNvPr id="3" name="Content Placeholder 2">
+            <a:extLst>
+              <a:ext uri="{FF2B5EF4-FFF2-40B4-BE49-F238E27FC236}">
+                <a16:creationId xmlns:a16="http://schemas.microsoft.com/office/drawing/2014/main" id="{0E6D595F-E13D-4ABB-8ECC-5F6E8C87EA26}"/>
+              </a:ext>
+            </a:extLst>
+          </p:cNvPr>
+          <p:cNvSpPr>
+            <a:spLocks noGrp="1"/>
+          </p:cNvSpPr>
+          <p:nvPr>
+            <p:ph idx="1"/>
+          </p:nvPr>
+        </p:nvSpPr>
+        <p:spPr/>
+        <p:txBody>
+          <a:bodyPr/>
+          <a:lstStyle/>
+          <a:p>
+            <a:endParaRPr lang="en-US" dirty="0"/>
+          </a:p>
+        </p:txBody>
+      </p:sp>
+      <p:sp>
+        <p:nvSpPr>
+          <p:cNvPr id="4" name="Footer Placeholder 3">
+            <a:extLst>
+              <a:ext uri="{FF2B5EF4-FFF2-40B4-BE49-F238E27FC236}">
+                <a16:creationId xmlns:a16="http://schemas.microsoft.com/office/drawing/2014/main" id="{479F8E9C-951C-4182-A6D4-D3B4901AC6E9}"/>
+              </a:ext>
+            </a:extLst>
+          </p:cNvPr>
+          <p:cNvSpPr>
+            <a:spLocks noGrp="1"/>
+          </p:cNvSpPr>
+          <p:nvPr>
+            <p:ph type="ftr" sz="quarter" idx="11"/>
+          </p:nvPr>
+        </p:nvSpPr>
+        <p:spPr/>
+        <p:txBody>
+          <a:bodyPr/>
+          <a:lstStyle/>
+          <a:p>
+            <a:r>
+              <a:rPr lang="en-US" dirty="0">
+                <a:latin typeface="Courier New" panose="02070309020205020404" pitchFamily="49" charset="0"/>
+                <a:cs typeface="Courier New" panose="02070309020205020404" pitchFamily="49" charset="0"/>
+              </a:rPr>
+              <a:t>Team EJJ</a:t>
+            </a:r>
+          </a:p>
+        </p:txBody>
+      </p:sp>
+    </p:spTree>
+    <p:extLst>
+      <p:ext uri="{BB962C8B-B14F-4D97-AF65-F5344CB8AC3E}">
+        <p14:creationId xmlns:p14="http://schemas.microsoft.com/office/powerpoint/2010/main" val="2140977605"/>
+      </p:ext>
+    </p:extLst>
+  </p:cSld>
+  <p:clrMapOvr>
+    <a:masterClrMapping/>
+  </p:clrMapOvr>
+</p:sld>
+</file>
+
 <file path=ppt/slides/slide2.xml><?xml version="1.0" encoding="utf-8"?>
 <p:sld xmlns:a="http://schemas.openxmlformats.org/drawingml/2006/main" xmlns:r="http://schemas.openxmlformats.org/officeDocument/2006/relationships" xmlns:p="http://schemas.openxmlformats.org/presentationml/2006/main">
   <p:cSld>
@@ -5922,6 +6034,188 @@
       </p:grpSpPr>
       <p:sp>
         <p:nvSpPr>
+          <p:cNvPr id="2" name="Title 1">
+            <a:extLst>
+              <a:ext uri="{FF2B5EF4-FFF2-40B4-BE49-F238E27FC236}">
+                <a16:creationId xmlns:a16="http://schemas.microsoft.com/office/drawing/2014/main" id="{E29B01D6-A7CA-4A3E-9C66-C2AA33322F12}"/>
+              </a:ext>
+            </a:extLst>
+          </p:cNvPr>
+          <p:cNvSpPr>
+            <a:spLocks noGrp="1"/>
+          </p:cNvSpPr>
+          <p:nvPr>
+            <p:ph type="title"/>
+          </p:nvPr>
+        </p:nvSpPr>
+        <p:spPr/>
+        <p:txBody>
+          <a:bodyPr/>
+          <a:lstStyle/>
+          <a:p>
+            <a:r>
+              <a:rPr lang="en-US" dirty="0"/>
+              <a:t>Mission </a:t>
+            </a:r>
+            <a:r>
+              <a:rPr lang="en-US"/>
+              <a:t>Planning </a:t>
+            </a:r>
+            <a:r>
+              <a:rPr lang="en-US" dirty="0"/>
+              <a:t>	</a:t>
+            </a:r>
+          </a:p>
+        </p:txBody>
+      </p:sp>
+      <p:sp>
+        <p:nvSpPr>
+          <p:cNvPr id="3" name="Content Placeholder 2">
+            <a:extLst>
+              <a:ext uri="{FF2B5EF4-FFF2-40B4-BE49-F238E27FC236}">
+                <a16:creationId xmlns:a16="http://schemas.microsoft.com/office/drawing/2014/main" id="{F1842140-4ACB-41A9-BC7F-30570259E5D8}"/>
+              </a:ext>
+            </a:extLst>
+          </p:cNvPr>
+          <p:cNvSpPr>
+            <a:spLocks noGrp="1"/>
+          </p:cNvSpPr>
+          <p:nvPr>
+            <p:ph idx="1"/>
+          </p:nvPr>
+        </p:nvSpPr>
+        <p:spPr/>
+        <p:txBody>
+          <a:bodyPr/>
+          <a:lstStyle/>
+          <a:p>
+            <a:r>
+              <a:rPr lang="en-US" dirty="0"/>
+              <a:t>Importing an ATO</a:t>
+            </a:r>
+          </a:p>
+          <a:p>
+            <a:pPr lvl="1"/>
+            <a:r>
+              <a:rPr lang="en-US" dirty="0"/>
+              <a:t>With JMPS:</a:t>
+            </a:r>
+          </a:p>
+          <a:p>
+            <a:pPr lvl="2"/>
+            <a:r>
+              <a:rPr lang="en-US" dirty="0"/>
+              <a:t>Import ATO and ACO with Task View (7 + clicks)</a:t>
+            </a:r>
+          </a:p>
+          <a:p>
+            <a:pPr lvl="2"/>
+            <a:r>
+              <a:rPr lang="en-US" dirty="0"/>
+              <a:t>Port over the targets and </a:t>
+            </a:r>
+            <a:r>
+              <a:rPr lang="en-US" dirty="0" err="1"/>
+              <a:t>geozones</a:t>
+            </a:r>
+            <a:r>
+              <a:rPr lang="en-US" dirty="0"/>
+              <a:t> from Task View into JMPS</a:t>
+            </a:r>
+          </a:p>
+          <a:p>
+            <a:pPr lvl="1"/>
+            <a:r>
+              <a:rPr lang="en-US" dirty="0"/>
+              <a:t>Now:</a:t>
+            </a:r>
+          </a:p>
+          <a:p>
+            <a:pPr lvl="2"/>
+            <a:r>
+              <a:rPr lang="en-US" dirty="0"/>
+              <a:t>Drag and drop tasking into page.  Get summary and visualization of targets immediately. (1 click)</a:t>
+            </a:r>
+          </a:p>
+          <a:p>
+            <a:pPr marL="914400" lvl="2" indent="0">
+              <a:buNone/>
+            </a:pPr>
+            <a:endParaRPr lang="en-US" dirty="0"/>
+          </a:p>
+          <a:p>
+            <a:pPr lvl="1"/>
+            <a:endParaRPr lang="en-US" dirty="0"/>
+          </a:p>
+        </p:txBody>
+      </p:sp>
+      <p:sp>
+        <p:nvSpPr>
+          <p:cNvPr id="4" name="Footer Placeholder 3">
+            <a:extLst>
+              <a:ext uri="{FF2B5EF4-FFF2-40B4-BE49-F238E27FC236}">
+                <a16:creationId xmlns:a16="http://schemas.microsoft.com/office/drawing/2014/main" id="{C401FFE3-F414-4CF5-AD6A-9C2DE5116ED4}"/>
+              </a:ext>
+            </a:extLst>
+          </p:cNvPr>
+          <p:cNvSpPr>
+            <a:spLocks noGrp="1"/>
+          </p:cNvSpPr>
+          <p:nvPr>
+            <p:ph type="ftr" sz="quarter" idx="11"/>
+          </p:nvPr>
+        </p:nvSpPr>
+        <p:spPr/>
+        <p:txBody>
+          <a:bodyPr/>
+          <a:lstStyle/>
+          <a:p>
+            <a:r>
+              <a:rPr lang="en-US">
+                <a:latin typeface="Courier New" panose="02070309020205020404" pitchFamily="49" charset="0"/>
+                <a:cs typeface="Courier New" panose="02070309020205020404" pitchFamily="49" charset="0"/>
+              </a:rPr>
+              <a:t>Team EJJ</a:t>
+            </a:r>
+            <a:endParaRPr lang="en-US" dirty="0">
+              <a:latin typeface="Courier New" panose="02070309020205020404" pitchFamily="49" charset="0"/>
+              <a:cs typeface="Courier New" panose="02070309020205020404" pitchFamily="49" charset="0"/>
+            </a:endParaRPr>
+          </a:p>
+        </p:txBody>
+      </p:sp>
+    </p:spTree>
+    <p:extLst>
+      <p:ext uri="{BB962C8B-B14F-4D97-AF65-F5344CB8AC3E}">
+        <p14:creationId xmlns:p14="http://schemas.microsoft.com/office/powerpoint/2010/main" val="1727388644"/>
+      </p:ext>
+    </p:extLst>
+  </p:cSld>
+  <p:clrMapOvr>
+    <a:masterClrMapping/>
+  </p:clrMapOvr>
+</p:sld>
+</file>
+
+<file path=ppt/slides/slide8.xml><?xml version="1.0" encoding="utf-8"?>
+<p:sld xmlns:a="http://schemas.openxmlformats.org/drawingml/2006/main" xmlns:r="http://schemas.openxmlformats.org/officeDocument/2006/relationships" xmlns:p="http://schemas.openxmlformats.org/presentationml/2006/main">
+  <p:cSld>
+    <p:spTree>
+      <p:nvGrpSpPr>
+        <p:cNvPr id="1" name=""/>
+        <p:cNvGrpSpPr/>
+        <p:nvPr/>
+      </p:nvGrpSpPr>
+      <p:grpSpPr>
+        <a:xfrm>
+          <a:off x="0" y="0"/>
+          <a:ext cx="0" cy="0"/>
+          <a:chOff x="0" y="0"/>
+          <a:chExt cx="0" cy="0"/>
+        </a:xfrm>
+      </p:grpSpPr>
+      <p:sp>
+        <p:nvSpPr>
           <p:cNvPr id="4" name="Footer Placeholder 3">
             <a:extLst>
               <a:ext uri="{FF2B5EF4-FFF2-40B4-BE49-F238E27FC236}">
@@ -6011,7 +6305,7 @@
 </p:sld>
 </file>
 
-<file path=ppt/slides/slide8.xml><?xml version="1.0" encoding="utf-8"?>
+<file path=ppt/slides/slide9.xml><?xml version="1.0" encoding="utf-8"?>
 <p:sld xmlns:a="http://schemas.openxmlformats.org/drawingml/2006/main" xmlns:r="http://schemas.openxmlformats.org/officeDocument/2006/relationships" xmlns:p="http://schemas.openxmlformats.org/presentationml/2006/main">
   <p:cSld>
     <p:spTree>
@@ -6390,117 +6684,6 @@
     <p:extLst>
       <p:ext uri="{BB962C8B-B14F-4D97-AF65-F5344CB8AC3E}">
         <p14:creationId xmlns:p14="http://schemas.microsoft.com/office/powerpoint/2010/main" val="3455397712"/>
-      </p:ext>
-    </p:extLst>
-  </p:cSld>
-  <p:clrMapOvr>
-    <a:masterClrMapping/>
-  </p:clrMapOvr>
-</p:sld>
-</file>
-
-<file path=ppt/slides/slide9.xml><?xml version="1.0" encoding="utf-8"?>
-<p:sld xmlns:a="http://schemas.openxmlformats.org/drawingml/2006/main" xmlns:r="http://schemas.openxmlformats.org/officeDocument/2006/relationships" xmlns:p="http://schemas.openxmlformats.org/presentationml/2006/main">
-  <p:cSld>
-    <p:spTree>
-      <p:nvGrpSpPr>
-        <p:cNvPr id="1" name=""/>
-        <p:cNvGrpSpPr/>
-        <p:nvPr/>
-      </p:nvGrpSpPr>
-      <p:grpSpPr>
-        <a:xfrm>
-          <a:off x="0" y="0"/>
-          <a:ext cx="0" cy="0"/>
-          <a:chOff x="0" y="0"/>
-          <a:chExt cx="0" cy="0"/>
-        </a:xfrm>
-      </p:grpSpPr>
-      <p:sp>
-        <p:nvSpPr>
-          <p:cNvPr id="2" name="Title 1">
-            <a:extLst>
-              <a:ext uri="{FF2B5EF4-FFF2-40B4-BE49-F238E27FC236}">
-                <a16:creationId xmlns:a16="http://schemas.microsoft.com/office/drawing/2014/main" id="{3FDE549A-A251-42BB-AA2B-69B6DD7BB2C5}"/>
-              </a:ext>
-            </a:extLst>
-          </p:cNvPr>
-          <p:cNvSpPr>
-            <a:spLocks noGrp="1"/>
-          </p:cNvSpPr>
-          <p:nvPr>
-            <p:ph type="title"/>
-          </p:nvPr>
-        </p:nvSpPr>
-        <p:spPr/>
-        <p:txBody>
-          <a:bodyPr/>
-          <a:lstStyle/>
-          <a:p>
-            <a:endParaRPr lang="en-US"/>
-          </a:p>
-        </p:txBody>
-      </p:sp>
-      <p:sp>
-        <p:nvSpPr>
-          <p:cNvPr id="3" name="Content Placeholder 2">
-            <a:extLst>
-              <a:ext uri="{FF2B5EF4-FFF2-40B4-BE49-F238E27FC236}">
-                <a16:creationId xmlns:a16="http://schemas.microsoft.com/office/drawing/2014/main" id="{0E6D595F-E13D-4ABB-8ECC-5F6E8C87EA26}"/>
-              </a:ext>
-            </a:extLst>
-          </p:cNvPr>
-          <p:cNvSpPr>
-            <a:spLocks noGrp="1"/>
-          </p:cNvSpPr>
-          <p:nvPr>
-            <p:ph idx="1"/>
-          </p:nvPr>
-        </p:nvSpPr>
-        <p:spPr/>
-        <p:txBody>
-          <a:bodyPr/>
-          <a:lstStyle/>
-          <a:p>
-            <a:endParaRPr lang="en-US" dirty="0"/>
-          </a:p>
-        </p:txBody>
-      </p:sp>
-      <p:sp>
-        <p:nvSpPr>
-          <p:cNvPr id="4" name="Footer Placeholder 3">
-            <a:extLst>
-              <a:ext uri="{FF2B5EF4-FFF2-40B4-BE49-F238E27FC236}">
-                <a16:creationId xmlns:a16="http://schemas.microsoft.com/office/drawing/2014/main" id="{479F8E9C-951C-4182-A6D4-D3B4901AC6E9}"/>
-              </a:ext>
-            </a:extLst>
-          </p:cNvPr>
-          <p:cNvSpPr>
-            <a:spLocks noGrp="1"/>
-          </p:cNvSpPr>
-          <p:nvPr>
-            <p:ph type="ftr" sz="quarter" idx="11"/>
-          </p:nvPr>
-        </p:nvSpPr>
-        <p:spPr/>
-        <p:txBody>
-          <a:bodyPr/>
-          <a:lstStyle/>
-          <a:p>
-            <a:r>
-              <a:rPr lang="en-US" dirty="0">
-                <a:latin typeface="Courier New" panose="02070309020205020404" pitchFamily="49" charset="0"/>
-                <a:cs typeface="Courier New" panose="02070309020205020404" pitchFamily="49" charset="0"/>
-              </a:rPr>
-              <a:t>Team EJJ</a:t>
-            </a:r>
-          </a:p>
-        </p:txBody>
-      </p:sp>
-    </p:spTree>
-    <p:extLst>
-      <p:ext uri="{BB962C8B-B14F-4D97-AF65-F5344CB8AC3E}">
-        <p14:creationId xmlns:p14="http://schemas.microsoft.com/office/powerpoint/2010/main" val="2140977605"/>
       </p:ext>
     </p:extLst>
   </p:cSld>

</xml_diff>

<commit_message>
Starting to toast.  Fixed build when importing
</commit_message>
<xml_diff>
--- a/TeamEJJ.pptx
+++ b/TeamEJJ.pptx
@@ -6055,15 +6055,7 @@
           <a:p>
             <a:r>
               <a:rPr lang="en-US" dirty="0"/>
-              <a:t>Mission </a:t>
-            </a:r>
-            <a:r>
-              <a:rPr lang="en-US"/>
-              <a:t>Planning </a:t>
-            </a:r>
-            <a:r>
-              <a:rPr lang="en-US" dirty="0"/>
-              <a:t>	</a:t>
+              <a:t>Mission Planning 	</a:t>
             </a:r>
           </a:p>
         </p:txBody>

</xml_diff>

<commit_message>
updated ppt and added in pilot mission flight number constraint
</commit_message>
<xml_diff>
--- a/TeamEJJ.pptx
+++ b/TeamEJJ.pptx
@@ -168,7 +168,7 @@
           <p:cNvPr id="2" name="Header Placeholder 1">
             <a:extLst>
               <a:ext uri="{FF2B5EF4-FFF2-40B4-BE49-F238E27FC236}">
-                <a16:creationId xmlns:a16="http://schemas.microsoft.com/office/drawing/2014/main" xmlns="" id="{4958D19B-78E4-413E-BC66-293646D7CD75}"/>
+                <a16:creationId xmlns="" xmlns:a16="http://schemas.microsoft.com/office/drawing/2014/main" id="{4958D19B-78E4-413E-BC66-293646D7CD75}"/>
               </a:ext>
             </a:extLst>
           </p:cNvPr>
@@ -205,7 +205,7 @@
           <p:cNvPr id="3" name="Date Placeholder 2">
             <a:extLst>
               <a:ext uri="{FF2B5EF4-FFF2-40B4-BE49-F238E27FC236}">
-                <a16:creationId xmlns:a16="http://schemas.microsoft.com/office/drawing/2014/main" xmlns="" id="{0969C5F0-82EE-47A5-8B10-9CE8E0B7BD22}"/>
+                <a16:creationId xmlns="" xmlns:a16="http://schemas.microsoft.com/office/drawing/2014/main" id="{0969C5F0-82EE-47A5-8B10-9CE8E0B7BD22}"/>
               </a:ext>
             </a:extLst>
           </p:cNvPr>
@@ -235,7 +235,7 @@
           <a:p>
             <a:fld id="{43711186-8B14-4681-A637-AA132258072E}" type="datetimeFigureOut">
               <a:rPr lang="en-US" smtClean="0"/>
-              <a:t>10/26/2021</a:t>
+              <a:t>10/27/2021</a:t>
             </a:fld>
             <a:endParaRPr lang="en-US"/>
           </a:p>
@@ -246,7 +246,7 @@
           <p:cNvPr id="4" name="Footer Placeholder 3">
             <a:extLst>
               <a:ext uri="{FF2B5EF4-FFF2-40B4-BE49-F238E27FC236}">
-                <a16:creationId xmlns:a16="http://schemas.microsoft.com/office/drawing/2014/main" xmlns="" id="{CD4B4307-B935-42D7-8F93-99E51A1CF54D}"/>
+                <a16:creationId xmlns="" xmlns:a16="http://schemas.microsoft.com/office/drawing/2014/main" id="{CD4B4307-B935-42D7-8F93-99E51A1CF54D}"/>
               </a:ext>
             </a:extLst>
           </p:cNvPr>
@@ -283,7 +283,7 @@
           <p:cNvPr id="5" name="Slide Number Placeholder 4">
             <a:extLst>
               <a:ext uri="{FF2B5EF4-FFF2-40B4-BE49-F238E27FC236}">
-                <a16:creationId xmlns:a16="http://schemas.microsoft.com/office/drawing/2014/main" xmlns="" id="{A9A5BBCE-64A3-4221-B231-485756321F03}"/>
+                <a16:creationId xmlns="" xmlns:a16="http://schemas.microsoft.com/office/drawing/2014/main" id="{A9A5BBCE-64A3-4221-B231-485756321F03}"/>
               </a:ext>
             </a:extLst>
           </p:cNvPr>
@@ -412,7 +412,7 @@
           <a:p>
             <a:fld id="{99DC0056-C103-4B33-8E11-3CD948A15D15}" type="datetimeFigureOut">
               <a:rPr lang="en-US" smtClean="0"/>
-              <a:t>10/26/2021</a:t>
+              <a:t>10/27/2021</a:t>
             </a:fld>
             <a:endParaRPr lang="en-US"/>
           </a:p>
@@ -810,7 +810,7 @@
           <a:p>
             <a:fld id="{F0715040-4006-4B81-8E7B-98276F4064AC}" type="datetime1">
               <a:rPr lang="en-US" smtClean="0"/>
-              <a:t>10/26/2021</a:t>
+              <a:t>10/27/2021</a:t>
             </a:fld>
             <a:endParaRPr lang="en-US"/>
           </a:p>
@@ -983,7 +983,7 @@
           <a:p>
             <a:fld id="{1D5F618A-0BD2-4BB4-99EA-CFB1AAE03AA9}" type="datetime1">
               <a:rPr lang="en-US" smtClean="0"/>
-              <a:t>10/26/2021</a:t>
+              <a:t>10/27/2021</a:t>
             </a:fld>
             <a:endParaRPr lang="en-US"/>
           </a:p>
@@ -1166,7 +1166,7 @@
           <a:p>
             <a:fld id="{100A5BE7-7F58-4107-8ADC-D927EA1D52A7}" type="datetime1">
               <a:rPr lang="en-US" smtClean="0"/>
-              <a:t>10/26/2021</a:t>
+              <a:t>10/27/2021</a:t>
             </a:fld>
             <a:endParaRPr lang="en-US"/>
           </a:p>
@@ -1339,7 +1339,7 @@
           <a:p>
             <a:fld id="{79D8393E-8AF1-4411-9688-0598DD3997B2}" type="datetime1">
               <a:rPr lang="en-US" smtClean="0"/>
-              <a:t>10/26/2021</a:t>
+              <a:t>10/27/2021</a:t>
             </a:fld>
             <a:endParaRPr lang="en-US"/>
           </a:p>
@@ -1591,7 +1591,7 @@
           <a:p>
             <a:fld id="{4494A84D-3866-4936-BBE1-CBE8033237A1}" type="datetime1">
               <a:rPr lang="en-US" smtClean="0"/>
-              <a:t>10/26/2021</a:t>
+              <a:t>10/27/2021</a:t>
             </a:fld>
             <a:endParaRPr lang="en-US"/>
           </a:p>
@@ -1826,7 +1826,7 @@
           <a:p>
             <a:fld id="{42EB40C8-0DE5-4916-914B-DE2D9D0DC05C}" type="datetime1">
               <a:rPr lang="en-US" smtClean="0"/>
-              <a:t>10/26/2021</a:t>
+              <a:t>10/27/2021</a:t>
             </a:fld>
             <a:endParaRPr lang="en-US"/>
           </a:p>
@@ -2196,7 +2196,7 @@
           <a:p>
             <a:fld id="{5AD917D3-0AC6-4233-B19C-676F66E35DF8}" type="datetime1">
               <a:rPr lang="en-US" smtClean="0"/>
-              <a:t>10/26/2021</a:t>
+              <a:t>10/27/2021</a:t>
             </a:fld>
             <a:endParaRPr lang="en-US"/>
           </a:p>
@@ -2317,7 +2317,7 @@
           <a:p>
             <a:fld id="{BF6DD421-6F06-402A-9506-A9FC723F6691}" type="datetime1">
               <a:rPr lang="en-US" smtClean="0"/>
-              <a:t>10/26/2021</a:t>
+              <a:t>10/27/2021</a:t>
             </a:fld>
             <a:endParaRPr lang="en-US"/>
           </a:p>
@@ -2415,7 +2415,7 @@
           <a:p>
             <a:fld id="{401633C5-CC45-438A-9A97-49500611ADB4}" type="datetime1">
               <a:rPr lang="en-US" smtClean="0"/>
-              <a:t>10/26/2021</a:t>
+              <a:t>10/27/2021</a:t>
             </a:fld>
             <a:endParaRPr lang="en-US"/>
           </a:p>
@@ -2695,7 +2695,7 @@
           <a:p>
             <a:fld id="{A55CBFFA-D9FC-4C62-8D59-B905B682E156}" type="datetime1">
               <a:rPr lang="en-US" smtClean="0"/>
-              <a:t>10/26/2021</a:t>
+              <a:t>10/27/2021</a:t>
             </a:fld>
             <a:endParaRPr lang="en-US"/>
           </a:p>
@@ -2955,7 +2955,7 @@
           <a:p>
             <a:fld id="{AB188B3F-697A-499E-B335-ABB5D5A4EFC7}" type="datetime1">
               <a:rPr lang="en-US" smtClean="0"/>
-              <a:t>10/26/2021</a:t>
+              <a:t>10/27/2021</a:t>
             </a:fld>
             <a:endParaRPr lang="en-US"/>
           </a:p>
@@ -3171,7 +3171,7 @@
           <a:p>
             <a:fld id="{5FA30516-2700-45A6-8956-A98456AA1844}" type="datetime1">
               <a:rPr lang="en-US" smtClean="0"/>
-              <a:t>10/26/2021</a:t>
+              <a:t>10/27/2021</a:t>
             </a:fld>
             <a:endParaRPr lang="en-US"/>
           </a:p>
@@ -3585,7 +3585,7 @@
           <p:cNvPr id="2" name="Title 1">
             <a:extLst>
               <a:ext uri="{FF2B5EF4-FFF2-40B4-BE49-F238E27FC236}">
-                <a16:creationId xmlns:a16="http://schemas.microsoft.com/office/drawing/2014/main" xmlns="" id="{BA01E277-331D-47A2-8EA1-4BF83C281FCD}"/>
+                <a16:creationId xmlns="" xmlns:a16="http://schemas.microsoft.com/office/drawing/2014/main" id="{BA01E277-331D-47A2-8EA1-4BF83C281FCD}"/>
               </a:ext>
             </a:extLst>
           </p:cNvPr>
@@ -3655,7 +3655,7 @@
           <p:cNvPr id="5" name="Footer Placeholder 4">
             <a:extLst>
               <a:ext uri="{FF2B5EF4-FFF2-40B4-BE49-F238E27FC236}">
-                <a16:creationId xmlns:a16="http://schemas.microsoft.com/office/drawing/2014/main" xmlns="" id="{25C38D51-E1A2-4B23-AFC5-FC39CBEE7E5B}"/>
+                <a16:creationId xmlns="" xmlns:a16="http://schemas.microsoft.com/office/drawing/2014/main" id="{25C38D51-E1A2-4B23-AFC5-FC39CBEE7E5B}"/>
               </a:ext>
             </a:extLst>
           </p:cNvPr>
@@ -3686,7 +3686,7 @@
           <p:cNvPr id="1030" name="Picture 6" descr="Gypsy Curse">
             <a:extLst>
               <a:ext uri="{FF2B5EF4-FFF2-40B4-BE49-F238E27FC236}">
-                <a16:creationId xmlns:a16="http://schemas.microsoft.com/office/drawing/2014/main" xmlns="" id="{B8F9B0D6-6EDF-434B-B198-FE7ED42FDBD8}"/>
+                <a16:creationId xmlns="" xmlns:a16="http://schemas.microsoft.com/office/drawing/2014/main" id="{B8F9B0D6-6EDF-434B-B198-FE7ED42FDBD8}"/>
               </a:ext>
             </a:extLst>
           </p:cNvPr>
@@ -3763,7 +3763,7 @@
           <p:cNvPr id="2" name="Title 1">
             <a:extLst>
               <a:ext uri="{FF2B5EF4-FFF2-40B4-BE49-F238E27FC236}">
-                <a16:creationId xmlns:a16="http://schemas.microsoft.com/office/drawing/2014/main" xmlns="" id="{E29B01D6-A7CA-4A3E-9C66-C2AA33322F12}"/>
+                <a16:creationId xmlns="" xmlns:a16="http://schemas.microsoft.com/office/drawing/2014/main" id="{E29B01D6-A7CA-4A3E-9C66-C2AA33322F12}"/>
               </a:ext>
             </a:extLst>
           </p:cNvPr>
@@ -3780,8 +3780,8 @@
           <a:lstStyle/>
           <a:p>
             <a:r>
-              <a:rPr lang="en-US" dirty="0"/>
-              <a:t>Mission </a:t>
+              <a:rPr lang="en-US" dirty="0" smtClean="0"/>
+              <a:t>EJJ Mission </a:t>
             </a:r>
             <a:r>
               <a:rPr lang="en-US" dirty="0" smtClean="0"/>
@@ -3799,7 +3799,7 @@
           <p:cNvPr id="3" name="Content Placeholder 2">
             <a:extLst>
               <a:ext uri="{FF2B5EF4-FFF2-40B4-BE49-F238E27FC236}">
-                <a16:creationId xmlns:a16="http://schemas.microsoft.com/office/drawing/2014/main" xmlns="" id="{F1842140-4ACB-41A9-BC7F-30570259E5D8}"/>
+                <a16:creationId xmlns="" xmlns:a16="http://schemas.microsoft.com/office/drawing/2014/main" id="{F1842140-4ACB-41A9-BC7F-30570259E5D8}"/>
               </a:ext>
             </a:extLst>
           </p:cNvPr>
@@ -3939,7 +3939,7 @@
           <p:cNvPr id="4" name="Footer Placeholder 3">
             <a:extLst>
               <a:ext uri="{FF2B5EF4-FFF2-40B4-BE49-F238E27FC236}">
-                <a16:creationId xmlns:a16="http://schemas.microsoft.com/office/drawing/2014/main" xmlns="" id="{C401FFE3-F414-4CF5-AD6A-9C2DE5116ED4}"/>
+                <a16:creationId xmlns="" xmlns:a16="http://schemas.microsoft.com/office/drawing/2014/main" id="{C401FFE3-F414-4CF5-AD6A-9C2DE5116ED4}"/>
               </a:ext>
             </a:extLst>
           </p:cNvPr>
@@ -4016,7 +4016,11 @@
           <a:p>
             <a:r>
               <a:rPr lang="en-US" dirty="0" smtClean="0"/>
-              <a:t>Web Page (1)</a:t>
+              <a:t>EJJ Web </a:t>
+            </a:r>
+            <a:r>
+              <a:rPr lang="en-US" dirty="0" smtClean="0"/>
+              <a:t>Page (1)</a:t>
             </a:r>
             <a:endParaRPr lang="en-US" dirty="0"/>
           </a:p>
@@ -4124,7 +4128,11 @@
           <a:p>
             <a:r>
               <a:rPr lang="en-US" dirty="0" smtClean="0"/>
-              <a:t>Web Page (2)</a:t>
+              <a:t>EJJ Web </a:t>
+            </a:r>
+            <a:r>
+              <a:rPr lang="en-US" dirty="0" smtClean="0"/>
+              <a:t>Page (2)</a:t>
             </a:r>
             <a:endParaRPr lang="en-US" dirty="0"/>
           </a:p>
@@ -4255,7 +4263,7 @@
       </p:grpSpPr>
       <p:pic>
         <p:nvPicPr>
-          <p:cNvPr id="7" name="Content Placeholder 6"/>
+          <p:cNvPr id="11" name="Content Placeholder 10"/>
           <p:cNvPicPr>
             <a:picLocks noGrp="1" noChangeAspect="1"/>
           </p:cNvPicPr>
@@ -4271,8 +4279,8 @@
         </p:blipFill>
         <p:spPr>
           <a:xfrm>
-            <a:off x="1852368" y="1825625"/>
-            <a:ext cx="8487263" cy="4351338"/>
+            <a:off x="307690" y="1709556"/>
+            <a:ext cx="8284780" cy="4351338"/>
           </a:xfrm>
           <a:prstGeom prst="rect">
             <a:avLst/>
@@ -4296,7 +4304,7 @@
           <a:p>
             <a:r>
               <a:rPr lang="en-US" dirty="0" smtClean="0"/>
-              <a:t>Example Timeline</a:t>
+              <a:t>EJJ Example Schedule Output</a:t>
             </a:r>
             <a:endParaRPr lang="en-US" dirty="0"/>
           </a:p>
@@ -4331,41 +4339,1183 @@
           </a:p>
         </p:txBody>
       </p:sp>
-      <p:sp>
-        <p:nvSpPr>
-          <p:cNvPr id="3" name="TextBox 2"/>
-          <p:cNvSpPr txBox="1"/>
+      <p:pic>
+        <p:nvPicPr>
+          <p:cNvPr id="8" name="Picture 7"/>
+          <p:cNvPicPr>
+            <a:picLocks noChangeAspect="1"/>
+          </p:cNvPicPr>
           <p:nvPr/>
-        </p:nvSpPr>
+        </p:nvPicPr>
+        <p:blipFill>
+          <a:blip r:embed="rId3"/>
+          <a:stretch>
+            <a:fillRect/>
+          </a:stretch>
+        </p:blipFill>
         <p:spPr>
           <a:xfrm>
-            <a:off x="5111261" y="3339574"/>
-            <a:ext cx="3423139" cy="707886"/>
+            <a:off x="4524375" y="5062130"/>
+            <a:ext cx="1571625" cy="857250"/>
           </a:xfrm>
           <a:prstGeom prst="rect">
             <a:avLst/>
           </a:prstGeom>
-          <a:noFill/>
         </p:spPr>
-        <p:txBody>
-          <a:bodyPr wrap="square" rtlCol="0">
+      </p:pic>
+      <p:sp>
+        <p:nvSpPr>
+          <p:cNvPr id="13" name="Rectangle 12"/>
+          <p:cNvSpPr/>
+          <p:nvPr/>
+        </p:nvSpPr>
+        <p:spPr>
+          <a:xfrm>
+            <a:off x="10312685" y="1782800"/>
+            <a:ext cx="1622683" cy="4278094"/>
+          </a:xfrm>
+          <a:prstGeom prst="rect">
+            <a:avLst/>
+          </a:prstGeom>
+          <a:solidFill>
+            <a:schemeClr val="bg1"/>
+          </a:solidFill>
+          <a:ln w="38100">
+            <a:solidFill>
+              <a:srgbClr val="00B050"/>
+            </a:solidFill>
+          </a:ln>
+        </p:spPr>
+        <p:txBody>
+          <a:bodyPr wrap="square">
             <a:spAutoFit/>
           </a:bodyPr>
           <a:lstStyle/>
           <a:p>
             <a:r>
-              <a:rPr lang="en-US" sz="4000" dirty="0" smtClean="0">
-                <a:solidFill>
-                  <a:srgbClr val="FF0000"/>
-                </a:solidFill>
-              </a:rPr>
-              <a:t>Need legend</a:t>
-            </a:r>
-            <a:endParaRPr lang="en-US" sz="4000" dirty="0">
+              <a:rPr lang="en-US" sz="800" dirty="0" smtClean="0">
+                <a:solidFill>
+                  <a:srgbClr val="7030A0"/>
+                </a:solidFill>
+              </a:rPr>
+              <a:t>Sortie 4 </a:t>
+            </a:r>
+            <a:r>
+              <a:rPr lang="en-US" sz="800" dirty="0">
+                <a:solidFill>
+                  <a:srgbClr val="7030A0"/>
+                </a:solidFill>
+              </a:rPr>
+              <a:t>for Target: 3</a:t>
+            </a:r>
+          </a:p>
+          <a:p>
+            <a:r>
+              <a:rPr lang="en-US" sz="800" dirty="0">
+                <a:solidFill>
+                  <a:srgbClr val="7030A0"/>
+                </a:solidFill>
+              </a:rPr>
+              <a:t>Mission Start Time (</a:t>
+            </a:r>
+            <a:r>
+              <a:rPr lang="en-US" sz="800" dirty="0" err="1">
+                <a:solidFill>
+                  <a:srgbClr val="7030A0"/>
+                </a:solidFill>
+              </a:rPr>
+              <a:t>hrs</a:t>
+            </a:r>
+            <a:r>
+              <a:rPr lang="en-US" sz="800" dirty="0">
+                <a:solidFill>
+                  <a:srgbClr val="7030A0"/>
+                </a:solidFill>
+              </a:rPr>
+              <a:t>): 19</a:t>
+            </a:r>
+          </a:p>
+          <a:p>
+            <a:r>
+              <a:rPr lang="en-US" sz="800" dirty="0">
+                <a:solidFill>
+                  <a:srgbClr val="7030A0"/>
+                </a:solidFill>
+              </a:rPr>
+              <a:t>Carrier Chosen: 2</a:t>
+            </a:r>
+          </a:p>
+          <a:p>
+            <a:r>
+              <a:rPr lang="en-US" sz="800" dirty="0">
+                <a:solidFill>
+                  <a:srgbClr val="7030A0"/>
+                </a:solidFill>
+              </a:rPr>
+              <a:t>Jets Chosen: 14, 15, 16</a:t>
+            </a:r>
+          </a:p>
+          <a:p>
+            <a:r>
+              <a:rPr lang="en-US" sz="800" dirty="0" err="1">
+                <a:solidFill>
+                  <a:srgbClr val="7030A0"/>
+                </a:solidFill>
+              </a:rPr>
+              <a:t>Helo</a:t>
+            </a:r>
+            <a:r>
+              <a:rPr lang="en-US" sz="800" dirty="0">
+                <a:solidFill>
+                  <a:srgbClr val="7030A0"/>
+                </a:solidFill>
+              </a:rPr>
+              <a:t> Chosen: 4</a:t>
+            </a:r>
+          </a:p>
+          <a:p>
+            <a:r>
+              <a:rPr lang="en-US" sz="800" dirty="0">
+                <a:solidFill>
+                  <a:srgbClr val="7030A0"/>
+                </a:solidFill>
+              </a:rPr>
+              <a:t>Pilots Chosen: 17, 18</a:t>
+            </a:r>
+          </a:p>
+          <a:p>
+            <a:r>
+              <a:rPr lang="en-US" sz="800" dirty="0">
+                <a:solidFill>
+                  <a:srgbClr val="7030A0"/>
+                </a:solidFill>
+              </a:rPr>
+              <a:t>Number of Missiles Chosen: 3</a:t>
+            </a:r>
+          </a:p>
+          <a:p>
+            <a:r>
+              <a:rPr lang="en-US" sz="800" dirty="0">
+                <a:solidFill>
+                  <a:srgbClr val="7030A0"/>
+                </a:solidFill>
+              </a:rPr>
+              <a:t>Missiles Chosen: 10, 11, 12</a:t>
+            </a:r>
+          </a:p>
+          <a:p>
+            <a:r>
+              <a:rPr lang="en-US" sz="800" dirty="0">
+                <a:solidFill>
+                  <a:srgbClr val="7030A0"/>
+                </a:solidFill>
+              </a:rPr>
+              <a:t>Number of Missiles Needed: 3</a:t>
+            </a:r>
+          </a:p>
+          <a:p>
+            <a:r>
+              <a:rPr lang="en-US" sz="800" dirty="0">
+                <a:solidFill>
+                  <a:srgbClr val="7030A0"/>
+                </a:solidFill>
+              </a:rPr>
+              <a:t>Number of Missiles Remaining: 6</a:t>
+            </a:r>
+          </a:p>
+          <a:p>
+            <a:r>
+              <a:rPr lang="en-US" sz="800" dirty="0">
+                <a:solidFill>
+                  <a:srgbClr val="7030A0"/>
+                </a:solidFill>
+              </a:rPr>
+              <a:t>Jet 14 is killed!!!</a:t>
+            </a:r>
+          </a:p>
+          <a:p>
+            <a:r>
+              <a:rPr lang="en-US" sz="800" dirty="0">
+                <a:solidFill>
+                  <a:srgbClr val="7030A0"/>
+                </a:solidFill>
+              </a:rPr>
+              <a:t>Pilot 17 is killed!!!</a:t>
+            </a:r>
+          </a:p>
+          <a:p>
+            <a:endParaRPr lang="en-US" sz="800" dirty="0">
               <a:solidFill>
-                <a:srgbClr val="FF0000"/>
+                <a:srgbClr val="7030A0"/>
               </a:solidFill>
             </a:endParaRPr>
+          </a:p>
+          <a:p>
+            <a:r>
+              <a:rPr lang="en-US" sz="800" dirty="0">
+                <a:solidFill>
+                  <a:srgbClr val="7030A0"/>
+                </a:solidFill>
+              </a:rPr>
+              <a:t>Sortie </a:t>
+            </a:r>
+            <a:r>
+              <a:rPr lang="en-US" sz="800" dirty="0" smtClean="0">
+                <a:solidFill>
+                  <a:srgbClr val="7030A0"/>
+                </a:solidFill>
+              </a:rPr>
+              <a:t>5 for </a:t>
+            </a:r>
+            <a:r>
+              <a:rPr lang="en-US" sz="800" dirty="0">
+                <a:solidFill>
+                  <a:srgbClr val="7030A0"/>
+                </a:solidFill>
+              </a:rPr>
+              <a:t>Target: 1</a:t>
+            </a:r>
+          </a:p>
+          <a:p>
+            <a:r>
+              <a:rPr lang="en-US" sz="800" dirty="0">
+                <a:solidFill>
+                  <a:srgbClr val="7030A0"/>
+                </a:solidFill>
+              </a:rPr>
+              <a:t>Mission Start Time (</a:t>
+            </a:r>
+            <a:r>
+              <a:rPr lang="en-US" sz="800" dirty="0" err="1">
+                <a:solidFill>
+                  <a:srgbClr val="7030A0"/>
+                </a:solidFill>
+              </a:rPr>
+              <a:t>hrs</a:t>
+            </a:r>
+            <a:r>
+              <a:rPr lang="en-US" sz="800" dirty="0">
+                <a:solidFill>
+                  <a:srgbClr val="7030A0"/>
+                </a:solidFill>
+              </a:rPr>
+              <a:t>): 28</a:t>
+            </a:r>
+          </a:p>
+          <a:p>
+            <a:r>
+              <a:rPr lang="en-US" sz="800" dirty="0">
+                <a:solidFill>
+                  <a:srgbClr val="7030A0"/>
+                </a:solidFill>
+              </a:rPr>
+              <a:t>Carrier Chosen: 1</a:t>
+            </a:r>
+          </a:p>
+          <a:p>
+            <a:r>
+              <a:rPr lang="en-US" sz="800" dirty="0">
+                <a:solidFill>
+                  <a:srgbClr val="7030A0"/>
+                </a:solidFill>
+              </a:rPr>
+              <a:t>Jets Chosen: 2, 3</a:t>
+            </a:r>
+          </a:p>
+          <a:p>
+            <a:r>
+              <a:rPr lang="en-US" sz="800" dirty="0" err="1">
+                <a:solidFill>
+                  <a:srgbClr val="7030A0"/>
+                </a:solidFill>
+              </a:rPr>
+              <a:t>Helo</a:t>
+            </a:r>
+            <a:r>
+              <a:rPr lang="en-US" sz="800" dirty="0">
+                <a:solidFill>
+                  <a:srgbClr val="7030A0"/>
+                </a:solidFill>
+              </a:rPr>
+              <a:t> Chosen: 2</a:t>
+            </a:r>
+          </a:p>
+          <a:p>
+            <a:r>
+              <a:rPr lang="en-US" sz="800" dirty="0">
+                <a:solidFill>
+                  <a:srgbClr val="7030A0"/>
+                </a:solidFill>
+              </a:rPr>
+              <a:t>Pilots Chosen: 1, 3</a:t>
+            </a:r>
+          </a:p>
+          <a:p>
+            <a:r>
+              <a:rPr lang="en-US" sz="800" dirty="0">
+                <a:solidFill>
+                  <a:srgbClr val="7030A0"/>
+                </a:solidFill>
+              </a:rPr>
+              <a:t>Number of Missiles Chosen: 2</a:t>
+            </a:r>
+          </a:p>
+          <a:p>
+            <a:r>
+              <a:rPr lang="en-US" sz="800" dirty="0">
+                <a:solidFill>
+                  <a:srgbClr val="7030A0"/>
+                </a:solidFill>
+              </a:rPr>
+              <a:t>Missiles Chosen: 4, 5</a:t>
+            </a:r>
+          </a:p>
+          <a:p>
+            <a:r>
+              <a:rPr lang="en-US" sz="800" dirty="0">
+                <a:solidFill>
+                  <a:srgbClr val="7030A0"/>
+                </a:solidFill>
+              </a:rPr>
+              <a:t>Number of Missiles Needed: 2</a:t>
+            </a:r>
+          </a:p>
+          <a:p>
+            <a:r>
+              <a:rPr lang="en-US" sz="800" dirty="0">
+                <a:solidFill>
+                  <a:srgbClr val="7030A0"/>
+                </a:solidFill>
+              </a:rPr>
+              <a:t>Number of Missiles Remaining: 4</a:t>
+            </a:r>
+          </a:p>
+          <a:p>
+            <a:endParaRPr lang="en-US" sz="800" dirty="0">
+              <a:solidFill>
+                <a:srgbClr val="7030A0"/>
+              </a:solidFill>
+            </a:endParaRPr>
+          </a:p>
+          <a:p>
+            <a:r>
+              <a:rPr lang="en-US" sz="800" dirty="0">
+                <a:solidFill>
+                  <a:srgbClr val="7030A0"/>
+                </a:solidFill>
+              </a:rPr>
+              <a:t>Sortie </a:t>
+            </a:r>
+            <a:r>
+              <a:rPr lang="en-US" sz="800" dirty="0" smtClean="0">
+                <a:solidFill>
+                  <a:srgbClr val="7030A0"/>
+                </a:solidFill>
+              </a:rPr>
+              <a:t>6 for </a:t>
+            </a:r>
+            <a:r>
+              <a:rPr lang="en-US" sz="800" dirty="0">
+                <a:solidFill>
+                  <a:srgbClr val="7030A0"/>
+                </a:solidFill>
+              </a:rPr>
+              <a:t>Target: 2</a:t>
+            </a:r>
+          </a:p>
+          <a:p>
+            <a:r>
+              <a:rPr lang="en-US" sz="800" dirty="0">
+                <a:solidFill>
+                  <a:srgbClr val="7030A0"/>
+                </a:solidFill>
+              </a:rPr>
+              <a:t>Mission Start Time (</a:t>
+            </a:r>
+            <a:r>
+              <a:rPr lang="en-US" sz="800" dirty="0" err="1">
+                <a:solidFill>
+                  <a:srgbClr val="7030A0"/>
+                </a:solidFill>
+              </a:rPr>
+              <a:t>hrs</a:t>
+            </a:r>
+            <a:r>
+              <a:rPr lang="en-US" sz="800" dirty="0">
+                <a:solidFill>
+                  <a:srgbClr val="7030A0"/>
+                </a:solidFill>
+              </a:rPr>
+              <a:t>): 51</a:t>
+            </a:r>
+          </a:p>
+          <a:p>
+            <a:r>
+              <a:rPr lang="en-US" sz="800" dirty="0">
+                <a:solidFill>
+                  <a:srgbClr val="7030A0"/>
+                </a:solidFill>
+              </a:rPr>
+              <a:t>Carrier Chosen: 2</a:t>
+            </a:r>
+          </a:p>
+          <a:p>
+            <a:r>
+              <a:rPr lang="en-US" sz="800" dirty="0">
+                <a:solidFill>
+                  <a:srgbClr val="7030A0"/>
+                </a:solidFill>
+              </a:rPr>
+              <a:t>Jets Chosen: 12, 13, 15</a:t>
+            </a:r>
+          </a:p>
+          <a:p>
+            <a:r>
+              <a:rPr lang="en-US" sz="800" dirty="0" err="1">
+                <a:solidFill>
+                  <a:srgbClr val="7030A0"/>
+                </a:solidFill>
+              </a:rPr>
+              <a:t>Helo</a:t>
+            </a:r>
+            <a:r>
+              <a:rPr lang="en-US" sz="800" dirty="0">
+                <a:solidFill>
+                  <a:srgbClr val="7030A0"/>
+                </a:solidFill>
+              </a:rPr>
+              <a:t> Chosen: 3</a:t>
+            </a:r>
+          </a:p>
+          <a:p>
+            <a:r>
+              <a:rPr lang="en-US" sz="800" dirty="0">
+                <a:solidFill>
+                  <a:srgbClr val="7030A0"/>
+                </a:solidFill>
+              </a:rPr>
+              <a:t>Pilots Chosen: 19, 20</a:t>
+            </a:r>
+          </a:p>
+          <a:p>
+            <a:r>
+              <a:rPr lang="en-US" sz="800" dirty="0">
+                <a:solidFill>
+                  <a:srgbClr val="7030A0"/>
+                </a:solidFill>
+              </a:rPr>
+              <a:t>Number of Missiles Chosen: 3</a:t>
+            </a:r>
+          </a:p>
+          <a:p>
+            <a:r>
+              <a:rPr lang="en-US" sz="800" dirty="0">
+                <a:solidFill>
+                  <a:srgbClr val="7030A0"/>
+                </a:solidFill>
+              </a:rPr>
+              <a:t>Missiles Chosen: 13, 6, 7</a:t>
+            </a:r>
+          </a:p>
+          <a:p>
+            <a:r>
+              <a:rPr lang="en-US" sz="800" dirty="0">
+                <a:solidFill>
+                  <a:srgbClr val="7030A0"/>
+                </a:solidFill>
+              </a:rPr>
+              <a:t>Number of Missiles Needed: 3</a:t>
+            </a:r>
+          </a:p>
+          <a:p>
+            <a:r>
+              <a:rPr lang="en-US" sz="800" dirty="0">
+                <a:solidFill>
+                  <a:srgbClr val="7030A0"/>
+                </a:solidFill>
+              </a:rPr>
+              <a:t>Number of Missiles Remaining: </a:t>
+            </a:r>
+            <a:r>
+              <a:rPr lang="en-US" sz="800" dirty="0" smtClean="0">
+                <a:solidFill>
+                  <a:srgbClr val="7030A0"/>
+                </a:solidFill>
+              </a:rPr>
+              <a:t>1</a:t>
+            </a:r>
+            <a:endParaRPr lang="en-US" sz="800" dirty="0">
+              <a:solidFill>
+                <a:srgbClr val="7030A0"/>
+              </a:solidFill>
+            </a:endParaRPr>
+          </a:p>
+        </p:txBody>
+      </p:sp>
+      <p:sp>
+        <p:nvSpPr>
+          <p:cNvPr id="14" name="Rectangle 13"/>
+          <p:cNvSpPr/>
+          <p:nvPr/>
+        </p:nvSpPr>
+        <p:spPr>
+          <a:xfrm>
+            <a:off x="8727726" y="767358"/>
+            <a:ext cx="3207642" cy="923330"/>
+          </a:xfrm>
+          <a:prstGeom prst="rect">
+            <a:avLst/>
+          </a:prstGeom>
+          <a:solidFill>
+            <a:schemeClr val="bg1"/>
+          </a:solidFill>
+          <a:ln w="38100">
+            <a:solidFill>
+              <a:srgbClr val="00B050"/>
+            </a:solidFill>
+          </a:ln>
+        </p:spPr>
+        <p:txBody>
+          <a:bodyPr wrap="square">
+            <a:spAutoFit/>
+          </a:bodyPr>
+          <a:lstStyle/>
+          <a:p>
+            <a:r>
+              <a:rPr lang="en-US" sz="900" dirty="0">
+                <a:solidFill>
+                  <a:srgbClr val="7030A0"/>
+                </a:solidFill>
+              </a:rPr>
+              <a:t>Target Strike Order: 5  6  4  3  1  2</a:t>
+            </a:r>
+          </a:p>
+          <a:p>
+            <a:r>
+              <a:rPr lang="en-US" sz="900" dirty="0" err="1" smtClean="0">
+                <a:solidFill>
+                  <a:srgbClr val="7030A0"/>
+                </a:solidFill>
+              </a:rPr>
+              <a:t>Num</a:t>
+            </a:r>
+            <a:r>
+              <a:rPr lang="en-US" sz="900" dirty="0" smtClean="0">
+                <a:solidFill>
+                  <a:srgbClr val="7030A0"/>
+                </a:solidFill>
+              </a:rPr>
+              <a:t> </a:t>
+            </a:r>
+            <a:r>
+              <a:rPr lang="en-US" sz="900" dirty="0">
+                <a:solidFill>
+                  <a:srgbClr val="7030A0"/>
+                </a:solidFill>
+              </a:rPr>
+              <a:t>Missiles Needed for 90% Success Disabling Target: 3</a:t>
+            </a:r>
+          </a:p>
+          <a:p>
+            <a:r>
+              <a:rPr lang="en-US" sz="900" dirty="0" err="1">
+                <a:solidFill>
+                  <a:srgbClr val="7030A0"/>
+                </a:solidFill>
+              </a:rPr>
+              <a:t>Num</a:t>
+            </a:r>
+            <a:r>
+              <a:rPr lang="en-US" sz="900" dirty="0">
+                <a:solidFill>
+                  <a:srgbClr val="7030A0"/>
+                </a:solidFill>
+              </a:rPr>
+              <a:t> Missiles Needed for 90% Success Destroying Target: 7</a:t>
+            </a:r>
+          </a:p>
+          <a:p>
+            <a:endParaRPr lang="en-US" sz="900" dirty="0">
+              <a:solidFill>
+                <a:srgbClr val="7030A0"/>
+              </a:solidFill>
+            </a:endParaRPr>
+          </a:p>
+          <a:p>
+            <a:r>
+              <a:rPr lang="en-US" sz="900" dirty="0" err="1">
+                <a:solidFill>
+                  <a:srgbClr val="7030A0"/>
+                </a:solidFill>
+              </a:rPr>
+              <a:t>Num</a:t>
+            </a:r>
+            <a:r>
+              <a:rPr lang="en-US" sz="900" dirty="0">
+                <a:solidFill>
+                  <a:srgbClr val="7030A0"/>
+                </a:solidFill>
+              </a:rPr>
+              <a:t> Missiles Needed for each Target: 3  3  3  3  7  3</a:t>
+            </a:r>
+          </a:p>
+          <a:p>
+            <a:r>
+              <a:rPr lang="en-US" sz="900" dirty="0" err="1">
+                <a:solidFill>
+                  <a:srgbClr val="7030A0"/>
+                </a:solidFill>
+              </a:rPr>
+              <a:t>Num</a:t>
+            </a:r>
+            <a:r>
+              <a:rPr lang="en-US" sz="900" dirty="0">
+                <a:solidFill>
+                  <a:srgbClr val="7030A0"/>
+                </a:solidFill>
+              </a:rPr>
+              <a:t> Missiles Actually Used for each Target: 2  1  1  3  2  </a:t>
+            </a:r>
+            <a:r>
+              <a:rPr lang="en-US" sz="900" dirty="0" smtClean="0">
+                <a:solidFill>
+                  <a:srgbClr val="7030A0"/>
+                </a:solidFill>
+              </a:rPr>
+              <a:t>3</a:t>
+            </a:r>
+            <a:endParaRPr lang="en-US" sz="900" dirty="0">
+              <a:solidFill>
+                <a:srgbClr val="7030A0"/>
+              </a:solidFill>
+            </a:endParaRPr>
+          </a:p>
+        </p:txBody>
+      </p:sp>
+      <p:sp>
+        <p:nvSpPr>
+          <p:cNvPr id="16" name="Rectangle 15"/>
+          <p:cNvSpPr/>
+          <p:nvPr/>
+        </p:nvSpPr>
+        <p:spPr>
+          <a:xfrm>
+            <a:off x="8727726" y="1782800"/>
+            <a:ext cx="1584959" cy="4278094"/>
+          </a:xfrm>
+          <a:prstGeom prst="rect">
+            <a:avLst/>
+          </a:prstGeom>
+          <a:solidFill>
+            <a:schemeClr val="bg1"/>
+          </a:solidFill>
+          <a:ln w="38100">
+            <a:solidFill>
+              <a:srgbClr val="00B050"/>
+            </a:solidFill>
+          </a:ln>
+        </p:spPr>
+        <p:txBody>
+          <a:bodyPr wrap="square">
+            <a:spAutoFit/>
+          </a:bodyPr>
+          <a:lstStyle/>
+          <a:p>
+            <a:r>
+              <a:rPr lang="en-US" sz="800" dirty="0" smtClean="0">
+                <a:solidFill>
+                  <a:srgbClr val="7030A0"/>
+                </a:solidFill>
+              </a:rPr>
+              <a:t>Sortie 1 </a:t>
+            </a:r>
+            <a:r>
+              <a:rPr lang="en-US" sz="800" dirty="0">
+                <a:solidFill>
+                  <a:srgbClr val="7030A0"/>
+                </a:solidFill>
+              </a:rPr>
+              <a:t>for Target: 5</a:t>
+            </a:r>
+          </a:p>
+          <a:p>
+            <a:r>
+              <a:rPr lang="en-US" sz="800" dirty="0">
+                <a:solidFill>
+                  <a:srgbClr val="7030A0"/>
+                </a:solidFill>
+              </a:rPr>
+              <a:t>Mission Start Time (</a:t>
+            </a:r>
+            <a:r>
+              <a:rPr lang="en-US" sz="800" dirty="0" err="1">
+                <a:solidFill>
+                  <a:srgbClr val="7030A0"/>
+                </a:solidFill>
+              </a:rPr>
+              <a:t>hrs</a:t>
+            </a:r>
+            <a:r>
+              <a:rPr lang="en-US" sz="800" dirty="0">
+                <a:solidFill>
+                  <a:srgbClr val="7030A0"/>
+                </a:solidFill>
+              </a:rPr>
+              <a:t>): 2</a:t>
+            </a:r>
+          </a:p>
+          <a:p>
+            <a:r>
+              <a:rPr lang="en-US" sz="800" dirty="0">
+                <a:solidFill>
+                  <a:srgbClr val="7030A0"/>
+                </a:solidFill>
+              </a:rPr>
+              <a:t>Carrier Chosen: 1</a:t>
+            </a:r>
+          </a:p>
+          <a:p>
+            <a:r>
+              <a:rPr lang="en-US" sz="800" dirty="0">
+                <a:solidFill>
+                  <a:srgbClr val="7030A0"/>
+                </a:solidFill>
+              </a:rPr>
+              <a:t>Jets Chosen: 2, 3</a:t>
+            </a:r>
+          </a:p>
+          <a:p>
+            <a:r>
+              <a:rPr lang="en-US" sz="800" dirty="0" err="1">
+                <a:solidFill>
+                  <a:srgbClr val="7030A0"/>
+                </a:solidFill>
+              </a:rPr>
+              <a:t>Helo</a:t>
+            </a:r>
+            <a:r>
+              <a:rPr lang="en-US" sz="800" dirty="0">
+                <a:solidFill>
+                  <a:srgbClr val="7030A0"/>
+                </a:solidFill>
+              </a:rPr>
+              <a:t> Chosen: 1</a:t>
+            </a:r>
+          </a:p>
+          <a:p>
+            <a:r>
+              <a:rPr lang="en-US" sz="800" dirty="0">
+                <a:solidFill>
+                  <a:srgbClr val="7030A0"/>
+                </a:solidFill>
+              </a:rPr>
+              <a:t>Pilots Chosen: 1, 3</a:t>
+            </a:r>
+          </a:p>
+          <a:p>
+            <a:r>
+              <a:rPr lang="en-US" sz="800" dirty="0">
+                <a:solidFill>
+                  <a:srgbClr val="7030A0"/>
+                </a:solidFill>
+              </a:rPr>
+              <a:t>Number of Missiles Chosen: 2</a:t>
+            </a:r>
+          </a:p>
+          <a:p>
+            <a:r>
+              <a:rPr lang="en-US" sz="800" dirty="0">
+                <a:solidFill>
+                  <a:srgbClr val="7030A0"/>
+                </a:solidFill>
+              </a:rPr>
+              <a:t>Missiles Chosen: 1, 2</a:t>
+            </a:r>
+          </a:p>
+          <a:p>
+            <a:r>
+              <a:rPr lang="en-US" sz="800" dirty="0">
+                <a:solidFill>
+                  <a:srgbClr val="7030A0"/>
+                </a:solidFill>
+              </a:rPr>
+              <a:t>Number of Missiles Needed: 2</a:t>
+            </a:r>
+          </a:p>
+          <a:p>
+            <a:r>
+              <a:rPr lang="en-US" sz="800" dirty="0">
+                <a:solidFill>
+                  <a:srgbClr val="7030A0"/>
+                </a:solidFill>
+              </a:rPr>
+              <a:t>Number of Missiles Remaining: 11</a:t>
+            </a:r>
+          </a:p>
+          <a:p>
+            <a:endParaRPr lang="en-US" sz="800" dirty="0">
+              <a:solidFill>
+                <a:srgbClr val="7030A0"/>
+              </a:solidFill>
+            </a:endParaRPr>
+          </a:p>
+          <a:p>
+            <a:r>
+              <a:rPr lang="en-US" sz="800" dirty="0" smtClean="0">
+                <a:solidFill>
+                  <a:srgbClr val="7030A0"/>
+                </a:solidFill>
+              </a:rPr>
+              <a:t>Sortie 2 </a:t>
+            </a:r>
+            <a:r>
+              <a:rPr lang="en-US" sz="800" dirty="0">
+                <a:solidFill>
+                  <a:srgbClr val="7030A0"/>
+                </a:solidFill>
+              </a:rPr>
+              <a:t>for Target: 6</a:t>
+            </a:r>
+          </a:p>
+          <a:p>
+            <a:r>
+              <a:rPr lang="en-US" sz="800" dirty="0">
+                <a:solidFill>
+                  <a:srgbClr val="7030A0"/>
+                </a:solidFill>
+              </a:rPr>
+              <a:t>Mission Start Time (</a:t>
+            </a:r>
+            <a:r>
+              <a:rPr lang="en-US" sz="800" dirty="0" err="1">
+                <a:solidFill>
+                  <a:srgbClr val="7030A0"/>
+                </a:solidFill>
+              </a:rPr>
+              <a:t>hrs</a:t>
+            </a:r>
+            <a:r>
+              <a:rPr lang="en-US" sz="800" dirty="0">
+                <a:solidFill>
+                  <a:srgbClr val="7030A0"/>
+                </a:solidFill>
+              </a:rPr>
+              <a:t>): 8</a:t>
+            </a:r>
+          </a:p>
+          <a:p>
+            <a:r>
+              <a:rPr lang="en-US" sz="800" dirty="0">
+                <a:solidFill>
+                  <a:srgbClr val="7030A0"/>
+                </a:solidFill>
+              </a:rPr>
+              <a:t>Carrier Chosen: 1</a:t>
+            </a:r>
+          </a:p>
+          <a:p>
+            <a:r>
+              <a:rPr lang="en-US" sz="800" dirty="0">
+                <a:solidFill>
+                  <a:srgbClr val="7030A0"/>
+                </a:solidFill>
+              </a:rPr>
+              <a:t>Jets Chosen: 4, 5</a:t>
+            </a:r>
+          </a:p>
+          <a:p>
+            <a:r>
+              <a:rPr lang="en-US" sz="800" dirty="0" err="1">
+                <a:solidFill>
+                  <a:srgbClr val="7030A0"/>
+                </a:solidFill>
+              </a:rPr>
+              <a:t>Helo</a:t>
+            </a:r>
+            <a:r>
+              <a:rPr lang="en-US" sz="800" dirty="0">
+                <a:solidFill>
+                  <a:srgbClr val="7030A0"/>
+                </a:solidFill>
+              </a:rPr>
+              <a:t> Chosen: 2</a:t>
+            </a:r>
+          </a:p>
+          <a:p>
+            <a:r>
+              <a:rPr lang="en-US" sz="800" dirty="0">
+                <a:solidFill>
+                  <a:srgbClr val="7030A0"/>
+                </a:solidFill>
+              </a:rPr>
+              <a:t>Pilots Chosen: 2, 4</a:t>
+            </a:r>
+          </a:p>
+          <a:p>
+            <a:r>
+              <a:rPr lang="en-US" sz="800" dirty="0">
+                <a:solidFill>
+                  <a:srgbClr val="7030A0"/>
+                </a:solidFill>
+              </a:rPr>
+              <a:t>Number of Missiles Chosen: 1</a:t>
+            </a:r>
+          </a:p>
+          <a:p>
+            <a:r>
+              <a:rPr lang="en-US" sz="800" dirty="0">
+                <a:solidFill>
+                  <a:srgbClr val="7030A0"/>
+                </a:solidFill>
+              </a:rPr>
+              <a:t>Missiles Chosen: 3</a:t>
+            </a:r>
+          </a:p>
+          <a:p>
+            <a:r>
+              <a:rPr lang="en-US" sz="800" dirty="0">
+                <a:solidFill>
+                  <a:srgbClr val="7030A0"/>
+                </a:solidFill>
+              </a:rPr>
+              <a:t>Number of Missiles Needed: 1</a:t>
+            </a:r>
+          </a:p>
+          <a:p>
+            <a:r>
+              <a:rPr lang="en-US" sz="800" dirty="0">
+                <a:solidFill>
+                  <a:srgbClr val="7030A0"/>
+                </a:solidFill>
+              </a:rPr>
+              <a:t>Number of Missiles Remaining: 10</a:t>
+            </a:r>
+          </a:p>
+          <a:p>
+            <a:endParaRPr lang="en-US" sz="800" dirty="0">
+              <a:solidFill>
+                <a:srgbClr val="7030A0"/>
+              </a:solidFill>
+            </a:endParaRPr>
+          </a:p>
+          <a:p>
+            <a:r>
+              <a:rPr lang="en-US" sz="800" dirty="0" smtClean="0">
+                <a:solidFill>
+                  <a:srgbClr val="7030A0"/>
+                </a:solidFill>
+              </a:rPr>
+              <a:t>Sortie 3 </a:t>
+            </a:r>
+            <a:r>
+              <a:rPr lang="en-US" sz="800" dirty="0">
+                <a:solidFill>
+                  <a:srgbClr val="7030A0"/>
+                </a:solidFill>
+              </a:rPr>
+              <a:t>for Target: 4</a:t>
+            </a:r>
+          </a:p>
+          <a:p>
+            <a:r>
+              <a:rPr lang="en-US" sz="800" dirty="0">
+                <a:solidFill>
+                  <a:srgbClr val="7030A0"/>
+                </a:solidFill>
+              </a:rPr>
+              <a:t>Mission Start Time (</a:t>
+            </a:r>
+            <a:r>
+              <a:rPr lang="en-US" sz="800" dirty="0" err="1">
+                <a:solidFill>
+                  <a:srgbClr val="7030A0"/>
+                </a:solidFill>
+              </a:rPr>
+              <a:t>hrs</a:t>
+            </a:r>
+            <a:r>
+              <a:rPr lang="en-US" sz="800" dirty="0">
+                <a:solidFill>
+                  <a:srgbClr val="7030A0"/>
+                </a:solidFill>
+              </a:rPr>
+              <a:t>): 14</a:t>
+            </a:r>
+          </a:p>
+          <a:p>
+            <a:r>
+              <a:rPr lang="en-US" sz="800" dirty="0">
+                <a:solidFill>
+                  <a:srgbClr val="7030A0"/>
+                </a:solidFill>
+              </a:rPr>
+              <a:t>Carrier Chosen: 2</a:t>
+            </a:r>
+          </a:p>
+          <a:p>
+            <a:r>
+              <a:rPr lang="en-US" sz="800" dirty="0">
+                <a:solidFill>
+                  <a:srgbClr val="7030A0"/>
+                </a:solidFill>
+              </a:rPr>
+              <a:t>Jets Chosen: 12, 13</a:t>
+            </a:r>
+          </a:p>
+          <a:p>
+            <a:r>
+              <a:rPr lang="en-US" sz="800" dirty="0" err="1">
+                <a:solidFill>
+                  <a:srgbClr val="7030A0"/>
+                </a:solidFill>
+              </a:rPr>
+              <a:t>Helo</a:t>
+            </a:r>
+            <a:r>
+              <a:rPr lang="en-US" sz="800" dirty="0">
+                <a:solidFill>
+                  <a:srgbClr val="7030A0"/>
+                </a:solidFill>
+              </a:rPr>
+              <a:t> Chosen: 3</a:t>
+            </a:r>
+          </a:p>
+          <a:p>
+            <a:r>
+              <a:rPr lang="en-US" sz="800" dirty="0">
+                <a:solidFill>
+                  <a:srgbClr val="7030A0"/>
+                </a:solidFill>
+              </a:rPr>
+              <a:t>Pilots Chosen: 15, 16</a:t>
+            </a:r>
+          </a:p>
+          <a:p>
+            <a:r>
+              <a:rPr lang="en-US" sz="800" dirty="0">
+                <a:solidFill>
+                  <a:srgbClr val="7030A0"/>
+                </a:solidFill>
+              </a:rPr>
+              <a:t>Number of Missiles Chosen: 1</a:t>
+            </a:r>
+          </a:p>
+          <a:p>
+            <a:r>
+              <a:rPr lang="en-US" sz="800" dirty="0">
+                <a:solidFill>
+                  <a:srgbClr val="7030A0"/>
+                </a:solidFill>
+              </a:rPr>
+              <a:t>Missiles Chosen: 9</a:t>
+            </a:r>
+          </a:p>
+          <a:p>
+            <a:r>
+              <a:rPr lang="en-US" sz="800" dirty="0">
+                <a:solidFill>
+                  <a:srgbClr val="7030A0"/>
+                </a:solidFill>
+              </a:rPr>
+              <a:t>Number of Missiles Needed: 1</a:t>
+            </a:r>
+          </a:p>
+          <a:p>
+            <a:r>
+              <a:rPr lang="en-US" sz="800" dirty="0">
+                <a:solidFill>
+                  <a:srgbClr val="7030A0"/>
+                </a:solidFill>
+              </a:rPr>
+              <a:t>Number of Missiles Remaining: </a:t>
+            </a:r>
+            <a:r>
+              <a:rPr lang="en-US" sz="800" dirty="0" smtClean="0">
+                <a:solidFill>
+                  <a:srgbClr val="7030A0"/>
+                </a:solidFill>
+              </a:rPr>
+              <a:t>9</a:t>
+            </a:r>
+            <a:endParaRPr lang="en-US" sz="800" dirty="0">
+              <a:solidFill>
+                <a:srgbClr val="7030A0"/>
+              </a:solidFill>
+            </a:endParaRPr>
+          </a:p>
+        </p:txBody>
+      </p:sp>
+      <p:sp>
+        <p:nvSpPr>
+          <p:cNvPr id="17" name="Rectangle 16"/>
+          <p:cNvSpPr/>
+          <p:nvPr/>
+        </p:nvSpPr>
+        <p:spPr>
+          <a:xfrm>
+            <a:off x="5024847" y="2204273"/>
+            <a:ext cx="3262824" cy="584775"/>
+          </a:xfrm>
+          <a:prstGeom prst="rect">
+            <a:avLst/>
+          </a:prstGeom>
+          <a:solidFill>
+            <a:schemeClr val="bg1"/>
+          </a:solidFill>
+          <a:ln w="38100">
+            <a:solidFill>
+              <a:srgbClr val="00B050"/>
+            </a:solidFill>
+          </a:ln>
+        </p:spPr>
+        <p:txBody>
+          <a:bodyPr wrap="square">
+            <a:spAutoFit/>
+          </a:bodyPr>
+          <a:lstStyle/>
+          <a:p>
+            <a:r>
+              <a:rPr lang="en-US" sz="1600" dirty="0" smtClean="0">
+                <a:solidFill>
+                  <a:srgbClr val="7030A0"/>
+                </a:solidFill>
+              </a:rPr>
+              <a:t>Number </a:t>
+            </a:r>
+            <a:r>
+              <a:rPr lang="en-US" sz="1600" dirty="0">
+                <a:solidFill>
+                  <a:srgbClr val="7030A0"/>
+                </a:solidFill>
+              </a:rPr>
+              <a:t>of </a:t>
+            </a:r>
+            <a:r>
+              <a:rPr lang="en-US" sz="1600" dirty="0" smtClean="0">
+                <a:solidFill>
+                  <a:srgbClr val="7030A0"/>
+                </a:solidFill>
+              </a:rPr>
+              <a:t>Casualties</a:t>
+            </a:r>
+            <a:r>
+              <a:rPr lang="en-US" sz="1600" dirty="0">
+                <a:solidFill>
+                  <a:srgbClr val="7030A0"/>
+                </a:solidFill>
+              </a:rPr>
+              <a:t>: 1</a:t>
+            </a:r>
+          </a:p>
+          <a:p>
+            <a:r>
+              <a:rPr lang="en-US" sz="1600" dirty="0">
+                <a:solidFill>
+                  <a:srgbClr val="7030A0"/>
+                </a:solidFill>
+              </a:rPr>
+              <a:t>Number of Targets Accounted For: 6</a:t>
+            </a:r>
           </a:p>
         </p:txBody>
       </p:sp>
@@ -4421,7 +5571,11 @@
           <a:p>
             <a:r>
               <a:rPr lang="en-US" dirty="0" smtClean="0"/>
-              <a:t>Scheduling Algorithm Details (1)</a:t>
+              <a:t>EJJ Scheduling </a:t>
+            </a:r>
+            <a:r>
+              <a:rPr lang="en-US" dirty="0" smtClean="0"/>
+              <a:t>Algorithm Details (1)</a:t>
             </a:r>
             <a:endParaRPr lang="en-US" dirty="0"/>
           </a:p>
@@ -4615,7 +5769,11 @@
           <a:p>
             <a:r>
               <a:rPr lang="en-US" dirty="0" smtClean="0"/>
-              <a:t>Scheduling Algorithm Details (2)</a:t>
+              <a:t>EJJ Scheduling </a:t>
+            </a:r>
+            <a:r>
+              <a:rPr lang="en-US" dirty="0" smtClean="0"/>
+              <a:t>Algorithm Details (2)</a:t>
             </a:r>
             <a:endParaRPr lang="en-US" dirty="0"/>
           </a:p>
@@ -4790,7 +5948,11 @@
           <a:p>
             <a:r>
               <a:rPr lang="en-US" dirty="0" smtClean="0"/>
-              <a:t>Scheduling Algorithm Details (3)</a:t>
+              <a:t>EJJ Scheduling </a:t>
+            </a:r>
+            <a:r>
+              <a:rPr lang="en-US" dirty="0" smtClean="0"/>
+              <a:t>Algorithm Details (3)</a:t>
             </a:r>
             <a:endParaRPr lang="en-US" dirty="0"/>
           </a:p>
@@ -4974,7 +6136,11 @@
           <a:p>
             <a:r>
               <a:rPr lang="en-US" dirty="0" smtClean="0"/>
-              <a:t>Scheduling Algorithm Details (4)</a:t>
+              <a:t>EJJ Scheduling </a:t>
+            </a:r>
+            <a:r>
+              <a:rPr lang="en-US" dirty="0" smtClean="0"/>
+              <a:t>Algorithm Details (4)</a:t>
             </a:r>
             <a:endParaRPr lang="en-US" dirty="0"/>
           </a:p>
@@ -5099,7 +6265,7 @@
           <p:cNvPr id="2" name="Title 1">
             <a:extLst>
               <a:ext uri="{FF2B5EF4-FFF2-40B4-BE49-F238E27FC236}">
-                <a16:creationId xmlns:a16="http://schemas.microsoft.com/office/drawing/2014/main" xmlns="" id="{E29B01D6-A7CA-4A3E-9C66-C2AA33322F12}"/>
+                <a16:creationId xmlns="" xmlns:a16="http://schemas.microsoft.com/office/drawing/2014/main" id="{E29B01D6-A7CA-4A3E-9C66-C2AA33322F12}"/>
               </a:ext>
             </a:extLst>
           </p:cNvPr>
@@ -5128,7 +6294,7 @@
           <p:cNvPr id="3" name="Content Placeholder 2">
             <a:extLst>
               <a:ext uri="{FF2B5EF4-FFF2-40B4-BE49-F238E27FC236}">
-                <a16:creationId xmlns:a16="http://schemas.microsoft.com/office/drawing/2014/main" xmlns="" id="{F1842140-4ACB-41A9-BC7F-30570259E5D8}"/>
+                <a16:creationId xmlns="" xmlns:a16="http://schemas.microsoft.com/office/drawing/2014/main" id="{F1842140-4ACB-41A9-BC7F-30570259E5D8}"/>
               </a:ext>
             </a:extLst>
           </p:cNvPr>
@@ -5196,15 +6362,7 @@
           <a:p>
             <a:r>
               <a:rPr lang="en-US" dirty="0" smtClean="0"/>
-              <a:t>User-friendly drag and drop </a:t>
-            </a:r>
-            <a:r>
-              <a:rPr lang="en-US" dirty="0" smtClean="0"/>
-              <a:t>capability to create a </a:t>
-            </a:r>
-            <a:r>
-              <a:rPr lang="en-US" dirty="0" smtClean="0"/>
-              <a:t>friendly force laydown</a:t>
+              <a:t>User-friendly drag and drop capability to create a friendly force laydown</a:t>
             </a:r>
           </a:p>
           <a:p>
@@ -5232,7 +6390,7 @@
           <p:cNvPr id="4" name="Footer Placeholder 3">
             <a:extLst>
               <a:ext uri="{FF2B5EF4-FFF2-40B4-BE49-F238E27FC236}">
-                <a16:creationId xmlns:a16="http://schemas.microsoft.com/office/drawing/2014/main" xmlns="" id="{C401FFE3-F414-4CF5-AD6A-9C2DE5116ED4}"/>
+                <a16:creationId xmlns="" xmlns:a16="http://schemas.microsoft.com/office/drawing/2014/main" id="{C401FFE3-F414-4CF5-AD6A-9C2DE5116ED4}"/>
               </a:ext>
             </a:extLst>
           </p:cNvPr>
@@ -5297,7 +6455,7 @@
           <p:cNvPr id="4" name="Footer Placeholder 3">
             <a:extLst>
               <a:ext uri="{FF2B5EF4-FFF2-40B4-BE49-F238E27FC236}">
-                <a16:creationId xmlns:a16="http://schemas.microsoft.com/office/drawing/2014/main" xmlns="" id="{7B57FAC7-9A78-418C-B807-48ECCF0BCB6C}"/>
+                <a16:creationId xmlns="" xmlns:a16="http://schemas.microsoft.com/office/drawing/2014/main" id="{7B57FAC7-9A78-418C-B807-48ECCF0BCB6C}"/>
               </a:ext>
             </a:extLst>
           </p:cNvPr>
@@ -5328,7 +6486,7 @@
           <p:cNvPr id="2050" name="Picture 2" descr="Gypsy Curse">
             <a:extLst>
               <a:ext uri="{FF2B5EF4-FFF2-40B4-BE49-F238E27FC236}">
-                <a16:creationId xmlns:a16="http://schemas.microsoft.com/office/drawing/2014/main" xmlns="" id="{7173D12A-5393-4EF8-B04F-3F560643558C}"/>
+                <a16:creationId xmlns="" xmlns:a16="http://schemas.microsoft.com/office/drawing/2014/main" id="{7173D12A-5393-4EF8-B04F-3F560643558C}"/>
               </a:ext>
             </a:extLst>
           </p:cNvPr>
@@ -5405,7 +6563,7 @@
           <p:cNvPr id="2" name="Title 1">
             <a:extLst>
               <a:ext uri="{FF2B5EF4-FFF2-40B4-BE49-F238E27FC236}">
-                <a16:creationId xmlns:a16="http://schemas.microsoft.com/office/drawing/2014/main" xmlns="" id="{943DCFC8-26A0-4B2E-87F6-0E00BE3F7F5E}"/>
+                <a16:creationId xmlns="" xmlns:a16="http://schemas.microsoft.com/office/drawing/2014/main" id="{943DCFC8-26A0-4B2E-87F6-0E00BE3F7F5E}"/>
               </a:ext>
             </a:extLst>
           </p:cNvPr>
@@ -5441,7 +6599,7 @@
           <p:cNvPr id="4" name="Footer Placeholder 3">
             <a:extLst>
               <a:ext uri="{FF2B5EF4-FFF2-40B4-BE49-F238E27FC236}">
-                <a16:creationId xmlns:a16="http://schemas.microsoft.com/office/drawing/2014/main" xmlns="" id="{6280CF32-9815-4EEB-889D-75232A4BA741}"/>
+                <a16:creationId xmlns="" xmlns:a16="http://schemas.microsoft.com/office/drawing/2014/main" id="{6280CF32-9815-4EEB-889D-75232A4BA741}"/>
               </a:ext>
             </a:extLst>
           </p:cNvPr>
@@ -5472,7 +6630,7 @@
           <p:cNvPr id="6" name="Group 5">
             <a:extLst>
               <a:ext uri="{FF2B5EF4-FFF2-40B4-BE49-F238E27FC236}">
-                <a16:creationId xmlns:a16="http://schemas.microsoft.com/office/drawing/2014/main" xmlns="" id="{141E14CB-BF28-4A1A-8DAB-6FDD0BCD224C}"/>
+                <a16:creationId xmlns="" xmlns:a16="http://schemas.microsoft.com/office/drawing/2014/main" id="{141E14CB-BF28-4A1A-8DAB-6FDD0BCD224C}"/>
               </a:ext>
             </a:extLst>
           </p:cNvPr>
@@ -5492,7 +6650,7 @@
             <p:cNvPr id="3074" name="Picture 2" descr="A Double Date With Leatherface – Texas Monthly">
               <a:extLst>
                 <a:ext uri="{FF2B5EF4-FFF2-40B4-BE49-F238E27FC236}">
-                  <a16:creationId xmlns:a16="http://schemas.microsoft.com/office/drawing/2014/main" xmlns="" id="{22020642-5868-4C46-8AE5-DC542E41254C}"/>
+                  <a16:creationId xmlns="" xmlns:a16="http://schemas.microsoft.com/office/drawing/2014/main" id="{22020642-5868-4C46-8AE5-DC542E41254C}"/>
                 </a:ext>
               </a:extLst>
             </p:cNvPr>
@@ -5537,7 +6695,7 @@
             <p:cNvPr id="7" name="TextBox 6">
               <a:extLst>
                 <a:ext uri="{FF2B5EF4-FFF2-40B4-BE49-F238E27FC236}">
-                  <a16:creationId xmlns:a16="http://schemas.microsoft.com/office/drawing/2014/main" xmlns="" id="{0708C8B9-A3AB-450B-81C4-A103DD3FC083}"/>
+                  <a16:creationId xmlns="" xmlns:a16="http://schemas.microsoft.com/office/drawing/2014/main" id="{0708C8B9-A3AB-450B-81C4-A103DD3FC083}"/>
                 </a:ext>
               </a:extLst>
             </p:cNvPr>
@@ -5585,7 +6743,7 @@
           <p:cNvPr id="9" name="TextBox 8">
             <a:extLst>
               <a:ext uri="{FF2B5EF4-FFF2-40B4-BE49-F238E27FC236}">
-                <a16:creationId xmlns:a16="http://schemas.microsoft.com/office/drawing/2014/main" xmlns="" id="{7F019BA2-3C4B-4F8D-A2EA-AB79D8D7B61B}"/>
+                <a16:creationId xmlns="" xmlns:a16="http://schemas.microsoft.com/office/drawing/2014/main" id="{7F019BA2-3C4B-4F8D-A2EA-AB79D8D7B61B}"/>
               </a:ext>
             </a:extLst>
           </p:cNvPr>
@@ -5675,7 +6833,7 @@
           <p:cNvPr id="10" name="TextBox 9">
             <a:extLst>
               <a:ext uri="{FF2B5EF4-FFF2-40B4-BE49-F238E27FC236}">
-                <a16:creationId xmlns:a16="http://schemas.microsoft.com/office/drawing/2014/main" xmlns="" id="{8418428D-5EA6-4972-8C73-2F7AA4740CBC}"/>
+                <a16:creationId xmlns="" xmlns:a16="http://schemas.microsoft.com/office/drawing/2014/main" id="{8418428D-5EA6-4972-8C73-2F7AA4740CBC}"/>
               </a:ext>
             </a:extLst>
           </p:cNvPr>
@@ -5723,7 +6881,7 @@
           <p:cNvPr id="3080" name="Picture 8" descr="In his new book, &amp;#39;Cabinet of Curiosities,&amp;#39; director Guillermo del Toro  reveals the inspiration behind his monstrous creations - New York Daily News">
             <a:extLst>
               <a:ext uri="{FF2B5EF4-FFF2-40B4-BE49-F238E27FC236}">
-                <a16:creationId xmlns:a16="http://schemas.microsoft.com/office/drawing/2014/main" xmlns="" id="{0D4F2247-B974-4A2A-86D2-A0F7662B0C85}"/>
+                <a16:creationId xmlns="" xmlns:a16="http://schemas.microsoft.com/office/drawing/2014/main" id="{0D4F2247-B974-4A2A-86D2-A0F7662B0C85}"/>
               </a:ext>
             </a:extLst>
           </p:cNvPr>
@@ -5770,7 +6928,7 @@
           <p:cNvPr id="3082" name="Picture 10" descr="Michael Myers | Villains Wiki | Fandom">
             <a:extLst>
               <a:ext uri="{FF2B5EF4-FFF2-40B4-BE49-F238E27FC236}">
-                <a16:creationId xmlns:a16="http://schemas.microsoft.com/office/drawing/2014/main" xmlns="" id="{B503C72F-E6FB-4C72-B77E-F21080370CEE}"/>
+                <a16:creationId xmlns="" xmlns:a16="http://schemas.microsoft.com/office/drawing/2014/main" id="{B503C72F-E6FB-4C72-B77E-F21080370CEE}"/>
               </a:ext>
             </a:extLst>
           </p:cNvPr>
@@ -5817,7 +6975,7 @@
           <p:cNvPr id="14" name="Picture 13">
             <a:extLst>
               <a:ext uri="{FF2B5EF4-FFF2-40B4-BE49-F238E27FC236}">
-                <a16:creationId xmlns:a16="http://schemas.microsoft.com/office/drawing/2014/main" xmlns="" id="{AA5F475A-5677-4D61-ACA5-D6FF94854F8B}"/>
+                <a16:creationId xmlns="" xmlns:a16="http://schemas.microsoft.com/office/drawing/2014/main" id="{AA5F475A-5677-4D61-ACA5-D6FF94854F8B}"/>
               </a:ext>
             </a:extLst>
           </p:cNvPr>
@@ -5877,7 +7035,7 @@
           <p:cNvPr id="2" name="Title 1">
             <a:extLst>
               <a:ext uri="{FF2B5EF4-FFF2-40B4-BE49-F238E27FC236}">
-                <a16:creationId xmlns:a16="http://schemas.microsoft.com/office/drawing/2014/main" xmlns="" id="{696DC911-7B2A-4AD3-9AF4-787E5BC26A76}"/>
+                <a16:creationId xmlns="" xmlns:a16="http://schemas.microsoft.com/office/drawing/2014/main" id="{696DC911-7B2A-4AD3-9AF4-787E5BC26A76}"/>
               </a:ext>
             </a:extLst>
           </p:cNvPr>
@@ -5910,7 +7068,7 @@
           <p:cNvPr id="3" name="Content Placeholder 2">
             <a:extLst>
               <a:ext uri="{FF2B5EF4-FFF2-40B4-BE49-F238E27FC236}">
-                <a16:creationId xmlns:a16="http://schemas.microsoft.com/office/drawing/2014/main" xmlns="" id="{6B99F6C5-7FEB-41EF-90AE-A09F09C1418E}"/>
+                <a16:creationId xmlns="" xmlns:a16="http://schemas.microsoft.com/office/drawing/2014/main" id="{6B99F6C5-7FEB-41EF-90AE-A09F09C1418E}"/>
               </a:ext>
             </a:extLst>
           </p:cNvPr>
@@ -5943,7 +7101,7 @@
           <p:cNvPr id="4" name="Footer Placeholder 3">
             <a:extLst>
               <a:ext uri="{FF2B5EF4-FFF2-40B4-BE49-F238E27FC236}">
-                <a16:creationId xmlns:a16="http://schemas.microsoft.com/office/drawing/2014/main" xmlns="" id="{8983722C-B068-479E-83D9-1EB6A54E8D62}"/>
+                <a16:creationId xmlns="" xmlns:a16="http://schemas.microsoft.com/office/drawing/2014/main" id="{8983722C-B068-479E-83D9-1EB6A54E8D62}"/>
               </a:ext>
             </a:extLst>
           </p:cNvPr>
@@ -5974,7 +7132,7 @@
           <p:cNvPr id="5" name="Title 1">
             <a:extLst>
               <a:ext uri="{FF2B5EF4-FFF2-40B4-BE49-F238E27FC236}">
-                <a16:creationId xmlns:a16="http://schemas.microsoft.com/office/drawing/2014/main" xmlns="" id="{17FCC00C-F20F-424B-92FC-603D1DEB5BCB}"/>
+                <a16:creationId xmlns="" xmlns:a16="http://schemas.microsoft.com/office/drawing/2014/main" id="{17FCC00C-F20F-424B-92FC-603D1DEB5BCB}"/>
               </a:ext>
             </a:extLst>
           </p:cNvPr>
@@ -6028,7 +7186,7 @@
           <p:cNvPr id="6" name="Content Placeholder 2">
             <a:extLst>
               <a:ext uri="{FF2B5EF4-FFF2-40B4-BE49-F238E27FC236}">
-                <a16:creationId xmlns:a16="http://schemas.microsoft.com/office/drawing/2014/main" xmlns="" id="{D83E20B2-7401-47EA-AEC9-B05AB0AE1F9F}"/>
+                <a16:creationId xmlns="" xmlns:a16="http://schemas.microsoft.com/office/drawing/2014/main" id="{D83E20B2-7401-47EA-AEC9-B05AB0AE1F9F}"/>
               </a:ext>
             </a:extLst>
           </p:cNvPr>
@@ -6221,11 +7379,7 @@
             </a:r>
             <a:r>
               <a:rPr lang="en-US" dirty="0" smtClean="0"/>
-              <a:t>Y</a:t>
-            </a:r>
-            <a:r>
-              <a:rPr lang="en-US" dirty="0" smtClean="0"/>
-              <a:t>ouTube </a:t>
+              <a:t>YouTube </a:t>
             </a:r>
             <a:r>
               <a:rPr lang="en-US" dirty="0"/>
@@ -6269,7 +7423,7 @@
           <p:cNvPr id="2" name="Title 1">
             <a:extLst>
               <a:ext uri="{FF2B5EF4-FFF2-40B4-BE49-F238E27FC236}">
-                <a16:creationId xmlns:a16="http://schemas.microsoft.com/office/drawing/2014/main" xmlns="" id="{3FDE549A-A251-42BB-AA2B-69B6DD7BB2C5}"/>
+                <a16:creationId xmlns="" xmlns:a16="http://schemas.microsoft.com/office/drawing/2014/main" id="{3FDE549A-A251-42BB-AA2B-69B6DD7BB2C5}"/>
               </a:ext>
             </a:extLst>
           </p:cNvPr>
@@ -6294,7 +7448,7 @@
           <p:cNvPr id="3" name="Content Placeholder 2">
             <a:extLst>
               <a:ext uri="{FF2B5EF4-FFF2-40B4-BE49-F238E27FC236}">
-                <a16:creationId xmlns:a16="http://schemas.microsoft.com/office/drawing/2014/main" xmlns="" id="{0E6D595F-E13D-4ABB-8ECC-5F6E8C87EA26}"/>
+                <a16:creationId xmlns="" xmlns:a16="http://schemas.microsoft.com/office/drawing/2014/main" id="{0E6D595F-E13D-4ABB-8ECC-5F6E8C87EA26}"/>
               </a:ext>
             </a:extLst>
           </p:cNvPr>
@@ -6319,7 +7473,7 @@
           <p:cNvPr id="4" name="Footer Placeholder 3">
             <a:extLst>
               <a:ext uri="{FF2B5EF4-FFF2-40B4-BE49-F238E27FC236}">
-                <a16:creationId xmlns:a16="http://schemas.microsoft.com/office/drawing/2014/main" xmlns="" id="{479F8E9C-951C-4182-A6D4-D3B4901AC6E9}"/>
+                <a16:creationId xmlns="" xmlns:a16="http://schemas.microsoft.com/office/drawing/2014/main" id="{479F8E9C-951C-4182-A6D4-D3B4901AC6E9}"/>
               </a:ext>
             </a:extLst>
           </p:cNvPr>
@@ -6380,7 +7534,7 @@
           <p:cNvPr id="2" name="Title 1">
             <a:extLst>
               <a:ext uri="{FF2B5EF4-FFF2-40B4-BE49-F238E27FC236}">
-                <a16:creationId xmlns:a16="http://schemas.microsoft.com/office/drawing/2014/main" xmlns="" id="{F2E87793-C400-4D49-AC42-F6C78A28B67D}"/>
+                <a16:creationId xmlns="" xmlns:a16="http://schemas.microsoft.com/office/drawing/2014/main" id="{F2E87793-C400-4D49-AC42-F6C78A28B67D}"/>
               </a:ext>
             </a:extLst>
           </p:cNvPr>
@@ -6398,11 +7552,7 @@
           <a:p>
             <a:r>
               <a:rPr lang="en-US" dirty="0"/>
-              <a:t>What </a:t>
-            </a:r>
-            <a:r>
-              <a:rPr lang="en-US" dirty="0"/>
-              <a:t>W</a:t>
+              <a:t>What W</a:t>
             </a:r>
             <a:r>
               <a:rPr lang="en-US" dirty="0" smtClean="0"/>
@@ -6417,7 +7567,7 @@
           <p:cNvPr id="3" name="Content Placeholder 2">
             <a:extLst>
               <a:ext uri="{FF2B5EF4-FFF2-40B4-BE49-F238E27FC236}">
-                <a16:creationId xmlns:a16="http://schemas.microsoft.com/office/drawing/2014/main" xmlns="" id="{E29D20E0-73E2-4C61-AF58-2EC3D1B5237C}"/>
+                <a16:creationId xmlns="" xmlns:a16="http://schemas.microsoft.com/office/drawing/2014/main" id="{E29D20E0-73E2-4C61-AF58-2EC3D1B5237C}"/>
               </a:ext>
             </a:extLst>
           </p:cNvPr>
@@ -6434,8 +7584,19 @@
           <a:lstStyle/>
           <a:p>
             <a:r>
+              <a:rPr lang="en-US" dirty="0" smtClean="0"/>
+              <a:t>EJJ Mission Planning Tool</a:t>
+            </a:r>
+          </a:p>
+          <a:p>
+            <a:pPr lvl="1"/>
+            <a:r>
+              <a:rPr lang="en-US" dirty="0" smtClean="0"/>
+              <a:t>Optimization </a:t>
+            </a:r>
+            <a:r>
               <a:rPr lang="en-US" dirty="0"/>
-              <a:t>Optimization algorithm for the </a:t>
+              <a:t>algorithm for the </a:t>
             </a:r>
             <a:r>
               <a:rPr lang="en-US" dirty="0" smtClean="0"/>
@@ -6444,15 +7605,16 @@
             <a:endParaRPr lang="en-US" dirty="0"/>
           </a:p>
           <a:p>
+            <a:pPr lvl="1"/>
             <a:r>
               <a:rPr lang="en-US" dirty="0"/>
               <a:t>Web application </a:t>
             </a:r>
           </a:p>
           <a:p>
-            <a:pPr lvl="1"/>
-            <a:r>
-              <a:rPr lang="en-US" dirty="0"/>
+            <a:pPr lvl="2"/>
+            <a:r>
+              <a:rPr lang="en-US" sz="2400" dirty="0"/>
               <a:t>“a fresh look” of mission planning</a:t>
             </a:r>
           </a:p>
@@ -6467,7 +7629,7 @@
           <p:cNvPr id="4" name="Footer Placeholder 3">
             <a:extLst>
               <a:ext uri="{FF2B5EF4-FFF2-40B4-BE49-F238E27FC236}">
-                <a16:creationId xmlns:a16="http://schemas.microsoft.com/office/drawing/2014/main" xmlns="" id="{C246C6AC-EE9C-4B9F-8926-F862296227DD}"/>
+                <a16:creationId xmlns="" xmlns:a16="http://schemas.microsoft.com/office/drawing/2014/main" id="{C246C6AC-EE9C-4B9F-8926-F862296227DD}"/>
               </a:ext>
             </a:extLst>
           </p:cNvPr>
@@ -6528,7 +7690,7 @@
           <p:cNvPr id="2" name="Title 1">
             <a:extLst>
               <a:ext uri="{FF2B5EF4-FFF2-40B4-BE49-F238E27FC236}">
-                <a16:creationId xmlns:a16="http://schemas.microsoft.com/office/drawing/2014/main" xmlns="" id="{E3B7ADCA-8719-4128-8B4D-881B76C12927}"/>
+                <a16:creationId xmlns="" xmlns:a16="http://schemas.microsoft.com/office/drawing/2014/main" id="{E3B7ADCA-8719-4128-8B4D-881B76C12927}"/>
               </a:ext>
             </a:extLst>
           </p:cNvPr>
@@ -6545,12 +7707,12 @@
           <a:lstStyle/>
           <a:p>
             <a:r>
-              <a:rPr lang="en-US" dirty="0"/>
-              <a:t>Optimization </a:t>
-            </a:r>
-            <a:r>
-              <a:rPr lang="en-US" dirty="0" smtClean="0"/>
-              <a:t>Algorithm </a:t>
+              <a:rPr lang="en-US" dirty="0" smtClean="0"/>
+              <a:t>EJJ Auto-</a:t>
+            </a:r>
+            <a:r>
+              <a:rPr lang="en-US" dirty="0" smtClean="0"/>
+              <a:t>Scheduling Constraints/Restraints/Intent </a:t>
             </a:r>
             <a:r>
               <a:rPr lang="en-US" dirty="0"/>
@@ -6572,7 +7734,7 @@
           <p:cNvPr id="3" name="Content Placeholder 2">
             <a:extLst>
               <a:ext uri="{FF2B5EF4-FFF2-40B4-BE49-F238E27FC236}">
-                <a16:creationId xmlns:a16="http://schemas.microsoft.com/office/drawing/2014/main" xmlns="" id="{3EC12B63-2CE0-48D4-A136-ADE12373C800}"/>
+                <a16:creationId xmlns="" xmlns:a16="http://schemas.microsoft.com/office/drawing/2014/main" id="{3EC12B63-2CE0-48D4-A136-ADE12373C800}"/>
               </a:ext>
             </a:extLst>
           </p:cNvPr>
@@ -6738,7 +7900,7 @@
           <p:cNvPr id="4" name="Footer Placeholder 3">
             <a:extLst>
               <a:ext uri="{FF2B5EF4-FFF2-40B4-BE49-F238E27FC236}">
-                <a16:creationId xmlns:a16="http://schemas.microsoft.com/office/drawing/2014/main" xmlns="" id="{693782FF-7ED5-4192-A01F-660E4D3EEAB0}"/>
+                <a16:creationId xmlns="" xmlns:a16="http://schemas.microsoft.com/office/drawing/2014/main" id="{693782FF-7ED5-4192-A01F-660E4D3EEAB0}"/>
               </a:ext>
             </a:extLst>
           </p:cNvPr>
@@ -6799,7 +7961,7 @@
           <p:cNvPr id="3" name="Content Placeholder 2">
             <a:extLst>
               <a:ext uri="{FF2B5EF4-FFF2-40B4-BE49-F238E27FC236}">
-                <a16:creationId xmlns:a16="http://schemas.microsoft.com/office/drawing/2014/main" xmlns="" id="{22DDF42D-3D90-4D39-8593-9FBBFEB2E97E}"/>
+                <a16:creationId xmlns="" xmlns:a16="http://schemas.microsoft.com/office/drawing/2014/main" id="{22DDF42D-3D90-4D39-8593-9FBBFEB2E97E}"/>
               </a:ext>
             </a:extLst>
           </p:cNvPr>
@@ -7188,7 +8350,7 @@
           <p:cNvPr id="4" name="Footer Placeholder 3">
             <a:extLst>
               <a:ext uri="{FF2B5EF4-FFF2-40B4-BE49-F238E27FC236}">
-                <a16:creationId xmlns:a16="http://schemas.microsoft.com/office/drawing/2014/main" xmlns="" id="{A002CB46-3E82-46AE-AE99-4D885792F48B}"/>
+                <a16:creationId xmlns="" xmlns:a16="http://schemas.microsoft.com/office/drawing/2014/main" id="{A002CB46-3E82-46AE-AE99-4D885792F48B}"/>
               </a:ext>
             </a:extLst>
           </p:cNvPr>
@@ -7219,7 +8381,7 @@
           <p:cNvPr id="8" name="TextBox 7">
             <a:extLst>
               <a:ext uri="{FF2B5EF4-FFF2-40B4-BE49-F238E27FC236}">
-                <a16:creationId xmlns:a16="http://schemas.microsoft.com/office/drawing/2014/main" xmlns="" id="{CDF35B94-B09E-4223-A496-D1AE1FFA9173}"/>
+                <a16:creationId xmlns="" xmlns:a16="http://schemas.microsoft.com/office/drawing/2014/main" id="{CDF35B94-B09E-4223-A496-D1AE1FFA9173}"/>
               </a:ext>
             </a:extLst>
           </p:cNvPr>
@@ -7442,7 +8604,7 @@
           <p:cNvPr id="3" name="Content Placeholder 2">
             <a:extLst>
               <a:ext uri="{FF2B5EF4-FFF2-40B4-BE49-F238E27FC236}">
-                <a16:creationId xmlns:a16="http://schemas.microsoft.com/office/drawing/2014/main" xmlns="" id="{B23BDF39-9DE8-4B5D-B2E9-28254D0A839C}"/>
+                <a16:creationId xmlns="" xmlns:a16="http://schemas.microsoft.com/office/drawing/2014/main" id="{B23BDF39-9DE8-4B5D-B2E9-28254D0A839C}"/>
               </a:ext>
             </a:extLst>
           </p:cNvPr>
@@ -7758,7 +8920,7 @@
           <p:cNvPr id="4" name="Footer Placeholder 3">
             <a:extLst>
               <a:ext uri="{FF2B5EF4-FFF2-40B4-BE49-F238E27FC236}">
-                <a16:creationId xmlns:a16="http://schemas.microsoft.com/office/drawing/2014/main" xmlns="" id="{CD510718-CD20-420D-9B74-298783B40D42}"/>
+                <a16:creationId xmlns="" xmlns:a16="http://schemas.microsoft.com/office/drawing/2014/main" id="{CD510718-CD20-420D-9B74-298783B40D42}"/>
               </a:ext>
             </a:extLst>
           </p:cNvPr>
@@ -7798,7 +8960,7 @@
           <p:cNvPr id="6" name="TextBox 5">
             <a:extLst>
               <a:ext uri="{FF2B5EF4-FFF2-40B4-BE49-F238E27FC236}">
-                <a16:creationId xmlns:a16="http://schemas.microsoft.com/office/drawing/2014/main" xmlns="" id="{EB3CB662-3D24-4DC7-869F-8ACB83720D30}"/>
+                <a16:creationId xmlns="" xmlns:a16="http://schemas.microsoft.com/office/drawing/2014/main" id="{EB3CB662-3D24-4DC7-869F-8ACB83720D30}"/>
               </a:ext>
             </a:extLst>
           </p:cNvPr>
@@ -7808,7 +8970,7 @@
         <p:spPr>
           <a:xfrm>
             <a:off x="5177642" y="355515"/>
-            <a:ext cx="6648697" cy="5745163"/>
+            <a:ext cx="6648697" cy="5421997"/>
           </a:xfrm>
           <a:prstGeom prst="rect">
             <a:avLst/>
@@ -7829,7 +8991,7 @@
               <a:buChar char="•"/>
             </a:pPr>
             <a:r>
-              <a:rPr lang="en-US" sz="1400" b="0" i="0" dirty="0">
+              <a:rPr lang="en-US" sz="1300" b="0" i="0" dirty="0">
                 <a:effectLst/>
                 <a:latin typeface="Arial" panose="020B0604020202020204" pitchFamily="34" charset="0"/>
               </a:rPr>
@@ -7845,35 +9007,35 @@
               <a:buChar char="•"/>
             </a:pPr>
             <a:r>
-              <a:rPr lang="en-US" sz="1400" b="0" i="0" dirty="0">
+              <a:rPr lang="en-US" sz="1300" b="0" i="0" dirty="0">
                 <a:effectLst/>
                 <a:latin typeface="Arial" panose="020B0604020202020204" pitchFamily="34" charset="0"/>
               </a:rPr>
               <a:t>Each sortie requires a </a:t>
             </a:r>
             <a:r>
-              <a:rPr lang="en-US" sz="1400" b="0" i="0" dirty="0" err="1">
+              <a:rPr lang="en-US" sz="1300" b="0" i="0" dirty="0" err="1">
                 <a:effectLst/>
                 <a:latin typeface="Arial" panose="020B0604020202020204" pitchFamily="34" charset="0"/>
               </a:rPr>
               <a:t>Helo</a:t>
             </a:r>
             <a:r>
-              <a:rPr lang="en-US" sz="1400" b="0" i="0" dirty="0">
+              <a:rPr lang="en-US" sz="1300" b="0" i="0" dirty="0">
                 <a:effectLst/>
                 <a:latin typeface="Arial" panose="020B0604020202020204" pitchFamily="34" charset="0"/>
               </a:rPr>
               <a:t> and crew for that carrier to be airborne during the period 1 hour before to 1 hour after launch and 1 hour before and 1 hour after recovery for man-overboard and rescue requirements (</a:t>
             </a:r>
             <a:r>
-              <a:rPr lang="en-US" sz="1400" b="0" i="0" dirty="0" err="1">
+              <a:rPr lang="en-US" sz="1300" b="0" i="0" dirty="0" err="1">
                 <a:effectLst/>
                 <a:latin typeface="Arial" panose="020B0604020202020204" pitchFamily="34" charset="0"/>
               </a:rPr>
               <a:t>helos</a:t>
             </a:r>
             <a:r>
-              <a:rPr lang="en-US" sz="1400" b="0" i="0" dirty="0">
+              <a:rPr lang="en-US" sz="1300" b="0" i="0" dirty="0">
                 <a:effectLst/>
                 <a:latin typeface="Arial" panose="020B0604020202020204" pitchFamily="34" charset="0"/>
               </a:rPr>
@@ -7889,14 +9051,14 @@
               <a:buChar char="•"/>
             </a:pPr>
             <a:r>
-              <a:rPr lang="en-US" sz="1400" b="0" i="0" dirty="0" err="1">
+              <a:rPr lang="en-US" sz="1300" b="0" i="0" dirty="0" err="1">
                 <a:effectLst/>
                 <a:latin typeface="Arial" panose="020B0604020202020204" pitchFamily="34" charset="0"/>
               </a:rPr>
               <a:t>Helos</a:t>
             </a:r>
             <a:r>
-              <a:rPr lang="en-US" sz="1400" b="0" i="0" dirty="0">
+              <a:rPr lang="en-US" sz="1300" b="0" i="0" dirty="0">
                 <a:effectLst/>
                 <a:latin typeface="Arial" panose="020B0604020202020204" pitchFamily="34" charset="0"/>
               </a:rPr>
@@ -7912,21 +9074,21 @@
               <a:buChar char="•"/>
             </a:pPr>
             <a:r>
-              <a:rPr lang="en-US" sz="1400" b="0" i="0" dirty="0">
+              <a:rPr lang="en-US" sz="1300" b="0" i="0" dirty="0">
                 <a:effectLst/>
                 <a:latin typeface="Arial" panose="020B0604020202020204" pitchFamily="34" charset="0"/>
               </a:rPr>
               <a:t>Each </a:t>
             </a:r>
             <a:r>
-              <a:rPr lang="en-US" sz="1400" b="0" i="0" dirty="0" err="1">
+              <a:rPr lang="en-US" sz="1300" b="0" i="0" dirty="0" err="1">
                 <a:effectLst/>
                 <a:latin typeface="Arial" panose="020B0604020202020204" pitchFamily="34" charset="0"/>
               </a:rPr>
               <a:t>helo</a:t>
             </a:r>
             <a:r>
-              <a:rPr lang="en-US" sz="1400" b="0" i="0" dirty="0">
+              <a:rPr lang="en-US" sz="1300" b="0" i="0" dirty="0">
                 <a:effectLst/>
                 <a:latin typeface="Arial" panose="020B0604020202020204" pitchFamily="34" charset="0"/>
               </a:rPr>
@@ -7942,21 +9104,21 @@
               <a:buChar char="•"/>
             </a:pPr>
             <a:r>
-              <a:rPr lang="en-US" sz="1400" b="0" i="0" dirty="0">
+              <a:rPr lang="en-US" sz="1300" b="0" i="0" dirty="0">
                 <a:effectLst/>
                 <a:latin typeface="Arial" panose="020B0604020202020204" pitchFamily="34" charset="0"/>
               </a:rPr>
               <a:t>Each </a:t>
             </a:r>
             <a:r>
-              <a:rPr lang="en-US" sz="1400" b="0" i="0" dirty="0" err="1">
+              <a:rPr lang="en-US" sz="1300" b="0" i="0" dirty="0" err="1">
                 <a:effectLst/>
                 <a:latin typeface="Arial" panose="020B0604020202020204" pitchFamily="34" charset="0"/>
               </a:rPr>
               <a:t>helo</a:t>
             </a:r>
             <a:r>
-              <a:rPr lang="en-US" sz="1400" b="0" i="0" dirty="0">
+              <a:rPr lang="en-US" sz="1300" b="0" i="0" dirty="0">
                 <a:effectLst/>
                 <a:latin typeface="Arial" panose="020B0604020202020204" pitchFamily="34" charset="0"/>
               </a:rPr>
@@ -7972,7 +9134,7 @@
               <a:buChar char="•"/>
             </a:pPr>
             <a:r>
-              <a:rPr lang="en-US" sz="1400" b="0" i="0" dirty="0">
+              <a:rPr lang="en-US" sz="1300" b="0" i="0" dirty="0">
                 <a:solidFill>
                   <a:srgbClr val="FF0000"/>
                 </a:solidFill>
@@ -7982,7 +9144,7 @@
               <a:t>Crews may hot-seat aircraft (that is, a jet or </a:t>
             </a:r>
             <a:r>
-              <a:rPr lang="en-US" sz="1400" b="0" i="0" dirty="0" err="1">
+              <a:rPr lang="en-US" sz="1300" b="0" i="0" dirty="0" err="1">
                 <a:solidFill>
                   <a:srgbClr val="FF0000"/>
                 </a:solidFill>
@@ -7992,7 +9154,7 @@
               <a:t>helo</a:t>
             </a:r>
             <a:r>
-              <a:rPr lang="en-US" sz="1400" b="0" i="0" dirty="0">
+              <a:rPr lang="en-US" sz="1300" b="0" i="0" dirty="0">
                 <a:solidFill>
                   <a:srgbClr val="FF0000"/>
                 </a:solidFill>
@@ -8011,7 +9173,7 @@
               <a:buChar char="•"/>
             </a:pPr>
             <a:r>
-              <a:rPr lang="en-US" sz="1400" b="0" i="0" dirty="0">
+              <a:rPr lang="en-US" sz="1300" b="0" i="0" dirty="0">
                 <a:effectLst/>
                 <a:latin typeface="Arial" panose="020B0604020202020204" pitchFamily="34" charset="0"/>
               </a:rPr>
@@ -8027,20 +9189,20 @@
               <a:buChar char="•"/>
             </a:pPr>
             <a:r>
-              <a:rPr lang="en-US" sz="1400" b="0" i="0" dirty="0">
+              <a:rPr lang="en-US" sz="1300" b="0" i="0" dirty="0">
                 <a:effectLst/>
                 <a:latin typeface="Arial" panose="020B0604020202020204" pitchFamily="34" charset="0"/>
               </a:rPr>
               <a:t>Each jet needs 8 hours after it lands at it's home carrier for that day, unless </a:t>
             </a:r>
             <a:r>
-              <a:rPr lang="en-US" sz="1400" b="0" i="0" dirty="0" err="1">
+              <a:rPr lang="en-US" sz="1300" b="0" i="0" dirty="0" err="1">
                 <a:effectLst/>
                 <a:latin typeface="Arial" panose="020B0604020202020204" pitchFamily="34" charset="0"/>
               </a:rPr>
               <a:t>hotseating</a:t>
             </a:r>
-            <a:endParaRPr lang="en-US" sz="1400" b="0" i="0" dirty="0">
+            <a:endParaRPr lang="en-US" sz="1300" b="0" i="0" dirty="0">
               <a:effectLst/>
               <a:latin typeface="Arial" panose="020B0604020202020204" pitchFamily="34" charset="0"/>
             </a:endParaRPr>
@@ -8054,7 +9216,7 @@
               <a:buChar char="•"/>
             </a:pPr>
             <a:r>
-              <a:rPr lang="en-US" sz="1400" b="0" i="0" dirty="0">
+              <a:rPr lang="en-US" sz="1300" b="0" i="0" dirty="0">
                 <a:solidFill>
                   <a:srgbClr val="FF0000"/>
                 </a:solidFill>
@@ -8073,7 +9235,7 @@
               <a:buChar char="•"/>
             </a:pPr>
             <a:r>
-              <a:rPr lang="en-US" sz="1400" b="0" i="0" dirty="0">
+              <a:rPr lang="en-US" sz="1300" b="0" i="0" dirty="0">
                 <a:solidFill>
                   <a:srgbClr val="FF0000"/>
                 </a:solidFill>
@@ -8083,7 +9245,7 @@
               <a:t>Each carrier can accommodate 2x hotseats at a time in any combination of jet or </a:t>
             </a:r>
             <a:r>
-              <a:rPr lang="en-US" sz="1400" b="0" i="0" dirty="0" err="1">
+              <a:rPr lang="en-US" sz="1300" b="0" i="0" dirty="0" err="1">
                 <a:solidFill>
                   <a:srgbClr val="FF0000"/>
                 </a:solidFill>
@@ -8092,7 +9254,7 @@
               </a:rPr>
               <a:t>helo</a:t>
             </a:r>
-            <a:endParaRPr lang="en-US" sz="1400" b="0" i="0" dirty="0">
+            <a:endParaRPr lang="en-US" sz="1300" b="0" i="0" dirty="0">
               <a:solidFill>
                 <a:srgbClr val="FF0000"/>
               </a:solidFill>
@@ -8109,7 +9271,7 @@
               <a:buChar char="•"/>
             </a:pPr>
             <a:r>
-              <a:rPr lang="en-US" sz="1400" b="0" i="0" dirty="0">
+              <a:rPr lang="en-US" sz="1300" b="0" i="0" dirty="0">
                 <a:effectLst/>
                 <a:latin typeface="Arial" panose="020B0604020202020204" pitchFamily="34" charset="0"/>
               </a:rPr>
@@ -8125,7 +9287,7 @@
               <a:buChar char="•"/>
             </a:pPr>
             <a:r>
-              <a:rPr lang="en-US" sz="1400" b="0" i="0" dirty="0">
+              <a:rPr lang="en-US" sz="1300" b="0" i="0" dirty="0">
                 <a:effectLst/>
                 <a:latin typeface="Arial" panose="020B0604020202020204" pitchFamily="34" charset="0"/>
               </a:rPr>
@@ -8169,7 +9331,7 @@
           <p:cNvPr id="2" name="Title 1">
             <a:extLst>
               <a:ext uri="{FF2B5EF4-FFF2-40B4-BE49-F238E27FC236}">
-                <a16:creationId xmlns:a16="http://schemas.microsoft.com/office/drawing/2014/main" xmlns="" id="{E29B01D6-A7CA-4A3E-9C66-C2AA33322F12}"/>
+                <a16:creationId xmlns="" xmlns:a16="http://schemas.microsoft.com/office/drawing/2014/main" id="{E29B01D6-A7CA-4A3E-9C66-C2AA33322F12}"/>
               </a:ext>
             </a:extLst>
           </p:cNvPr>
@@ -8186,8 +9348,8 @@
           <a:lstStyle/>
           <a:p>
             <a:r>
-              <a:rPr lang="en-US" dirty="0"/>
-              <a:t>Mission </a:t>
+              <a:rPr lang="en-US" dirty="0" smtClean="0"/>
+              <a:t>EJJ Mission </a:t>
             </a:r>
             <a:r>
               <a:rPr lang="en-US" dirty="0" smtClean="0"/>
@@ -8205,7 +9367,7 @@
           <p:cNvPr id="3" name="Content Placeholder 2">
             <a:extLst>
               <a:ext uri="{FF2B5EF4-FFF2-40B4-BE49-F238E27FC236}">
-                <a16:creationId xmlns:a16="http://schemas.microsoft.com/office/drawing/2014/main" xmlns="" id="{F1842140-4ACB-41A9-BC7F-30570259E5D8}"/>
+                <a16:creationId xmlns="" xmlns:a16="http://schemas.microsoft.com/office/drawing/2014/main" id="{F1842140-4ACB-41A9-BC7F-30570259E5D8}"/>
               </a:ext>
             </a:extLst>
           </p:cNvPr>
@@ -8309,7 +9471,7 @@
           <p:cNvPr id="4" name="Footer Placeholder 3">
             <a:extLst>
               <a:ext uri="{FF2B5EF4-FFF2-40B4-BE49-F238E27FC236}">
-                <a16:creationId xmlns:a16="http://schemas.microsoft.com/office/drawing/2014/main" xmlns="" id="{C401FFE3-F414-4CF5-AD6A-9C2DE5116ED4}"/>
+                <a16:creationId xmlns="" xmlns:a16="http://schemas.microsoft.com/office/drawing/2014/main" id="{C401FFE3-F414-4CF5-AD6A-9C2DE5116ED4}"/>
               </a:ext>
             </a:extLst>
           </p:cNvPr>
@@ -8374,7 +9536,7 @@
           <p:cNvPr id="2" name="Title 1">
             <a:extLst>
               <a:ext uri="{FF2B5EF4-FFF2-40B4-BE49-F238E27FC236}">
-                <a16:creationId xmlns:a16="http://schemas.microsoft.com/office/drawing/2014/main" xmlns="" id="{E29B01D6-A7CA-4A3E-9C66-C2AA33322F12}"/>
+                <a16:creationId xmlns="" xmlns:a16="http://schemas.microsoft.com/office/drawing/2014/main" id="{E29B01D6-A7CA-4A3E-9C66-C2AA33322F12}"/>
               </a:ext>
             </a:extLst>
           </p:cNvPr>
@@ -8391,8 +9553,8 @@
           <a:lstStyle/>
           <a:p>
             <a:r>
-              <a:rPr lang="en-US" dirty="0"/>
-              <a:t>Mission </a:t>
+              <a:rPr lang="en-US" dirty="0" smtClean="0"/>
+              <a:t>EJJ Mission </a:t>
             </a:r>
             <a:r>
               <a:rPr lang="en-US" dirty="0" smtClean="0"/>
@@ -8410,7 +9572,7 @@
           <p:cNvPr id="3" name="Content Placeholder 2">
             <a:extLst>
               <a:ext uri="{FF2B5EF4-FFF2-40B4-BE49-F238E27FC236}">
-                <a16:creationId xmlns:a16="http://schemas.microsoft.com/office/drawing/2014/main" xmlns="" id="{F1842140-4ACB-41A9-BC7F-30570259E5D8}"/>
+                <a16:creationId xmlns="" xmlns:a16="http://schemas.microsoft.com/office/drawing/2014/main" id="{F1842140-4ACB-41A9-BC7F-30570259E5D8}"/>
               </a:ext>
             </a:extLst>
           </p:cNvPr>
@@ -8484,7 +9646,7 @@
           <p:cNvPr id="4" name="Footer Placeholder 3">
             <a:extLst>
               <a:ext uri="{FF2B5EF4-FFF2-40B4-BE49-F238E27FC236}">
-                <a16:creationId xmlns:a16="http://schemas.microsoft.com/office/drawing/2014/main" xmlns="" id="{C401FFE3-F414-4CF5-AD6A-9C2DE5116ED4}"/>
+                <a16:creationId xmlns="" xmlns:a16="http://schemas.microsoft.com/office/drawing/2014/main" id="{C401FFE3-F414-4CF5-AD6A-9C2DE5116ED4}"/>
               </a:ext>
             </a:extLst>
           </p:cNvPr>
@@ -8549,7 +9711,7 @@
           <p:cNvPr id="2" name="Title 1">
             <a:extLst>
               <a:ext uri="{FF2B5EF4-FFF2-40B4-BE49-F238E27FC236}">
-                <a16:creationId xmlns:a16="http://schemas.microsoft.com/office/drawing/2014/main" xmlns="" id="{E29B01D6-A7CA-4A3E-9C66-C2AA33322F12}"/>
+                <a16:creationId xmlns="" xmlns:a16="http://schemas.microsoft.com/office/drawing/2014/main" id="{E29B01D6-A7CA-4A3E-9C66-C2AA33322F12}"/>
               </a:ext>
             </a:extLst>
           </p:cNvPr>
@@ -8566,8 +9728,8 @@
           <a:lstStyle/>
           <a:p>
             <a:r>
-              <a:rPr lang="en-US" dirty="0"/>
-              <a:t>Mission </a:t>
+              <a:rPr lang="en-US" dirty="0" smtClean="0"/>
+              <a:t>EJJ Mission </a:t>
             </a:r>
             <a:r>
               <a:rPr lang="en-US" dirty="0" smtClean="0"/>
@@ -8585,7 +9747,7 @@
           <p:cNvPr id="3" name="Content Placeholder 2">
             <a:extLst>
               <a:ext uri="{FF2B5EF4-FFF2-40B4-BE49-F238E27FC236}">
-                <a16:creationId xmlns:a16="http://schemas.microsoft.com/office/drawing/2014/main" xmlns="" id="{F1842140-4ACB-41A9-BC7F-30570259E5D8}"/>
+                <a16:creationId xmlns="" xmlns:a16="http://schemas.microsoft.com/office/drawing/2014/main" id="{F1842140-4ACB-41A9-BC7F-30570259E5D8}"/>
               </a:ext>
             </a:extLst>
           </p:cNvPr>
@@ -8619,8 +9781,20 @@
             </a:r>
             <a:r>
               <a:rPr lang="en-US" dirty="0" smtClean="0"/>
-              <a:t>, and missiles, including reposition times and rest times, are displayed on the web page</a:t>
-            </a:r>
+              <a:t>, and missiles, including reposition times and rest times, are displayed on the web </a:t>
+            </a:r>
+            <a:r>
+              <a:rPr lang="en-US" dirty="0" smtClean="0"/>
+              <a:t>page</a:t>
+            </a:r>
+          </a:p>
+          <a:p>
+            <a:pPr lvl="1"/>
+            <a:r>
+              <a:rPr lang="en-US" dirty="0" smtClean="0"/>
+              <a:t>Also, display the number of successful target strikes achieved</a:t>
+            </a:r>
+            <a:endParaRPr lang="en-US" dirty="0" smtClean="0"/>
           </a:p>
           <a:p>
             <a:r>
@@ -8642,7 +9816,7 @@
           <p:cNvPr id="4" name="Footer Placeholder 3">
             <a:extLst>
               <a:ext uri="{FF2B5EF4-FFF2-40B4-BE49-F238E27FC236}">
-                <a16:creationId xmlns:a16="http://schemas.microsoft.com/office/drawing/2014/main" xmlns="" id="{C401FFE3-F414-4CF5-AD6A-9C2DE5116ED4}"/>
+                <a16:creationId xmlns="" xmlns:a16="http://schemas.microsoft.com/office/drawing/2014/main" id="{C401FFE3-F414-4CF5-AD6A-9C2DE5116ED4}"/>
               </a:ext>
             </a:extLst>
           </p:cNvPr>

</xml_diff>

<commit_message>
updated the button text
</commit_message>
<xml_diff>
--- a/TeamEJJ.pptx
+++ b/TeamEJJ.pptx
@@ -5,10 +5,10 @@
     <p:sldMasterId id="2147483660" r:id="rId1"/>
   </p:sldMasterIdLst>
   <p:notesMasterIdLst>
-    <p:notesMasterId r:id="rId26"/>
+    <p:notesMasterId r:id="rId30"/>
   </p:notesMasterIdLst>
   <p:handoutMasterIdLst>
-    <p:handoutMasterId r:id="rId27"/>
+    <p:handoutMasterId r:id="rId31"/>
   </p:handoutMasterIdLst>
   <p:sldIdLst>
     <p:sldId id="256" r:id="rId2"/>
@@ -27,14 +27,18 @@
     <p:sldId id="275" r:id="rId15"/>
     <p:sldId id="277" r:id="rId16"/>
     <p:sldId id="278" r:id="rId17"/>
-    <p:sldId id="266" r:id="rId18"/>
-    <p:sldId id="259" r:id="rId19"/>
-    <p:sldId id="271" r:id="rId20"/>
-    <p:sldId id="270" r:id="rId21"/>
-    <p:sldId id="272" r:id="rId22"/>
-    <p:sldId id="273" r:id="rId23"/>
-    <p:sldId id="260" r:id="rId24"/>
-    <p:sldId id="261" r:id="rId25"/>
+    <p:sldId id="282" r:id="rId18"/>
+    <p:sldId id="283" r:id="rId19"/>
+    <p:sldId id="266" r:id="rId20"/>
+    <p:sldId id="259" r:id="rId21"/>
+    <p:sldId id="281" r:id="rId22"/>
+    <p:sldId id="280" r:id="rId23"/>
+    <p:sldId id="271" r:id="rId24"/>
+    <p:sldId id="270" r:id="rId25"/>
+    <p:sldId id="272" r:id="rId26"/>
+    <p:sldId id="273" r:id="rId27"/>
+    <p:sldId id="260" r:id="rId28"/>
+    <p:sldId id="261" r:id="rId29"/>
   </p:sldIdLst>
   <p:sldSz cx="12192000" cy="6858000"/>
   <p:notesSz cx="6858000" cy="9144000"/>
@@ -4693,36 +4697,6 @@
           </a:p>
         </p:txBody>
       </p:sp>
-      <p:pic>
-        <p:nvPicPr>
-          <p:cNvPr id="5" name="Picture 4">
-            <a:extLst>
-              <a:ext uri="{FF2B5EF4-FFF2-40B4-BE49-F238E27FC236}">
-                <a16:creationId xmlns:a16="http://schemas.microsoft.com/office/drawing/2014/main" id="{7C99ED1B-AADE-4E57-93AE-BBA3D88EDF50}"/>
-              </a:ext>
-            </a:extLst>
-          </p:cNvPr>
-          <p:cNvPicPr>
-            <a:picLocks noChangeAspect="1"/>
-          </p:cNvPicPr>
-          <p:nvPr/>
-        </p:nvPicPr>
-        <p:blipFill>
-          <a:blip r:embed="rId2"/>
-          <a:stretch>
-            <a:fillRect/>
-          </a:stretch>
-        </p:blipFill>
-        <p:spPr>
-          <a:xfrm>
-            <a:off x="337635" y="1379013"/>
-            <a:ext cx="11307922" cy="2582941"/>
-          </a:xfrm>
-          <a:prstGeom prst="rect">
-            <a:avLst/>
-          </a:prstGeom>
-        </p:spPr>
-      </p:pic>
       <p:sp>
         <p:nvSpPr>
           <p:cNvPr id="7" name="TextBox 6">
@@ -4738,7 +4712,7 @@
         <p:spPr>
           <a:xfrm>
             <a:off x="689759" y="4104472"/>
-            <a:ext cx="10306792" cy="3139321"/>
+            <a:ext cx="10306792" cy="2585323"/>
           </a:xfrm>
           <a:prstGeom prst="rect">
             <a:avLst/>
@@ -4823,31 +4797,7 @@
                   <a:srgbClr val="7030A0"/>
                 </a:solidFill>
               </a:rPr>
-              <a:t>Rest displayed as well</a:t>
-            </a:r>
-          </a:p>
-          <a:p>
-            <a:r>
-              <a:rPr lang="en-US" dirty="0">
-                <a:solidFill>
-                  <a:srgbClr val="FF0000"/>
-                </a:solidFill>
-              </a:rPr>
-              <a:t>Analysis (not implemented)</a:t>
-            </a:r>
-          </a:p>
-          <a:p>
-            <a:pPr marL="285750" indent="-285750">
-              <a:buFontTx/>
-              <a:buChar char="-"/>
-            </a:pPr>
-            <a:r>
-              <a:rPr lang="en-US" dirty="0">
-                <a:solidFill>
-                  <a:srgbClr val="FF0000"/>
-                </a:solidFill>
-              </a:rPr>
-              <a:t>Quickly see the effects of survivability and success in real time</a:t>
+              <a:t>Rest time after the sortie displayed as well</a:t>
             </a:r>
           </a:p>
           <a:p>
@@ -5067,36 +5017,6 @@
           </a:p>
         </p:txBody>
       </p:sp>
-      <p:pic>
-        <p:nvPicPr>
-          <p:cNvPr id="6" name="Picture 5">
-            <a:extLst>
-              <a:ext uri="{FF2B5EF4-FFF2-40B4-BE49-F238E27FC236}">
-                <a16:creationId xmlns:a16="http://schemas.microsoft.com/office/drawing/2014/main" id="{D3F1BCBC-0B78-4854-A6D4-E89A21E3429E}"/>
-              </a:ext>
-            </a:extLst>
-          </p:cNvPr>
-          <p:cNvPicPr>
-            <a:picLocks noChangeAspect="1"/>
-          </p:cNvPicPr>
-          <p:nvPr/>
-        </p:nvPicPr>
-        <p:blipFill>
-          <a:blip r:embed="rId2"/>
-          <a:stretch>
-            <a:fillRect/>
-          </a:stretch>
-        </p:blipFill>
-        <p:spPr>
-          <a:xfrm>
-            <a:off x="461463" y="1601901"/>
-            <a:ext cx="7154273" cy="3096057"/>
-          </a:xfrm>
-          <a:prstGeom prst="rect">
-            <a:avLst/>
-          </a:prstGeom>
-        </p:spPr>
-      </p:pic>
       <p:sp>
         <p:nvSpPr>
           <p:cNvPr id="7" name="TextBox 6">
@@ -5199,7 +5119,7 @@
           <p:cNvPr id="2" name="Title 1">
             <a:extLst>
               <a:ext uri="{FF2B5EF4-FFF2-40B4-BE49-F238E27FC236}">
-                <a16:creationId xmlns:a16="http://schemas.microsoft.com/office/drawing/2014/main" id="{E29B01D6-A7CA-4A3E-9C66-C2AA33322F12}"/>
+                <a16:creationId xmlns:a16="http://schemas.microsoft.com/office/drawing/2014/main" id="{F957234A-F1A3-453E-8A2C-61F082D663C1}"/>
               </a:ext>
             </a:extLst>
           </p:cNvPr>
@@ -5210,109 +5130,20 @@
             <p:ph type="title"/>
           </p:nvPr>
         </p:nvSpPr>
-        <p:spPr/>
+        <p:spPr>
+          <a:xfrm>
+            <a:off x="838200" y="365126"/>
+            <a:ext cx="10515600" cy="1095540"/>
+          </a:xfrm>
+        </p:spPr>
         <p:txBody>
           <a:bodyPr/>
           <a:lstStyle/>
           <a:p>
             <a:r>
               <a:rPr lang="en-US" dirty="0"/>
-              <a:t>Improvements to Mission Planning/Mission Execution Processes</a:t>
-            </a:r>
-          </a:p>
-        </p:txBody>
-      </p:sp>
-      <p:sp>
-        <p:nvSpPr>
-          <p:cNvPr id="3" name="Content Placeholder 2">
-            <a:extLst>
-              <a:ext uri="{FF2B5EF4-FFF2-40B4-BE49-F238E27FC236}">
-                <a16:creationId xmlns:a16="http://schemas.microsoft.com/office/drawing/2014/main" id="{F1842140-4ACB-41A9-BC7F-30570259E5D8}"/>
-              </a:ext>
-            </a:extLst>
-          </p:cNvPr>
-          <p:cNvSpPr>
-            <a:spLocks noGrp="1"/>
-          </p:cNvSpPr>
-          <p:nvPr>
-            <p:ph idx="1"/>
-          </p:nvPr>
-        </p:nvSpPr>
-        <p:spPr/>
-        <p:txBody>
-          <a:bodyPr>
-            <a:normAutofit lnSpcReduction="10000"/>
-          </a:bodyPr>
-          <a:lstStyle/>
-          <a:p>
-            <a:r>
-              <a:rPr lang="en-US" dirty="0"/>
-              <a:t>Reduced user clicks by dragging and dropping target tasking onto the web page</a:t>
-            </a:r>
-          </a:p>
-          <a:p>
-            <a:pPr lvl="1"/>
-            <a:r>
-              <a:rPr lang="en-US" dirty="0"/>
-              <a:t>1 click vs. 7+ clicks when importing ATO/ACO through Task View and porting over the targets/</a:t>
-            </a:r>
-            <a:r>
-              <a:rPr lang="en-US" dirty="0" err="1"/>
-              <a:t>GeoZones</a:t>
-            </a:r>
-            <a:r>
-              <a:rPr lang="en-US" dirty="0"/>
-              <a:t> into JMPS</a:t>
-            </a:r>
-          </a:p>
-          <a:p>
-            <a:r>
-              <a:rPr lang="en-US" dirty="0"/>
-              <a:t>Automated task scheduling based on survivability</a:t>
-            </a:r>
-          </a:p>
-          <a:p>
-            <a:r>
-              <a:rPr lang="en-US" dirty="0"/>
-              <a:t>Automated sortie scheduling given constraints/restraints</a:t>
-            </a:r>
-          </a:p>
-          <a:p>
-            <a:r>
-              <a:rPr lang="en-US" dirty="0"/>
-              <a:t>Dynamic sortie </a:t>
-            </a:r>
-            <a:r>
-              <a:rPr lang="en-US" dirty="0" err="1"/>
-              <a:t>replan</a:t>
-            </a:r>
-            <a:r>
-              <a:rPr lang="en-US" dirty="0"/>
-              <a:t> capability during Mission Execution</a:t>
-            </a:r>
-          </a:p>
-          <a:p>
-            <a:r>
-              <a:rPr lang="en-US" dirty="0"/>
-              <a:t>User-friendly drag and drop capability to create a friendly force laydown</a:t>
-            </a:r>
-          </a:p>
-          <a:p>
-            <a:pPr lvl="1"/>
-            <a:r>
-              <a:rPr lang="en-US" dirty="0"/>
-              <a:t>Once created, this can be saved and reloaded</a:t>
-            </a:r>
-          </a:p>
-          <a:p>
-            <a:pPr marL="914400" lvl="2" indent="0">
-              <a:buNone/>
-            </a:pPr>
-            <a:endParaRPr lang="en-US" dirty="0"/>
-          </a:p>
-          <a:p>
-            <a:pPr lvl="1"/>
-            <a:endParaRPr lang="en-US" dirty="0"/>
+              <a:t>Collaboration during Mission Planning</a:t>
+            </a:r>
           </a:p>
         </p:txBody>
       </p:sp>
@@ -5321,7 +5152,7 @@
           <p:cNvPr id="4" name="Footer Placeholder 3">
             <a:extLst>
               <a:ext uri="{FF2B5EF4-FFF2-40B4-BE49-F238E27FC236}">
-                <a16:creationId xmlns:a16="http://schemas.microsoft.com/office/drawing/2014/main" id="{C401FFE3-F414-4CF5-AD6A-9C2DE5116ED4}"/>
+                <a16:creationId xmlns:a16="http://schemas.microsoft.com/office/drawing/2014/main" id="{169FFFA7-9B2C-49FC-AC49-66B5B7B7C039}"/>
               </a:ext>
             </a:extLst>
           </p:cNvPr>
@@ -5351,10 +5182,85 @@
           </a:p>
         </p:txBody>
       </p:sp>
+      <p:sp>
+        <p:nvSpPr>
+          <p:cNvPr id="8" name="Content Placeholder 7">
+            <a:extLst>
+              <a:ext uri="{FF2B5EF4-FFF2-40B4-BE49-F238E27FC236}">
+                <a16:creationId xmlns:a16="http://schemas.microsoft.com/office/drawing/2014/main" id="{2E7707F0-D0DA-4C8D-B2BA-9A55BACB9F14}"/>
+              </a:ext>
+            </a:extLst>
+          </p:cNvPr>
+          <p:cNvSpPr>
+            <a:spLocks noGrp="1"/>
+          </p:cNvSpPr>
+          <p:nvPr>
+            <p:ph idx="1"/>
+          </p:nvPr>
+        </p:nvSpPr>
+        <p:spPr>
+          <a:xfrm>
+            <a:off x="836221" y="1395351"/>
+            <a:ext cx="10515600" cy="4781612"/>
+          </a:xfrm>
+        </p:spPr>
+        <p:txBody>
+          <a:bodyPr/>
+          <a:lstStyle/>
+          <a:p>
+            <a:r>
+              <a:rPr lang="en-US" dirty="0"/>
+              <a:t>Set the active mission or the mission session to plan with</a:t>
+            </a:r>
+          </a:p>
+          <a:p>
+            <a:r>
+              <a:rPr lang="en-US" dirty="0"/>
+              <a:t>Multiple planners across multiple platforms can work on the same mission session</a:t>
+            </a:r>
+          </a:p>
+          <a:p>
+            <a:r>
+              <a:rPr lang="en-US" dirty="0"/>
+              <a:t>Active mission displayed on the top right</a:t>
+            </a:r>
+          </a:p>
+        </p:txBody>
+      </p:sp>
+      <p:pic>
+        <p:nvPicPr>
+          <p:cNvPr id="12" name="Picture 11">
+            <a:extLst>
+              <a:ext uri="{FF2B5EF4-FFF2-40B4-BE49-F238E27FC236}">
+                <a16:creationId xmlns:a16="http://schemas.microsoft.com/office/drawing/2014/main" id="{0F2C8AFF-C8FC-4837-8C61-15D24392CD73}"/>
+              </a:ext>
+            </a:extLst>
+          </p:cNvPr>
+          <p:cNvPicPr>
+            <a:picLocks noChangeAspect="1"/>
+          </p:cNvPicPr>
+          <p:nvPr/>
+        </p:nvPicPr>
+        <p:blipFill>
+          <a:blip r:embed="rId2"/>
+          <a:stretch>
+            <a:fillRect/>
+          </a:stretch>
+        </p:blipFill>
+        <p:spPr>
+          <a:xfrm>
+            <a:off x="1273628" y="4485429"/>
+            <a:ext cx="9751621" cy="1691534"/>
+          </a:xfrm>
+          <a:prstGeom prst="rect">
+            <a:avLst/>
+          </a:prstGeom>
+        </p:spPr>
+      </p:pic>
     </p:spTree>
     <p:extLst>
       <p:ext uri="{BB962C8B-B14F-4D97-AF65-F5344CB8AC3E}">
-        <p14:creationId xmlns:p14="http://schemas.microsoft.com/office/powerpoint/2010/main" val="3129570609"/>
+        <p14:creationId xmlns:p14="http://schemas.microsoft.com/office/powerpoint/2010/main" val="3595705282"/>
       </p:ext>
     </p:extLst>
   </p:cSld>
@@ -5383,10 +5289,43 @@
       </p:grpSpPr>
       <p:sp>
         <p:nvSpPr>
+          <p:cNvPr id="2" name="Title 1">
+            <a:extLst>
+              <a:ext uri="{FF2B5EF4-FFF2-40B4-BE49-F238E27FC236}">
+                <a16:creationId xmlns:a16="http://schemas.microsoft.com/office/drawing/2014/main" id="{F957234A-F1A3-453E-8A2C-61F082D663C1}"/>
+              </a:ext>
+            </a:extLst>
+          </p:cNvPr>
+          <p:cNvSpPr>
+            <a:spLocks noGrp="1"/>
+          </p:cNvSpPr>
+          <p:nvPr>
+            <p:ph type="title"/>
+          </p:nvPr>
+        </p:nvSpPr>
+        <p:spPr>
+          <a:xfrm>
+            <a:off x="838200" y="365126"/>
+            <a:ext cx="10515600" cy="1095540"/>
+          </a:xfrm>
+        </p:spPr>
+        <p:txBody>
+          <a:bodyPr/>
+          <a:lstStyle/>
+          <a:p>
+            <a:r>
+              <a:rPr lang="en-US" dirty="0"/>
+              <a:t>Collaboration during Mission Planning</a:t>
+            </a:r>
+          </a:p>
+        </p:txBody>
+      </p:sp>
+      <p:sp>
+        <p:nvSpPr>
           <p:cNvPr id="4" name="Footer Placeholder 3">
             <a:extLst>
               <a:ext uri="{FF2B5EF4-FFF2-40B4-BE49-F238E27FC236}">
-                <a16:creationId xmlns:a16="http://schemas.microsoft.com/office/drawing/2014/main" id="{7B57FAC7-9A78-418C-B807-48ECCF0BCB6C}"/>
+                <a16:creationId xmlns:a16="http://schemas.microsoft.com/office/drawing/2014/main" id="{169FFFA7-9B2C-49FC-AC49-66B5B7B7C039}"/>
               </a:ext>
             </a:extLst>
           </p:cNvPr>
@@ -5403,66 +5342,62 @@
           <a:lstStyle/>
           <a:p>
             <a:r>
-              <a:rPr lang="en-US" dirty="0">
+              <a:rPr lang="en-US">
                 <a:latin typeface="Courier New" panose="02070309020205020404" pitchFamily="49" charset="0"/>
                 <a:cs typeface="Courier New" panose="02070309020205020404" pitchFamily="49" charset="0"/>
               </a:rPr>
               <a:t>Team EJJ</a:t>
             </a:r>
-          </a:p>
-        </p:txBody>
-      </p:sp>
-      <p:pic>
-        <p:nvPicPr>
-          <p:cNvPr id="2050" name="Picture 2" descr="Gypsy Curse">
+            <a:endParaRPr lang="en-US" dirty="0">
+              <a:latin typeface="Courier New" panose="02070309020205020404" pitchFamily="49" charset="0"/>
+              <a:cs typeface="Courier New" panose="02070309020205020404" pitchFamily="49" charset="0"/>
+            </a:endParaRPr>
+          </a:p>
+        </p:txBody>
+      </p:sp>
+      <p:sp>
+        <p:nvSpPr>
+          <p:cNvPr id="8" name="Content Placeholder 7">
             <a:extLst>
               <a:ext uri="{FF2B5EF4-FFF2-40B4-BE49-F238E27FC236}">
-                <a16:creationId xmlns:a16="http://schemas.microsoft.com/office/drawing/2014/main" id="{7173D12A-5393-4EF8-B04F-3F560643558C}"/>
+                <a16:creationId xmlns:a16="http://schemas.microsoft.com/office/drawing/2014/main" id="{2E7707F0-D0DA-4C8D-B2BA-9A55BACB9F14}"/>
               </a:ext>
             </a:extLst>
           </p:cNvPr>
-          <p:cNvPicPr>
-            <a:picLocks noChangeAspect="1" noChangeArrowheads="1"/>
-          </p:cNvPicPr>
-          <p:nvPr/>
-        </p:nvPicPr>
-        <p:blipFill>
-          <a:blip r:embed="rId2">
-            <a:extLst>
-              <a:ext uri="{28A0092B-C50C-407E-A947-70E740481C1C}">
-                <a14:useLocalDpi xmlns:a14="http://schemas.microsoft.com/office/drawing/2010/main" val="0"/>
-              </a:ext>
-            </a:extLst>
-          </a:blip>
-          <a:srcRect/>
-          <a:stretch>
-            <a:fillRect/>
-          </a:stretch>
-        </p:blipFill>
-        <p:spPr bwMode="auto">
+          <p:cNvSpPr>
+            <a:spLocks noGrp="1"/>
+          </p:cNvSpPr>
+          <p:nvPr>
+            <p:ph idx="1"/>
+          </p:nvPr>
+        </p:nvSpPr>
+        <p:spPr>
           <a:xfrm>
-            <a:off x="2250930" y="2440380"/>
-            <a:ext cx="7901631" cy="1831645"/>
+            <a:off x="836221" y="1395351"/>
+            <a:ext cx="10515600" cy="4781612"/>
           </a:xfrm>
-          <a:prstGeom prst="rect">
-            <a:avLst/>
-          </a:prstGeom>
-          <a:noFill/>
-          <a:extLst>
-            <a:ext uri="{909E8E84-426E-40DD-AFC4-6F175D3DCCD1}">
-              <a14:hiddenFill xmlns:a14="http://schemas.microsoft.com/office/drawing/2010/main">
-                <a:solidFill>
-                  <a:srgbClr val="FFFFFF"/>
-                </a:solidFill>
-              </a14:hiddenFill>
-            </a:ext>
-          </a:extLst>
         </p:spPr>
-      </p:pic>
+        <p:txBody>
+          <a:bodyPr/>
+          <a:lstStyle/>
+          <a:p>
+            <a:r>
+              <a:rPr lang="en-US" dirty="0"/>
+              <a:t>Mission planners can collaboratively adjust, verify, and plan routes on targets</a:t>
+            </a:r>
+          </a:p>
+          <a:p>
+            <a:r>
+              <a:rPr lang="en-US" dirty="0"/>
+              <a:t>See progress of targets in real time </a:t>
+            </a:r>
+          </a:p>
+        </p:txBody>
+      </p:sp>
     </p:spTree>
     <p:extLst>
       <p:ext uri="{BB962C8B-B14F-4D97-AF65-F5344CB8AC3E}">
-        <p14:creationId xmlns:p14="http://schemas.microsoft.com/office/powerpoint/2010/main" val="935959818"/>
+        <p14:creationId xmlns:p14="http://schemas.microsoft.com/office/powerpoint/2010/main" val="3603947618"/>
       </p:ext>
     </p:extLst>
   </p:cSld>
@@ -5491,7 +5426,13 @@
       </p:grpSpPr>
       <p:sp>
         <p:nvSpPr>
-          <p:cNvPr id="2" name="Title 1"/>
+          <p:cNvPr id="2" name="Title 1">
+            <a:extLst>
+              <a:ext uri="{FF2B5EF4-FFF2-40B4-BE49-F238E27FC236}">
+                <a16:creationId xmlns:a16="http://schemas.microsoft.com/office/drawing/2014/main" id="{E29B01D6-A7CA-4A3E-9C66-C2AA33322F12}"/>
+              </a:ext>
+            </a:extLst>
+          </p:cNvPr>
           <p:cNvSpPr>
             <a:spLocks noGrp="1"/>
           </p:cNvSpPr>
@@ -5499,26 +5440,27 @@
             <p:ph type="title"/>
           </p:nvPr>
         </p:nvSpPr>
-        <p:spPr>
-          <a:xfrm>
-            <a:off x="838200" y="298623"/>
-            <a:ext cx="10515600" cy="1325563"/>
-          </a:xfrm>
-        </p:spPr>
+        <p:spPr/>
         <p:txBody>
           <a:bodyPr/>
           <a:lstStyle/>
           <a:p>
             <a:r>
               <a:rPr lang="en-US" dirty="0"/>
-              <a:t>EJJ Scheduling Algorithm Details (1)</a:t>
-            </a:r>
-          </a:p>
-        </p:txBody>
-      </p:sp>
-      <p:sp>
-        <p:nvSpPr>
-          <p:cNvPr id="3" name="Content Placeholder 2"/>
+              <a:t>Improvements to Mission Planning/Mission Execution Processes</a:t>
+            </a:r>
+          </a:p>
+        </p:txBody>
+      </p:sp>
+      <p:sp>
+        <p:nvSpPr>
+          <p:cNvPr id="3" name="Content Placeholder 2">
+            <a:extLst>
+              <a:ext uri="{FF2B5EF4-FFF2-40B4-BE49-F238E27FC236}">
+                <a16:creationId xmlns:a16="http://schemas.microsoft.com/office/drawing/2014/main" id="{F1842140-4ACB-41A9-BC7F-30570259E5D8}"/>
+              </a:ext>
+            </a:extLst>
+          </p:cNvPr>
           <p:cNvSpPr>
             <a:spLocks noGrp="1"/>
           </p:cNvSpPr>
@@ -5529,79 +5471,90 @@
         <p:spPr/>
         <p:txBody>
           <a:bodyPr>
-            <a:normAutofit fontScale="92500" lnSpcReduction="10000"/>
+            <a:normAutofit lnSpcReduction="10000"/>
           </a:bodyPr>
           <a:lstStyle/>
           <a:p>
             <a:r>
               <a:rPr lang="en-US" dirty="0"/>
-              <a:t>Inputs:</a:t>
+              <a:t>Reduced user clicks by dragging and dropping target tasking onto the web page</a:t>
             </a:r>
           </a:p>
           <a:p>
             <a:pPr lvl="1"/>
             <a:r>
               <a:rPr lang="en-US" dirty="0"/>
-              <a:t>Constraints/Restraints, Inventory, Maximum Sortie Length, Earliest Start Time</a:t>
-            </a:r>
-          </a:p>
-          <a:p>
-            <a:pPr marL="457200" lvl="1" indent="0">
+              <a:t>1 click vs. 7+ clicks when importing ATO/ACO through Task View and porting over the targets/</a:t>
+            </a:r>
+            <a:r>
+              <a:rPr lang="en-US" dirty="0" err="1"/>
+              <a:t>GeoZones</a:t>
+            </a:r>
+            <a:r>
+              <a:rPr lang="en-US" dirty="0"/>
+              <a:t> into JMPS</a:t>
+            </a:r>
+          </a:p>
+          <a:p>
+            <a:r>
+              <a:rPr lang="en-US" dirty="0"/>
+              <a:t>Automated task scheduling based on survivability</a:t>
+            </a:r>
+          </a:p>
+          <a:p>
+            <a:r>
+              <a:rPr lang="en-US" dirty="0"/>
+              <a:t>Automated sortie scheduling given constraints/restraints</a:t>
+            </a:r>
+          </a:p>
+          <a:p>
+            <a:r>
+              <a:rPr lang="en-US" dirty="0"/>
+              <a:t>Dynamic sortie </a:t>
+            </a:r>
+            <a:r>
+              <a:rPr lang="en-US" dirty="0" err="1"/>
+              <a:t>replan</a:t>
+            </a:r>
+            <a:r>
+              <a:rPr lang="en-US" dirty="0"/>
+              <a:t> capability during Mission Execution</a:t>
+            </a:r>
+          </a:p>
+          <a:p>
+            <a:r>
+              <a:rPr lang="en-US" dirty="0"/>
+              <a:t>User-friendly drag and drop capability to create a friendly force laydown</a:t>
+            </a:r>
+          </a:p>
+          <a:p>
+            <a:pPr lvl="1"/>
+            <a:r>
+              <a:rPr lang="en-US" dirty="0"/>
+              <a:t>Once created, this can be saved and reloaded</a:t>
+            </a:r>
+          </a:p>
+          <a:p>
+            <a:pPr marL="914400" lvl="2" indent="0">
               <a:buNone/>
             </a:pPr>
             <a:endParaRPr lang="en-US" dirty="0"/>
           </a:p>
           <a:p>
-            <a:r>
-              <a:rPr lang="en-US" dirty="0"/>
-              <a:t>Start by finding a carrier with more jets and pilots to be the carrier to start the sortie from</a:t>
-            </a:r>
-          </a:p>
-          <a:p>
             <a:pPr lvl="1"/>
-            <a:r>
-              <a:rPr lang="en-US" dirty="0"/>
-              <a:t>Also try to find a carrier with available </a:t>
-            </a:r>
-            <a:r>
-              <a:rPr lang="en-US" dirty="0" err="1"/>
-              <a:t>helos</a:t>
-            </a:r>
             <a:endParaRPr lang="en-US" dirty="0"/>
           </a:p>
-          <a:p>
-            <a:r>
-              <a:rPr lang="en-US" dirty="0"/>
-              <a:t>The number of jets/pilots needed is determined by the number of missiles needed for 90% probability of success at striking the target depending on the requirement (i.e. disable or destroy)</a:t>
-            </a:r>
-          </a:p>
-          <a:p>
-            <a:pPr lvl="1"/>
-            <a:r>
-              <a:rPr lang="en-US" dirty="0"/>
-              <a:t>Also depends on the chosen </a:t>
-            </a:r>
-            <a:r>
-              <a:rPr lang="en-US" dirty="0" err="1"/>
-              <a:t>jets’s</a:t>
-            </a:r>
-            <a:r>
-              <a:rPr lang="en-US" dirty="0"/>
-              <a:t> missile carriage capacity</a:t>
-            </a:r>
-          </a:p>
-          <a:p>
-            <a:pPr lvl="1"/>
-            <a:r>
-              <a:rPr lang="en-US" dirty="0"/>
-              <a:t>Assuming that each jet can carry only 1 missile at first; Will have more jets/pilots to choose the final set from</a:t>
-            </a:r>
-          </a:p>
-        </p:txBody>
-      </p:sp>
-      <p:sp>
-        <p:nvSpPr>
-          <p:cNvPr id="4" name="Footer Placeholder 3"/>
+        </p:txBody>
+      </p:sp>
+      <p:sp>
+        <p:nvSpPr>
+          <p:cNvPr id="4" name="Footer Placeholder 3">
+            <a:extLst>
+              <a:ext uri="{FF2B5EF4-FFF2-40B4-BE49-F238E27FC236}">
+                <a16:creationId xmlns:a16="http://schemas.microsoft.com/office/drawing/2014/main" id="{C401FFE3-F414-4CF5-AD6A-9C2DE5116ED4}"/>
+              </a:ext>
+            </a:extLst>
+          </p:cNvPr>
           <p:cNvSpPr>
             <a:spLocks noGrp="1"/>
           </p:cNvSpPr>
@@ -5631,7 +5584,7 @@
     </p:spTree>
     <p:extLst>
       <p:ext uri="{BB962C8B-B14F-4D97-AF65-F5344CB8AC3E}">
-        <p14:creationId xmlns:p14="http://schemas.microsoft.com/office/powerpoint/2010/main" val="1567541983"/>
+        <p14:creationId xmlns:p14="http://schemas.microsoft.com/office/powerpoint/2010/main" val="3129570609"/>
       </p:ext>
     </p:extLst>
   </p:cSld>
@@ -6131,144 +6084,86 @@
       </p:grpSpPr>
       <p:sp>
         <p:nvSpPr>
-          <p:cNvPr id="2" name="Title 1"/>
-          <p:cNvSpPr>
-            <a:spLocks noGrp="1"/>
-          </p:cNvSpPr>
-          <p:nvPr>
-            <p:ph type="title"/>
-          </p:nvPr>
-        </p:nvSpPr>
-        <p:spPr>
-          <a:xfrm>
-            <a:off x="838200" y="298623"/>
-            <a:ext cx="10515600" cy="1325563"/>
-          </a:xfrm>
-        </p:spPr>
+          <p:cNvPr id="4" name="Footer Placeholder 3">
+            <a:extLst>
+              <a:ext uri="{FF2B5EF4-FFF2-40B4-BE49-F238E27FC236}">
+                <a16:creationId xmlns:a16="http://schemas.microsoft.com/office/drawing/2014/main" id="{7B57FAC7-9A78-418C-B807-48ECCF0BCB6C}"/>
+              </a:ext>
+            </a:extLst>
+          </p:cNvPr>
+          <p:cNvSpPr>
+            <a:spLocks noGrp="1"/>
+          </p:cNvSpPr>
+          <p:nvPr>
+            <p:ph type="ftr" sz="quarter" idx="11"/>
+          </p:nvPr>
+        </p:nvSpPr>
+        <p:spPr/>
         <p:txBody>
           <a:bodyPr/>
           <a:lstStyle/>
           <a:p>
             <a:r>
-              <a:rPr lang="en-US" dirty="0"/>
-              <a:t>EJJ Scheduling Algorithm Details (2)</a:t>
-            </a:r>
-          </a:p>
-        </p:txBody>
-      </p:sp>
-      <p:sp>
-        <p:nvSpPr>
-          <p:cNvPr id="3" name="Content Placeholder 2"/>
-          <p:cNvSpPr>
-            <a:spLocks noGrp="1"/>
-          </p:cNvSpPr>
-          <p:nvPr>
-            <p:ph idx="1"/>
-          </p:nvPr>
-        </p:nvSpPr>
-        <p:spPr/>
-        <p:txBody>
-          <a:bodyPr>
-            <a:normAutofit fontScale="92500" lnSpcReduction="10000"/>
-          </a:bodyPr>
-          <a:lstStyle/>
-          <a:p>
-            <a:r>
-              <a:rPr lang="en-US" dirty="0"/>
-              <a:t>If there aren’t enough jets, pilots, and/or </a:t>
-            </a:r>
-            <a:r>
-              <a:rPr lang="en-US" dirty="0" err="1"/>
-              <a:t>helos</a:t>
-            </a:r>
-            <a:r>
-              <a:rPr lang="en-US" dirty="0"/>
-              <a:t> on that carrier, store possible repositions of the least  amount of jets/pilots/</a:t>
-            </a:r>
-            <a:r>
-              <a:rPr lang="en-US" dirty="0" err="1"/>
-              <a:t>helos</a:t>
-            </a:r>
-            <a:r>
-              <a:rPr lang="en-US" dirty="0"/>
-              <a:t> to the carrier possible</a:t>
-            </a:r>
-          </a:p>
-          <a:p>
-            <a:pPr lvl="1"/>
-            <a:r>
-              <a:rPr lang="en-US" dirty="0"/>
-              <a:t>Use what we can on the carrier already</a:t>
-            </a:r>
-          </a:p>
-          <a:p>
-            <a:r>
-              <a:rPr lang="en-US" dirty="0"/>
-              <a:t>Given the available subset of the jets on a carrier (after possible repositions, if necessary), find the first set of jets that can fly together</a:t>
-            </a:r>
-          </a:p>
-          <a:p>
-            <a:pPr lvl="1"/>
-            <a:r>
-              <a:rPr lang="en-US" dirty="0"/>
-              <a:t>The number of jets chosen is based on their missile carriage capacity and the number of missiles needed</a:t>
-            </a:r>
-          </a:p>
-          <a:p>
-            <a:r>
-              <a:rPr lang="en-US" dirty="0"/>
-              <a:t>Once the jets are found, then that determines the number of pilots needed</a:t>
-            </a:r>
-          </a:p>
-          <a:p>
-            <a:pPr lvl="1"/>
-            <a:r>
-              <a:rPr lang="en-US" dirty="0"/>
-              <a:t>Find the first set of pilots that can fly with each other, and most importantly has a pilot that can fly with each jet</a:t>
-            </a:r>
-          </a:p>
-          <a:p>
-            <a:pPr lvl="1"/>
-            <a:r>
-              <a:rPr lang="en-US" dirty="0"/>
-              <a:t>Map the pilots to the jets</a:t>
-            </a:r>
-          </a:p>
-        </p:txBody>
-      </p:sp>
-      <p:sp>
-        <p:nvSpPr>
-          <p:cNvPr id="4" name="Footer Placeholder 3"/>
-          <p:cNvSpPr>
-            <a:spLocks noGrp="1"/>
-          </p:cNvSpPr>
-          <p:nvPr>
-            <p:ph type="ftr" sz="quarter" idx="11"/>
-          </p:nvPr>
-        </p:nvSpPr>
-        <p:spPr/>
-        <p:txBody>
-          <a:bodyPr/>
-          <a:lstStyle/>
-          <a:p>
-            <a:r>
-              <a:rPr lang="en-US">
+              <a:rPr lang="en-US" dirty="0">
                 <a:latin typeface="Courier New" panose="02070309020205020404" pitchFamily="49" charset="0"/>
                 <a:cs typeface="Courier New" panose="02070309020205020404" pitchFamily="49" charset="0"/>
               </a:rPr>
               <a:t>Team EJJ</a:t>
             </a:r>
-            <a:endParaRPr lang="en-US" dirty="0">
-              <a:latin typeface="Courier New" panose="02070309020205020404" pitchFamily="49" charset="0"/>
-              <a:cs typeface="Courier New" panose="02070309020205020404" pitchFamily="49" charset="0"/>
-            </a:endParaRPr>
-          </a:p>
-        </p:txBody>
-      </p:sp>
+          </a:p>
+        </p:txBody>
+      </p:sp>
+      <p:pic>
+        <p:nvPicPr>
+          <p:cNvPr id="2050" name="Picture 2" descr="Gypsy Curse">
+            <a:extLst>
+              <a:ext uri="{FF2B5EF4-FFF2-40B4-BE49-F238E27FC236}">
+                <a16:creationId xmlns:a16="http://schemas.microsoft.com/office/drawing/2014/main" id="{7173D12A-5393-4EF8-B04F-3F560643558C}"/>
+              </a:ext>
+            </a:extLst>
+          </p:cNvPr>
+          <p:cNvPicPr>
+            <a:picLocks noChangeAspect="1" noChangeArrowheads="1"/>
+          </p:cNvPicPr>
+          <p:nvPr/>
+        </p:nvPicPr>
+        <p:blipFill>
+          <a:blip r:embed="rId2">
+            <a:extLst>
+              <a:ext uri="{28A0092B-C50C-407E-A947-70E740481C1C}">
+                <a14:useLocalDpi xmlns:a14="http://schemas.microsoft.com/office/drawing/2010/main" val="0"/>
+              </a:ext>
+            </a:extLst>
+          </a:blip>
+          <a:srcRect/>
+          <a:stretch>
+            <a:fillRect/>
+          </a:stretch>
+        </p:blipFill>
+        <p:spPr bwMode="auto">
+          <a:xfrm>
+            <a:off x="2250930" y="2440380"/>
+            <a:ext cx="7901631" cy="1831645"/>
+          </a:xfrm>
+          <a:prstGeom prst="rect">
+            <a:avLst/>
+          </a:prstGeom>
+          <a:noFill/>
+          <a:extLst>
+            <a:ext uri="{909E8E84-426E-40DD-AFC4-6F175D3DCCD1}">
+              <a14:hiddenFill xmlns:a14="http://schemas.microsoft.com/office/drawing/2010/main">
+                <a:solidFill>
+                  <a:srgbClr val="FFFFFF"/>
+                </a:solidFill>
+              </a14:hiddenFill>
+            </a:ext>
+          </a:extLst>
+        </p:spPr>
+      </p:pic>
     </p:spTree>
     <p:extLst>
       <p:ext uri="{BB962C8B-B14F-4D97-AF65-F5344CB8AC3E}">
-        <p14:creationId xmlns:p14="http://schemas.microsoft.com/office/powerpoint/2010/main" val="1878794731"/>
+        <p14:creationId xmlns:p14="http://schemas.microsoft.com/office/powerpoint/2010/main" val="935959818"/>
       </p:ext>
     </p:extLst>
   </p:cSld>
@@ -6297,156 +6192,74 @@
       </p:grpSpPr>
       <p:sp>
         <p:nvSpPr>
-          <p:cNvPr id="2" name="Title 1"/>
-          <p:cNvSpPr>
-            <a:spLocks noGrp="1"/>
-          </p:cNvSpPr>
-          <p:nvPr>
-            <p:ph type="title"/>
-          </p:nvPr>
+          <p:cNvPr id="4" name="Footer Placeholder 3">
+            <a:extLst>
+              <a:ext uri="{FF2B5EF4-FFF2-40B4-BE49-F238E27FC236}">
+                <a16:creationId xmlns:a16="http://schemas.microsoft.com/office/drawing/2014/main" id="{7B57FAC7-9A78-418C-B807-48ECCF0BCB6C}"/>
+              </a:ext>
+            </a:extLst>
+          </p:cNvPr>
+          <p:cNvSpPr>
+            <a:spLocks noGrp="1"/>
+          </p:cNvSpPr>
+          <p:nvPr>
+            <p:ph type="ftr" sz="quarter" idx="11"/>
+          </p:nvPr>
+        </p:nvSpPr>
+        <p:spPr/>
+        <p:txBody>
+          <a:bodyPr/>
+          <a:lstStyle/>
+          <a:p>
+            <a:r>
+              <a:rPr lang="en-US" dirty="0">
+                <a:latin typeface="Courier New" panose="02070309020205020404" pitchFamily="49" charset="0"/>
+                <a:cs typeface="Courier New" panose="02070309020205020404" pitchFamily="49" charset="0"/>
+              </a:rPr>
+              <a:t>Team EJJ</a:t>
+            </a:r>
+          </a:p>
+        </p:txBody>
+      </p:sp>
+      <p:sp>
+        <p:nvSpPr>
+          <p:cNvPr id="2" name="TextBox 1">
+            <a:extLst>
+              <a:ext uri="{FF2B5EF4-FFF2-40B4-BE49-F238E27FC236}">
+                <a16:creationId xmlns:a16="http://schemas.microsoft.com/office/drawing/2014/main" id="{ABD7F561-60CD-490C-A66A-7874934A3F0A}"/>
+              </a:ext>
+            </a:extLst>
+          </p:cNvPr>
+          <p:cNvSpPr txBox="1"/>
+          <p:nvPr/>
         </p:nvSpPr>
         <p:spPr>
           <a:xfrm>
-            <a:off x="838200" y="298623"/>
-            <a:ext cx="10515600" cy="1325563"/>
+            <a:off x="3149930" y="2749136"/>
+            <a:ext cx="7858496" cy="1107996"/>
           </a:xfrm>
+          <a:prstGeom prst="rect">
+            <a:avLst/>
+          </a:prstGeom>
+          <a:noFill/>
         </p:spPr>
         <p:txBody>
-          <a:bodyPr/>
-          <a:lstStyle/>
-          <a:p>
-            <a:r>
-              <a:rPr lang="en-US" dirty="0"/>
-              <a:t>EJJ Scheduling Algorithm Details (3)</a:t>
-            </a:r>
-          </a:p>
-        </p:txBody>
-      </p:sp>
-      <p:sp>
-        <p:nvSpPr>
-          <p:cNvPr id="3" name="Content Placeholder 2"/>
-          <p:cNvSpPr>
-            <a:spLocks noGrp="1"/>
-          </p:cNvSpPr>
-          <p:nvPr>
-            <p:ph idx="1"/>
-          </p:nvPr>
-        </p:nvSpPr>
-        <p:spPr/>
-        <p:txBody>
-          <a:bodyPr>
-            <a:normAutofit fontScale="92500"/>
+          <a:bodyPr wrap="square" rtlCol="0">
+            <a:spAutoFit/>
           </a:bodyPr>
           <a:lstStyle/>
           <a:p>
             <a:r>
-              <a:rPr lang="en-US" dirty="0"/>
-              <a:t>Choose a </a:t>
-            </a:r>
-            <a:r>
-              <a:rPr lang="en-US" dirty="0" err="1"/>
-              <a:t>helo</a:t>
-            </a:r>
-            <a:r>
-              <a:rPr lang="en-US" dirty="0"/>
-              <a:t> for the sortie from the same carrier, if possible, otherwise, need to reposition a </a:t>
-            </a:r>
-            <a:r>
-              <a:rPr lang="en-US" dirty="0" err="1"/>
-              <a:t>helo</a:t>
-            </a:r>
-            <a:endParaRPr lang="en-US" dirty="0"/>
-          </a:p>
-          <a:p>
-            <a:r>
-              <a:rPr lang="en-US" dirty="0"/>
-              <a:t>Check the chosen pilots, jets, and </a:t>
-            </a:r>
-            <a:r>
-              <a:rPr lang="en-US" dirty="0" err="1"/>
-              <a:t>helos</a:t>
-            </a:r>
-            <a:r>
-              <a:rPr lang="en-US" dirty="0"/>
-              <a:t> for any flying time constraints</a:t>
-            </a:r>
-          </a:p>
-          <a:p>
-            <a:pPr lvl="1"/>
-            <a:r>
-              <a:rPr lang="en-US" dirty="0"/>
-              <a:t>Max </a:t>
-            </a:r>
-            <a:r>
-              <a:rPr lang="en-US" dirty="0" err="1"/>
-              <a:t>helo</a:t>
-            </a:r>
-            <a:r>
-              <a:rPr lang="en-US" dirty="0"/>
-              <a:t> consecutive flying time, max jet flying time per day, max sorties per day, max pilot flying time per day, maintenance times after X amount of flight time</a:t>
-            </a:r>
-          </a:p>
-          <a:p>
-            <a:r>
-              <a:rPr lang="en-US" dirty="0"/>
-              <a:t>Choose missiles for the sortie (as many as possible without repositioning)</a:t>
-            </a:r>
-          </a:p>
-          <a:p>
-            <a:r>
-              <a:rPr lang="en-US" dirty="0"/>
-              <a:t>Determine if any missiles need to be repositioned based on the carrier to start the sortie from</a:t>
-            </a:r>
-          </a:p>
-          <a:p>
-            <a:pPr lvl="1"/>
-            <a:r>
-              <a:rPr lang="en-US" dirty="0"/>
-              <a:t>No need to add extra repositioning if enough jets are already being repositioned from the same carrier</a:t>
-            </a:r>
-          </a:p>
-          <a:p>
-            <a:pPr lvl="1"/>
-            <a:r>
-              <a:rPr lang="en-US" dirty="0"/>
-              <a:t>Repositioning adds extra jets/pilots to the chose jets/pilots lists</a:t>
-            </a:r>
-          </a:p>
-        </p:txBody>
-      </p:sp>
-      <p:sp>
-        <p:nvSpPr>
-          <p:cNvPr id="4" name="Footer Placeholder 3"/>
-          <p:cNvSpPr>
-            <a:spLocks noGrp="1"/>
-          </p:cNvSpPr>
-          <p:nvPr>
-            <p:ph type="ftr" sz="quarter" idx="11"/>
-          </p:nvPr>
-        </p:nvSpPr>
-        <p:spPr/>
-        <p:txBody>
-          <a:bodyPr/>
-          <a:lstStyle/>
-          <a:p>
-            <a:r>
-              <a:rPr lang="en-US">
-                <a:latin typeface="Courier New" panose="02070309020205020404" pitchFamily="49" charset="0"/>
-                <a:cs typeface="Courier New" panose="02070309020205020404" pitchFamily="49" charset="0"/>
-              </a:rPr>
-              <a:t>Team EJJ</a:t>
-            </a:r>
-            <a:endParaRPr lang="en-US" dirty="0">
-              <a:latin typeface="Courier New" panose="02070309020205020404" pitchFamily="49" charset="0"/>
-              <a:cs typeface="Courier New" panose="02070309020205020404" pitchFamily="49" charset="0"/>
-            </a:endParaRPr>
+              <a:rPr lang="en-US" sz="6600" dirty="0"/>
+              <a:t>To be continued….</a:t>
+            </a:r>
           </a:p>
         </p:txBody>
       </p:sp>
     </p:spTree>
     <p:extLst>
       <p:ext uri="{BB962C8B-B14F-4D97-AF65-F5344CB8AC3E}">
-        <p14:creationId xmlns:p14="http://schemas.microsoft.com/office/powerpoint/2010/main" val="2360376206"/>
+        <p14:creationId xmlns:p14="http://schemas.microsoft.com/office/powerpoint/2010/main" val="669830058"/>
       </p:ext>
     </p:extLst>
   </p:cSld>
@@ -6475,119 +6288,74 @@
       </p:grpSpPr>
       <p:sp>
         <p:nvSpPr>
-          <p:cNvPr id="2" name="Title 1"/>
-          <p:cNvSpPr>
-            <a:spLocks noGrp="1"/>
-          </p:cNvSpPr>
-          <p:nvPr>
-            <p:ph type="title"/>
-          </p:nvPr>
+          <p:cNvPr id="4" name="Footer Placeholder 3">
+            <a:extLst>
+              <a:ext uri="{FF2B5EF4-FFF2-40B4-BE49-F238E27FC236}">
+                <a16:creationId xmlns:a16="http://schemas.microsoft.com/office/drawing/2014/main" id="{7B57FAC7-9A78-418C-B807-48ECCF0BCB6C}"/>
+              </a:ext>
+            </a:extLst>
+          </p:cNvPr>
+          <p:cNvSpPr>
+            <a:spLocks noGrp="1"/>
+          </p:cNvSpPr>
+          <p:nvPr>
+            <p:ph type="ftr" sz="quarter" idx="11"/>
+          </p:nvPr>
+        </p:nvSpPr>
+        <p:spPr/>
+        <p:txBody>
+          <a:bodyPr/>
+          <a:lstStyle/>
+          <a:p>
+            <a:r>
+              <a:rPr lang="en-US" dirty="0">
+                <a:latin typeface="Courier New" panose="02070309020205020404" pitchFamily="49" charset="0"/>
+                <a:cs typeface="Courier New" panose="02070309020205020404" pitchFamily="49" charset="0"/>
+              </a:rPr>
+              <a:t>Team EJJ</a:t>
+            </a:r>
+          </a:p>
+        </p:txBody>
+      </p:sp>
+      <p:sp>
+        <p:nvSpPr>
+          <p:cNvPr id="2" name="TextBox 1">
+            <a:extLst>
+              <a:ext uri="{FF2B5EF4-FFF2-40B4-BE49-F238E27FC236}">
+                <a16:creationId xmlns:a16="http://schemas.microsoft.com/office/drawing/2014/main" id="{ABD7F561-60CD-490C-A66A-7874934A3F0A}"/>
+              </a:ext>
+            </a:extLst>
+          </p:cNvPr>
+          <p:cNvSpPr txBox="1"/>
+          <p:nvPr/>
         </p:nvSpPr>
         <p:spPr>
           <a:xfrm>
-            <a:off x="838200" y="298623"/>
-            <a:ext cx="10515600" cy="1325563"/>
+            <a:off x="3642756" y="2689760"/>
+            <a:ext cx="7858496" cy="1107996"/>
           </a:xfrm>
+          <a:prstGeom prst="rect">
+            <a:avLst/>
+          </a:prstGeom>
+          <a:noFill/>
         </p:spPr>
         <p:txBody>
-          <a:bodyPr/>
-          <a:lstStyle/>
-          <a:p>
-            <a:r>
-              <a:rPr lang="en-US" dirty="0"/>
-              <a:t>EJJ Scheduling Algorithm Details (4)</a:t>
-            </a:r>
-          </a:p>
-        </p:txBody>
-      </p:sp>
-      <p:sp>
-        <p:nvSpPr>
-          <p:cNvPr id="3" name="Content Placeholder 2"/>
-          <p:cNvSpPr>
-            <a:spLocks noGrp="1"/>
-          </p:cNvSpPr>
-          <p:nvPr>
-            <p:ph idx="1"/>
-          </p:nvPr>
-        </p:nvSpPr>
-        <p:spPr/>
-        <p:txBody>
-          <a:bodyPr>
-            <a:normAutofit/>
+          <a:bodyPr wrap="square" rtlCol="0">
+            <a:spAutoFit/>
           </a:bodyPr>
           <a:lstStyle/>
           <a:p>
             <a:r>
-              <a:rPr lang="en-US" dirty="0"/>
-              <a:t>Set any downtime needed for jets after they reach their home carrier</a:t>
-            </a:r>
-          </a:p>
-          <a:p>
-            <a:r>
-              <a:rPr lang="en-US" dirty="0"/>
-              <a:t>Store all the data for the sortie including specific assets for each start/end time section (i.e. repositions, missile repositions, flying for the sortie intervals, rest intervals, down time intervals</a:t>
-            </a:r>
-          </a:p>
-          <a:p>
-            <a:r>
-              <a:rPr lang="en-US" dirty="0"/>
-              <a:t>Display the sortie data on the web page timeline for each jet, pilot, and </a:t>
-            </a:r>
-            <a:r>
-              <a:rPr lang="en-US" dirty="0" err="1"/>
-              <a:t>helo</a:t>
-            </a:r>
-            <a:endParaRPr lang="en-US" dirty="0"/>
-          </a:p>
-          <a:p>
-            <a:r>
-              <a:rPr lang="en-US" dirty="0"/>
-              <a:t>If at any time during this algorithm that there are not enough assets/humans to get a set of jets/pilots/</a:t>
-            </a:r>
-            <a:r>
-              <a:rPr lang="en-US" dirty="0" err="1"/>
-              <a:t>helos</a:t>
-            </a:r>
-            <a:r>
-              <a:rPr lang="en-US" dirty="0"/>
-              <a:t> to accomplish the sortie, then rerun the algorithm but with an incremented new sortie start time</a:t>
-            </a:r>
-          </a:p>
-        </p:txBody>
-      </p:sp>
-      <p:sp>
-        <p:nvSpPr>
-          <p:cNvPr id="4" name="Footer Placeholder 3"/>
-          <p:cNvSpPr>
-            <a:spLocks noGrp="1"/>
-          </p:cNvSpPr>
-          <p:nvPr>
-            <p:ph type="ftr" sz="quarter" idx="11"/>
-          </p:nvPr>
-        </p:nvSpPr>
-        <p:spPr/>
-        <p:txBody>
-          <a:bodyPr/>
-          <a:lstStyle/>
-          <a:p>
-            <a:r>
-              <a:rPr lang="en-US">
-                <a:latin typeface="Courier New" panose="02070309020205020404" pitchFamily="49" charset="0"/>
-                <a:cs typeface="Courier New" panose="02070309020205020404" pitchFamily="49" charset="0"/>
-              </a:rPr>
-              <a:t>Team EJJ</a:t>
-            </a:r>
-            <a:endParaRPr lang="en-US" dirty="0">
-              <a:latin typeface="Courier New" panose="02070309020205020404" pitchFamily="49" charset="0"/>
-              <a:cs typeface="Courier New" panose="02070309020205020404" pitchFamily="49" charset="0"/>
-            </a:endParaRPr>
+              <a:rPr lang="en-US" sz="6600" dirty="0"/>
+              <a:t>Back up slides</a:t>
+            </a:r>
           </a:p>
         </p:txBody>
       </p:sp>
     </p:spTree>
     <p:extLst>
       <p:ext uri="{BB962C8B-B14F-4D97-AF65-F5344CB8AC3E}">
-        <p14:creationId xmlns:p14="http://schemas.microsoft.com/office/powerpoint/2010/main" val="946942991"/>
+        <p14:creationId xmlns:p14="http://schemas.microsoft.com/office/powerpoint/2010/main" val="2167628825"/>
       </p:ext>
     </p:extLst>
   </p:cSld>
@@ -6616,6 +6384,660 @@
       </p:grpSpPr>
       <p:sp>
         <p:nvSpPr>
+          <p:cNvPr id="2" name="Title 1"/>
+          <p:cNvSpPr>
+            <a:spLocks noGrp="1"/>
+          </p:cNvSpPr>
+          <p:nvPr>
+            <p:ph type="title"/>
+          </p:nvPr>
+        </p:nvSpPr>
+        <p:spPr>
+          <a:xfrm>
+            <a:off x="838200" y="298623"/>
+            <a:ext cx="10515600" cy="1325563"/>
+          </a:xfrm>
+        </p:spPr>
+        <p:txBody>
+          <a:bodyPr/>
+          <a:lstStyle/>
+          <a:p>
+            <a:r>
+              <a:rPr lang="en-US" dirty="0"/>
+              <a:t>EJJ Scheduling Algorithm Details (1)</a:t>
+            </a:r>
+          </a:p>
+        </p:txBody>
+      </p:sp>
+      <p:sp>
+        <p:nvSpPr>
+          <p:cNvPr id="3" name="Content Placeholder 2"/>
+          <p:cNvSpPr>
+            <a:spLocks noGrp="1"/>
+          </p:cNvSpPr>
+          <p:nvPr>
+            <p:ph idx="1"/>
+          </p:nvPr>
+        </p:nvSpPr>
+        <p:spPr/>
+        <p:txBody>
+          <a:bodyPr>
+            <a:normAutofit fontScale="92500" lnSpcReduction="10000"/>
+          </a:bodyPr>
+          <a:lstStyle/>
+          <a:p>
+            <a:r>
+              <a:rPr lang="en-US" dirty="0"/>
+              <a:t>Inputs:</a:t>
+            </a:r>
+          </a:p>
+          <a:p>
+            <a:pPr lvl="1"/>
+            <a:r>
+              <a:rPr lang="en-US" dirty="0"/>
+              <a:t>Constraints/Restraints, Inventory, Maximum Sortie Length, Earliest Start Time</a:t>
+            </a:r>
+          </a:p>
+          <a:p>
+            <a:pPr marL="457200" lvl="1" indent="0">
+              <a:buNone/>
+            </a:pPr>
+            <a:endParaRPr lang="en-US" dirty="0"/>
+          </a:p>
+          <a:p>
+            <a:r>
+              <a:rPr lang="en-US" dirty="0"/>
+              <a:t>Start by finding a carrier with more jets and pilots to be the carrier to start the sortie from</a:t>
+            </a:r>
+          </a:p>
+          <a:p>
+            <a:pPr lvl="1"/>
+            <a:r>
+              <a:rPr lang="en-US" dirty="0"/>
+              <a:t>Also try to find a carrier with available </a:t>
+            </a:r>
+            <a:r>
+              <a:rPr lang="en-US" dirty="0" err="1"/>
+              <a:t>helos</a:t>
+            </a:r>
+            <a:endParaRPr lang="en-US" dirty="0"/>
+          </a:p>
+          <a:p>
+            <a:r>
+              <a:rPr lang="en-US" dirty="0"/>
+              <a:t>The number of jets/pilots needed is determined by the number of missiles needed for 90% probability of success at striking the target depending on the requirement (i.e. disable or destroy)</a:t>
+            </a:r>
+          </a:p>
+          <a:p>
+            <a:pPr lvl="1"/>
+            <a:r>
+              <a:rPr lang="en-US" dirty="0"/>
+              <a:t>Also depends on the chosen </a:t>
+            </a:r>
+            <a:r>
+              <a:rPr lang="en-US" dirty="0" err="1"/>
+              <a:t>jets’s</a:t>
+            </a:r>
+            <a:r>
+              <a:rPr lang="en-US" dirty="0"/>
+              <a:t> missile carriage capacity</a:t>
+            </a:r>
+          </a:p>
+          <a:p>
+            <a:pPr lvl="1"/>
+            <a:r>
+              <a:rPr lang="en-US" dirty="0"/>
+              <a:t>Assuming that each jet can carry only 1 missile at first; Will have more jets/pilots to choose the final set from</a:t>
+            </a:r>
+          </a:p>
+        </p:txBody>
+      </p:sp>
+      <p:sp>
+        <p:nvSpPr>
+          <p:cNvPr id="4" name="Footer Placeholder 3"/>
+          <p:cNvSpPr>
+            <a:spLocks noGrp="1"/>
+          </p:cNvSpPr>
+          <p:nvPr>
+            <p:ph type="ftr" sz="quarter" idx="11"/>
+          </p:nvPr>
+        </p:nvSpPr>
+        <p:spPr/>
+        <p:txBody>
+          <a:bodyPr/>
+          <a:lstStyle/>
+          <a:p>
+            <a:r>
+              <a:rPr lang="en-US">
+                <a:latin typeface="Courier New" panose="02070309020205020404" pitchFamily="49" charset="0"/>
+                <a:cs typeface="Courier New" panose="02070309020205020404" pitchFamily="49" charset="0"/>
+              </a:rPr>
+              <a:t>Team EJJ</a:t>
+            </a:r>
+            <a:endParaRPr lang="en-US" dirty="0">
+              <a:latin typeface="Courier New" panose="02070309020205020404" pitchFamily="49" charset="0"/>
+              <a:cs typeface="Courier New" panose="02070309020205020404" pitchFamily="49" charset="0"/>
+            </a:endParaRPr>
+          </a:p>
+        </p:txBody>
+      </p:sp>
+    </p:spTree>
+    <p:extLst>
+      <p:ext uri="{BB962C8B-B14F-4D97-AF65-F5344CB8AC3E}">
+        <p14:creationId xmlns:p14="http://schemas.microsoft.com/office/powerpoint/2010/main" val="1567541983"/>
+      </p:ext>
+    </p:extLst>
+  </p:cSld>
+  <p:clrMapOvr>
+    <a:masterClrMapping/>
+  </p:clrMapOvr>
+</p:sld>
+</file>
+
+<file path=ppt/slides/slide24.xml><?xml version="1.0" encoding="utf-8"?>
+<p:sld xmlns:a="http://schemas.openxmlformats.org/drawingml/2006/main" xmlns:r="http://schemas.openxmlformats.org/officeDocument/2006/relationships" xmlns:p="http://schemas.openxmlformats.org/presentationml/2006/main">
+  <p:cSld>
+    <p:spTree>
+      <p:nvGrpSpPr>
+        <p:cNvPr id="1" name=""/>
+        <p:cNvGrpSpPr/>
+        <p:nvPr/>
+      </p:nvGrpSpPr>
+      <p:grpSpPr>
+        <a:xfrm>
+          <a:off x="0" y="0"/>
+          <a:ext cx="0" cy="0"/>
+          <a:chOff x="0" y="0"/>
+          <a:chExt cx="0" cy="0"/>
+        </a:xfrm>
+      </p:grpSpPr>
+      <p:sp>
+        <p:nvSpPr>
+          <p:cNvPr id="2" name="Title 1"/>
+          <p:cNvSpPr>
+            <a:spLocks noGrp="1"/>
+          </p:cNvSpPr>
+          <p:nvPr>
+            <p:ph type="title"/>
+          </p:nvPr>
+        </p:nvSpPr>
+        <p:spPr>
+          <a:xfrm>
+            <a:off x="838200" y="298623"/>
+            <a:ext cx="10515600" cy="1325563"/>
+          </a:xfrm>
+        </p:spPr>
+        <p:txBody>
+          <a:bodyPr/>
+          <a:lstStyle/>
+          <a:p>
+            <a:r>
+              <a:rPr lang="en-US" dirty="0"/>
+              <a:t>EJJ Scheduling Algorithm Details (2)</a:t>
+            </a:r>
+          </a:p>
+        </p:txBody>
+      </p:sp>
+      <p:sp>
+        <p:nvSpPr>
+          <p:cNvPr id="3" name="Content Placeholder 2"/>
+          <p:cNvSpPr>
+            <a:spLocks noGrp="1"/>
+          </p:cNvSpPr>
+          <p:nvPr>
+            <p:ph idx="1"/>
+          </p:nvPr>
+        </p:nvSpPr>
+        <p:spPr/>
+        <p:txBody>
+          <a:bodyPr>
+            <a:normAutofit fontScale="92500" lnSpcReduction="10000"/>
+          </a:bodyPr>
+          <a:lstStyle/>
+          <a:p>
+            <a:r>
+              <a:rPr lang="en-US" dirty="0"/>
+              <a:t>If there aren’t enough jets, pilots, and/or </a:t>
+            </a:r>
+            <a:r>
+              <a:rPr lang="en-US" dirty="0" err="1"/>
+              <a:t>helos</a:t>
+            </a:r>
+            <a:r>
+              <a:rPr lang="en-US" dirty="0"/>
+              <a:t> on that carrier, store possible repositions of the least  amount of jets/pilots/</a:t>
+            </a:r>
+            <a:r>
+              <a:rPr lang="en-US" dirty="0" err="1"/>
+              <a:t>helos</a:t>
+            </a:r>
+            <a:r>
+              <a:rPr lang="en-US" dirty="0"/>
+              <a:t> to the carrier possible</a:t>
+            </a:r>
+          </a:p>
+          <a:p>
+            <a:pPr lvl="1"/>
+            <a:r>
+              <a:rPr lang="en-US" dirty="0"/>
+              <a:t>Use what we can on the carrier already</a:t>
+            </a:r>
+          </a:p>
+          <a:p>
+            <a:r>
+              <a:rPr lang="en-US" dirty="0"/>
+              <a:t>Given the available subset of the jets on a carrier (after possible repositions, if necessary), find the first set of jets that can fly together</a:t>
+            </a:r>
+          </a:p>
+          <a:p>
+            <a:pPr lvl="1"/>
+            <a:r>
+              <a:rPr lang="en-US" dirty="0"/>
+              <a:t>The number of jets chosen is based on their missile carriage capacity and the number of missiles needed</a:t>
+            </a:r>
+          </a:p>
+          <a:p>
+            <a:r>
+              <a:rPr lang="en-US" dirty="0"/>
+              <a:t>Once the jets are found, then that determines the number of pilots needed</a:t>
+            </a:r>
+          </a:p>
+          <a:p>
+            <a:pPr lvl="1"/>
+            <a:r>
+              <a:rPr lang="en-US" dirty="0"/>
+              <a:t>Find the first set of pilots that can fly with each other, and most importantly has a pilot that can fly with each jet</a:t>
+            </a:r>
+          </a:p>
+          <a:p>
+            <a:pPr lvl="1"/>
+            <a:r>
+              <a:rPr lang="en-US" dirty="0"/>
+              <a:t>Map the pilots to the jets</a:t>
+            </a:r>
+          </a:p>
+        </p:txBody>
+      </p:sp>
+      <p:sp>
+        <p:nvSpPr>
+          <p:cNvPr id="4" name="Footer Placeholder 3"/>
+          <p:cNvSpPr>
+            <a:spLocks noGrp="1"/>
+          </p:cNvSpPr>
+          <p:nvPr>
+            <p:ph type="ftr" sz="quarter" idx="11"/>
+          </p:nvPr>
+        </p:nvSpPr>
+        <p:spPr/>
+        <p:txBody>
+          <a:bodyPr/>
+          <a:lstStyle/>
+          <a:p>
+            <a:r>
+              <a:rPr lang="en-US">
+                <a:latin typeface="Courier New" panose="02070309020205020404" pitchFamily="49" charset="0"/>
+                <a:cs typeface="Courier New" panose="02070309020205020404" pitchFamily="49" charset="0"/>
+              </a:rPr>
+              <a:t>Team EJJ</a:t>
+            </a:r>
+            <a:endParaRPr lang="en-US" dirty="0">
+              <a:latin typeface="Courier New" panose="02070309020205020404" pitchFamily="49" charset="0"/>
+              <a:cs typeface="Courier New" panose="02070309020205020404" pitchFamily="49" charset="0"/>
+            </a:endParaRPr>
+          </a:p>
+        </p:txBody>
+      </p:sp>
+    </p:spTree>
+    <p:extLst>
+      <p:ext uri="{BB962C8B-B14F-4D97-AF65-F5344CB8AC3E}">
+        <p14:creationId xmlns:p14="http://schemas.microsoft.com/office/powerpoint/2010/main" val="1878794731"/>
+      </p:ext>
+    </p:extLst>
+  </p:cSld>
+  <p:clrMapOvr>
+    <a:masterClrMapping/>
+  </p:clrMapOvr>
+</p:sld>
+</file>
+
+<file path=ppt/slides/slide25.xml><?xml version="1.0" encoding="utf-8"?>
+<p:sld xmlns:a="http://schemas.openxmlformats.org/drawingml/2006/main" xmlns:r="http://schemas.openxmlformats.org/officeDocument/2006/relationships" xmlns:p="http://schemas.openxmlformats.org/presentationml/2006/main">
+  <p:cSld>
+    <p:spTree>
+      <p:nvGrpSpPr>
+        <p:cNvPr id="1" name=""/>
+        <p:cNvGrpSpPr/>
+        <p:nvPr/>
+      </p:nvGrpSpPr>
+      <p:grpSpPr>
+        <a:xfrm>
+          <a:off x="0" y="0"/>
+          <a:ext cx="0" cy="0"/>
+          <a:chOff x="0" y="0"/>
+          <a:chExt cx="0" cy="0"/>
+        </a:xfrm>
+      </p:grpSpPr>
+      <p:sp>
+        <p:nvSpPr>
+          <p:cNvPr id="2" name="Title 1"/>
+          <p:cNvSpPr>
+            <a:spLocks noGrp="1"/>
+          </p:cNvSpPr>
+          <p:nvPr>
+            <p:ph type="title"/>
+          </p:nvPr>
+        </p:nvSpPr>
+        <p:spPr>
+          <a:xfrm>
+            <a:off x="838200" y="298623"/>
+            <a:ext cx="10515600" cy="1325563"/>
+          </a:xfrm>
+        </p:spPr>
+        <p:txBody>
+          <a:bodyPr/>
+          <a:lstStyle/>
+          <a:p>
+            <a:r>
+              <a:rPr lang="en-US" dirty="0"/>
+              <a:t>EJJ Scheduling Algorithm Details (3)</a:t>
+            </a:r>
+          </a:p>
+        </p:txBody>
+      </p:sp>
+      <p:sp>
+        <p:nvSpPr>
+          <p:cNvPr id="3" name="Content Placeholder 2"/>
+          <p:cNvSpPr>
+            <a:spLocks noGrp="1"/>
+          </p:cNvSpPr>
+          <p:nvPr>
+            <p:ph idx="1"/>
+          </p:nvPr>
+        </p:nvSpPr>
+        <p:spPr/>
+        <p:txBody>
+          <a:bodyPr>
+            <a:normAutofit fontScale="92500"/>
+          </a:bodyPr>
+          <a:lstStyle/>
+          <a:p>
+            <a:r>
+              <a:rPr lang="en-US" dirty="0"/>
+              <a:t>Choose a </a:t>
+            </a:r>
+            <a:r>
+              <a:rPr lang="en-US" dirty="0" err="1"/>
+              <a:t>helo</a:t>
+            </a:r>
+            <a:r>
+              <a:rPr lang="en-US" dirty="0"/>
+              <a:t> for the sortie from the same carrier, if possible, otherwise, need to reposition a </a:t>
+            </a:r>
+            <a:r>
+              <a:rPr lang="en-US" dirty="0" err="1"/>
+              <a:t>helo</a:t>
+            </a:r>
+            <a:endParaRPr lang="en-US" dirty="0"/>
+          </a:p>
+          <a:p>
+            <a:r>
+              <a:rPr lang="en-US" dirty="0"/>
+              <a:t>Check the chosen pilots, jets, and </a:t>
+            </a:r>
+            <a:r>
+              <a:rPr lang="en-US" dirty="0" err="1"/>
+              <a:t>helos</a:t>
+            </a:r>
+            <a:r>
+              <a:rPr lang="en-US" dirty="0"/>
+              <a:t> for any flying time constraints</a:t>
+            </a:r>
+          </a:p>
+          <a:p>
+            <a:pPr lvl="1"/>
+            <a:r>
+              <a:rPr lang="en-US" dirty="0"/>
+              <a:t>Max </a:t>
+            </a:r>
+            <a:r>
+              <a:rPr lang="en-US" dirty="0" err="1"/>
+              <a:t>helo</a:t>
+            </a:r>
+            <a:r>
+              <a:rPr lang="en-US" dirty="0"/>
+              <a:t> consecutive flying time, max jet flying time per day, max sorties per day, max pilot flying time per day, maintenance times after X amount of flight time</a:t>
+            </a:r>
+          </a:p>
+          <a:p>
+            <a:r>
+              <a:rPr lang="en-US" dirty="0"/>
+              <a:t>Choose missiles for the sortie (as many as possible without repositioning)</a:t>
+            </a:r>
+          </a:p>
+          <a:p>
+            <a:r>
+              <a:rPr lang="en-US" dirty="0"/>
+              <a:t>Determine if any missiles need to be repositioned based on the carrier to start the sortie from</a:t>
+            </a:r>
+          </a:p>
+          <a:p>
+            <a:pPr lvl="1"/>
+            <a:r>
+              <a:rPr lang="en-US" dirty="0"/>
+              <a:t>No need to add extra repositioning if enough jets are already being repositioned from the same carrier</a:t>
+            </a:r>
+          </a:p>
+          <a:p>
+            <a:pPr lvl="1"/>
+            <a:r>
+              <a:rPr lang="en-US" dirty="0"/>
+              <a:t>Repositioning adds extra jets/pilots to the chose jets/pilots lists</a:t>
+            </a:r>
+          </a:p>
+        </p:txBody>
+      </p:sp>
+      <p:sp>
+        <p:nvSpPr>
+          <p:cNvPr id="4" name="Footer Placeholder 3"/>
+          <p:cNvSpPr>
+            <a:spLocks noGrp="1"/>
+          </p:cNvSpPr>
+          <p:nvPr>
+            <p:ph type="ftr" sz="quarter" idx="11"/>
+          </p:nvPr>
+        </p:nvSpPr>
+        <p:spPr/>
+        <p:txBody>
+          <a:bodyPr/>
+          <a:lstStyle/>
+          <a:p>
+            <a:r>
+              <a:rPr lang="en-US">
+                <a:latin typeface="Courier New" panose="02070309020205020404" pitchFamily="49" charset="0"/>
+                <a:cs typeface="Courier New" panose="02070309020205020404" pitchFamily="49" charset="0"/>
+              </a:rPr>
+              <a:t>Team EJJ</a:t>
+            </a:r>
+            <a:endParaRPr lang="en-US" dirty="0">
+              <a:latin typeface="Courier New" panose="02070309020205020404" pitchFamily="49" charset="0"/>
+              <a:cs typeface="Courier New" panose="02070309020205020404" pitchFamily="49" charset="0"/>
+            </a:endParaRPr>
+          </a:p>
+        </p:txBody>
+      </p:sp>
+    </p:spTree>
+    <p:extLst>
+      <p:ext uri="{BB962C8B-B14F-4D97-AF65-F5344CB8AC3E}">
+        <p14:creationId xmlns:p14="http://schemas.microsoft.com/office/powerpoint/2010/main" val="2360376206"/>
+      </p:ext>
+    </p:extLst>
+  </p:cSld>
+  <p:clrMapOvr>
+    <a:masterClrMapping/>
+  </p:clrMapOvr>
+</p:sld>
+</file>
+
+<file path=ppt/slides/slide26.xml><?xml version="1.0" encoding="utf-8"?>
+<p:sld xmlns:a="http://schemas.openxmlformats.org/drawingml/2006/main" xmlns:r="http://schemas.openxmlformats.org/officeDocument/2006/relationships" xmlns:p="http://schemas.openxmlformats.org/presentationml/2006/main">
+  <p:cSld>
+    <p:spTree>
+      <p:nvGrpSpPr>
+        <p:cNvPr id="1" name=""/>
+        <p:cNvGrpSpPr/>
+        <p:nvPr/>
+      </p:nvGrpSpPr>
+      <p:grpSpPr>
+        <a:xfrm>
+          <a:off x="0" y="0"/>
+          <a:ext cx="0" cy="0"/>
+          <a:chOff x="0" y="0"/>
+          <a:chExt cx="0" cy="0"/>
+        </a:xfrm>
+      </p:grpSpPr>
+      <p:sp>
+        <p:nvSpPr>
+          <p:cNvPr id="2" name="Title 1"/>
+          <p:cNvSpPr>
+            <a:spLocks noGrp="1"/>
+          </p:cNvSpPr>
+          <p:nvPr>
+            <p:ph type="title"/>
+          </p:nvPr>
+        </p:nvSpPr>
+        <p:spPr>
+          <a:xfrm>
+            <a:off x="838200" y="298623"/>
+            <a:ext cx="10515600" cy="1325563"/>
+          </a:xfrm>
+        </p:spPr>
+        <p:txBody>
+          <a:bodyPr/>
+          <a:lstStyle/>
+          <a:p>
+            <a:r>
+              <a:rPr lang="en-US" dirty="0"/>
+              <a:t>EJJ Scheduling Algorithm Details (4)</a:t>
+            </a:r>
+          </a:p>
+        </p:txBody>
+      </p:sp>
+      <p:sp>
+        <p:nvSpPr>
+          <p:cNvPr id="3" name="Content Placeholder 2"/>
+          <p:cNvSpPr>
+            <a:spLocks noGrp="1"/>
+          </p:cNvSpPr>
+          <p:nvPr>
+            <p:ph idx="1"/>
+          </p:nvPr>
+        </p:nvSpPr>
+        <p:spPr/>
+        <p:txBody>
+          <a:bodyPr>
+            <a:normAutofit/>
+          </a:bodyPr>
+          <a:lstStyle/>
+          <a:p>
+            <a:r>
+              <a:rPr lang="en-US" dirty="0"/>
+              <a:t>Set any downtime needed for jets after they reach their home carrier</a:t>
+            </a:r>
+          </a:p>
+          <a:p>
+            <a:r>
+              <a:rPr lang="en-US" dirty="0"/>
+              <a:t>Store all the data for the sortie including specific assets for each start/end time section (i.e. repositions, missile repositions, flying for the sortie intervals, rest intervals, down time intervals</a:t>
+            </a:r>
+          </a:p>
+          <a:p>
+            <a:r>
+              <a:rPr lang="en-US" dirty="0"/>
+              <a:t>Display the sortie data on the web page timeline for each jet, pilot, and </a:t>
+            </a:r>
+            <a:r>
+              <a:rPr lang="en-US" dirty="0" err="1"/>
+              <a:t>helo</a:t>
+            </a:r>
+            <a:endParaRPr lang="en-US" dirty="0"/>
+          </a:p>
+          <a:p>
+            <a:r>
+              <a:rPr lang="en-US" dirty="0"/>
+              <a:t>If at any time during this algorithm that there are not enough assets/humans to get a set of jets/pilots/</a:t>
+            </a:r>
+            <a:r>
+              <a:rPr lang="en-US" dirty="0" err="1"/>
+              <a:t>helos</a:t>
+            </a:r>
+            <a:r>
+              <a:rPr lang="en-US" dirty="0"/>
+              <a:t> to accomplish the sortie, then rerun the algorithm but with an incremented new sortie start time</a:t>
+            </a:r>
+          </a:p>
+        </p:txBody>
+      </p:sp>
+      <p:sp>
+        <p:nvSpPr>
+          <p:cNvPr id="4" name="Footer Placeholder 3"/>
+          <p:cNvSpPr>
+            <a:spLocks noGrp="1"/>
+          </p:cNvSpPr>
+          <p:nvPr>
+            <p:ph type="ftr" sz="quarter" idx="11"/>
+          </p:nvPr>
+        </p:nvSpPr>
+        <p:spPr/>
+        <p:txBody>
+          <a:bodyPr/>
+          <a:lstStyle/>
+          <a:p>
+            <a:r>
+              <a:rPr lang="en-US">
+                <a:latin typeface="Courier New" panose="02070309020205020404" pitchFamily="49" charset="0"/>
+                <a:cs typeface="Courier New" panose="02070309020205020404" pitchFamily="49" charset="0"/>
+              </a:rPr>
+              <a:t>Team EJJ</a:t>
+            </a:r>
+            <a:endParaRPr lang="en-US" dirty="0">
+              <a:latin typeface="Courier New" panose="02070309020205020404" pitchFamily="49" charset="0"/>
+              <a:cs typeface="Courier New" panose="02070309020205020404" pitchFamily="49" charset="0"/>
+            </a:endParaRPr>
+          </a:p>
+        </p:txBody>
+      </p:sp>
+    </p:spTree>
+    <p:extLst>
+      <p:ext uri="{BB962C8B-B14F-4D97-AF65-F5344CB8AC3E}">
+        <p14:creationId xmlns:p14="http://schemas.microsoft.com/office/powerpoint/2010/main" val="946942991"/>
+      </p:ext>
+    </p:extLst>
+  </p:cSld>
+  <p:clrMapOvr>
+    <a:masterClrMapping/>
+  </p:clrMapOvr>
+</p:sld>
+</file>
+
+<file path=ppt/slides/slide27.xml><?xml version="1.0" encoding="utf-8"?>
+<p:sld xmlns:a="http://schemas.openxmlformats.org/drawingml/2006/main" xmlns:r="http://schemas.openxmlformats.org/officeDocument/2006/relationships" xmlns:p="http://schemas.openxmlformats.org/presentationml/2006/main">
+  <p:cSld>
+    <p:spTree>
+      <p:nvGrpSpPr>
+        <p:cNvPr id="1" name=""/>
+        <p:cNvGrpSpPr/>
+        <p:nvPr/>
+      </p:nvGrpSpPr>
+      <p:grpSpPr>
+        <a:xfrm>
+          <a:off x="0" y="0"/>
+          <a:ext cx="0" cy="0"/>
+          <a:chOff x="0" y="0"/>
+          <a:chExt cx="0" cy="0"/>
+        </a:xfrm>
+      </p:grpSpPr>
+      <p:sp>
+        <p:nvSpPr>
           <p:cNvPr id="2" name="Title 1">
             <a:extLst>
               <a:ext uri="{FF2B5EF4-FFF2-40B4-BE49-F238E27FC236}">
@@ -6977,7 +7399,7 @@
 </p:sld>
 </file>
 
-<file path=ppt/slides/slide24.xml><?xml version="1.0" encoding="utf-8"?>
+<file path=ppt/slides/slide28.xml><?xml version="1.0" encoding="utf-8"?>
 <p:sld xmlns:a="http://schemas.openxmlformats.org/drawingml/2006/main" xmlns:r="http://schemas.openxmlformats.org/officeDocument/2006/relationships" xmlns:p="http://schemas.openxmlformats.org/presentationml/2006/main">
   <p:cSld>
     <p:spTree>

</xml_diff>

<commit_message>
allow choosing rest of missiles even if not have enough, minor ppt updates
</commit_message>
<xml_diff>
--- a/TeamEJJ.pptx
+++ b/TeamEJJ.pptx
@@ -5,10 +5,10 @@
     <p:sldMasterId id="2147483660" r:id="rId1"/>
   </p:sldMasterIdLst>
   <p:notesMasterIdLst>
-    <p:notesMasterId r:id="rId27"/>
+    <p:notesMasterId r:id="rId28"/>
   </p:notesMasterIdLst>
   <p:handoutMasterIdLst>
-    <p:handoutMasterId r:id="rId28"/>
+    <p:handoutMasterId r:id="rId29"/>
   </p:handoutMasterIdLst>
   <p:sldIdLst>
     <p:sldId id="256" r:id="rId2"/>
@@ -24,18 +24,19 @@
     <p:sldId id="268" r:id="rId12"/>
     <p:sldId id="275" r:id="rId13"/>
     <p:sldId id="269" r:id="rId14"/>
-    <p:sldId id="277" r:id="rId15"/>
-    <p:sldId id="278" r:id="rId16"/>
-    <p:sldId id="282" r:id="rId17"/>
-    <p:sldId id="283" r:id="rId18"/>
-    <p:sldId id="266" r:id="rId19"/>
-    <p:sldId id="259" r:id="rId20"/>
-    <p:sldId id="281" r:id="rId21"/>
-    <p:sldId id="280" r:id="rId22"/>
-    <p:sldId id="271" r:id="rId23"/>
-    <p:sldId id="270" r:id="rId24"/>
-    <p:sldId id="272" r:id="rId25"/>
-    <p:sldId id="273" r:id="rId26"/>
+    <p:sldId id="284" r:id="rId15"/>
+    <p:sldId id="277" r:id="rId16"/>
+    <p:sldId id="278" r:id="rId17"/>
+    <p:sldId id="282" r:id="rId18"/>
+    <p:sldId id="283" r:id="rId19"/>
+    <p:sldId id="266" r:id="rId20"/>
+    <p:sldId id="259" r:id="rId21"/>
+    <p:sldId id="281" r:id="rId22"/>
+    <p:sldId id="280" r:id="rId23"/>
+    <p:sldId id="271" r:id="rId24"/>
+    <p:sldId id="270" r:id="rId25"/>
+    <p:sldId id="272" r:id="rId26"/>
+    <p:sldId id="273" r:id="rId27"/>
   </p:sldIdLst>
   <p:sldSz cx="12192000" cy="6858000"/>
   <p:notesSz cx="6858000" cy="9144000"/>
@@ -172,7 +173,7 @@
           <p:cNvPr id="2" name="Header Placeholder 1">
             <a:extLst>
               <a:ext uri="{FF2B5EF4-FFF2-40B4-BE49-F238E27FC236}">
-                <a16:creationId xmlns:a16="http://schemas.microsoft.com/office/drawing/2014/main" xmlns="" id="{4958D19B-78E4-413E-BC66-293646D7CD75}"/>
+                <a16:creationId xmlns="" xmlns:a16="http://schemas.microsoft.com/office/drawing/2014/main" id="{4958D19B-78E4-413E-BC66-293646D7CD75}"/>
               </a:ext>
             </a:extLst>
           </p:cNvPr>
@@ -209,7 +210,7 @@
           <p:cNvPr id="3" name="Date Placeholder 2">
             <a:extLst>
               <a:ext uri="{FF2B5EF4-FFF2-40B4-BE49-F238E27FC236}">
-                <a16:creationId xmlns:a16="http://schemas.microsoft.com/office/drawing/2014/main" xmlns="" id="{0969C5F0-82EE-47A5-8B10-9CE8E0B7BD22}"/>
+                <a16:creationId xmlns="" xmlns:a16="http://schemas.microsoft.com/office/drawing/2014/main" id="{0969C5F0-82EE-47A5-8B10-9CE8E0B7BD22}"/>
               </a:ext>
             </a:extLst>
           </p:cNvPr>
@@ -250,7 +251,7 @@
           <p:cNvPr id="4" name="Footer Placeholder 3">
             <a:extLst>
               <a:ext uri="{FF2B5EF4-FFF2-40B4-BE49-F238E27FC236}">
-                <a16:creationId xmlns:a16="http://schemas.microsoft.com/office/drawing/2014/main" xmlns="" id="{CD4B4307-B935-42D7-8F93-99E51A1CF54D}"/>
+                <a16:creationId xmlns="" xmlns:a16="http://schemas.microsoft.com/office/drawing/2014/main" id="{CD4B4307-B935-42D7-8F93-99E51A1CF54D}"/>
               </a:ext>
             </a:extLst>
           </p:cNvPr>
@@ -287,7 +288,7 @@
           <p:cNvPr id="5" name="Slide Number Placeholder 4">
             <a:extLst>
               <a:ext uri="{FF2B5EF4-FFF2-40B4-BE49-F238E27FC236}">
-                <a16:creationId xmlns:a16="http://schemas.microsoft.com/office/drawing/2014/main" xmlns="" id="{A9A5BBCE-64A3-4221-B231-485756321F03}"/>
+                <a16:creationId xmlns="" xmlns:a16="http://schemas.microsoft.com/office/drawing/2014/main" id="{A9A5BBCE-64A3-4221-B231-485756321F03}"/>
               </a:ext>
             </a:extLst>
           </p:cNvPr>
@@ -3589,7 +3590,7 @@
           <p:cNvPr id="2" name="Title 1">
             <a:extLst>
               <a:ext uri="{FF2B5EF4-FFF2-40B4-BE49-F238E27FC236}">
-                <a16:creationId xmlns:a16="http://schemas.microsoft.com/office/drawing/2014/main" xmlns="" id="{BA01E277-331D-47A2-8EA1-4BF83C281FCD}"/>
+                <a16:creationId xmlns="" xmlns:a16="http://schemas.microsoft.com/office/drawing/2014/main" id="{BA01E277-331D-47A2-8EA1-4BF83C281FCD}"/>
               </a:ext>
             </a:extLst>
           </p:cNvPr>
@@ -3661,7 +3662,7 @@
           <p:cNvPr id="5" name="Footer Placeholder 4">
             <a:extLst>
               <a:ext uri="{FF2B5EF4-FFF2-40B4-BE49-F238E27FC236}">
-                <a16:creationId xmlns:a16="http://schemas.microsoft.com/office/drawing/2014/main" xmlns="" id="{25C38D51-E1A2-4B23-AFC5-FC39CBEE7E5B}"/>
+                <a16:creationId xmlns="" xmlns:a16="http://schemas.microsoft.com/office/drawing/2014/main" id="{25C38D51-E1A2-4B23-AFC5-FC39CBEE7E5B}"/>
               </a:ext>
             </a:extLst>
           </p:cNvPr>
@@ -3692,7 +3693,7 @@
           <p:cNvPr id="1030" name="Picture 6" descr="Gypsy Curse">
             <a:extLst>
               <a:ext uri="{FF2B5EF4-FFF2-40B4-BE49-F238E27FC236}">
-                <a16:creationId xmlns:a16="http://schemas.microsoft.com/office/drawing/2014/main" xmlns="" id="{B8F9B0D6-6EDF-434B-B198-FE7ED42FDBD8}"/>
+                <a16:creationId xmlns="" xmlns:a16="http://schemas.microsoft.com/office/drawing/2014/main" id="{B8F9B0D6-6EDF-434B-B198-FE7ED42FDBD8}"/>
               </a:ext>
             </a:extLst>
           </p:cNvPr>
@@ -3769,7 +3770,7 @@
           <p:cNvPr id="2" name="Title 1">
             <a:extLst>
               <a:ext uri="{FF2B5EF4-FFF2-40B4-BE49-F238E27FC236}">
-                <a16:creationId xmlns:a16="http://schemas.microsoft.com/office/drawing/2014/main" xmlns="" id="{E29B01D6-A7CA-4A3E-9C66-C2AA33322F12}"/>
+                <a16:creationId xmlns="" xmlns:a16="http://schemas.microsoft.com/office/drawing/2014/main" id="{E29B01D6-A7CA-4A3E-9C66-C2AA33322F12}"/>
               </a:ext>
             </a:extLst>
           </p:cNvPr>
@@ -3797,7 +3798,7 @@
           <p:cNvPr id="3" name="Content Placeholder 2">
             <a:extLst>
               <a:ext uri="{FF2B5EF4-FFF2-40B4-BE49-F238E27FC236}">
-                <a16:creationId xmlns:a16="http://schemas.microsoft.com/office/drawing/2014/main" xmlns="" id="{F1842140-4ACB-41A9-BC7F-30570259E5D8}"/>
+                <a16:creationId xmlns="" xmlns:a16="http://schemas.microsoft.com/office/drawing/2014/main" id="{F1842140-4ACB-41A9-BC7F-30570259E5D8}"/>
               </a:ext>
             </a:extLst>
           </p:cNvPr>
@@ -3871,7 +3872,7 @@
           <p:cNvPr id="4" name="Footer Placeholder 3">
             <a:extLst>
               <a:ext uri="{FF2B5EF4-FFF2-40B4-BE49-F238E27FC236}">
-                <a16:creationId xmlns:a16="http://schemas.microsoft.com/office/drawing/2014/main" xmlns="" id="{C401FFE3-F414-4CF5-AD6A-9C2DE5116ED4}"/>
+                <a16:creationId xmlns="" xmlns:a16="http://schemas.microsoft.com/office/drawing/2014/main" id="{C401FFE3-F414-4CF5-AD6A-9C2DE5116ED4}"/>
               </a:ext>
             </a:extLst>
           </p:cNvPr>
@@ -3936,7 +3937,7 @@
           <p:cNvPr id="2" name="Title 1">
             <a:extLst>
               <a:ext uri="{FF2B5EF4-FFF2-40B4-BE49-F238E27FC236}">
-                <a16:creationId xmlns:a16="http://schemas.microsoft.com/office/drawing/2014/main" xmlns="" id="{E29B01D6-A7CA-4A3E-9C66-C2AA33322F12}"/>
+                <a16:creationId xmlns="" xmlns:a16="http://schemas.microsoft.com/office/drawing/2014/main" id="{E29B01D6-A7CA-4A3E-9C66-C2AA33322F12}"/>
               </a:ext>
             </a:extLst>
           </p:cNvPr>
@@ -3964,7 +3965,7 @@
           <p:cNvPr id="3" name="Content Placeholder 2">
             <a:extLst>
               <a:ext uri="{FF2B5EF4-FFF2-40B4-BE49-F238E27FC236}">
-                <a16:creationId xmlns:a16="http://schemas.microsoft.com/office/drawing/2014/main" xmlns="" id="{F1842140-4ACB-41A9-BC7F-30570259E5D8}"/>
+                <a16:creationId xmlns="" xmlns:a16="http://schemas.microsoft.com/office/drawing/2014/main" id="{F1842140-4ACB-41A9-BC7F-30570259E5D8}"/>
               </a:ext>
             </a:extLst>
           </p:cNvPr>
@@ -4028,7 +4029,7 @@
           <p:cNvPr id="4" name="Footer Placeholder 3">
             <a:extLst>
               <a:ext uri="{FF2B5EF4-FFF2-40B4-BE49-F238E27FC236}">
-                <a16:creationId xmlns:a16="http://schemas.microsoft.com/office/drawing/2014/main" xmlns="" id="{C401FFE3-F414-4CF5-AD6A-9C2DE5116ED4}"/>
+                <a16:creationId xmlns="" xmlns:a16="http://schemas.microsoft.com/office/drawing/2014/main" id="{C401FFE3-F414-4CF5-AD6A-9C2DE5116ED4}"/>
               </a:ext>
             </a:extLst>
           </p:cNvPr>
@@ -4105,8 +4106,13 @@
           <a:p>
             <a:r>
               <a:rPr lang="en-US" dirty="0"/>
-              <a:t>EJJ Web Page (2)</a:t>
-            </a:r>
+              <a:t>EJJ Web Page </a:t>
+            </a:r>
+            <a:r>
+              <a:rPr lang="en-US" dirty="0" smtClean="0"/>
+              <a:t>– Output Schedule</a:t>
+            </a:r>
+            <a:endParaRPr lang="en-US" dirty="0"/>
           </a:p>
         </p:txBody>
       </p:sp>
@@ -4144,7 +4150,7 @@
           <p:cNvPr id="9" name="Picture 8">
             <a:extLst>
               <a:ext uri="{FF2B5EF4-FFF2-40B4-BE49-F238E27FC236}">
-                <a16:creationId xmlns:a16="http://schemas.microsoft.com/office/drawing/2014/main" xmlns="" id="{8FF5839C-26EA-45D4-A43D-5FDEE1086692}"/>
+                <a16:creationId xmlns="" xmlns:a16="http://schemas.microsoft.com/office/drawing/2014/main" id="{8FF5839C-26EA-45D4-A43D-5FDEE1086692}"/>
               </a:ext>
             </a:extLst>
           </p:cNvPr>
@@ -4204,7 +4210,7 @@
           <p:cNvPr id="2" name="Title 1">
             <a:extLst>
               <a:ext uri="{FF2B5EF4-FFF2-40B4-BE49-F238E27FC236}">
-                <a16:creationId xmlns:a16="http://schemas.microsoft.com/office/drawing/2014/main" xmlns="" id="{E29B01D6-A7CA-4A3E-9C66-C2AA33322F12}"/>
+                <a16:creationId xmlns="" xmlns:a16="http://schemas.microsoft.com/office/drawing/2014/main" id="{E29B01D6-A7CA-4A3E-9C66-C2AA33322F12}"/>
               </a:ext>
             </a:extLst>
           </p:cNvPr>
@@ -4232,7 +4238,7 @@
           <p:cNvPr id="3" name="Content Placeholder 2">
             <a:extLst>
               <a:ext uri="{FF2B5EF4-FFF2-40B4-BE49-F238E27FC236}">
-                <a16:creationId xmlns:a16="http://schemas.microsoft.com/office/drawing/2014/main" xmlns="" id="{F1842140-4ACB-41A9-BC7F-30570259E5D8}"/>
+                <a16:creationId xmlns="" xmlns:a16="http://schemas.microsoft.com/office/drawing/2014/main" id="{F1842140-4ACB-41A9-BC7F-30570259E5D8}"/>
               </a:ext>
             </a:extLst>
           </p:cNvPr>
@@ -4347,7 +4353,7 @@
           <p:cNvPr id="4" name="Footer Placeholder 3">
             <a:extLst>
               <a:ext uri="{FF2B5EF4-FFF2-40B4-BE49-F238E27FC236}">
-                <a16:creationId xmlns:a16="http://schemas.microsoft.com/office/drawing/2014/main" xmlns="" id="{C401FFE3-F414-4CF5-AD6A-9C2DE5116ED4}"/>
+                <a16:creationId xmlns="" xmlns:a16="http://schemas.microsoft.com/office/drawing/2014/main" id="{C401FFE3-F414-4CF5-AD6A-9C2DE5116ED4}"/>
               </a:ext>
             </a:extLst>
           </p:cNvPr>
@@ -4407,6 +4413,32 @@
           <a:chExt cx="0" cy="0"/>
         </a:xfrm>
       </p:grpSpPr>
+      <p:pic>
+        <p:nvPicPr>
+          <p:cNvPr id="11" name="Content Placeholder 10"/>
+          <p:cNvPicPr>
+            <a:picLocks noGrp="1" noChangeAspect="1"/>
+          </p:cNvPicPr>
+          <p:nvPr>
+            <p:ph idx="1"/>
+          </p:nvPr>
+        </p:nvPicPr>
+        <p:blipFill>
+          <a:blip r:embed="rId2"/>
+          <a:stretch>
+            <a:fillRect/>
+          </a:stretch>
+        </p:blipFill>
+        <p:spPr>
+          <a:xfrm>
+            <a:off x="307690" y="1709556"/>
+            <a:ext cx="8284780" cy="4351338"/>
+          </a:xfrm>
+          <a:prstGeom prst="rect">
+            <a:avLst/>
+          </a:prstGeom>
+        </p:spPr>
+      </p:pic>
       <p:sp>
         <p:nvSpPr>
           <p:cNvPr id="2" name="Title 1"/>
@@ -4419,13 +4451,66 @@
         </p:nvSpPr>
         <p:spPr/>
         <p:txBody>
-          <a:bodyPr/>
+          <a:bodyPr>
+            <a:normAutofit/>
+          </a:bodyPr>
           <a:lstStyle/>
           <a:p>
             <a:r>
               <a:rPr lang="en-US" dirty="0"/>
-              <a:t>EJJ Web Page (3) - Timeline</a:t>
-            </a:r>
+              <a:t>EJJ Example Schedule </a:t>
+            </a:r>
+            <a:r>
+              <a:rPr lang="en-US" dirty="0" smtClean="0"/>
+              <a:t>Output</a:t>
+            </a:r>
+            <a:br>
+              <a:rPr lang="en-US" dirty="0" smtClean="0"/>
+            </a:br>
+            <a:r>
+              <a:rPr lang="en-US" sz="1400" dirty="0" smtClean="0"/>
+              <a:t>With additional info on </a:t>
+            </a:r>
+            <a:r>
+              <a:rPr lang="en-US" sz="1600" dirty="0"/>
+              <a:t>casualties, jet/</a:t>
+            </a:r>
+            <a:r>
+              <a:rPr lang="en-US" sz="1600" dirty="0" err="1"/>
+              <a:t>helo</a:t>
+            </a:r>
+            <a:r>
+              <a:rPr lang="en-US" sz="1600" dirty="0"/>
+              <a:t> down times, or successful target </a:t>
+            </a:r>
+            <a:r>
+              <a:rPr lang="en-US" sz="1600" dirty="0" smtClean="0"/>
+              <a:t>strikes</a:t>
+            </a:r>
+            <a:br>
+              <a:rPr lang="en-US" sz="1600" dirty="0" smtClean="0"/>
+            </a:br>
+            <a:r>
+              <a:rPr lang="en-US" sz="1200" dirty="0" smtClean="0"/>
+              <a:t>(Able to Disable </a:t>
+            </a:r>
+            <a:r>
+              <a:rPr lang="en-US" sz="1200" dirty="0"/>
+              <a:t>Target 2, 3, </a:t>
+            </a:r>
+            <a:r>
+              <a:rPr lang="en-US" sz="1200" dirty="0" smtClean="0"/>
+              <a:t>4, 5, 6; </a:t>
+            </a:r>
+            <a:r>
+              <a:rPr lang="en-US" sz="1200" dirty="0"/>
+              <a:t>Destroy Target </a:t>
+            </a:r>
+            <a:r>
+              <a:rPr lang="en-US" sz="1200" dirty="0" smtClean="0"/>
+              <a:t>1)</a:t>
+            </a:r>
+            <a:endParaRPr lang="en-US" sz="1200" dirty="0"/>
           </a:p>
         </p:txBody>
       </p:sp>
@@ -4458,12 +4543,1143 @@
           </a:p>
         </p:txBody>
       </p:sp>
+      <p:pic>
+        <p:nvPicPr>
+          <p:cNvPr id="8" name="Picture 7"/>
+          <p:cNvPicPr>
+            <a:picLocks noChangeAspect="1"/>
+          </p:cNvPicPr>
+          <p:nvPr/>
+        </p:nvPicPr>
+        <p:blipFill>
+          <a:blip r:embed="rId3"/>
+          <a:stretch>
+            <a:fillRect/>
+          </a:stretch>
+        </p:blipFill>
+        <p:spPr>
+          <a:xfrm>
+            <a:off x="4524375" y="5062130"/>
+            <a:ext cx="1571625" cy="857250"/>
+          </a:xfrm>
+          <a:prstGeom prst="rect">
+            <a:avLst/>
+          </a:prstGeom>
+        </p:spPr>
+      </p:pic>
+      <p:sp>
+        <p:nvSpPr>
+          <p:cNvPr id="13" name="Rectangle 12"/>
+          <p:cNvSpPr/>
+          <p:nvPr/>
+        </p:nvSpPr>
+        <p:spPr>
+          <a:xfrm>
+            <a:off x="10312685" y="1782800"/>
+            <a:ext cx="1622683" cy="4278094"/>
+          </a:xfrm>
+          <a:prstGeom prst="rect">
+            <a:avLst/>
+          </a:prstGeom>
+          <a:solidFill>
+            <a:schemeClr val="bg1"/>
+          </a:solidFill>
+          <a:ln w="38100">
+            <a:solidFill>
+              <a:srgbClr val="00B050"/>
+            </a:solidFill>
+          </a:ln>
+        </p:spPr>
+        <p:txBody>
+          <a:bodyPr wrap="square">
+            <a:spAutoFit/>
+          </a:bodyPr>
+          <a:lstStyle/>
+          <a:p>
+            <a:r>
+              <a:rPr lang="en-US" sz="800" dirty="0">
+                <a:solidFill>
+                  <a:srgbClr val="7030A0"/>
+                </a:solidFill>
+              </a:rPr>
+              <a:t>Sortie 4 for Target: 3</a:t>
+            </a:r>
+          </a:p>
+          <a:p>
+            <a:r>
+              <a:rPr lang="en-US" sz="800" dirty="0">
+                <a:solidFill>
+                  <a:srgbClr val="7030A0"/>
+                </a:solidFill>
+              </a:rPr>
+              <a:t>Mission Start Time (</a:t>
+            </a:r>
+            <a:r>
+              <a:rPr lang="en-US" sz="800" dirty="0" err="1">
+                <a:solidFill>
+                  <a:srgbClr val="7030A0"/>
+                </a:solidFill>
+              </a:rPr>
+              <a:t>hrs</a:t>
+            </a:r>
+            <a:r>
+              <a:rPr lang="en-US" sz="800" dirty="0">
+                <a:solidFill>
+                  <a:srgbClr val="7030A0"/>
+                </a:solidFill>
+              </a:rPr>
+              <a:t>): 19</a:t>
+            </a:r>
+          </a:p>
+          <a:p>
+            <a:r>
+              <a:rPr lang="en-US" sz="800" dirty="0">
+                <a:solidFill>
+                  <a:srgbClr val="7030A0"/>
+                </a:solidFill>
+              </a:rPr>
+              <a:t>Carrier Chosen: 2</a:t>
+            </a:r>
+          </a:p>
+          <a:p>
+            <a:r>
+              <a:rPr lang="en-US" sz="800" dirty="0">
+                <a:solidFill>
+                  <a:srgbClr val="7030A0"/>
+                </a:solidFill>
+              </a:rPr>
+              <a:t>Jets Chosen: 14, 15, 16</a:t>
+            </a:r>
+          </a:p>
+          <a:p>
+            <a:r>
+              <a:rPr lang="en-US" sz="800" dirty="0" err="1">
+                <a:solidFill>
+                  <a:srgbClr val="7030A0"/>
+                </a:solidFill>
+              </a:rPr>
+              <a:t>Helo</a:t>
+            </a:r>
+            <a:r>
+              <a:rPr lang="en-US" sz="800" dirty="0">
+                <a:solidFill>
+                  <a:srgbClr val="7030A0"/>
+                </a:solidFill>
+              </a:rPr>
+              <a:t> Chosen: 4</a:t>
+            </a:r>
+          </a:p>
+          <a:p>
+            <a:r>
+              <a:rPr lang="en-US" sz="800" dirty="0">
+                <a:solidFill>
+                  <a:srgbClr val="7030A0"/>
+                </a:solidFill>
+              </a:rPr>
+              <a:t>Pilots Chosen: 17, 18</a:t>
+            </a:r>
+          </a:p>
+          <a:p>
+            <a:r>
+              <a:rPr lang="en-US" sz="800" dirty="0">
+                <a:solidFill>
+                  <a:srgbClr val="7030A0"/>
+                </a:solidFill>
+              </a:rPr>
+              <a:t>Number of Missiles Chosen: 3</a:t>
+            </a:r>
+          </a:p>
+          <a:p>
+            <a:r>
+              <a:rPr lang="en-US" sz="800" dirty="0">
+                <a:solidFill>
+                  <a:srgbClr val="7030A0"/>
+                </a:solidFill>
+              </a:rPr>
+              <a:t>Missiles Chosen: 10, 11, 12</a:t>
+            </a:r>
+          </a:p>
+          <a:p>
+            <a:r>
+              <a:rPr lang="en-US" sz="800" dirty="0">
+                <a:solidFill>
+                  <a:srgbClr val="7030A0"/>
+                </a:solidFill>
+              </a:rPr>
+              <a:t>Number of Missiles Needed: 3</a:t>
+            </a:r>
+          </a:p>
+          <a:p>
+            <a:r>
+              <a:rPr lang="en-US" sz="800" dirty="0">
+                <a:solidFill>
+                  <a:srgbClr val="7030A0"/>
+                </a:solidFill>
+              </a:rPr>
+              <a:t>Number of Missiles Remaining: 6</a:t>
+            </a:r>
+          </a:p>
+          <a:p>
+            <a:r>
+              <a:rPr lang="en-US" sz="800" dirty="0">
+                <a:solidFill>
+                  <a:srgbClr val="7030A0"/>
+                </a:solidFill>
+              </a:rPr>
+              <a:t>Jet 14 is killed!!!</a:t>
+            </a:r>
+          </a:p>
+          <a:p>
+            <a:r>
+              <a:rPr lang="en-US" sz="800" dirty="0">
+                <a:solidFill>
+                  <a:srgbClr val="7030A0"/>
+                </a:solidFill>
+              </a:rPr>
+              <a:t>Pilot 17 is killed!!!</a:t>
+            </a:r>
+          </a:p>
+          <a:p>
+            <a:endParaRPr lang="en-US" sz="800" dirty="0">
+              <a:solidFill>
+                <a:srgbClr val="7030A0"/>
+              </a:solidFill>
+            </a:endParaRPr>
+          </a:p>
+          <a:p>
+            <a:r>
+              <a:rPr lang="en-US" sz="800" dirty="0">
+                <a:solidFill>
+                  <a:srgbClr val="7030A0"/>
+                </a:solidFill>
+              </a:rPr>
+              <a:t>Sortie 5 for Target: 1</a:t>
+            </a:r>
+          </a:p>
+          <a:p>
+            <a:r>
+              <a:rPr lang="en-US" sz="800" dirty="0">
+                <a:solidFill>
+                  <a:srgbClr val="7030A0"/>
+                </a:solidFill>
+              </a:rPr>
+              <a:t>Mission Start Time (</a:t>
+            </a:r>
+            <a:r>
+              <a:rPr lang="en-US" sz="800" dirty="0" err="1">
+                <a:solidFill>
+                  <a:srgbClr val="7030A0"/>
+                </a:solidFill>
+              </a:rPr>
+              <a:t>hrs</a:t>
+            </a:r>
+            <a:r>
+              <a:rPr lang="en-US" sz="800" dirty="0">
+                <a:solidFill>
+                  <a:srgbClr val="7030A0"/>
+                </a:solidFill>
+              </a:rPr>
+              <a:t>): 28</a:t>
+            </a:r>
+          </a:p>
+          <a:p>
+            <a:r>
+              <a:rPr lang="en-US" sz="800" dirty="0">
+                <a:solidFill>
+                  <a:srgbClr val="7030A0"/>
+                </a:solidFill>
+              </a:rPr>
+              <a:t>Carrier Chosen: 1</a:t>
+            </a:r>
+          </a:p>
+          <a:p>
+            <a:r>
+              <a:rPr lang="en-US" sz="800" dirty="0">
+                <a:solidFill>
+                  <a:srgbClr val="7030A0"/>
+                </a:solidFill>
+              </a:rPr>
+              <a:t>Jets Chosen: 2, 3</a:t>
+            </a:r>
+          </a:p>
+          <a:p>
+            <a:r>
+              <a:rPr lang="en-US" sz="800" dirty="0" err="1">
+                <a:solidFill>
+                  <a:srgbClr val="7030A0"/>
+                </a:solidFill>
+              </a:rPr>
+              <a:t>Helo</a:t>
+            </a:r>
+            <a:r>
+              <a:rPr lang="en-US" sz="800" dirty="0">
+                <a:solidFill>
+                  <a:srgbClr val="7030A0"/>
+                </a:solidFill>
+              </a:rPr>
+              <a:t> Chosen: 2</a:t>
+            </a:r>
+          </a:p>
+          <a:p>
+            <a:r>
+              <a:rPr lang="en-US" sz="800" dirty="0">
+                <a:solidFill>
+                  <a:srgbClr val="7030A0"/>
+                </a:solidFill>
+              </a:rPr>
+              <a:t>Pilots Chosen: 1, 3</a:t>
+            </a:r>
+          </a:p>
+          <a:p>
+            <a:r>
+              <a:rPr lang="en-US" sz="800" dirty="0">
+                <a:solidFill>
+                  <a:srgbClr val="7030A0"/>
+                </a:solidFill>
+              </a:rPr>
+              <a:t>Number of Missiles Chosen: 2</a:t>
+            </a:r>
+          </a:p>
+          <a:p>
+            <a:r>
+              <a:rPr lang="en-US" sz="800" dirty="0">
+                <a:solidFill>
+                  <a:srgbClr val="7030A0"/>
+                </a:solidFill>
+              </a:rPr>
+              <a:t>Missiles Chosen: 4, 5</a:t>
+            </a:r>
+          </a:p>
+          <a:p>
+            <a:r>
+              <a:rPr lang="en-US" sz="800" dirty="0">
+                <a:solidFill>
+                  <a:srgbClr val="7030A0"/>
+                </a:solidFill>
+              </a:rPr>
+              <a:t>Number of Missiles Needed: 2</a:t>
+            </a:r>
+          </a:p>
+          <a:p>
+            <a:r>
+              <a:rPr lang="en-US" sz="800" dirty="0">
+                <a:solidFill>
+                  <a:srgbClr val="7030A0"/>
+                </a:solidFill>
+              </a:rPr>
+              <a:t>Number of Missiles Remaining: 4</a:t>
+            </a:r>
+          </a:p>
+          <a:p>
+            <a:endParaRPr lang="en-US" sz="800" dirty="0">
+              <a:solidFill>
+                <a:srgbClr val="7030A0"/>
+              </a:solidFill>
+            </a:endParaRPr>
+          </a:p>
+          <a:p>
+            <a:r>
+              <a:rPr lang="en-US" sz="800" dirty="0">
+                <a:solidFill>
+                  <a:srgbClr val="7030A0"/>
+                </a:solidFill>
+              </a:rPr>
+              <a:t>Sortie 6 for Target: 2</a:t>
+            </a:r>
+          </a:p>
+          <a:p>
+            <a:r>
+              <a:rPr lang="en-US" sz="800" dirty="0">
+                <a:solidFill>
+                  <a:srgbClr val="7030A0"/>
+                </a:solidFill>
+              </a:rPr>
+              <a:t>Mission Start Time (</a:t>
+            </a:r>
+            <a:r>
+              <a:rPr lang="en-US" sz="800" dirty="0" err="1">
+                <a:solidFill>
+                  <a:srgbClr val="7030A0"/>
+                </a:solidFill>
+              </a:rPr>
+              <a:t>hrs</a:t>
+            </a:r>
+            <a:r>
+              <a:rPr lang="en-US" sz="800" dirty="0">
+                <a:solidFill>
+                  <a:srgbClr val="7030A0"/>
+                </a:solidFill>
+              </a:rPr>
+              <a:t>): 51</a:t>
+            </a:r>
+          </a:p>
+          <a:p>
+            <a:r>
+              <a:rPr lang="en-US" sz="800" dirty="0">
+                <a:solidFill>
+                  <a:srgbClr val="7030A0"/>
+                </a:solidFill>
+              </a:rPr>
+              <a:t>Carrier Chosen: 2</a:t>
+            </a:r>
+          </a:p>
+          <a:p>
+            <a:r>
+              <a:rPr lang="en-US" sz="800" dirty="0">
+                <a:solidFill>
+                  <a:srgbClr val="7030A0"/>
+                </a:solidFill>
+              </a:rPr>
+              <a:t>Jets Chosen: 12, 13, 15</a:t>
+            </a:r>
+          </a:p>
+          <a:p>
+            <a:r>
+              <a:rPr lang="en-US" sz="800" dirty="0" err="1">
+                <a:solidFill>
+                  <a:srgbClr val="7030A0"/>
+                </a:solidFill>
+              </a:rPr>
+              <a:t>Helo</a:t>
+            </a:r>
+            <a:r>
+              <a:rPr lang="en-US" sz="800" dirty="0">
+                <a:solidFill>
+                  <a:srgbClr val="7030A0"/>
+                </a:solidFill>
+              </a:rPr>
+              <a:t> Chosen: 3</a:t>
+            </a:r>
+          </a:p>
+          <a:p>
+            <a:r>
+              <a:rPr lang="en-US" sz="800" dirty="0">
+                <a:solidFill>
+                  <a:srgbClr val="7030A0"/>
+                </a:solidFill>
+              </a:rPr>
+              <a:t>Pilots Chosen: 19, 20</a:t>
+            </a:r>
+          </a:p>
+          <a:p>
+            <a:r>
+              <a:rPr lang="en-US" sz="800" dirty="0">
+                <a:solidFill>
+                  <a:srgbClr val="7030A0"/>
+                </a:solidFill>
+              </a:rPr>
+              <a:t>Number of Missiles Chosen: 3</a:t>
+            </a:r>
+          </a:p>
+          <a:p>
+            <a:r>
+              <a:rPr lang="en-US" sz="800" dirty="0">
+                <a:solidFill>
+                  <a:srgbClr val="7030A0"/>
+                </a:solidFill>
+              </a:rPr>
+              <a:t>Missiles Chosen: 13, 6, 7</a:t>
+            </a:r>
+          </a:p>
+          <a:p>
+            <a:r>
+              <a:rPr lang="en-US" sz="800" dirty="0">
+                <a:solidFill>
+                  <a:srgbClr val="7030A0"/>
+                </a:solidFill>
+              </a:rPr>
+              <a:t>Number of Missiles Needed: 3</a:t>
+            </a:r>
+          </a:p>
+          <a:p>
+            <a:r>
+              <a:rPr lang="en-US" sz="800" dirty="0">
+                <a:solidFill>
+                  <a:srgbClr val="7030A0"/>
+                </a:solidFill>
+              </a:rPr>
+              <a:t>Number of Missiles Remaining: 1</a:t>
+            </a:r>
+          </a:p>
+        </p:txBody>
+      </p:sp>
+      <p:sp>
+        <p:nvSpPr>
+          <p:cNvPr id="14" name="Rectangle 13"/>
+          <p:cNvSpPr/>
+          <p:nvPr/>
+        </p:nvSpPr>
+        <p:spPr>
+          <a:xfrm>
+            <a:off x="8727726" y="767358"/>
+            <a:ext cx="3207642" cy="923330"/>
+          </a:xfrm>
+          <a:prstGeom prst="rect">
+            <a:avLst/>
+          </a:prstGeom>
+          <a:solidFill>
+            <a:schemeClr val="bg1"/>
+          </a:solidFill>
+          <a:ln w="38100">
+            <a:solidFill>
+              <a:srgbClr val="00B050"/>
+            </a:solidFill>
+          </a:ln>
+        </p:spPr>
+        <p:txBody>
+          <a:bodyPr wrap="square">
+            <a:spAutoFit/>
+          </a:bodyPr>
+          <a:lstStyle/>
+          <a:p>
+            <a:r>
+              <a:rPr lang="en-US" sz="900" dirty="0">
+                <a:solidFill>
+                  <a:srgbClr val="7030A0"/>
+                </a:solidFill>
+              </a:rPr>
+              <a:t>Target Strike Order: 5  6  4  3  1  2</a:t>
+            </a:r>
+          </a:p>
+          <a:p>
+            <a:r>
+              <a:rPr lang="en-US" sz="900" dirty="0" err="1">
+                <a:solidFill>
+                  <a:srgbClr val="7030A0"/>
+                </a:solidFill>
+              </a:rPr>
+              <a:t>Num</a:t>
+            </a:r>
+            <a:r>
+              <a:rPr lang="en-US" sz="900" dirty="0">
+                <a:solidFill>
+                  <a:srgbClr val="7030A0"/>
+                </a:solidFill>
+              </a:rPr>
+              <a:t> Missiles Needed for 90% Success Disabling Target: 3</a:t>
+            </a:r>
+          </a:p>
+          <a:p>
+            <a:r>
+              <a:rPr lang="en-US" sz="900" dirty="0" err="1">
+                <a:solidFill>
+                  <a:srgbClr val="7030A0"/>
+                </a:solidFill>
+              </a:rPr>
+              <a:t>Num</a:t>
+            </a:r>
+            <a:r>
+              <a:rPr lang="en-US" sz="900" dirty="0">
+                <a:solidFill>
+                  <a:srgbClr val="7030A0"/>
+                </a:solidFill>
+              </a:rPr>
+              <a:t> Missiles Needed for 90% Success Destroying Target: 7</a:t>
+            </a:r>
+          </a:p>
+          <a:p>
+            <a:endParaRPr lang="en-US" sz="900" dirty="0">
+              <a:solidFill>
+                <a:srgbClr val="7030A0"/>
+              </a:solidFill>
+            </a:endParaRPr>
+          </a:p>
+          <a:p>
+            <a:r>
+              <a:rPr lang="en-US" sz="900" dirty="0" err="1">
+                <a:solidFill>
+                  <a:srgbClr val="7030A0"/>
+                </a:solidFill>
+              </a:rPr>
+              <a:t>Num</a:t>
+            </a:r>
+            <a:r>
+              <a:rPr lang="en-US" sz="900" dirty="0">
+                <a:solidFill>
+                  <a:srgbClr val="7030A0"/>
+                </a:solidFill>
+              </a:rPr>
+              <a:t> Missiles Needed for each Target: 3  3  3  3  7  3</a:t>
+            </a:r>
+          </a:p>
+          <a:p>
+            <a:r>
+              <a:rPr lang="en-US" sz="900" dirty="0" err="1">
+                <a:solidFill>
+                  <a:srgbClr val="7030A0"/>
+                </a:solidFill>
+              </a:rPr>
+              <a:t>Num</a:t>
+            </a:r>
+            <a:r>
+              <a:rPr lang="en-US" sz="900" dirty="0">
+                <a:solidFill>
+                  <a:srgbClr val="7030A0"/>
+                </a:solidFill>
+              </a:rPr>
+              <a:t> Missiles Actually Used for each Target: 2  1  1  3  2  3</a:t>
+            </a:r>
+          </a:p>
+        </p:txBody>
+      </p:sp>
+      <p:sp>
+        <p:nvSpPr>
+          <p:cNvPr id="16" name="Rectangle 15"/>
+          <p:cNvSpPr/>
+          <p:nvPr/>
+        </p:nvSpPr>
+        <p:spPr>
+          <a:xfrm>
+            <a:off x="8727726" y="1782800"/>
+            <a:ext cx="1584959" cy="4278094"/>
+          </a:xfrm>
+          <a:prstGeom prst="rect">
+            <a:avLst/>
+          </a:prstGeom>
+          <a:solidFill>
+            <a:schemeClr val="bg1"/>
+          </a:solidFill>
+          <a:ln w="38100">
+            <a:solidFill>
+              <a:srgbClr val="00B050"/>
+            </a:solidFill>
+          </a:ln>
+        </p:spPr>
+        <p:txBody>
+          <a:bodyPr wrap="square">
+            <a:spAutoFit/>
+          </a:bodyPr>
+          <a:lstStyle/>
+          <a:p>
+            <a:r>
+              <a:rPr lang="en-US" sz="800" dirty="0">
+                <a:solidFill>
+                  <a:srgbClr val="7030A0"/>
+                </a:solidFill>
+              </a:rPr>
+              <a:t>Sortie 1 for Target: 5</a:t>
+            </a:r>
+          </a:p>
+          <a:p>
+            <a:r>
+              <a:rPr lang="en-US" sz="800" dirty="0">
+                <a:solidFill>
+                  <a:srgbClr val="7030A0"/>
+                </a:solidFill>
+              </a:rPr>
+              <a:t>Mission Start Time (</a:t>
+            </a:r>
+            <a:r>
+              <a:rPr lang="en-US" sz="800" dirty="0" err="1">
+                <a:solidFill>
+                  <a:srgbClr val="7030A0"/>
+                </a:solidFill>
+              </a:rPr>
+              <a:t>hrs</a:t>
+            </a:r>
+            <a:r>
+              <a:rPr lang="en-US" sz="800" dirty="0">
+                <a:solidFill>
+                  <a:srgbClr val="7030A0"/>
+                </a:solidFill>
+              </a:rPr>
+              <a:t>): 2</a:t>
+            </a:r>
+          </a:p>
+          <a:p>
+            <a:r>
+              <a:rPr lang="en-US" sz="800" dirty="0">
+                <a:solidFill>
+                  <a:srgbClr val="7030A0"/>
+                </a:solidFill>
+              </a:rPr>
+              <a:t>Carrier Chosen: 1</a:t>
+            </a:r>
+          </a:p>
+          <a:p>
+            <a:r>
+              <a:rPr lang="en-US" sz="800" dirty="0">
+                <a:solidFill>
+                  <a:srgbClr val="7030A0"/>
+                </a:solidFill>
+              </a:rPr>
+              <a:t>Jets Chosen: 2, 3</a:t>
+            </a:r>
+          </a:p>
+          <a:p>
+            <a:r>
+              <a:rPr lang="en-US" sz="800" dirty="0" err="1">
+                <a:solidFill>
+                  <a:srgbClr val="7030A0"/>
+                </a:solidFill>
+              </a:rPr>
+              <a:t>Helo</a:t>
+            </a:r>
+            <a:r>
+              <a:rPr lang="en-US" sz="800" dirty="0">
+                <a:solidFill>
+                  <a:srgbClr val="7030A0"/>
+                </a:solidFill>
+              </a:rPr>
+              <a:t> Chosen: 1</a:t>
+            </a:r>
+          </a:p>
+          <a:p>
+            <a:r>
+              <a:rPr lang="en-US" sz="800" dirty="0">
+                <a:solidFill>
+                  <a:srgbClr val="7030A0"/>
+                </a:solidFill>
+              </a:rPr>
+              <a:t>Pilots Chosen: 1, 3</a:t>
+            </a:r>
+          </a:p>
+          <a:p>
+            <a:r>
+              <a:rPr lang="en-US" sz="800" dirty="0">
+                <a:solidFill>
+                  <a:srgbClr val="7030A0"/>
+                </a:solidFill>
+              </a:rPr>
+              <a:t>Number of Missiles Chosen: 2</a:t>
+            </a:r>
+          </a:p>
+          <a:p>
+            <a:r>
+              <a:rPr lang="en-US" sz="800" dirty="0">
+                <a:solidFill>
+                  <a:srgbClr val="7030A0"/>
+                </a:solidFill>
+              </a:rPr>
+              <a:t>Missiles Chosen: 1, 2</a:t>
+            </a:r>
+          </a:p>
+          <a:p>
+            <a:r>
+              <a:rPr lang="en-US" sz="800" dirty="0">
+                <a:solidFill>
+                  <a:srgbClr val="7030A0"/>
+                </a:solidFill>
+              </a:rPr>
+              <a:t>Number of Missiles Needed: 2</a:t>
+            </a:r>
+          </a:p>
+          <a:p>
+            <a:r>
+              <a:rPr lang="en-US" sz="800" dirty="0">
+                <a:solidFill>
+                  <a:srgbClr val="7030A0"/>
+                </a:solidFill>
+              </a:rPr>
+              <a:t>Number of Missiles Remaining: 11</a:t>
+            </a:r>
+          </a:p>
+          <a:p>
+            <a:endParaRPr lang="en-US" sz="800" dirty="0">
+              <a:solidFill>
+                <a:srgbClr val="7030A0"/>
+              </a:solidFill>
+            </a:endParaRPr>
+          </a:p>
+          <a:p>
+            <a:r>
+              <a:rPr lang="en-US" sz="800" dirty="0">
+                <a:solidFill>
+                  <a:srgbClr val="7030A0"/>
+                </a:solidFill>
+              </a:rPr>
+              <a:t>Sortie 2 for Target: 6</a:t>
+            </a:r>
+          </a:p>
+          <a:p>
+            <a:r>
+              <a:rPr lang="en-US" sz="800" dirty="0">
+                <a:solidFill>
+                  <a:srgbClr val="7030A0"/>
+                </a:solidFill>
+              </a:rPr>
+              <a:t>Mission Start Time (</a:t>
+            </a:r>
+            <a:r>
+              <a:rPr lang="en-US" sz="800" dirty="0" err="1">
+                <a:solidFill>
+                  <a:srgbClr val="7030A0"/>
+                </a:solidFill>
+              </a:rPr>
+              <a:t>hrs</a:t>
+            </a:r>
+            <a:r>
+              <a:rPr lang="en-US" sz="800" dirty="0">
+                <a:solidFill>
+                  <a:srgbClr val="7030A0"/>
+                </a:solidFill>
+              </a:rPr>
+              <a:t>): 8</a:t>
+            </a:r>
+          </a:p>
+          <a:p>
+            <a:r>
+              <a:rPr lang="en-US" sz="800" dirty="0">
+                <a:solidFill>
+                  <a:srgbClr val="7030A0"/>
+                </a:solidFill>
+              </a:rPr>
+              <a:t>Carrier Chosen: 1</a:t>
+            </a:r>
+          </a:p>
+          <a:p>
+            <a:r>
+              <a:rPr lang="en-US" sz="800" dirty="0">
+                <a:solidFill>
+                  <a:srgbClr val="7030A0"/>
+                </a:solidFill>
+              </a:rPr>
+              <a:t>Jets Chosen: 4, 5</a:t>
+            </a:r>
+          </a:p>
+          <a:p>
+            <a:r>
+              <a:rPr lang="en-US" sz="800" dirty="0" err="1">
+                <a:solidFill>
+                  <a:srgbClr val="7030A0"/>
+                </a:solidFill>
+              </a:rPr>
+              <a:t>Helo</a:t>
+            </a:r>
+            <a:r>
+              <a:rPr lang="en-US" sz="800" dirty="0">
+                <a:solidFill>
+                  <a:srgbClr val="7030A0"/>
+                </a:solidFill>
+              </a:rPr>
+              <a:t> Chosen: 2</a:t>
+            </a:r>
+          </a:p>
+          <a:p>
+            <a:r>
+              <a:rPr lang="en-US" sz="800" dirty="0">
+                <a:solidFill>
+                  <a:srgbClr val="7030A0"/>
+                </a:solidFill>
+              </a:rPr>
+              <a:t>Pilots Chosen: 2, 4</a:t>
+            </a:r>
+          </a:p>
+          <a:p>
+            <a:r>
+              <a:rPr lang="en-US" sz="800" dirty="0">
+                <a:solidFill>
+                  <a:srgbClr val="7030A0"/>
+                </a:solidFill>
+              </a:rPr>
+              <a:t>Number of Missiles Chosen: 1</a:t>
+            </a:r>
+          </a:p>
+          <a:p>
+            <a:r>
+              <a:rPr lang="en-US" sz="800" dirty="0">
+                <a:solidFill>
+                  <a:srgbClr val="7030A0"/>
+                </a:solidFill>
+              </a:rPr>
+              <a:t>Missiles Chosen: 3</a:t>
+            </a:r>
+          </a:p>
+          <a:p>
+            <a:r>
+              <a:rPr lang="en-US" sz="800" dirty="0">
+                <a:solidFill>
+                  <a:srgbClr val="7030A0"/>
+                </a:solidFill>
+              </a:rPr>
+              <a:t>Number of Missiles Needed: 1</a:t>
+            </a:r>
+          </a:p>
+          <a:p>
+            <a:r>
+              <a:rPr lang="en-US" sz="800" dirty="0">
+                <a:solidFill>
+                  <a:srgbClr val="7030A0"/>
+                </a:solidFill>
+              </a:rPr>
+              <a:t>Number of Missiles Remaining: 10</a:t>
+            </a:r>
+          </a:p>
+          <a:p>
+            <a:endParaRPr lang="en-US" sz="800" dirty="0">
+              <a:solidFill>
+                <a:srgbClr val="7030A0"/>
+              </a:solidFill>
+            </a:endParaRPr>
+          </a:p>
+          <a:p>
+            <a:r>
+              <a:rPr lang="en-US" sz="800" dirty="0">
+                <a:solidFill>
+                  <a:srgbClr val="7030A0"/>
+                </a:solidFill>
+              </a:rPr>
+              <a:t>Sortie 3 for Target: 4</a:t>
+            </a:r>
+          </a:p>
+          <a:p>
+            <a:r>
+              <a:rPr lang="en-US" sz="800" dirty="0">
+                <a:solidFill>
+                  <a:srgbClr val="7030A0"/>
+                </a:solidFill>
+              </a:rPr>
+              <a:t>Mission Start Time (</a:t>
+            </a:r>
+            <a:r>
+              <a:rPr lang="en-US" sz="800" dirty="0" err="1">
+                <a:solidFill>
+                  <a:srgbClr val="7030A0"/>
+                </a:solidFill>
+              </a:rPr>
+              <a:t>hrs</a:t>
+            </a:r>
+            <a:r>
+              <a:rPr lang="en-US" sz="800" dirty="0">
+                <a:solidFill>
+                  <a:srgbClr val="7030A0"/>
+                </a:solidFill>
+              </a:rPr>
+              <a:t>): 14</a:t>
+            </a:r>
+          </a:p>
+          <a:p>
+            <a:r>
+              <a:rPr lang="en-US" sz="800" dirty="0">
+                <a:solidFill>
+                  <a:srgbClr val="7030A0"/>
+                </a:solidFill>
+              </a:rPr>
+              <a:t>Carrier Chosen: 2</a:t>
+            </a:r>
+          </a:p>
+          <a:p>
+            <a:r>
+              <a:rPr lang="en-US" sz="800" dirty="0">
+                <a:solidFill>
+                  <a:srgbClr val="7030A0"/>
+                </a:solidFill>
+              </a:rPr>
+              <a:t>Jets Chosen: 12, 13</a:t>
+            </a:r>
+          </a:p>
+          <a:p>
+            <a:r>
+              <a:rPr lang="en-US" sz="800" dirty="0" err="1">
+                <a:solidFill>
+                  <a:srgbClr val="7030A0"/>
+                </a:solidFill>
+              </a:rPr>
+              <a:t>Helo</a:t>
+            </a:r>
+            <a:r>
+              <a:rPr lang="en-US" sz="800" dirty="0">
+                <a:solidFill>
+                  <a:srgbClr val="7030A0"/>
+                </a:solidFill>
+              </a:rPr>
+              <a:t> Chosen: 3</a:t>
+            </a:r>
+          </a:p>
+          <a:p>
+            <a:r>
+              <a:rPr lang="en-US" sz="800" dirty="0">
+                <a:solidFill>
+                  <a:srgbClr val="7030A0"/>
+                </a:solidFill>
+              </a:rPr>
+              <a:t>Pilots Chosen: 15, 16</a:t>
+            </a:r>
+          </a:p>
+          <a:p>
+            <a:r>
+              <a:rPr lang="en-US" sz="800" dirty="0">
+                <a:solidFill>
+                  <a:srgbClr val="7030A0"/>
+                </a:solidFill>
+              </a:rPr>
+              <a:t>Number of Missiles Chosen: 1</a:t>
+            </a:r>
+          </a:p>
+          <a:p>
+            <a:r>
+              <a:rPr lang="en-US" sz="800" dirty="0">
+                <a:solidFill>
+                  <a:srgbClr val="7030A0"/>
+                </a:solidFill>
+              </a:rPr>
+              <a:t>Missiles Chosen: 9</a:t>
+            </a:r>
+          </a:p>
+          <a:p>
+            <a:r>
+              <a:rPr lang="en-US" sz="800" dirty="0">
+                <a:solidFill>
+                  <a:srgbClr val="7030A0"/>
+                </a:solidFill>
+              </a:rPr>
+              <a:t>Number of Missiles Needed: 1</a:t>
+            </a:r>
+          </a:p>
+          <a:p>
+            <a:r>
+              <a:rPr lang="en-US" sz="800" dirty="0">
+                <a:solidFill>
+                  <a:srgbClr val="7030A0"/>
+                </a:solidFill>
+              </a:rPr>
+              <a:t>Number of Missiles Remaining: 9</a:t>
+            </a:r>
+          </a:p>
+        </p:txBody>
+      </p:sp>
+      <p:sp>
+        <p:nvSpPr>
+          <p:cNvPr id="17" name="Rectangle 16"/>
+          <p:cNvSpPr/>
+          <p:nvPr/>
+        </p:nvSpPr>
+        <p:spPr>
+          <a:xfrm>
+            <a:off x="5024847" y="2204273"/>
+            <a:ext cx="3262824" cy="584775"/>
+          </a:xfrm>
+          <a:prstGeom prst="rect">
+            <a:avLst/>
+          </a:prstGeom>
+          <a:solidFill>
+            <a:schemeClr val="bg1"/>
+          </a:solidFill>
+          <a:ln w="38100">
+            <a:solidFill>
+              <a:srgbClr val="00B050"/>
+            </a:solidFill>
+          </a:ln>
+        </p:spPr>
+        <p:txBody>
+          <a:bodyPr wrap="square">
+            <a:spAutoFit/>
+          </a:bodyPr>
+          <a:lstStyle/>
+          <a:p>
+            <a:r>
+              <a:rPr lang="en-US" sz="1600" dirty="0">
+                <a:solidFill>
+                  <a:srgbClr val="7030A0"/>
+                </a:solidFill>
+              </a:rPr>
+              <a:t>Number of Casualties: 1</a:t>
+            </a:r>
+          </a:p>
+          <a:p>
+            <a:r>
+              <a:rPr lang="en-US" sz="1600" dirty="0">
+                <a:solidFill>
+                  <a:srgbClr val="7030A0"/>
+                </a:solidFill>
+              </a:rPr>
+              <a:t>Number of Targets Accounted For: 6</a:t>
+            </a:r>
+          </a:p>
+        </p:txBody>
+      </p:sp>
+    </p:spTree>
+    <p:extLst>
+      <p:ext uri="{BB962C8B-B14F-4D97-AF65-F5344CB8AC3E}">
+        <p14:creationId xmlns:p14="http://schemas.microsoft.com/office/powerpoint/2010/main" val="2745458709"/>
+      </p:ext>
+    </p:extLst>
+  </p:cSld>
+  <p:clrMapOvr>
+    <a:masterClrMapping/>
+  </p:clrMapOvr>
+</p:sld>
+</file>
+
+<file path=ppt/slides/slide15.xml><?xml version="1.0" encoding="utf-8"?>
+<p:sld xmlns:a="http://schemas.openxmlformats.org/drawingml/2006/main" xmlns:r="http://schemas.openxmlformats.org/officeDocument/2006/relationships" xmlns:p="http://schemas.openxmlformats.org/presentationml/2006/main">
+  <p:cSld>
+    <p:spTree>
+      <p:nvGrpSpPr>
+        <p:cNvPr id="1" name=""/>
+        <p:cNvGrpSpPr/>
+        <p:nvPr/>
+      </p:nvGrpSpPr>
+      <p:grpSpPr>
+        <a:xfrm>
+          <a:off x="0" y="0"/>
+          <a:ext cx="0" cy="0"/>
+          <a:chOff x="0" y="0"/>
+          <a:chExt cx="0" cy="0"/>
+        </a:xfrm>
+      </p:grpSpPr>
+      <p:sp>
+        <p:nvSpPr>
+          <p:cNvPr id="2" name="Title 1"/>
+          <p:cNvSpPr>
+            <a:spLocks noGrp="1"/>
+          </p:cNvSpPr>
+          <p:nvPr>
+            <p:ph type="title"/>
+          </p:nvPr>
+        </p:nvSpPr>
+        <p:spPr/>
+        <p:txBody>
+          <a:bodyPr/>
+          <a:lstStyle/>
+          <a:p>
+            <a:r>
+              <a:rPr lang="en-US" dirty="0"/>
+              <a:t>EJJ Web Page </a:t>
+            </a:r>
+            <a:r>
+              <a:rPr lang="en-US" dirty="0" smtClean="0"/>
+              <a:t>– User Can Interact With/Update the Output Schedule</a:t>
+            </a:r>
+            <a:endParaRPr lang="en-US" dirty="0"/>
+          </a:p>
+        </p:txBody>
+      </p:sp>
+      <p:sp>
+        <p:nvSpPr>
+          <p:cNvPr id="4" name="Footer Placeholder 3"/>
+          <p:cNvSpPr>
+            <a:spLocks noGrp="1"/>
+          </p:cNvSpPr>
+          <p:nvPr>
+            <p:ph type="ftr" sz="quarter" idx="11"/>
+          </p:nvPr>
+        </p:nvSpPr>
+        <p:spPr/>
+        <p:txBody>
+          <a:bodyPr/>
+          <a:lstStyle/>
+          <a:p>
+            <a:r>
+              <a:rPr lang="en-US">
+                <a:latin typeface="Courier New" panose="02070309020205020404" pitchFamily="49" charset="0"/>
+                <a:cs typeface="Courier New" panose="02070309020205020404" pitchFamily="49" charset="0"/>
+              </a:rPr>
+              <a:t>Team EJJ</a:t>
+            </a:r>
+            <a:endParaRPr lang="en-US" dirty="0">
+              <a:latin typeface="Courier New" panose="02070309020205020404" pitchFamily="49" charset="0"/>
+              <a:cs typeface="Courier New" panose="02070309020205020404" pitchFamily="49" charset="0"/>
+            </a:endParaRPr>
+          </a:p>
+        </p:txBody>
+      </p:sp>
       <p:sp>
         <p:nvSpPr>
           <p:cNvPr id="7" name="TextBox 6">
             <a:extLst>
               <a:ext uri="{FF2B5EF4-FFF2-40B4-BE49-F238E27FC236}">
-                <a16:creationId xmlns:a16="http://schemas.microsoft.com/office/drawing/2014/main" xmlns="" id="{227070AC-AE43-48DC-BDCB-577F4AABD8B1}"/>
+                <a16:creationId xmlns="" xmlns:a16="http://schemas.microsoft.com/office/drawing/2014/main" id="{227070AC-AE43-48DC-BDCB-577F4AABD8B1}"/>
               </a:ext>
             </a:extLst>
           </p:cNvPr>
@@ -4593,7 +5809,7 @@
           <p:cNvPr id="6" name="Rectangle 5">
             <a:extLst>
               <a:ext uri="{FF2B5EF4-FFF2-40B4-BE49-F238E27FC236}">
-                <a16:creationId xmlns:a16="http://schemas.microsoft.com/office/drawing/2014/main" xmlns="" id="{A8FC2D7F-4AD5-4B53-A18A-1E6F60559076}"/>
+                <a16:creationId xmlns="" xmlns:a16="http://schemas.microsoft.com/office/drawing/2014/main" id="{A8FC2D7F-4AD5-4B53-A18A-1E6F60559076}"/>
               </a:ext>
             </a:extLst>
           </p:cNvPr>
@@ -4645,7 +5861,7 @@
           <p:cNvPr id="10" name="Rectangle 9">
             <a:extLst>
               <a:ext uri="{FF2B5EF4-FFF2-40B4-BE49-F238E27FC236}">
-                <a16:creationId xmlns:a16="http://schemas.microsoft.com/office/drawing/2014/main" xmlns="" id="{DF8BD097-76C6-4176-A414-B0E0751655CC}"/>
+                <a16:creationId xmlns="" xmlns:a16="http://schemas.microsoft.com/office/drawing/2014/main" id="{DF8BD097-76C6-4176-A414-B0E0751655CC}"/>
               </a:ext>
             </a:extLst>
           </p:cNvPr>
@@ -4705,159 +5921,6 @@
 </p:sld>
 </file>
 
-<file path=ppt/slides/slide15.xml><?xml version="1.0" encoding="utf-8"?>
-<p:sld xmlns:a="http://schemas.openxmlformats.org/drawingml/2006/main" xmlns:r="http://schemas.openxmlformats.org/officeDocument/2006/relationships" xmlns:p="http://schemas.openxmlformats.org/presentationml/2006/main">
-  <p:cSld>
-    <p:spTree>
-      <p:nvGrpSpPr>
-        <p:cNvPr id="1" name=""/>
-        <p:cNvGrpSpPr/>
-        <p:nvPr/>
-      </p:nvGrpSpPr>
-      <p:grpSpPr>
-        <a:xfrm>
-          <a:off x="0" y="0"/>
-          <a:ext cx="0" cy="0"/>
-          <a:chOff x="0" y="0"/>
-          <a:chExt cx="0" cy="0"/>
-        </a:xfrm>
-      </p:grpSpPr>
-      <p:sp>
-        <p:nvSpPr>
-          <p:cNvPr id="2" name="Title 1"/>
-          <p:cNvSpPr>
-            <a:spLocks noGrp="1"/>
-          </p:cNvSpPr>
-          <p:nvPr>
-            <p:ph type="title"/>
-          </p:nvPr>
-        </p:nvSpPr>
-        <p:spPr>
-          <a:xfrm>
-            <a:off x="838199" y="365125"/>
-            <a:ext cx="10995561" cy="1325563"/>
-          </a:xfrm>
-        </p:spPr>
-        <p:txBody>
-          <a:bodyPr/>
-          <a:lstStyle/>
-          <a:p>
-            <a:r>
-              <a:rPr lang="en-US" dirty="0"/>
-              <a:t>EJJ Web Page (4) – Other Target Info &amp; Options</a:t>
-            </a:r>
-          </a:p>
-        </p:txBody>
-      </p:sp>
-      <p:sp>
-        <p:nvSpPr>
-          <p:cNvPr id="4" name="Footer Placeholder 3"/>
-          <p:cNvSpPr>
-            <a:spLocks noGrp="1"/>
-          </p:cNvSpPr>
-          <p:nvPr>
-            <p:ph type="ftr" sz="quarter" idx="11"/>
-          </p:nvPr>
-        </p:nvSpPr>
-        <p:spPr/>
-        <p:txBody>
-          <a:bodyPr/>
-          <a:lstStyle/>
-          <a:p>
-            <a:r>
-              <a:rPr lang="en-US">
-                <a:latin typeface="Courier New" panose="02070309020205020404" pitchFamily="49" charset="0"/>
-                <a:cs typeface="Courier New" panose="02070309020205020404" pitchFamily="49" charset="0"/>
-              </a:rPr>
-              <a:t>Team EJJ</a:t>
-            </a:r>
-            <a:endParaRPr lang="en-US" dirty="0">
-              <a:latin typeface="Courier New" panose="02070309020205020404" pitchFamily="49" charset="0"/>
-              <a:cs typeface="Courier New" panose="02070309020205020404" pitchFamily="49" charset="0"/>
-            </a:endParaRPr>
-          </a:p>
-        </p:txBody>
-      </p:sp>
-      <p:sp>
-        <p:nvSpPr>
-          <p:cNvPr id="7" name="TextBox 6">
-            <a:extLst>
-              <a:ext uri="{FF2B5EF4-FFF2-40B4-BE49-F238E27FC236}">
-                <a16:creationId xmlns:a16="http://schemas.microsoft.com/office/drawing/2014/main" xmlns="" id="{57CAA007-58FD-4C65-A417-13DA1B87CF7E}"/>
-              </a:ext>
-            </a:extLst>
-          </p:cNvPr>
-          <p:cNvSpPr txBox="1"/>
-          <p:nvPr/>
-        </p:nvSpPr>
-        <p:spPr>
-          <a:xfrm>
-            <a:off x="7992473" y="1601901"/>
-            <a:ext cx="3271271" cy="1200329"/>
-          </a:xfrm>
-          <a:prstGeom prst="rect">
-            <a:avLst/>
-          </a:prstGeom>
-          <a:noFill/>
-        </p:spPr>
-        <p:txBody>
-          <a:bodyPr wrap="square" rtlCol="0">
-            <a:spAutoFit/>
-          </a:bodyPr>
-          <a:lstStyle/>
-          <a:p>
-            <a:r>
-              <a:rPr lang="en-US" dirty="0">
-                <a:solidFill>
-                  <a:srgbClr val="7030A0"/>
-                </a:solidFill>
-              </a:rPr>
-              <a:t>Quickly see important target info:</a:t>
-            </a:r>
-          </a:p>
-          <a:p>
-            <a:pPr marL="285750" indent="-285750">
-              <a:buFontTx/>
-              <a:buChar char="-"/>
-            </a:pPr>
-            <a:r>
-              <a:rPr lang="en-US" dirty="0">
-                <a:solidFill>
-                  <a:srgbClr val="7030A0"/>
-                </a:solidFill>
-              </a:rPr>
-              <a:t>Latitude, Longitude, Elevation</a:t>
-            </a:r>
-          </a:p>
-          <a:p>
-            <a:pPr marL="285750" indent="-285750">
-              <a:buFontTx/>
-              <a:buChar char="-"/>
-            </a:pPr>
-            <a:r>
-              <a:rPr lang="en-US" dirty="0">
-                <a:solidFill>
-                  <a:srgbClr val="7030A0"/>
-                </a:solidFill>
-              </a:rPr>
-              <a:t>Image of </a:t>
-            </a:r>
-          </a:p>
-        </p:txBody>
-      </p:sp>
-    </p:spTree>
-    <p:extLst>
-      <p:ext uri="{BB962C8B-B14F-4D97-AF65-F5344CB8AC3E}">
-        <p14:creationId xmlns:p14="http://schemas.microsoft.com/office/powerpoint/2010/main" val="3704891831"/>
-      </p:ext>
-    </p:extLst>
-  </p:cSld>
-  <p:clrMapOvr>
-    <a:masterClrMapping/>
-  </p:clrMapOvr>
-</p:sld>
-</file>
-
 <file path=ppt/slides/slide16.xml><?xml version="1.0" encoding="utf-8"?>
 <p:sld xmlns:a="http://schemas.openxmlformats.org/drawingml/2006/main" xmlns:r="http://schemas.openxmlformats.org/officeDocument/2006/relationships" xmlns:p="http://schemas.openxmlformats.org/presentationml/2006/main">
   <p:cSld>
@@ -4877,10 +5940,171 @@
       </p:grpSpPr>
       <p:sp>
         <p:nvSpPr>
+          <p:cNvPr id="2" name="Title 1"/>
+          <p:cNvSpPr>
+            <a:spLocks noGrp="1"/>
+          </p:cNvSpPr>
+          <p:nvPr>
+            <p:ph type="title"/>
+          </p:nvPr>
+        </p:nvSpPr>
+        <p:spPr>
+          <a:xfrm>
+            <a:off x="838199" y="365125"/>
+            <a:ext cx="10995561" cy="1325563"/>
+          </a:xfrm>
+        </p:spPr>
+        <p:txBody>
+          <a:bodyPr/>
+          <a:lstStyle/>
+          <a:p>
+            <a:r>
+              <a:rPr lang="en-US" dirty="0"/>
+              <a:t>EJJ Web </a:t>
+            </a:r>
+            <a:r>
+              <a:rPr lang="en-US" dirty="0" smtClean="0"/>
+              <a:t>Page </a:t>
+            </a:r>
+            <a:r>
+              <a:rPr lang="en-US" dirty="0"/>
+              <a:t>– Other Target Info &amp; Options</a:t>
+            </a:r>
+          </a:p>
+        </p:txBody>
+      </p:sp>
+      <p:sp>
+        <p:nvSpPr>
+          <p:cNvPr id="4" name="Footer Placeholder 3"/>
+          <p:cNvSpPr>
+            <a:spLocks noGrp="1"/>
+          </p:cNvSpPr>
+          <p:nvPr>
+            <p:ph type="ftr" sz="quarter" idx="11"/>
+          </p:nvPr>
+        </p:nvSpPr>
+        <p:spPr/>
+        <p:txBody>
+          <a:bodyPr/>
+          <a:lstStyle/>
+          <a:p>
+            <a:r>
+              <a:rPr lang="en-US">
+                <a:latin typeface="Courier New" panose="02070309020205020404" pitchFamily="49" charset="0"/>
+                <a:cs typeface="Courier New" panose="02070309020205020404" pitchFamily="49" charset="0"/>
+              </a:rPr>
+              <a:t>Team EJJ</a:t>
+            </a:r>
+            <a:endParaRPr lang="en-US" dirty="0">
+              <a:latin typeface="Courier New" panose="02070309020205020404" pitchFamily="49" charset="0"/>
+              <a:cs typeface="Courier New" panose="02070309020205020404" pitchFamily="49" charset="0"/>
+            </a:endParaRPr>
+          </a:p>
+        </p:txBody>
+      </p:sp>
+      <p:sp>
+        <p:nvSpPr>
+          <p:cNvPr id="7" name="TextBox 6">
+            <a:extLst>
+              <a:ext uri="{FF2B5EF4-FFF2-40B4-BE49-F238E27FC236}">
+                <a16:creationId xmlns="" xmlns:a16="http://schemas.microsoft.com/office/drawing/2014/main" id="{57CAA007-58FD-4C65-A417-13DA1B87CF7E}"/>
+              </a:ext>
+            </a:extLst>
+          </p:cNvPr>
+          <p:cNvSpPr txBox="1"/>
+          <p:nvPr/>
+        </p:nvSpPr>
+        <p:spPr>
+          <a:xfrm>
+            <a:off x="7992473" y="1601901"/>
+            <a:ext cx="3271271" cy="1200329"/>
+          </a:xfrm>
+          <a:prstGeom prst="rect">
+            <a:avLst/>
+          </a:prstGeom>
+          <a:noFill/>
+        </p:spPr>
+        <p:txBody>
+          <a:bodyPr wrap="square" rtlCol="0">
+            <a:spAutoFit/>
+          </a:bodyPr>
+          <a:lstStyle/>
+          <a:p>
+            <a:r>
+              <a:rPr lang="en-US" dirty="0">
+                <a:solidFill>
+                  <a:srgbClr val="7030A0"/>
+                </a:solidFill>
+              </a:rPr>
+              <a:t>Quickly see important target info:</a:t>
+            </a:r>
+          </a:p>
+          <a:p>
+            <a:pPr marL="285750" indent="-285750">
+              <a:buFontTx/>
+              <a:buChar char="-"/>
+            </a:pPr>
+            <a:r>
+              <a:rPr lang="en-US" dirty="0">
+                <a:solidFill>
+                  <a:srgbClr val="7030A0"/>
+                </a:solidFill>
+              </a:rPr>
+              <a:t>Latitude, Longitude, Elevation</a:t>
+            </a:r>
+          </a:p>
+          <a:p>
+            <a:pPr marL="285750" indent="-285750">
+              <a:buFontTx/>
+              <a:buChar char="-"/>
+            </a:pPr>
+            <a:r>
+              <a:rPr lang="en-US" dirty="0">
+                <a:solidFill>
+                  <a:srgbClr val="7030A0"/>
+                </a:solidFill>
+              </a:rPr>
+              <a:t>Image of </a:t>
+            </a:r>
+          </a:p>
+        </p:txBody>
+      </p:sp>
+    </p:spTree>
+    <p:extLst>
+      <p:ext uri="{BB962C8B-B14F-4D97-AF65-F5344CB8AC3E}">
+        <p14:creationId xmlns:p14="http://schemas.microsoft.com/office/powerpoint/2010/main" val="3704891831"/>
+      </p:ext>
+    </p:extLst>
+  </p:cSld>
+  <p:clrMapOvr>
+    <a:masterClrMapping/>
+  </p:clrMapOvr>
+</p:sld>
+</file>
+
+<file path=ppt/slides/slide17.xml><?xml version="1.0" encoding="utf-8"?>
+<p:sld xmlns:a="http://schemas.openxmlformats.org/drawingml/2006/main" xmlns:r="http://schemas.openxmlformats.org/officeDocument/2006/relationships" xmlns:p="http://schemas.openxmlformats.org/presentationml/2006/main">
+  <p:cSld>
+    <p:spTree>
+      <p:nvGrpSpPr>
+        <p:cNvPr id="1" name=""/>
+        <p:cNvGrpSpPr/>
+        <p:nvPr/>
+      </p:nvGrpSpPr>
+      <p:grpSpPr>
+        <a:xfrm>
+          <a:off x="0" y="0"/>
+          <a:ext cx="0" cy="0"/>
+          <a:chOff x="0" y="0"/>
+          <a:chExt cx="0" cy="0"/>
+        </a:xfrm>
+      </p:grpSpPr>
+      <p:sp>
+        <p:nvSpPr>
           <p:cNvPr id="2" name="Title 1">
             <a:extLst>
               <a:ext uri="{FF2B5EF4-FFF2-40B4-BE49-F238E27FC236}">
-                <a16:creationId xmlns:a16="http://schemas.microsoft.com/office/drawing/2014/main" xmlns="" id="{F957234A-F1A3-453E-8A2C-61F082D663C1}"/>
+                <a16:creationId xmlns="" xmlns:a16="http://schemas.microsoft.com/office/drawing/2014/main" id="{F957234A-F1A3-453E-8A2C-61F082D663C1}"/>
               </a:ext>
             </a:extLst>
           </p:cNvPr>
@@ -4926,7 +6150,7 @@
           <p:cNvPr id="4" name="Footer Placeholder 3">
             <a:extLst>
               <a:ext uri="{FF2B5EF4-FFF2-40B4-BE49-F238E27FC236}">
-                <a16:creationId xmlns:a16="http://schemas.microsoft.com/office/drawing/2014/main" xmlns="" id="{169FFFA7-9B2C-49FC-AC49-66B5B7B7C039}"/>
+                <a16:creationId xmlns="" xmlns:a16="http://schemas.microsoft.com/office/drawing/2014/main" id="{169FFFA7-9B2C-49FC-AC49-66B5B7B7C039}"/>
               </a:ext>
             </a:extLst>
           </p:cNvPr>
@@ -4961,7 +6185,7 @@
           <p:cNvPr id="8" name="Content Placeholder 7">
             <a:extLst>
               <a:ext uri="{FF2B5EF4-FFF2-40B4-BE49-F238E27FC236}">
-                <a16:creationId xmlns:a16="http://schemas.microsoft.com/office/drawing/2014/main" xmlns="" id="{2E7707F0-D0DA-4C8D-B2BA-9A55BACB9F14}"/>
+                <a16:creationId xmlns="" xmlns:a16="http://schemas.microsoft.com/office/drawing/2014/main" id="{2E7707F0-D0DA-4C8D-B2BA-9A55BACB9F14}"/>
               </a:ext>
             </a:extLst>
           </p:cNvPr>
@@ -5006,7 +6230,7 @@
           <p:cNvPr id="12" name="Picture 11">
             <a:extLst>
               <a:ext uri="{FF2B5EF4-FFF2-40B4-BE49-F238E27FC236}">
-                <a16:creationId xmlns:a16="http://schemas.microsoft.com/office/drawing/2014/main" xmlns="" id="{0F2C8AFF-C8FC-4837-8C61-15D24392CD73}"/>
+                <a16:creationId xmlns="" xmlns:a16="http://schemas.microsoft.com/office/drawing/2014/main" id="{0F2C8AFF-C8FC-4837-8C61-15D24392CD73}"/>
               </a:ext>
             </a:extLst>
           </p:cNvPr>
@@ -5044,148 +6268,6 @@
 </p:sld>
 </file>
 
-<file path=ppt/slides/slide17.xml><?xml version="1.0" encoding="utf-8"?>
-<p:sld xmlns:a="http://schemas.openxmlformats.org/drawingml/2006/main" xmlns:r="http://schemas.openxmlformats.org/officeDocument/2006/relationships" xmlns:p="http://schemas.openxmlformats.org/presentationml/2006/main">
-  <p:cSld>
-    <p:spTree>
-      <p:nvGrpSpPr>
-        <p:cNvPr id="1" name=""/>
-        <p:cNvGrpSpPr/>
-        <p:nvPr/>
-      </p:nvGrpSpPr>
-      <p:grpSpPr>
-        <a:xfrm>
-          <a:off x="0" y="0"/>
-          <a:ext cx="0" cy="0"/>
-          <a:chOff x="0" y="0"/>
-          <a:chExt cx="0" cy="0"/>
-        </a:xfrm>
-      </p:grpSpPr>
-      <p:sp>
-        <p:nvSpPr>
-          <p:cNvPr id="2" name="Title 1">
-            <a:extLst>
-              <a:ext uri="{FF2B5EF4-FFF2-40B4-BE49-F238E27FC236}">
-                <a16:creationId xmlns:a16="http://schemas.microsoft.com/office/drawing/2014/main" xmlns="" id="{F957234A-F1A3-453E-8A2C-61F082D663C1}"/>
-              </a:ext>
-            </a:extLst>
-          </p:cNvPr>
-          <p:cNvSpPr>
-            <a:spLocks noGrp="1"/>
-          </p:cNvSpPr>
-          <p:nvPr>
-            <p:ph type="title"/>
-          </p:nvPr>
-        </p:nvSpPr>
-        <p:spPr>
-          <a:xfrm>
-            <a:off x="838200" y="365126"/>
-            <a:ext cx="10515600" cy="1095540"/>
-          </a:xfrm>
-        </p:spPr>
-        <p:txBody>
-          <a:bodyPr/>
-          <a:lstStyle/>
-          <a:p>
-            <a:r>
-              <a:rPr lang="en-US" dirty="0"/>
-              <a:t>Collaboration during Mission </a:t>
-            </a:r>
-            <a:r>
-              <a:rPr lang="en-US" dirty="0" smtClean="0"/>
-              <a:t>Planning (2)</a:t>
-            </a:r>
-            <a:endParaRPr lang="en-US" dirty="0"/>
-          </a:p>
-        </p:txBody>
-      </p:sp>
-      <p:sp>
-        <p:nvSpPr>
-          <p:cNvPr id="4" name="Footer Placeholder 3">
-            <a:extLst>
-              <a:ext uri="{FF2B5EF4-FFF2-40B4-BE49-F238E27FC236}">
-                <a16:creationId xmlns:a16="http://schemas.microsoft.com/office/drawing/2014/main" xmlns="" id="{169FFFA7-9B2C-49FC-AC49-66B5B7B7C039}"/>
-              </a:ext>
-            </a:extLst>
-          </p:cNvPr>
-          <p:cNvSpPr>
-            <a:spLocks noGrp="1"/>
-          </p:cNvSpPr>
-          <p:nvPr>
-            <p:ph type="ftr" sz="quarter" idx="11"/>
-          </p:nvPr>
-        </p:nvSpPr>
-        <p:spPr/>
-        <p:txBody>
-          <a:bodyPr/>
-          <a:lstStyle/>
-          <a:p>
-            <a:r>
-              <a:rPr lang="en-US">
-                <a:latin typeface="Courier New" panose="02070309020205020404" pitchFamily="49" charset="0"/>
-                <a:cs typeface="Courier New" panose="02070309020205020404" pitchFamily="49" charset="0"/>
-              </a:rPr>
-              <a:t>Team EJJ</a:t>
-            </a:r>
-            <a:endParaRPr lang="en-US" dirty="0">
-              <a:latin typeface="Courier New" panose="02070309020205020404" pitchFamily="49" charset="0"/>
-              <a:cs typeface="Courier New" panose="02070309020205020404" pitchFamily="49" charset="0"/>
-            </a:endParaRPr>
-          </a:p>
-        </p:txBody>
-      </p:sp>
-      <p:sp>
-        <p:nvSpPr>
-          <p:cNvPr id="8" name="Content Placeholder 7">
-            <a:extLst>
-              <a:ext uri="{FF2B5EF4-FFF2-40B4-BE49-F238E27FC236}">
-                <a16:creationId xmlns:a16="http://schemas.microsoft.com/office/drawing/2014/main" xmlns="" id="{2E7707F0-D0DA-4C8D-B2BA-9A55BACB9F14}"/>
-              </a:ext>
-            </a:extLst>
-          </p:cNvPr>
-          <p:cNvSpPr>
-            <a:spLocks noGrp="1"/>
-          </p:cNvSpPr>
-          <p:nvPr>
-            <p:ph idx="1"/>
-          </p:nvPr>
-        </p:nvSpPr>
-        <p:spPr>
-          <a:xfrm>
-            <a:off x="836221" y="1395351"/>
-            <a:ext cx="10515600" cy="4781612"/>
-          </a:xfrm>
-        </p:spPr>
-        <p:txBody>
-          <a:bodyPr/>
-          <a:lstStyle/>
-          <a:p>
-            <a:r>
-              <a:rPr lang="en-US" dirty="0"/>
-              <a:t>Mission planners can collaboratively adjust, verify, and plan routes on targets</a:t>
-            </a:r>
-          </a:p>
-          <a:p>
-            <a:r>
-              <a:rPr lang="en-US" dirty="0"/>
-              <a:t>See progress of targets in real time </a:t>
-            </a:r>
-          </a:p>
-        </p:txBody>
-      </p:sp>
-    </p:spTree>
-    <p:extLst>
-      <p:ext uri="{BB962C8B-B14F-4D97-AF65-F5344CB8AC3E}">
-        <p14:creationId xmlns:p14="http://schemas.microsoft.com/office/powerpoint/2010/main" val="3603947618"/>
-      </p:ext>
-    </p:extLst>
-  </p:cSld>
-  <p:clrMapOvr>
-    <a:masterClrMapping/>
-  </p:clrMapOvr>
-</p:sld>
-</file>
-
 <file path=ppt/slides/slide18.xml><?xml version="1.0" encoding="utf-8"?>
 <p:sld xmlns:a="http://schemas.openxmlformats.org/drawingml/2006/main" xmlns:r="http://schemas.openxmlformats.org/officeDocument/2006/relationships" xmlns:p="http://schemas.openxmlformats.org/presentationml/2006/main">
   <p:cSld>
@@ -5208,7 +6290,7 @@
           <p:cNvPr id="2" name="Title 1">
             <a:extLst>
               <a:ext uri="{FF2B5EF4-FFF2-40B4-BE49-F238E27FC236}">
-                <a16:creationId xmlns:a16="http://schemas.microsoft.com/office/drawing/2014/main" xmlns="" id="{E29B01D6-A7CA-4A3E-9C66-C2AA33322F12}"/>
+                <a16:creationId xmlns="" xmlns:a16="http://schemas.microsoft.com/office/drawing/2014/main" id="{F957234A-F1A3-453E-8A2C-61F082D663C1}"/>
               </a:ext>
             </a:extLst>
           </p:cNvPr>
@@ -5219,108 +6301,24 @@
             <p:ph type="title"/>
           </p:nvPr>
         </p:nvSpPr>
-        <p:spPr/>
+        <p:spPr>
+          <a:xfrm>
+            <a:off x="838200" y="365126"/>
+            <a:ext cx="10515600" cy="1095540"/>
+          </a:xfrm>
+        </p:spPr>
         <p:txBody>
           <a:bodyPr/>
           <a:lstStyle/>
           <a:p>
             <a:r>
               <a:rPr lang="en-US" dirty="0"/>
-              <a:t>Improvements to Mission Planning/Mission Execution Processes</a:t>
-            </a:r>
-          </a:p>
-        </p:txBody>
-      </p:sp>
-      <p:sp>
-        <p:nvSpPr>
-          <p:cNvPr id="3" name="Content Placeholder 2">
-            <a:extLst>
-              <a:ext uri="{FF2B5EF4-FFF2-40B4-BE49-F238E27FC236}">
-                <a16:creationId xmlns:a16="http://schemas.microsoft.com/office/drawing/2014/main" xmlns="" id="{F1842140-4ACB-41A9-BC7F-30570259E5D8}"/>
-              </a:ext>
-            </a:extLst>
-          </p:cNvPr>
-          <p:cNvSpPr>
-            <a:spLocks noGrp="1"/>
-          </p:cNvSpPr>
-          <p:nvPr>
-            <p:ph idx="1"/>
-          </p:nvPr>
-        </p:nvSpPr>
-        <p:spPr/>
-        <p:txBody>
-          <a:bodyPr>
-            <a:normAutofit lnSpcReduction="10000"/>
-          </a:bodyPr>
-          <a:lstStyle/>
-          <a:p>
-            <a:r>
-              <a:rPr lang="en-US" dirty="0"/>
-              <a:t>Reduced user clicks by dragging and dropping target tasking onto the web page</a:t>
-            </a:r>
-          </a:p>
-          <a:p>
-            <a:pPr lvl="1"/>
-            <a:r>
-              <a:rPr lang="en-US" dirty="0"/>
-              <a:t>1 click vs. 7+ clicks when importing ATO/ACO through Task View and porting over the targets/</a:t>
-            </a:r>
-            <a:r>
-              <a:rPr lang="en-US" dirty="0" err="1"/>
-              <a:t>GeoZones</a:t>
-            </a:r>
-            <a:r>
-              <a:rPr lang="en-US" dirty="0"/>
-              <a:t> into JMPS</a:t>
-            </a:r>
-          </a:p>
-          <a:p>
-            <a:r>
-              <a:rPr lang="en-US" dirty="0"/>
-              <a:t>Automated task scheduling based on survivability</a:t>
-            </a:r>
-          </a:p>
-          <a:p>
-            <a:r>
-              <a:rPr lang="en-US" dirty="0"/>
-              <a:t>Automated sortie scheduling given constraints/restraints</a:t>
-            </a:r>
-          </a:p>
-          <a:p>
-            <a:r>
-              <a:rPr lang="en-US" dirty="0"/>
-              <a:t>Dynamic sortie </a:t>
-            </a:r>
-            <a:r>
-              <a:rPr lang="en-US" dirty="0" err="1"/>
-              <a:t>replan</a:t>
-            </a:r>
-            <a:r>
-              <a:rPr lang="en-US" dirty="0"/>
-              <a:t> capability during Mission Execution</a:t>
-            </a:r>
-          </a:p>
-          <a:p>
-            <a:r>
-              <a:rPr lang="en-US" dirty="0"/>
-              <a:t>User-friendly drag and drop capability to create a friendly force laydown</a:t>
-            </a:r>
-          </a:p>
-          <a:p>
-            <a:pPr lvl="1"/>
-            <a:r>
-              <a:rPr lang="en-US" dirty="0"/>
-              <a:t>Once created, this can be saved and reloaded</a:t>
-            </a:r>
-          </a:p>
-          <a:p>
-            <a:pPr marL="914400" lvl="2" indent="0">
-              <a:buNone/>
-            </a:pPr>
-            <a:endParaRPr lang="en-US" dirty="0"/>
-          </a:p>
-          <a:p>
-            <a:pPr lvl="1"/>
+              <a:t>Collaboration during Mission </a:t>
+            </a:r>
+            <a:r>
+              <a:rPr lang="en-US" dirty="0" smtClean="0"/>
+              <a:t>Planning (2)</a:t>
+            </a:r>
             <a:endParaRPr lang="en-US" dirty="0"/>
           </a:p>
         </p:txBody>
@@ -5330,7 +6328,7 @@
           <p:cNvPr id="4" name="Footer Placeholder 3">
             <a:extLst>
               <a:ext uri="{FF2B5EF4-FFF2-40B4-BE49-F238E27FC236}">
-                <a16:creationId xmlns:a16="http://schemas.microsoft.com/office/drawing/2014/main" xmlns="" id="{C401FFE3-F414-4CF5-AD6A-9C2DE5116ED4}"/>
+                <a16:creationId xmlns="" xmlns:a16="http://schemas.microsoft.com/office/drawing/2014/main" id="{169FFFA7-9B2C-49FC-AC49-66B5B7B7C039}"/>
               </a:ext>
             </a:extLst>
           </p:cNvPr>
@@ -5360,10 +6358,49 @@
           </a:p>
         </p:txBody>
       </p:sp>
+      <p:sp>
+        <p:nvSpPr>
+          <p:cNvPr id="8" name="Content Placeholder 7">
+            <a:extLst>
+              <a:ext uri="{FF2B5EF4-FFF2-40B4-BE49-F238E27FC236}">
+                <a16:creationId xmlns="" xmlns:a16="http://schemas.microsoft.com/office/drawing/2014/main" id="{2E7707F0-D0DA-4C8D-B2BA-9A55BACB9F14}"/>
+              </a:ext>
+            </a:extLst>
+          </p:cNvPr>
+          <p:cNvSpPr>
+            <a:spLocks noGrp="1"/>
+          </p:cNvSpPr>
+          <p:nvPr>
+            <p:ph idx="1"/>
+          </p:nvPr>
+        </p:nvSpPr>
+        <p:spPr>
+          <a:xfrm>
+            <a:off x="836221" y="1395351"/>
+            <a:ext cx="10515600" cy="4781612"/>
+          </a:xfrm>
+        </p:spPr>
+        <p:txBody>
+          <a:bodyPr/>
+          <a:lstStyle/>
+          <a:p>
+            <a:r>
+              <a:rPr lang="en-US" dirty="0"/>
+              <a:t>Mission planners can collaboratively adjust, verify, and plan routes on targets</a:t>
+            </a:r>
+          </a:p>
+          <a:p>
+            <a:r>
+              <a:rPr lang="en-US" dirty="0"/>
+              <a:t>See progress of targets in real time </a:t>
+            </a:r>
+          </a:p>
+        </p:txBody>
+      </p:sp>
     </p:spTree>
     <p:extLst>
       <p:ext uri="{BB962C8B-B14F-4D97-AF65-F5344CB8AC3E}">
-        <p14:creationId xmlns:p14="http://schemas.microsoft.com/office/powerpoint/2010/main" val="3129570609"/>
+        <p14:creationId xmlns:p14="http://schemas.microsoft.com/office/powerpoint/2010/main" val="3603947618"/>
       </p:ext>
     </p:extLst>
   </p:cSld>
@@ -5392,10 +6429,132 @@
       </p:grpSpPr>
       <p:sp>
         <p:nvSpPr>
+          <p:cNvPr id="2" name="Title 1">
+            <a:extLst>
+              <a:ext uri="{FF2B5EF4-FFF2-40B4-BE49-F238E27FC236}">
+                <a16:creationId xmlns="" xmlns:a16="http://schemas.microsoft.com/office/drawing/2014/main" id="{E29B01D6-A7CA-4A3E-9C66-C2AA33322F12}"/>
+              </a:ext>
+            </a:extLst>
+          </p:cNvPr>
+          <p:cNvSpPr>
+            <a:spLocks noGrp="1"/>
+          </p:cNvSpPr>
+          <p:nvPr>
+            <p:ph type="title"/>
+          </p:nvPr>
+        </p:nvSpPr>
+        <p:spPr/>
+        <p:txBody>
+          <a:bodyPr/>
+          <a:lstStyle/>
+          <a:p>
+            <a:r>
+              <a:rPr lang="en-US" dirty="0"/>
+              <a:t>Improvements to Mission Planning/Mission Execution Processes</a:t>
+            </a:r>
+          </a:p>
+        </p:txBody>
+      </p:sp>
+      <p:sp>
+        <p:nvSpPr>
+          <p:cNvPr id="3" name="Content Placeholder 2">
+            <a:extLst>
+              <a:ext uri="{FF2B5EF4-FFF2-40B4-BE49-F238E27FC236}">
+                <a16:creationId xmlns="" xmlns:a16="http://schemas.microsoft.com/office/drawing/2014/main" id="{F1842140-4ACB-41A9-BC7F-30570259E5D8}"/>
+              </a:ext>
+            </a:extLst>
+          </p:cNvPr>
+          <p:cNvSpPr>
+            <a:spLocks noGrp="1"/>
+          </p:cNvSpPr>
+          <p:nvPr>
+            <p:ph idx="1"/>
+          </p:nvPr>
+        </p:nvSpPr>
+        <p:spPr/>
+        <p:txBody>
+          <a:bodyPr>
+            <a:normAutofit lnSpcReduction="10000"/>
+          </a:bodyPr>
+          <a:lstStyle/>
+          <a:p>
+            <a:r>
+              <a:rPr lang="en-US" dirty="0"/>
+              <a:t>Reduced user clicks by dragging and dropping target tasking onto the web page</a:t>
+            </a:r>
+          </a:p>
+          <a:p>
+            <a:pPr lvl="1"/>
+            <a:r>
+              <a:rPr lang="en-US" dirty="0"/>
+              <a:t>1 click vs. 7+ clicks when importing ATO/ACO through Task View and porting over the targets/</a:t>
+            </a:r>
+            <a:r>
+              <a:rPr lang="en-US" dirty="0" err="1"/>
+              <a:t>GeoZones</a:t>
+            </a:r>
+            <a:r>
+              <a:rPr lang="en-US" dirty="0"/>
+              <a:t> into JMPS</a:t>
+            </a:r>
+          </a:p>
+          <a:p>
+            <a:r>
+              <a:rPr lang="en-US" dirty="0"/>
+              <a:t>Automated task scheduling based on survivability</a:t>
+            </a:r>
+          </a:p>
+          <a:p>
+            <a:r>
+              <a:rPr lang="en-US" dirty="0"/>
+              <a:t>Automated sortie scheduling given constraints/restraints</a:t>
+            </a:r>
+          </a:p>
+          <a:p>
+            <a:r>
+              <a:rPr lang="en-US" dirty="0"/>
+              <a:t>Dynamic sortie </a:t>
+            </a:r>
+            <a:r>
+              <a:rPr lang="en-US" dirty="0" err="1"/>
+              <a:t>replan</a:t>
+            </a:r>
+            <a:r>
+              <a:rPr lang="en-US" dirty="0"/>
+              <a:t> capability during Mission Execution</a:t>
+            </a:r>
+          </a:p>
+          <a:p>
+            <a:r>
+              <a:rPr lang="en-US" dirty="0"/>
+              <a:t>User-friendly drag and drop capability to create a friendly force laydown</a:t>
+            </a:r>
+          </a:p>
+          <a:p>
+            <a:pPr lvl="1"/>
+            <a:r>
+              <a:rPr lang="en-US" dirty="0"/>
+              <a:t>Once created, this can be saved and reloaded</a:t>
+            </a:r>
+          </a:p>
+          <a:p>
+            <a:pPr marL="914400" lvl="2" indent="0">
+              <a:buNone/>
+            </a:pPr>
+            <a:endParaRPr lang="en-US" dirty="0"/>
+          </a:p>
+          <a:p>
+            <a:pPr lvl="1"/>
+            <a:endParaRPr lang="en-US" dirty="0"/>
+          </a:p>
+        </p:txBody>
+      </p:sp>
+      <p:sp>
+        <p:nvSpPr>
           <p:cNvPr id="4" name="Footer Placeholder 3">
             <a:extLst>
               <a:ext uri="{FF2B5EF4-FFF2-40B4-BE49-F238E27FC236}">
-                <a16:creationId xmlns:a16="http://schemas.microsoft.com/office/drawing/2014/main" xmlns="" id="{7B57FAC7-9A78-418C-B807-48ECCF0BCB6C}"/>
+                <a16:creationId xmlns="" xmlns:a16="http://schemas.microsoft.com/office/drawing/2014/main" id="{C401FFE3-F414-4CF5-AD6A-9C2DE5116ED4}"/>
               </a:ext>
             </a:extLst>
           </p:cNvPr>
@@ -5412,66 +6571,23 @@
           <a:lstStyle/>
           <a:p>
             <a:r>
-              <a:rPr lang="en-US" dirty="0">
+              <a:rPr lang="en-US">
                 <a:latin typeface="Courier New" panose="02070309020205020404" pitchFamily="49" charset="0"/>
                 <a:cs typeface="Courier New" panose="02070309020205020404" pitchFamily="49" charset="0"/>
               </a:rPr>
               <a:t>Team EJJ</a:t>
             </a:r>
-          </a:p>
-        </p:txBody>
-      </p:sp>
-      <p:pic>
-        <p:nvPicPr>
-          <p:cNvPr id="2050" name="Picture 2" descr="Gypsy Curse">
-            <a:extLst>
-              <a:ext uri="{FF2B5EF4-FFF2-40B4-BE49-F238E27FC236}">
-                <a16:creationId xmlns:a16="http://schemas.microsoft.com/office/drawing/2014/main" xmlns="" id="{7173D12A-5393-4EF8-B04F-3F560643558C}"/>
-              </a:ext>
-            </a:extLst>
-          </p:cNvPr>
-          <p:cNvPicPr>
-            <a:picLocks noChangeAspect="1" noChangeArrowheads="1"/>
-          </p:cNvPicPr>
-          <p:nvPr/>
-        </p:nvPicPr>
-        <p:blipFill>
-          <a:blip r:embed="rId2">
-            <a:extLst>
-              <a:ext uri="{28A0092B-C50C-407E-A947-70E740481C1C}">
-                <a14:useLocalDpi xmlns:a14="http://schemas.microsoft.com/office/drawing/2010/main" val="0"/>
-              </a:ext>
-            </a:extLst>
-          </a:blip>
-          <a:srcRect/>
-          <a:stretch>
-            <a:fillRect/>
-          </a:stretch>
-        </p:blipFill>
-        <p:spPr bwMode="auto">
-          <a:xfrm>
-            <a:off x="2250930" y="2440380"/>
-            <a:ext cx="7901631" cy="1831645"/>
-          </a:xfrm>
-          <a:prstGeom prst="rect">
-            <a:avLst/>
-          </a:prstGeom>
-          <a:noFill/>
-          <a:extLst>
-            <a:ext uri="{909E8E84-426E-40DD-AFC4-6F175D3DCCD1}">
-              <a14:hiddenFill xmlns:a14="http://schemas.microsoft.com/office/drawing/2010/main">
-                <a:solidFill>
-                  <a:srgbClr val="FFFFFF"/>
-                </a:solidFill>
-              </a14:hiddenFill>
-            </a:ext>
-          </a:extLst>
-        </p:spPr>
-      </p:pic>
+            <a:endParaRPr lang="en-US" dirty="0">
+              <a:latin typeface="Courier New" panose="02070309020205020404" pitchFamily="49" charset="0"/>
+              <a:cs typeface="Courier New" panose="02070309020205020404" pitchFamily="49" charset="0"/>
+            </a:endParaRPr>
+          </a:p>
+        </p:txBody>
+      </p:sp>
     </p:spTree>
     <p:extLst>
       <p:ext uri="{BB962C8B-B14F-4D97-AF65-F5344CB8AC3E}">
-        <p14:creationId xmlns:p14="http://schemas.microsoft.com/office/powerpoint/2010/main" val="935959818"/>
+        <p14:creationId xmlns:p14="http://schemas.microsoft.com/office/powerpoint/2010/main" val="3129570609"/>
       </p:ext>
     </p:extLst>
   </p:cSld>
@@ -5503,7 +6619,7 @@
           <p:cNvPr id="2" name="Title 1">
             <a:extLst>
               <a:ext uri="{FF2B5EF4-FFF2-40B4-BE49-F238E27FC236}">
-                <a16:creationId xmlns:a16="http://schemas.microsoft.com/office/drawing/2014/main" xmlns="" id="{943DCFC8-26A0-4B2E-87F6-0E00BE3F7F5E}"/>
+                <a16:creationId xmlns="" xmlns:a16="http://schemas.microsoft.com/office/drawing/2014/main" id="{943DCFC8-26A0-4B2E-87F6-0E00BE3F7F5E}"/>
               </a:ext>
             </a:extLst>
           </p:cNvPr>
@@ -5539,7 +6655,7 @@
           <p:cNvPr id="4" name="Footer Placeholder 3">
             <a:extLst>
               <a:ext uri="{FF2B5EF4-FFF2-40B4-BE49-F238E27FC236}">
-                <a16:creationId xmlns:a16="http://schemas.microsoft.com/office/drawing/2014/main" xmlns="" id="{6280CF32-9815-4EEB-889D-75232A4BA741}"/>
+                <a16:creationId xmlns="" xmlns:a16="http://schemas.microsoft.com/office/drawing/2014/main" id="{6280CF32-9815-4EEB-889D-75232A4BA741}"/>
               </a:ext>
             </a:extLst>
           </p:cNvPr>
@@ -5570,7 +6686,7 @@
           <p:cNvPr id="6" name="Group 5">
             <a:extLst>
               <a:ext uri="{FF2B5EF4-FFF2-40B4-BE49-F238E27FC236}">
-                <a16:creationId xmlns:a16="http://schemas.microsoft.com/office/drawing/2014/main" xmlns="" id="{141E14CB-BF28-4A1A-8DAB-6FDD0BCD224C}"/>
+                <a16:creationId xmlns="" xmlns:a16="http://schemas.microsoft.com/office/drawing/2014/main" id="{141E14CB-BF28-4A1A-8DAB-6FDD0BCD224C}"/>
               </a:ext>
             </a:extLst>
           </p:cNvPr>
@@ -5590,7 +6706,7 @@
             <p:cNvPr id="3074" name="Picture 2" descr="A Double Date With Leatherface – Texas Monthly">
               <a:extLst>
                 <a:ext uri="{FF2B5EF4-FFF2-40B4-BE49-F238E27FC236}">
-                  <a16:creationId xmlns:a16="http://schemas.microsoft.com/office/drawing/2014/main" xmlns="" id="{22020642-5868-4C46-8AE5-DC542E41254C}"/>
+                  <a16:creationId xmlns="" xmlns:a16="http://schemas.microsoft.com/office/drawing/2014/main" id="{22020642-5868-4C46-8AE5-DC542E41254C}"/>
                 </a:ext>
               </a:extLst>
             </p:cNvPr>
@@ -5635,7 +6751,7 @@
             <p:cNvPr id="7" name="TextBox 6">
               <a:extLst>
                 <a:ext uri="{FF2B5EF4-FFF2-40B4-BE49-F238E27FC236}">
-                  <a16:creationId xmlns:a16="http://schemas.microsoft.com/office/drawing/2014/main" xmlns="" id="{0708C8B9-A3AB-450B-81C4-A103DD3FC083}"/>
+                  <a16:creationId xmlns="" xmlns:a16="http://schemas.microsoft.com/office/drawing/2014/main" id="{0708C8B9-A3AB-450B-81C4-A103DD3FC083}"/>
                 </a:ext>
               </a:extLst>
             </p:cNvPr>
@@ -5683,7 +6799,7 @@
           <p:cNvPr id="9" name="TextBox 8">
             <a:extLst>
               <a:ext uri="{FF2B5EF4-FFF2-40B4-BE49-F238E27FC236}">
-                <a16:creationId xmlns:a16="http://schemas.microsoft.com/office/drawing/2014/main" xmlns="" id="{7F019BA2-3C4B-4F8D-A2EA-AB79D8D7B61B}"/>
+                <a16:creationId xmlns="" xmlns:a16="http://schemas.microsoft.com/office/drawing/2014/main" id="{7F019BA2-3C4B-4F8D-A2EA-AB79D8D7B61B}"/>
               </a:ext>
             </a:extLst>
           </p:cNvPr>
@@ -5773,7 +6889,7 @@
           <p:cNvPr id="10" name="TextBox 9">
             <a:extLst>
               <a:ext uri="{FF2B5EF4-FFF2-40B4-BE49-F238E27FC236}">
-                <a16:creationId xmlns:a16="http://schemas.microsoft.com/office/drawing/2014/main" xmlns="" id="{8418428D-5EA6-4972-8C73-2F7AA4740CBC}"/>
+                <a16:creationId xmlns="" xmlns:a16="http://schemas.microsoft.com/office/drawing/2014/main" id="{8418428D-5EA6-4972-8C73-2F7AA4740CBC}"/>
               </a:ext>
             </a:extLst>
           </p:cNvPr>
@@ -5820,7 +6936,7 @@
           <p:cNvPr id="3080" name="Picture 8" descr="In his new book, &amp;#39;Cabinet of Curiosities,&amp;#39; director Guillermo del Toro  reveals the inspiration behind his monstrous creations - New York Daily News">
             <a:extLst>
               <a:ext uri="{FF2B5EF4-FFF2-40B4-BE49-F238E27FC236}">
-                <a16:creationId xmlns:a16="http://schemas.microsoft.com/office/drawing/2014/main" xmlns="" id="{0D4F2247-B974-4A2A-86D2-A0F7662B0C85}"/>
+                <a16:creationId xmlns="" xmlns:a16="http://schemas.microsoft.com/office/drawing/2014/main" id="{0D4F2247-B974-4A2A-86D2-A0F7662B0C85}"/>
               </a:ext>
             </a:extLst>
           </p:cNvPr>
@@ -5867,7 +6983,7 @@
           <p:cNvPr id="3082" name="Picture 10" descr="Michael Myers | Villains Wiki | Fandom">
             <a:extLst>
               <a:ext uri="{FF2B5EF4-FFF2-40B4-BE49-F238E27FC236}">
-                <a16:creationId xmlns:a16="http://schemas.microsoft.com/office/drawing/2014/main" xmlns="" id="{B503C72F-E6FB-4C72-B77E-F21080370CEE}"/>
+                <a16:creationId xmlns="" xmlns:a16="http://schemas.microsoft.com/office/drawing/2014/main" id="{B503C72F-E6FB-4C72-B77E-F21080370CEE}"/>
               </a:ext>
             </a:extLst>
           </p:cNvPr>
@@ -5914,7 +7030,7 @@
           <p:cNvPr id="14" name="Picture 13">
             <a:extLst>
               <a:ext uri="{FF2B5EF4-FFF2-40B4-BE49-F238E27FC236}">
-                <a16:creationId xmlns:a16="http://schemas.microsoft.com/office/drawing/2014/main" xmlns="" id="{AA5F475A-5677-4D61-ACA5-D6FF94854F8B}"/>
+                <a16:creationId xmlns="" xmlns:a16="http://schemas.microsoft.com/office/drawing/2014/main" id="{AA5F475A-5677-4D61-ACA5-D6FF94854F8B}"/>
               </a:ext>
             </a:extLst>
           </p:cNvPr>
@@ -5969,12 +7085,120 @@
           <a:chExt cx="0" cy="0"/>
         </a:xfrm>
       </p:grpSpPr>
+      <p:sp>
+        <p:nvSpPr>
+          <p:cNvPr id="4" name="Footer Placeholder 3">
+            <a:extLst>
+              <a:ext uri="{FF2B5EF4-FFF2-40B4-BE49-F238E27FC236}">
+                <a16:creationId xmlns="" xmlns:a16="http://schemas.microsoft.com/office/drawing/2014/main" id="{7B57FAC7-9A78-418C-B807-48ECCF0BCB6C}"/>
+              </a:ext>
+            </a:extLst>
+          </p:cNvPr>
+          <p:cNvSpPr>
+            <a:spLocks noGrp="1"/>
+          </p:cNvSpPr>
+          <p:nvPr>
+            <p:ph type="ftr" sz="quarter" idx="11"/>
+          </p:nvPr>
+        </p:nvSpPr>
+        <p:spPr/>
+        <p:txBody>
+          <a:bodyPr/>
+          <a:lstStyle/>
+          <a:p>
+            <a:r>
+              <a:rPr lang="en-US" dirty="0">
+                <a:latin typeface="Courier New" panose="02070309020205020404" pitchFamily="49" charset="0"/>
+                <a:cs typeface="Courier New" panose="02070309020205020404" pitchFamily="49" charset="0"/>
+              </a:rPr>
+              <a:t>Team EJJ</a:t>
+            </a:r>
+          </a:p>
+        </p:txBody>
+      </p:sp>
+      <p:pic>
+        <p:nvPicPr>
+          <p:cNvPr id="2050" name="Picture 2" descr="Gypsy Curse">
+            <a:extLst>
+              <a:ext uri="{FF2B5EF4-FFF2-40B4-BE49-F238E27FC236}">
+                <a16:creationId xmlns="" xmlns:a16="http://schemas.microsoft.com/office/drawing/2014/main" id="{7173D12A-5393-4EF8-B04F-3F560643558C}"/>
+              </a:ext>
+            </a:extLst>
+          </p:cNvPr>
+          <p:cNvPicPr>
+            <a:picLocks noChangeAspect="1" noChangeArrowheads="1"/>
+          </p:cNvPicPr>
+          <p:nvPr/>
+        </p:nvPicPr>
+        <p:blipFill>
+          <a:blip r:embed="rId2">
+            <a:extLst>
+              <a:ext uri="{28A0092B-C50C-407E-A947-70E740481C1C}">
+                <a14:useLocalDpi xmlns:a14="http://schemas.microsoft.com/office/drawing/2010/main" val="0"/>
+              </a:ext>
+            </a:extLst>
+          </a:blip>
+          <a:srcRect/>
+          <a:stretch>
+            <a:fillRect/>
+          </a:stretch>
+        </p:blipFill>
+        <p:spPr bwMode="auto">
+          <a:xfrm>
+            <a:off x="2250930" y="2440380"/>
+            <a:ext cx="7901631" cy="1831645"/>
+          </a:xfrm>
+          <a:prstGeom prst="rect">
+            <a:avLst/>
+          </a:prstGeom>
+          <a:noFill/>
+          <a:extLst>
+            <a:ext uri="{909E8E84-426E-40DD-AFC4-6F175D3DCCD1}">
+              <a14:hiddenFill xmlns:a14="http://schemas.microsoft.com/office/drawing/2010/main">
+                <a:solidFill>
+                  <a:srgbClr val="FFFFFF"/>
+                </a:solidFill>
+              </a14:hiddenFill>
+            </a:ext>
+          </a:extLst>
+        </p:spPr>
+      </p:pic>
+    </p:spTree>
+    <p:extLst>
+      <p:ext uri="{BB962C8B-B14F-4D97-AF65-F5344CB8AC3E}">
+        <p14:creationId xmlns:p14="http://schemas.microsoft.com/office/powerpoint/2010/main" val="935959818"/>
+      </p:ext>
+    </p:extLst>
+  </p:cSld>
+  <p:clrMapOvr>
+    <a:masterClrMapping/>
+  </p:clrMapOvr>
+</p:sld>
+</file>
+
+<file path=ppt/slides/slide21.xml><?xml version="1.0" encoding="utf-8"?>
+<p:sld xmlns:a="http://schemas.openxmlformats.org/drawingml/2006/main" xmlns:r="http://schemas.openxmlformats.org/officeDocument/2006/relationships" xmlns:p="http://schemas.openxmlformats.org/presentationml/2006/main">
+  <p:cSld>
+    <p:spTree>
+      <p:nvGrpSpPr>
+        <p:cNvPr id="1" name=""/>
+        <p:cNvGrpSpPr/>
+        <p:nvPr/>
+      </p:nvGrpSpPr>
+      <p:grpSpPr>
+        <a:xfrm>
+          <a:off x="0" y="0"/>
+          <a:ext cx="0" cy="0"/>
+          <a:chOff x="0" y="0"/>
+          <a:chExt cx="0" cy="0"/>
+        </a:xfrm>
+      </p:grpSpPr>
       <p:pic>
         <p:nvPicPr>
           <p:cNvPr id="5" name="Picture 2" descr="352,927 Evil Stock Photos, Pictures &amp;amp; Royalty-Free Images - iStock">
             <a:extLst>
               <a:ext uri="{FF2B5EF4-FFF2-40B4-BE49-F238E27FC236}">
-                <a16:creationId xmlns:a16="http://schemas.microsoft.com/office/drawing/2014/main" xmlns="" id="{5F600820-50C2-44A6-A5E4-7D4D85DCC460}"/>
+                <a16:creationId xmlns="" xmlns:a16="http://schemas.microsoft.com/office/drawing/2014/main" id="{5F600820-50C2-44A6-A5E4-7D4D85DCC460}"/>
               </a:ext>
             </a:extLst>
           </p:cNvPr>
@@ -6021,7 +7245,7 @@
           <p:cNvPr id="4" name="Footer Placeholder 3">
             <a:extLst>
               <a:ext uri="{FF2B5EF4-FFF2-40B4-BE49-F238E27FC236}">
-                <a16:creationId xmlns:a16="http://schemas.microsoft.com/office/drawing/2014/main" xmlns="" id="{7B57FAC7-9A78-418C-B807-48ECCF0BCB6C}"/>
+                <a16:creationId xmlns="" xmlns:a16="http://schemas.microsoft.com/office/drawing/2014/main" id="{7B57FAC7-9A78-418C-B807-48ECCF0BCB6C}"/>
               </a:ext>
             </a:extLst>
           </p:cNvPr>
@@ -6052,7 +7276,7 @@
           <p:cNvPr id="2" name="TextBox 1">
             <a:extLst>
               <a:ext uri="{FF2B5EF4-FFF2-40B4-BE49-F238E27FC236}">
-                <a16:creationId xmlns:a16="http://schemas.microsoft.com/office/drawing/2014/main" xmlns="" id="{ABD7F561-60CD-490C-A66A-7874934A3F0A}"/>
+                <a16:creationId xmlns="" xmlns:a16="http://schemas.microsoft.com/office/drawing/2014/main" id="{ABD7F561-60CD-490C-A66A-7874934A3F0A}"/>
               </a:ext>
             </a:extLst>
           </p:cNvPr>
@@ -6086,102 +7310,6 @@
     <p:extLst>
       <p:ext uri="{BB962C8B-B14F-4D97-AF65-F5344CB8AC3E}">
         <p14:creationId xmlns:p14="http://schemas.microsoft.com/office/powerpoint/2010/main" val="669830058"/>
-      </p:ext>
-    </p:extLst>
-  </p:cSld>
-  <p:clrMapOvr>
-    <a:masterClrMapping/>
-  </p:clrMapOvr>
-</p:sld>
-</file>
-
-<file path=ppt/slides/slide21.xml><?xml version="1.0" encoding="utf-8"?>
-<p:sld xmlns:a="http://schemas.openxmlformats.org/drawingml/2006/main" xmlns:r="http://schemas.openxmlformats.org/officeDocument/2006/relationships" xmlns:p="http://schemas.openxmlformats.org/presentationml/2006/main">
-  <p:cSld>
-    <p:spTree>
-      <p:nvGrpSpPr>
-        <p:cNvPr id="1" name=""/>
-        <p:cNvGrpSpPr/>
-        <p:nvPr/>
-      </p:nvGrpSpPr>
-      <p:grpSpPr>
-        <a:xfrm>
-          <a:off x="0" y="0"/>
-          <a:ext cx="0" cy="0"/>
-          <a:chOff x="0" y="0"/>
-          <a:chExt cx="0" cy="0"/>
-        </a:xfrm>
-      </p:grpSpPr>
-      <p:sp>
-        <p:nvSpPr>
-          <p:cNvPr id="4" name="Footer Placeholder 3">
-            <a:extLst>
-              <a:ext uri="{FF2B5EF4-FFF2-40B4-BE49-F238E27FC236}">
-                <a16:creationId xmlns:a16="http://schemas.microsoft.com/office/drawing/2014/main" xmlns="" id="{7B57FAC7-9A78-418C-B807-48ECCF0BCB6C}"/>
-              </a:ext>
-            </a:extLst>
-          </p:cNvPr>
-          <p:cNvSpPr>
-            <a:spLocks noGrp="1"/>
-          </p:cNvSpPr>
-          <p:nvPr>
-            <p:ph type="ftr" sz="quarter" idx="11"/>
-          </p:nvPr>
-        </p:nvSpPr>
-        <p:spPr/>
-        <p:txBody>
-          <a:bodyPr/>
-          <a:lstStyle/>
-          <a:p>
-            <a:r>
-              <a:rPr lang="en-US" dirty="0">
-                <a:latin typeface="Courier New" panose="02070309020205020404" pitchFamily="49" charset="0"/>
-                <a:cs typeface="Courier New" panose="02070309020205020404" pitchFamily="49" charset="0"/>
-              </a:rPr>
-              <a:t>Team EJJ</a:t>
-            </a:r>
-          </a:p>
-        </p:txBody>
-      </p:sp>
-      <p:sp>
-        <p:nvSpPr>
-          <p:cNvPr id="2" name="TextBox 1">
-            <a:extLst>
-              <a:ext uri="{FF2B5EF4-FFF2-40B4-BE49-F238E27FC236}">
-                <a16:creationId xmlns:a16="http://schemas.microsoft.com/office/drawing/2014/main" xmlns="" id="{ABD7F561-60CD-490C-A66A-7874934A3F0A}"/>
-              </a:ext>
-            </a:extLst>
-          </p:cNvPr>
-          <p:cNvSpPr txBox="1"/>
-          <p:nvPr/>
-        </p:nvSpPr>
-        <p:spPr>
-          <a:xfrm>
-            <a:off x="3642756" y="2689760"/>
-            <a:ext cx="7858496" cy="1107996"/>
-          </a:xfrm>
-          <a:prstGeom prst="rect">
-            <a:avLst/>
-          </a:prstGeom>
-          <a:noFill/>
-        </p:spPr>
-        <p:txBody>
-          <a:bodyPr wrap="square" rtlCol="0">
-            <a:spAutoFit/>
-          </a:bodyPr>
-          <a:lstStyle/>
-          <a:p>
-            <a:r>
-              <a:rPr lang="en-US" sz="6600" dirty="0"/>
-              <a:t>Back up slides</a:t>
-            </a:r>
-          </a:p>
-        </p:txBody>
-      </p:sp>
-    </p:spTree>
-    <p:extLst>
-      <p:ext uri="{BB962C8B-B14F-4D97-AF65-F5344CB8AC3E}">
-        <p14:creationId xmlns:p14="http://schemas.microsoft.com/office/powerpoint/2010/main" val="2167628825"/>
       </p:ext>
     </p:extLst>
   </p:cSld>
@@ -6210,147 +7338,74 @@
       </p:grpSpPr>
       <p:sp>
         <p:nvSpPr>
-          <p:cNvPr id="2" name="Title 1"/>
-          <p:cNvSpPr>
-            <a:spLocks noGrp="1"/>
-          </p:cNvSpPr>
-          <p:nvPr>
-            <p:ph type="title"/>
-          </p:nvPr>
+          <p:cNvPr id="4" name="Footer Placeholder 3">
+            <a:extLst>
+              <a:ext uri="{FF2B5EF4-FFF2-40B4-BE49-F238E27FC236}">
+                <a16:creationId xmlns="" xmlns:a16="http://schemas.microsoft.com/office/drawing/2014/main" id="{7B57FAC7-9A78-418C-B807-48ECCF0BCB6C}"/>
+              </a:ext>
+            </a:extLst>
+          </p:cNvPr>
+          <p:cNvSpPr>
+            <a:spLocks noGrp="1"/>
+          </p:cNvSpPr>
+          <p:nvPr>
+            <p:ph type="ftr" sz="quarter" idx="11"/>
+          </p:nvPr>
+        </p:nvSpPr>
+        <p:spPr/>
+        <p:txBody>
+          <a:bodyPr/>
+          <a:lstStyle/>
+          <a:p>
+            <a:r>
+              <a:rPr lang="en-US" dirty="0">
+                <a:latin typeface="Courier New" panose="02070309020205020404" pitchFamily="49" charset="0"/>
+                <a:cs typeface="Courier New" panose="02070309020205020404" pitchFamily="49" charset="0"/>
+              </a:rPr>
+              <a:t>Team EJJ</a:t>
+            </a:r>
+          </a:p>
+        </p:txBody>
+      </p:sp>
+      <p:sp>
+        <p:nvSpPr>
+          <p:cNvPr id="2" name="TextBox 1">
+            <a:extLst>
+              <a:ext uri="{FF2B5EF4-FFF2-40B4-BE49-F238E27FC236}">
+                <a16:creationId xmlns="" xmlns:a16="http://schemas.microsoft.com/office/drawing/2014/main" id="{ABD7F561-60CD-490C-A66A-7874934A3F0A}"/>
+              </a:ext>
+            </a:extLst>
+          </p:cNvPr>
+          <p:cNvSpPr txBox="1"/>
+          <p:nvPr/>
         </p:nvSpPr>
         <p:spPr>
           <a:xfrm>
-            <a:off x="838200" y="298623"/>
-            <a:ext cx="10515600" cy="1325563"/>
+            <a:off x="3642756" y="2689760"/>
+            <a:ext cx="7858496" cy="1107996"/>
           </a:xfrm>
+          <a:prstGeom prst="rect">
+            <a:avLst/>
+          </a:prstGeom>
+          <a:noFill/>
         </p:spPr>
         <p:txBody>
-          <a:bodyPr/>
-          <a:lstStyle/>
-          <a:p>
-            <a:r>
-              <a:rPr lang="en-US" dirty="0"/>
-              <a:t>EJJ Scheduling Algorithm Details (1)</a:t>
-            </a:r>
-          </a:p>
-        </p:txBody>
-      </p:sp>
-      <p:sp>
-        <p:nvSpPr>
-          <p:cNvPr id="3" name="Content Placeholder 2"/>
-          <p:cNvSpPr>
-            <a:spLocks noGrp="1"/>
-          </p:cNvSpPr>
-          <p:nvPr>
-            <p:ph idx="1"/>
-          </p:nvPr>
-        </p:nvSpPr>
-        <p:spPr/>
-        <p:txBody>
-          <a:bodyPr>
-            <a:normAutofit fontScale="92500" lnSpcReduction="10000"/>
+          <a:bodyPr wrap="square" rtlCol="0">
+            <a:spAutoFit/>
           </a:bodyPr>
           <a:lstStyle/>
           <a:p>
             <a:r>
-              <a:rPr lang="en-US" dirty="0"/>
-              <a:t>Inputs:</a:t>
-            </a:r>
-          </a:p>
-          <a:p>
-            <a:pPr lvl="1"/>
-            <a:r>
-              <a:rPr lang="en-US" dirty="0"/>
-              <a:t>Constraints/Restraints, Inventory, Maximum Sortie Length, Earliest Start Time</a:t>
-            </a:r>
-          </a:p>
-          <a:p>
-            <a:pPr marL="457200" lvl="1" indent="0">
-              <a:buNone/>
-            </a:pPr>
-            <a:endParaRPr lang="en-US" dirty="0"/>
-          </a:p>
-          <a:p>
-            <a:r>
-              <a:rPr lang="en-US" dirty="0"/>
-              <a:t>Start by finding a carrier with more jets and pilots to be the carrier to start the sortie from</a:t>
-            </a:r>
-          </a:p>
-          <a:p>
-            <a:pPr lvl="1"/>
-            <a:r>
-              <a:rPr lang="en-US" dirty="0"/>
-              <a:t>Also try to find a carrier with available </a:t>
-            </a:r>
-            <a:r>
-              <a:rPr lang="en-US" dirty="0" err="1"/>
-              <a:t>helos</a:t>
-            </a:r>
-            <a:endParaRPr lang="en-US" dirty="0"/>
-          </a:p>
-          <a:p>
-            <a:r>
-              <a:rPr lang="en-US" dirty="0"/>
-              <a:t>The number of jets/pilots needed is determined by the number of missiles needed for 90% probability of success at striking the target depending on the requirement (i.e. disable or destroy)</a:t>
-            </a:r>
-          </a:p>
-          <a:p>
-            <a:pPr lvl="1"/>
-            <a:r>
-              <a:rPr lang="en-US" dirty="0"/>
-              <a:t>Also depends on the chosen </a:t>
-            </a:r>
-            <a:r>
-              <a:rPr lang="en-US" dirty="0" err="1"/>
-              <a:t>jets’s</a:t>
-            </a:r>
-            <a:r>
-              <a:rPr lang="en-US" dirty="0"/>
-              <a:t> missile carriage capacity</a:t>
-            </a:r>
-          </a:p>
-          <a:p>
-            <a:pPr lvl="1"/>
-            <a:r>
-              <a:rPr lang="en-US" dirty="0"/>
-              <a:t>Assuming that each jet can carry only 1 missile at first; Will have more jets/pilots to choose the final set from</a:t>
-            </a:r>
-          </a:p>
-        </p:txBody>
-      </p:sp>
-      <p:sp>
-        <p:nvSpPr>
-          <p:cNvPr id="4" name="Footer Placeholder 3"/>
-          <p:cNvSpPr>
-            <a:spLocks noGrp="1"/>
-          </p:cNvSpPr>
-          <p:nvPr>
-            <p:ph type="ftr" sz="quarter" idx="11"/>
-          </p:nvPr>
-        </p:nvSpPr>
-        <p:spPr/>
-        <p:txBody>
-          <a:bodyPr/>
-          <a:lstStyle/>
-          <a:p>
-            <a:r>
-              <a:rPr lang="en-US">
-                <a:latin typeface="Courier New" panose="02070309020205020404" pitchFamily="49" charset="0"/>
-                <a:cs typeface="Courier New" panose="02070309020205020404" pitchFamily="49" charset="0"/>
-              </a:rPr>
-              <a:t>Team EJJ</a:t>
-            </a:r>
-            <a:endParaRPr lang="en-US" dirty="0">
-              <a:latin typeface="Courier New" panose="02070309020205020404" pitchFamily="49" charset="0"/>
-              <a:cs typeface="Courier New" panose="02070309020205020404" pitchFamily="49" charset="0"/>
-            </a:endParaRPr>
+              <a:rPr lang="en-US" sz="6600" dirty="0"/>
+              <a:t>Back up slides</a:t>
+            </a:r>
           </a:p>
         </p:txBody>
       </p:sp>
     </p:spTree>
     <p:extLst>
       <p:ext uri="{BB962C8B-B14F-4D97-AF65-F5344CB8AC3E}">
-        <p14:creationId xmlns:p14="http://schemas.microsoft.com/office/powerpoint/2010/main" val="1567541983"/>
+        <p14:creationId xmlns:p14="http://schemas.microsoft.com/office/powerpoint/2010/main" val="2167628825"/>
       </p:ext>
     </p:extLst>
   </p:cSld>
@@ -6399,7 +7454,7 @@
           <a:p>
             <a:r>
               <a:rPr lang="en-US" dirty="0"/>
-              <a:t>EJJ Scheduling Algorithm Details (2)</a:t>
+              <a:t>EJJ Scheduling Algorithm Details (1)</a:t>
             </a:r>
           </a:p>
         </p:txBody>
@@ -6423,63 +7478,66 @@
           <a:p>
             <a:r>
               <a:rPr lang="en-US" dirty="0"/>
-              <a:t>If there aren’t enough jets, pilots, and/or </a:t>
+              <a:t>Inputs:</a:t>
+            </a:r>
+          </a:p>
+          <a:p>
+            <a:pPr lvl="1"/>
+            <a:r>
+              <a:rPr lang="en-US" dirty="0"/>
+              <a:t>Constraints/Restraints, Inventory, Maximum Sortie Length, Earliest Start Time</a:t>
+            </a:r>
+          </a:p>
+          <a:p>
+            <a:pPr marL="457200" lvl="1" indent="0">
+              <a:buNone/>
+            </a:pPr>
+            <a:endParaRPr lang="en-US" dirty="0"/>
+          </a:p>
+          <a:p>
+            <a:r>
+              <a:rPr lang="en-US" dirty="0"/>
+              <a:t>Start by finding a carrier with more jets and pilots to be the carrier to start the sortie from</a:t>
+            </a:r>
+          </a:p>
+          <a:p>
+            <a:pPr lvl="1"/>
+            <a:r>
+              <a:rPr lang="en-US" dirty="0"/>
+              <a:t>Also try to find a carrier with available </a:t>
             </a:r>
             <a:r>
               <a:rPr lang="en-US" dirty="0" err="1"/>
               <a:t>helos</a:t>
             </a:r>
+            <a:endParaRPr lang="en-US" dirty="0"/>
+          </a:p>
+          <a:p>
             <a:r>
               <a:rPr lang="en-US" dirty="0"/>
-              <a:t> on that carrier, store possible repositions of the least  amount of jets/pilots/</a:t>
+              <a:t>The number of jets/pilots needed is determined by the number of missiles needed for 90% probability of success at striking the target depending on the requirement (i.e. disable or destroy)</a:t>
+            </a:r>
+          </a:p>
+          <a:p>
+            <a:pPr lvl="1"/>
+            <a:r>
+              <a:rPr lang="en-US" dirty="0"/>
+              <a:t>Also depends on the chosen </a:t>
             </a:r>
             <a:r>
               <a:rPr lang="en-US" dirty="0" err="1"/>
-              <a:t>helos</a:t>
+              <a:t>jets’s</a:t>
             </a:r>
             <a:r>
               <a:rPr lang="en-US" dirty="0"/>
-              <a:t> to the carrier possible</a:t>
+              <a:t> missile carriage capacity</a:t>
             </a:r>
           </a:p>
           <a:p>
             <a:pPr lvl="1"/>
             <a:r>
               <a:rPr lang="en-US" dirty="0"/>
-              <a:t>Use what we can on the carrier already</a:t>
-            </a:r>
-          </a:p>
-          <a:p>
-            <a:r>
-              <a:rPr lang="en-US" dirty="0"/>
-              <a:t>Given the available subset of the jets on a carrier (after possible repositions, if necessary), find the first set of jets that can fly together</a:t>
-            </a:r>
-          </a:p>
-          <a:p>
-            <a:pPr lvl="1"/>
-            <a:r>
-              <a:rPr lang="en-US" dirty="0"/>
-              <a:t>The number of jets chosen is based on their missile carriage capacity and the number of missiles needed</a:t>
-            </a:r>
-          </a:p>
-          <a:p>
-            <a:r>
-              <a:rPr lang="en-US" dirty="0"/>
-              <a:t>Once the jets are found, then that determines the number of pilots needed</a:t>
-            </a:r>
-          </a:p>
-          <a:p>
-            <a:pPr lvl="1"/>
-            <a:r>
-              <a:rPr lang="en-US" dirty="0"/>
-              <a:t>Find the first set of pilots that can fly with each other, and most importantly has a pilot that can fly with each jet</a:t>
-            </a:r>
-          </a:p>
-          <a:p>
-            <a:pPr lvl="1"/>
-            <a:r>
-              <a:rPr lang="en-US" dirty="0"/>
-              <a:t>Map the pilots to the jets</a:t>
+              <a:t>Assuming that each jet can carry only 1 missile at first; Will have more jets/pilots to choose the final set from</a:t>
             </a:r>
           </a:p>
         </p:txBody>
@@ -6516,7 +7574,7 @@
     </p:spTree>
     <p:extLst>
       <p:ext uri="{BB962C8B-B14F-4D97-AF65-F5344CB8AC3E}">
-        <p14:creationId xmlns:p14="http://schemas.microsoft.com/office/powerpoint/2010/main" val="1878794731"/>
+        <p14:creationId xmlns:p14="http://schemas.microsoft.com/office/powerpoint/2010/main" val="1567541983"/>
       </p:ext>
     </p:extLst>
   </p:cSld>
@@ -6565,6 +7623,172 @@
           <a:p>
             <a:r>
               <a:rPr lang="en-US" dirty="0"/>
+              <a:t>EJJ Scheduling Algorithm Details (2)</a:t>
+            </a:r>
+          </a:p>
+        </p:txBody>
+      </p:sp>
+      <p:sp>
+        <p:nvSpPr>
+          <p:cNvPr id="3" name="Content Placeholder 2"/>
+          <p:cNvSpPr>
+            <a:spLocks noGrp="1"/>
+          </p:cNvSpPr>
+          <p:nvPr>
+            <p:ph idx="1"/>
+          </p:nvPr>
+        </p:nvSpPr>
+        <p:spPr/>
+        <p:txBody>
+          <a:bodyPr>
+            <a:normAutofit fontScale="92500" lnSpcReduction="10000"/>
+          </a:bodyPr>
+          <a:lstStyle/>
+          <a:p>
+            <a:r>
+              <a:rPr lang="en-US" dirty="0"/>
+              <a:t>If there aren’t enough jets, pilots, and/or </a:t>
+            </a:r>
+            <a:r>
+              <a:rPr lang="en-US" dirty="0" err="1"/>
+              <a:t>helos</a:t>
+            </a:r>
+            <a:r>
+              <a:rPr lang="en-US" dirty="0"/>
+              <a:t> on that carrier, store possible repositions of the least  amount of jets/pilots/</a:t>
+            </a:r>
+            <a:r>
+              <a:rPr lang="en-US" dirty="0" err="1"/>
+              <a:t>helos</a:t>
+            </a:r>
+            <a:r>
+              <a:rPr lang="en-US" dirty="0"/>
+              <a:t> to the carrier possible</a:t>
+            </a:r>
+          </a:p>
+          <a:p>
+            <a:pPr lvl="1"/>
+            <a:r>
+              <a:rPr lang="en-US" dirty="0"/>
+              <a:t>Use what we can on the carrier already</a:t>
+            </a:r>
+          </a:p>
+          <a:p>
+            <a:r>
+              <a:rPr lang="en-US" dirty="0"/>
+              <a:t>Given the available subset of the jets on a carrier (after possible repositions, if necessary), find the first set of jets that can fly together</a:t>
+            </a:r>
+          </a:p>
+          <a:p>
+            <a:pPr lvl="1"/>
+            <a:r>
+              <a:rPr lang="en-US" dirty="0"/>
+              <a:t>The number of jets chosen is based on their missile carriage capacity and the number of missiles needed</a:t>
+            </a:r>
+          </a:p>
+          <a:p>
+            <a:r>
+              <a:rPr lang="en-US" dirty="0"/>
+              <a:t>Once the jets are found, then that determines the number of pilots needed</a:t>
+            </a:r>
+          </a:p>
+          <a:p>
+            <a:pPr lvl="1"/>
+            <a:r>
+              <a:rPr lang="en-US" dirty="0"/>
+              <a:t>Find the first set of pilots that can fly with each other, and most importantly has a pilot that can fly with each jet</a:t>
+            </a:r>
+          </a:p>
+          <a:p>
+            <a:pPr lvl="1"/>
+            <a:r>
+              <a:rPr lang="en-US" dirty="0"/>
+              <a:t>Map the pilots to the jets</a:t>
+            </a:r>
+          </a:p>
+        </p:txBody>
+      </p:sp>
+      <p:sp>
+        <p:nvSpPr>
+          <p:cNvPr id="4" name="Footer Placeholder 3"/>
+          <p:cNvSpPr>
+            <a:spLocks noGrp="1"/>
+          </p:cNvSpPr>
+          <p:nvPr>
+            <p:ph type="ftr" sz="quarter" idx="11"/>
+          </p:nvPr>
+        </p:nvSpPr>
+        <p:spPr/>
+        <p:txBody>
+          <a:bodyPr/>
+          <a:lstStyle/>
+          <a:p>
+            <a:r>
+              <a:rPr lang="en-US">
+                <a:latin typeface="Courier New" panose="02070309020205020404" pitchFamily="49" charset="0"/>
+                <a:cs typeface="Courier New" panose="02070309020205020404" pitchFamily="49" charset="0"/>
+              </a:rPr>
+              <a:t>Team EJJ</a:t>
+            </a:r>
+            <a:endParaRPr lang="en-US" dirty="0">
+              <a:latin typeface="Courier New" panose="02070309020205020404" pitchFamily="49" charset="0"/>
+              <a:cs typeface="Courier New" panose="02070309020205020404" pitchFamily="49" charset="0"/>
+            </a:endParaRPr>
+          </a:p>
+        </p:txBody>
+      </p:sp>
+    </p:spTree>
+    <p:extLst>
+      <p:ext uri="{BB962C8B-B14F-4D97-AF65-F5344CB8AC3E}">
+        <p14:creationId xmlns:p14="http://schemas.microsoft.com/office/powerpoint/2010/main" val="1878794731"/>
+      </p:ext>
+    </p:extLst>
+  </p:cSld>
+  <p:clrMapOvr>
+    <a:masterClrMapping/>
+  </p:clrMapOvr>
+</p:sld>
+</file>
+
+<file path=ppt/slides/slide25.xml><?xml version="1.0" encoding="utf-8"?>
+<p:sld xmlns:a="http://schemas.openxmlformats.org/drawingml/2006/main" xmlns:r="http://schemas.openxmlformats.org/officeDocument/2006/relationships" xmlns:p="http://schemas.openxmlformats.org/presentationml/2006/main">
+  <p:cSld>
+    <p:spTree>
+      <p:nvGrpSpPr>
+        <p:cNvPr id="1" name=""/>
+        <p:cNvGrpSpPr/>
+        <p:nvPr/>
+      </p:nvGrpSpPr>
+      <p:grpSpPr>
+        <a:xfrm>
+          <a:off x="0" y="0"/>
+          <a:ext cx="0" cy="0"/>
+          <a:chOff x="0" y="0"/>
+          <a:chExt cx="0" cy="0"/>
+        </a:xfrm>
+      </p:grpSpPr>
+      <p:sp>
+        <p:nvSpPr>
+          <p:cNvPr id="2" name="Title 1"/>
+          <p:cNvSpPr>
+            <a:spLocks noGrp="1"/>
+          </p:cNvSpPr>
+          <p:nvPr>
+            <p:ph type="title"/>
+          </p:nvPr>
+        </p:nvSpPr>
+        <p:spPr>
+          <a:xfrm>
+            <a:off x="838200" y="298623"/>
+            <a:ext cx="10515600" cy="1325563"/>
+          </a:xfrm>
+        </p:spPr>
+        <p:txBody>
+          <a:bodyPr/>
+          <a:lstStyle/>
+          <a:p>
+            <a:r>
+              <a:rPr lang="en-US" dirty="0"/>
               <a:t>EJJ Scheduling Algorithm Details (3)</a:t>
             </a:r>
           </a:p>
@@ -6704,7 +7928,7 @@
 </p:sld>
 </file>
 
-<file path=ppt/slides/slide25.xml><?xml version="1.0" encoding="utf-8"?>
+<file path=ppt/slides/slide26.xml><?xml version="1.0" encoding="utf-8"?>
 <p:sld xmlns:a="http://schemas.openxmlformats.org/drawingml/2006/main" xmlns:r="http://schemas.openxmlformats.org/officeDocument/2006/relationships" xmlns:p="http://schemas.openxmlformats.org/presentationml/2006/main">
   <p:cSld>
     <p:spTree>
@@ -6867,7 +8091,7 @@
           <p:cNvPr id="2" name="Title 1">
             <a:extLst>
               <a:ext uri="{FF2B5EF4-FFF2-40B4-BE49-F238E27FC236}">
-                <a16:creationId xmlns:a16="http://schemas.microsoft.com/office/drawing/2014/main" xmlns="" id="{F2E87793-C400-4D49-AC42-F6C78A28B67D}"/>
+                <a16:creationId xmlns="" xmlns:a16="http://schemas.microsoft.com/office/drawing/2014/main" id="{F2E87793-C400-4D49-AC42-F6C78A28B67D}"/>
               </a:ext>
             </a:extLst>
           </p:cNvPr>
@@ -6895,7 +8119,7 @@
           <p:cNvPr id="3" name="Content Placeholder 2">
             <a:extLst>
               <a:ext uri="{FF2B5EF4-FFF2-40B4-BE49-F238E27FC236}">
-                <a16:creationId xmlns:a16="http://schemas.microsoft.com/office/drawing/2014/main" xmlns="" id="{E29D20E0-73E2-4C61-AF58-2EC3D1B5237C}"/>
+                <a16:creationId xmlns="" xmlns:a16="http://schemas.microsoft.com/office/drawing/2014/main" id="{E29D20E0-73E2-4C61-AF58-2EC3D1B5237C}"/>
               </a:ext>
             </a:extLst>
           </p:cNvPr>
@@ -6948,7 +8172,7 @@
           <p:cNvPr id="4" name="Footer Placeholder 3">
             <a:extLst>
               <a:ext uri="{FF2B5EF4-FFF2-40B4-BE49-F238E27FC236}">
-                <a16:creationId xmlns:a16="http://schemas.microsoft.com/office/drawing/2014/main" xmlns="" id="{C246C6AC-EE9C-4B9F-8926-F862296227DD}"/>
+                <a16:creationId xmlns="" xmlns:a16="http://schemas.microsoft.com/office/drawing/2014/main" id="{C246C6AC-EE9C-4B9F-8926-F862296227DD}"/>
               </a:ext>
             </a:extLst>
           </p:cNvPr>
@@ -7009,7 +8233,7 @@
           <p:cNvPr id="2" name="Title 1">
             <a:extLst>
               <a:ext uri="{FF2B5EF4-FFF2-40B4-BE49-F238E27FC236}">
-                <a16:creationId xmlns:a16="http://schemas.microsoft.com/office/drawing/2014/main" xmlns="" id="{E3B7ADCA-8719-4128-8B4D-881B76C12927}"/>
+                <a16:creationId xmlns="" xmlns:a16="http://schemas.microsoft.com/office/drawing/2014/main" id="{E3B7ADCA-8719-4128-8B4D-881B76C12927}"/>
               </a:ext>
             </a:extLst>
           </p:cNvPr>
@@ -7037,7 +8261,7 @@
           <p:cNvPr id="3" name="Content Placeholder 2">
             <a:extLst>
               <a:ext uri="{FF2B5EF4-FFF2-40B4-BE49-F238E27FC236}">
-                <a16:creationId xmlns:a16="http://schemas.microsoft.com/office/drawing/2014/main" xmlns="" id="{3EC12B63-2CE0-48D4-A136-ADE12373C800}"/>
+                <a16:creationId xmlns="" xmlns:a16="http://schemas.microsoft.com/office/drawing/2014/main" id="{3EC12B63-2CE0-48D4-A136-ADE12373C800}"/>
               </a:ext>
             </a:extLst>
           </p:cNvPr>
@@ -7155,7 +8379,7 @@
           <p:cNvPr id="4" name="Footer Placeholder 3">
             <a:extLst>
               <a:ext uri="{FF2B5EF4-FFF2-40B4-BE49-F238E27FC236}">
-                <a16:creationId xmlns:a16="http://schemas.microsoft.com/office/drawing/2014/main" xmlns="" id="{693782FF-7ED5-4192-A01F-660E4D3EEAB0}"/>
+                <a16:creationId xmlns="" xmlns:a16="http://schemas.microsoft.com/office/drawing/2014/main" id="{693782FF-7ED5-4192-A01F-660E4D3EEAB0}"/>
               </a:ext>
             </a:extLst>
           </p:cNvPr>
@@ -7216,7 +8440,7 @@
           <p:cNvPr id="3" name="Content Placeholder 2">
             <a:extLst>
               <a:ext uri="{FF2B5EF4-FFF2-40B4-BE49-F238E27FC236}">
-                <a16:creationId xmlns:a16="http://schemas.microsoft.com/office/drawing/2014/main" xmlns="" id="{22DDF42D-3D90-4D39-8593-9FBBFEB2E97E}"/>
+                <a16:creationId xmlns="" xmlns:a16="http://schemas.microsoft.com/office/drawing/2014/main" id="{22DDF42D-3D90-4D39-8593-9FBBFEB2E97E}"/>
               </a:ext>
             </a:extLst>
           </p:cNvPr>
@@ -7589,7 +8813,7 @@
           <p:cNvPr id="4" name="Footer Placeholder 3">
             <a:extLst>
               <a:ext uri="{FF2B5EF4-FFF2-40B4-BE49-F238E27FC236}">
-                <a16:creationId xmlns:a16="http://schemas.microsoft.com/office/drawing/2014/main" xmlns="" id="{A002CB46-3E82-46AE-AE99-4D885792F48B}"/>
+                <a16:creationId xmlns="" xmlns:a16="http://schemas.microsoft.com/office/drawing/2014/main" id="{A002CB46-3E82-46AE-AE99-4D885792F48B}"/>
               </a:ext>
             </a:extLst>
           </p:cNvPr>
@@ -7620,7 +8844,7 @@
           <p:cNvPr id="8" name="TextBox 7">
             <a:extLst>
               <a:ext uri="{FF2B5EF4-FFF2-40B4-BE49-F238E27FC236}">
-                <a16:creationId xmlns:a16="http://schemas.microsoft.com/office/drawing/2014/main" xmlns="" id="{CDF35B94-B09E-4223-A496-D1AE1FFA9173}"/>
+                <a16:creationId xmlns="" xmlns:a16="http://schemas.microsoft.com/office/drawing/2014/main" id="{CDF35B94-B09E-4223-A496-D1AE1FFA9173}"/>
               </a:ext>
             </a:extLst>
           </p:cNvPr>
@@ -7843,7 +9067,7 @@
           <p:cNvPr id="3" name="Content Placeholder 2">
             <a:extLst>
               <a:ext uri="{FF2B5EF4-FFF2-40B4-BE49-F238E27FC236}">
-                <a16:creationId xmlns:a16="http://schemas.microsoft.com/office/drawing/2014/main" xmlns="" id="{B23BDF39-9DE8-4B5D-B2E9-28254D0A839C}"/>
+                <a16:creationId xmlns="" xmlns:a16="http://schemas.microsoft.com/office/drawing/2014/main" id="{B23BDF39-9DE8-4B5D-B2E9-28254D0A839C}"/>
               </a:ext>
             </a:extLst>
           </p:cNvPr>
@@ -8152,7 +9376,7 @@
           <p:cNvPr id="4" name="Footer Placeholder 3">
             <a:extLst>
               <a:ext uri="{FF2B5EF4-FFF2-40B4-BE49-F238E27FC236}">
-                <a16:creationId xmlns:a16="http://schemas.microsoft.com/office/drawing/2014/main" xmlns="" id="{CD510718-CD20-420D-9B74-298783B40D42}"/>
+                <a16:creationId xmlns="" xmlns:a16="http://schemas.microsoft.com/office/drawing/2014/main" id="{CD510718-CD20-420D-9B74-298783B40D42}"/>
               </a:ext>
             </a:extLst>
           </p:cNvPr>
@@ -8192,7 +9416,7 @@
           <p:cNvPr id="6" name="TextBox 5">
             <a:extLst>
               <a:ext uri="{FF2B5EF4-FFF2-40B4-BE49-F238E27FC236}">
-                <a16:creationId xmlns:a16="http://schemas.microsoft.com/office/drawing/2014/main" xmlns="" id="{EB3CB662-3D24-4DC7-869F-8ACB83720D30}"/>
+                <a16:creationId xmlns="" xmlns:a16="http://schemas.microsoft.com/office/drawing/2014/main" id="{EB3CB662-3D24-4DC7-869F-8ACB83720D30}"/>
               </a:ext>
             </a:extLst>
           </p:cNvPr>
@@ -8560,7 +9784,7 @@
       </p:grpSpPr>
       <p:pic>
         <p:nvPicPr>
-          <p:cNvPr id="11" name="Content Placeholder 10"/>
+          <p:cNvPr id="10" name="Content Placeholder 9"/>
           <p:cNvPicPr>
             <a:picLocks noGrp="1" noChangeAspect="1"/>
           </p:cNvPicPr>
@@ -8576,8 +9800,8 @@
         </p:blipFill>
         <p:spPr>
           <a:xfrm>
-            <a:off x="307690" y="1709556"/>
-            <a:ext cx="8284780" cy="4351338"/>
+            <a:off x="219310" y="1825625"/>
+            <a:ext cx="8534691" cy="4351338"/>
           </a:xfrm>
           <a:prstGeom prst="rect">
             <a:avLst/>
@@ -8596,13 +9820,54 @@
         </p:nvSpPr>
         <p:spPr/>
         <p:txBody>
-          <a:bodyPr/>
+          <a:bodyPr>
+            <a:normAutofit/>
+          </a:bodyPr>
           <a:lstStyle/>
           <a:p>
             <a:r>
               <a:rPr lang="en-US" dirty="0"/>
-              <a:t>EJJ Example Schedule Output</a:t>
-            </a:r>
+              <a:t>EJJ Example Schedule </a:t>
+            </a:r>
+            <a:r>
+              <a:rPr lang="en-US" dirty="0" smtClean="0"/>
+              <a:t>Output</a:t>
+            </a:r>
+            <a:br>
+              <a:rPr lang="en-US" dirty="0" smtClean="0"/>
+            </a:br>
+            <a:r>
+              <a:rPr lang="en-US" sz="1400" dirty="0" smtClean="0"/>
+              <a:t>With 90% probability of disabling/destroying targets</a:t>
+            </a:r>
+            <a:r>
+              <a:rPr lang="en-US" dirty="0" smtClean="0"/>
+              <a:t/>
+            </a:r>
+            <a:br>
+              <a:rPr lang="en-US" dirty="0" smtClean="0"/>
+            </a:br>
+            <a:r>
+              <a:rPr lang="en-US" sz="1200" dirty="0" smtClean="0"/>
+              <a:t>(Able to Disable Target 2, 3, 4; </a:t>
+            </a:r>
+            <a:r>
+              <a:rPr lang="en-US" sz="1200" dirty="0" err="1" smtClean="0"/>
+              <a:t>Unharm</a:t>
+            </a:r>
+            <a:r>
+              <a:rPr lang="en-US" sz="1200" dirty="0" smtClean="0"/>
+              <a:t> Targets 5, 6; Disable and Attempt to Destroy </a:t>
+            </a:r>
+            <a:r>
+              <a:rPr lang="en-US" sz="1200" dirty="0"/>
+              <a:t>Target </a:t>
+            </a:r>
+            <a:r>
+              <a:rPr lang="en-US" sz="1200" dirty="0" smtClean="0"/>
+              <a:t>1 – may not have enough missiles )</a:t>
+            </a:r>
+            <a:endParaRPr lang="en-US" dirty="0"/>
           </a:p>
         </p:txBody>
       </p:sp>
@@ -8668,7 +9933,7 @@
         <p:spPr>
           <a:xfrm>
             <a:off x="10312685" y="1782800"/>
-            <a:ext cx="1622683" cy="4278094"/>
+            <a:ext cx="1622683" cy="2800767"/>
           </a:xfrm>
           <a:prstGeom prst="rect">
             <a:avLst/>
@@ -8694,7 +9959,7 @@
                   <a:srgbClr val="7030A0"/>
                 </a:solidFill>
               </a:rPr>
-              <a:t>Sortie 4 for Target: 3</a:t>
+              <a:t>Sortie 3 for Target: 2</a:t>
             </a:r>
           </a:p>
           <a:p>
@@ -8720,7 +9985,7 @@
                   <a:srgbClr val="7030A0"/>
                 </a:solidFill>
               </a:rPr>
-              <a:t>): 19</a:t>
+              <a:t>): 11</a:t>
             </a:r>
           </a:p>
           <a:p>
@@ -8740,7 +10005,7 @@
                   <a:srgbClr val="7030A0"/>
                 </a:solidFill>
               </a:rPr>
-              <a:t>Jets Chosen: 14, 15, 16</a:t>
+              <a:t>Jets Chosen: 12, 13, 14</a:t>
             </a:r>
           </a:p>
           <a:p>
@@ -8758,7 +10023,7 @@
                   <a:srgbClr val="7030A0"/>
                 </a:solidFill>
               </a:rPr>
-              <a:t> Chosen: 4</a:t>
+              <a:t> Chosen: 3</a:t>
             </a:r>
           </a:p>
           <a:p>
@@ -8768,7 +10033,7 @@
                   <a:srgbClr val="7030A0"/>
                 </a:solidFill>
               </a:rPr>
-              <a:t>Pilots Chosen: 17, 18</a:t>
+              <a:t>Pilots Chosen: 15, 16</a:t>
             </a:r>
           </a:p>
           <a:p>
@@ -8788,7 +10053,7 @@
                   <a:srgbClr val="7030A0"/>
                 </a:solidFill>
               </a:rPr>
-              <a:t>Missiles Chosen: 10, 11, 12</a:t>
+              <a:t>Missiles Chosen: 9, 10, 11</a:t>
             </a:r>
           </a:p>
           <a:p>
@@ -8808,27 +10073,7 @@
                   <a:srgbClr val="7030A0"/>
                 </a:solidFill>
               </a:rPr>
-              <a:t>Number of Missiles Remaining: 6</a:t>
-            </a:r>
-          </a:p>
-          <a:p>
-            <a:r>
-              <a:rPr lang="en-US" sz="800" dirty="0">
-                <a:solidFill>
-                  <a:srgbClr val="7030A0"/>
-                </a:solidFill>
-              </a:rPr>
-              <a:t>Jet 14 is killed!!!</a:t>
-            </a:r>
-          </a:p>
-          <a:p>
-            <a:r>
-              <a:rPr lang="en-US" sz="800" dirty="0">
-                <a:solidFill>
-                  <a:srgbClr val="7030A0"/>
-                </a:solidFill>
-              </a:rPr>
-              <a:t>Pilot 17 is killed!!!</a:t>
+              <a:t>Number of Missiles Remaining: 4</a:t>
             </a:r>
           </a:p>
           <a:p>
@@ -8845,7 +10090,7 @@
                   <a:srgbClr val="7030A0"/>
                 </a:solidFill>
               </a:rPr>
-              <a:t>Sortie 5 for Target: 1</a:t>
+              <a:t>Sortie 4 for Target: 1</a:t>
             </a:r>
           </a:p>
           <a:p>
@@ -8871,7 +10116,7 @@
                   <a:srgbClr val="7030A0"/>
                 </a:solidFill>
               </a:rPr>
-              <a:t>): 28</a:t>
+              <a:t>): 46</a:t>
             </a:r>
           </a:p>
           <a:p>
@@ -8881,7 +10126,7 @@
                   <a:srgbClr val="7030A0"/>
                 </a:solidFill>
               </a:rPr>
-              <a:t>Carrier Chosen: 1</a:t>
+              <a:t>Carrier Chosen: 2</a:t>
             </a:r>
           </a:p>
           <a:p>
@@ -8891,7 +10136,7 @@
                   <a:srgbClr val="7030A0"/>
                 </a:solidFill>
               </a:rPr>
-              <a:t>Jets Chosen: 2, 3</a:t>
+              <a:t>Jets Chosen: 14, 2, 15, 16, 17, 18, 19</a:t>
             </a:r>
           </a:p>
           <a:p>
@@ -8909,7 +10154,7 @@
                   <a:srgbClr val="7030A0"/>
                 </a:solidFill>
               </a:rPr>
-              <a:t> Chosen: 2</a:t>
+              <a:t> Chosen: 4</a:t>
             </a:r>
           </a:p>
           <a:p>
@@ -8919,7 +10164,7 @@
                   <a:srgbClr val="7030A0"/>
                 </a:solidFill>
               </a:rPr>
-              <a:t>Pilots Chosen: 1, 3</a:t>
+              <a:t>Pilots Chosen: 17, 5, 6, 7</a:t>
             </a:r>
           </a:p>
           <a:p>
@@ -8929,7 +10174,7 @@
                   <a:srgbClr val="7030A0"/>
                 </a:solidFill>
               </a:rPr>
-              <a:t>Number of Missiles Chosen: 2</a:t>
+              <a:t>Number of Missiles Chosen: 4</a:t>
             </a:r>
           </a:p>
           <a:p>
@@ -8939,7 +10184,7 @@
                   <a:srgbClr val="7030A0"/>
                 </a:solidFill>
               </a:rPr>
-              <a:t>Missiles Chosen: 4, 5</a:t>
+              <a:t>Missiles Chosen: 12, 13, 7, 8</a:t>
             </a:r>
           </a:p>
           <a:p>
@@ -8949,7 +10194,7 @@
                   <a:srgbClr val="7030A0"/>
                 </a:solidFill>
               </a:rPr>
-              <a:t>Number of Missiles Needed: 2</a:t>
+              <a:t>Number of Missiles Needed: 7</a:t>
             </a:r>
           </a:p>
           <a:p>
@@ -8959,138 +10204,7 @@
                   <a:srgbClr val="7030A0"/>
                 </a:solidFill>
               </a:rPr>
-              <a:t>Number of Missiles Remaining: 4</a:t>
-            </a:r>
-          </a:p>
-          <a:p>
-            <a:endParaRPr lang="en-US" sz="800" dirty="0">
-              <a:solidFill>
-                <a:srgbClr val="7030A0"/>
-              </a:solidFill>
-            </a:endParaRPr>
-          </a:p>
-          <a:p>
-            <a:r>
-              <a:rPr lang="en-US" sz="800" dirty="0">
-                <a:solidFill>
-                  <a:srgbClr val="7030A0"/>
-                </a:solidFill>
-              </a:rPr>
-              <a:t>Sortie 6 for Target: 2</a:t>
-            </a:r>
-          </a:p>
-          <a:p>
-            <a:r>
-              <a:rPr lang="en-US" sz="800" dirty="0">
-                <a:solidFill>
-                  <a:srgbClr val="7030A0"/>
-                </a:solidFill>
-              </a:rPr>
-              <a:t>Mission Start Time (</a:t>
-            </a:r>
-            <a:r>
-              <a:rPr lang="en-US" sz="800" dirty="0" err="1">
-                <a:solidFill>
-                  <a:srgbClr val="7030A0"/>
-                </a:solidFill>
-              </a:rPr>
-              <a:t>hrs</a:t>
-            </a:r>
-            <a:r>
-              <a:rPr lang="en-US" sz="800" dirty="0">
-                <a:solidFill>
-                  <a:srgbClr val="7030A0"/>
-                </a:solidFill>
-              </a:rPr>
-              <a:t>): 51</a:t>
-            </a:r>
-          </a:p>
-          <a:p>
-            <a:r>
-              <a:rPr lang="en-US" sz="800" dirty="0">
-                <a:solidFill>
-                  <a:srgbClr val="7030A0"/>
-                </a:solidFill>
-              </a:rPr>
-              <a:t>Carrier Chosen: 2</a:t>
-            </a:r>
-          </a:p>
-          <a:p>
-            <a:r>
-              <a:rPr lang="en-US" sz="800" dirty="0">
-                <a:solidFill>
-                  <a:srgbClr val="7030A0"/>
-                </a:solidFill>
-              </a:rPr>
-              <a:t>Jets Chosen: 12, 13, 15</a:t>
-            </a:r>
-          </a:p>
-          <a:p>
-            <a:r>
-              <a:rPr lang="en-US" sz="800" dirty="0" err="1">
-                <a:solidFill>
-                  <a:srgbClr val="7030A0"/>
-                </a:solidFill>
-              </a:rPr>
-              <a:t>Helo</a:t>
-            </a:r>
-            <a:r>
-              <a:rPr lang="en-US" sz="800" dirty="0">
-                <a:solidFill>
-                  <a:srgbClr val="7030A0"/>
-                </a:solidFill>
-              </a:rPr>
-              <a:t> Chosen: 3</a:t>
-            </a:r>
-          </a:p>
-          <a:p>
-            <a:r>
-              <a:rPr lang="en-US" sz="800" dirty="0">
-                <a:solidFill>
-                  <a:srgbClr val="7030A0"/>
-                </a:solidFill>
-              </a:rPr>
-              <a:t>Pilots Chosen: 19, 20</a:t>
-            </a:r>
-          </a:p>
-          <a:p>
-            <a:r>
-              <a:rPr lang="en-US" sz="800" dirty="0">
-                <a:solidFill>
-                  <a:srgbClr val="7030A0"/>
-                </a:solidFill>
-              </a:rPr>
-              <a:t>Number of Missiles Chosen: 3</a:t>
-            </a:r>
-          </a:p>
-          <a:p>
-            <a:r>
-              <a:rPr lang="en-US" sz="800" dirty="0">
-                <a:solidFill>
-                  <a:srgbClr val="7030A0"/>
-                </a:solidFill>
-              </a:rPr>
-              <a:t>Missiles Chosen: 13, 6, 7</a:t>
-            </a:r>
-          </a:p>
-          <a:p>
-            <a:r>
-              <a:rPr lang="en-US" sz="800" dirty="0">
-                <a:solidFill>
-                  <a:srgbClr val="7030A0"/>
-                </a:solidFill>
-              </a:rPr>
-              <a:t>Number of Missiles Needed: 3</a:t>
-            </a:r>
-          </a:p>
-          <a:p>
-            <a:r>
-              <a:rPr lang="en-US" sz="800" dirty="0">
-                <a:solidFill>
-                  <a:srgbClr val="7030A0"/>
-                </a:solidFill>
-              </a:rPr>
-              <a:t>Number of Missiles Remaining: 1</a:t>
+              <a:t>Number of Missiles Remaining: 0</a:t>
             </a:r>
           </a:p>
         </p:txBody>
@@ -9104,7 +10218,7 @@
         <p:spPr>
           <a:xfrm>
             <a:off x="8727726" y="767358"/>
-            <a:ext cx="3207642" cy="923330"/>
+            <a:ext cx="3207642" cy="784830"/>
           </a:xfrm>
           <a:prstGeom prst="rect">
             <a:avLst/>
@@ -9130,12 +10244,20 @@
                   <a:srgbClr val="7030A0"/>
                 </a:solidFill>
               </a:rPr>
-              <a:t>Target Strike Order: 5  6  4  3  1  2</a:t>
-            </a:r>
-          </a:p>
-          <a:p>
-            <a:r>
-              <a:rPr lang="en-US" sz="900" dirty="0" err="1">
+              <a:t>Target Strike Order: 3  4  2  1  5  </a:t>
+            </a:r>
+            <a:r>
+              <a:rPr lang="en-US" sz="900" dirty="0" smtClean="0">
+                <a:solidFill>
+                  <a:srgbClr val="7030A0"/>
+                </a:solidFill>
+              </a:rPr>
+              <a:t>6</a:t>
+            </a:r>
+          </a:p>
+          <a:p>
+            <a:r>
+              <a:rPr lang="en-US" sz="900" dirty="0" err="1" smtClean="0">
                 <a:solidFill>
                   <a:srgbClr val="7030A0"/>
                 </a:solidFill>
@@ -9143,12 +10265,20 @@
               <a:t>Num</a:t>
             </a:r>
             <a:r>
+              <a:rPr lang="en-US" sz="900" dirty="0" smtClean="0">
+                <a:solidFill>
+                  <a:srgbClr val="7030A0"/>
+                </a:solidFill>
+              </a:rPr>
+              <a:t> </a:t>
+            </a:r>
+            <a:r>
               <a:rPr lang="en-US" sz="900" dirty="0">
                 <a:solidFill>
                   <a:srgbClr val="7030A0"/>
                 </a:solidFill>
               </a:rPr>
-              <a:t> Missiles Needed for 90% Success Disabling Target: 3</a:t>
+              <a:t>Missiles Needed for 90% Success Disabling Target: 3</a:t>
             </a:r>
           </a:p>
           <a:p>
@@ -9191,25 +10321,7 @@
                   <a:srgbClr val="7030A0"/>
                 </a:solidFill>
               </a:rPr>
-              <a:t> Missiles Needed for each Target: 3  3  3  3  7  3</a:t>
-            </a:r>
-          </a:p>
-          <a:p>
-            <a:r>
-              <a:rPr lang="en-US" sz="900" dirty="0" err="1">
-                <a:solidFill>
-                  <a:srgbClr val="7030A0"/>
-                </a:solidFill>
-              </a:rPr>
-              <a:t>Num</a:t>
-            </a:r>
-            <a:r>
-              <a:rPr lang="en-US" sz="900" dirty="0">
-                <a:solidFill>
-                  <a:srgbClr val="7030A0"/>
-                </a:solidFill>
-              </a:rPr>
-              <a:t> Missiles Actually Used for each Target: 2  1  1  3  2  3</a:t>
+              <a:t> Missiles Needed for each Target: 3  3  3  7  0  0</a:t>
             </a:r>
           </a:p>
         </p:txBody>
@@ -9223,7 +10335,7 @@
         <p:spPr>
           <a:xfrm>
             <a:off x="8727726" y="1782800"/>
-            <a:ext cx="1584959" cy="4278094"/>
+            <a:ext cx="1584959" cy="2800767"/>
           </a:xfrm>
           <a:prstGeom prst="rect">
             <a:avLst/>
@@ -9249,7 +10361,7 @@
                   <a:srgbClr val="7030A0"/>
                 </a:solidFill>
               </a:rPr>
-              <a:t>Sortie 1 for Target: 5</a:t>
+              <a:t>Sortie 1 for Target: 3</a:t>
             </a:r>
           </a:p>
           <a:p>
@@ -9295,7 +10407,7 @@
                   <a:srgbClr val="7030A0"/>
                 </a:solidFill>
               </a:rPr>
-              <a:t>Jets Chosen: 2, 3</a:t>
+              <a:t>Jets Chosen: 2, 3, 4</a:t>
             </a:r>
           </a:p>
           <a:p>
@@ -9333,7 +10445,7 @@
                   <a:srgbClr val="7030A0"/>
                 </a:solidFill>
               </a:rPr>
-              <a:t>Number of Missiles Chosen: 2</a:t>
+              <a:t>Number of Missiles Chosen: 3</a:t>
             </a:r>
           </a:p>
           <a:p>
@@ -9343,7 +10455,7 @@
                   <a:srgbClr val="7030A0"/>
                 </a:solidFill>
               </a:rPr>
-              <a:t>Missiles Chosen: 1, 2</a:t>
+              <a:t>Missiles Chosen: 1, 2, 3</a:t>
             </a:r>
           </a:p>
           <a:p>
@@ -9353,7 +10465,7 @@
                   <a:srgbClr val="7030A0"/>
                 </a:solidFill>
               </a:rPr>
-              <a:t>Number of Missiles Needed: 2</a:t>
+              <a:t>Number of Missiles Needed: 3</a:t>
             </a:r>
           </a:p>
           <a:p>
@@ -9363,7 +10475,7 @@
                   <a:srgbClr val="7030A0"/>
                 </a:solidFill>
               </a:rPr>
-              <a:t>Number of Missiles Remaining: 11</a:t>
+              <a:t>Number of Missiles Remaining: 10</a:t>
             </a:r>
           </a:p>
           <a:p>
@@ -9380,7 +10492,7 @@
                   <a:srgbClr val="7030A0"/>
                 </a:solidFill>
               </a:rPr>
-              <a:t>Sortie 2 for Target: 6</a:t>
+              <a:t>Sortie 2 for Target: 4</a:t>
             </a:r>
           </a:p>
           <a:p>
@@ -9406,7 +10518,7 @@
                   <a:srgbClr val="7030A0"/>
                 </a:solidFill>
               </a:rPr>
-              <a:t>): 8</a:t>
+              <a:t>): 6</a:t>
             </a:r>
           </a:p>
           <a:p>
@@ -9426,7 +10538,7 @@
                   <a:srgbClr val="7030A0"/>
                 </a:solidFill>
               </a:rPr>
-              <a:t>Jets Chosen: 4, 5</a:t>
+              <a:t>Jets Chosen: 4, 5, 6</a:t>
             </a:r>
           </a:p>
           <a:p>
@@ -9464,7 +10576,7 @@
                   <a:srgbClr val="7030A0"/>
                 </a:solidFill>
               </a:rPr>
-              <a:t>Number of Missiles Chosen: 1</a:t>
+              <a:t>Number of Missiles Chosen: 3</a:t>
             </a:r>
           </a:p>
           <a:p>
@@ -9474,7 +10586,7 @@
                   <a:srgbClr val="7030A0"/>
                 </a:solidFill>
               </a:rPr>
-              <a:t>Missiles Chosen: 3</a:t>
+              <a:t>Missiles Chosen: 4, 5, 6</a:t>
             </a:r>
           </a:p>
           <a:p>
@@ -9484,7 +10596,7 @@
                   <a:srgbClr val="7030A0"/>
                 </a:solidFill>
               </a:rPr>
-              <a:t>Number of Missiles Needed: 1</a:t>
+              <a:t>Number of Missiles Needed: 3</a:t>
             </a:r>
           </a:p>
           <a:p>
@@ -9494,138 +10606,7 @@
                   <a:srgbClr val="7030A0"/>
                 </a:solidFill>
               </a:rPr>
-              <a:t>Number of Missiles Remaining: 10</a:t>
-            </a:r>
-          </a:p>
-          <a:p>
-            <a:endParaRPr lang="en-US" sz="800" dirty="0">
-              <a:solidFill>
-                <a:srgbClr val="7030A0"/>
-              </a:solidFill>
-            </a:endParaRPr>
-          </a:p>
-          <a:p>
-            <a:r>
-              <a:rPr lang="en-US" sz="800" dirty="0">
-                <a:solidFill>
-                  <a:srgbClr val="7030A0"/>
-                </a:solidFill>
-              </a:rPr>
-              <a:t>Sortie 3 for Target: 4</a:t>
-            </a:r>
-          </a:p>
-          <a:p>
-            <a:r>
-              <a:rPr lang="en-US" sz="800" dirty="0">
-                <a:solidFill>
-                  <a:srgbClr val="7030A0"/>
-                </a:solidFill>
-              </a:rPr>
-              <a:t>Mission Start Time (</a:t>
-            </a:r>
-            <a:r>
-              <a:rPr lang="en-US" sz="800" dirty="0" err="1">
-                <a:solidFill>
-                  <a:srgbClr val="7030A0"/>
-                </a:solidFill>
-              </a:rPr>
-              <a:t>hrs</a:t>
-            </a:r>
-            <a:r>
-              <a:rPr lang="en-US" sz="800" dirty="0">
-                <a:solidFill>
-                  <a:srgbClr val="7030A0"/>
-                </a:solidFill>
-              </a:rPr>
-              <a:t>): 14</a:t>
-            </a:r>
-          </a:p>
-          <a:p>
-            <a:r>
-              <a:rPr lang="en-US" sz="800" dirty="0">
-                <a:solidFill>
-                  <a:srgbClr val="7030A0"/>
-                </a:solidFill>
-              </a:rPr>
-              <a:t>Carrier Chosen: 2</a:t>
-            </a:r>
-          </a:p>
-          <a:p>
-            <a:r>
-              <a:rPr lang="en-US" sz="800" dirty="0">
-                <a:solidFill>
-                  <a:srgbClr val="7030A0"/>
-                </a:solidFill>
-              </a:rPr>
-              <a:t>Jets Chosen: 12, 13</a:t>
-            </a:r>
-          </a:p>
-          <a:p>
-            <a:r>
-              <a:rPr lang="en-US" sz="800" dirty="0" err="1">
-                <a:solidFill>
-                  <a:srgbClr val="7030A0"/>
-                </a:solidFill>
-              </a:rPr>
-              <a:t>Helo</a:t>
-            </a:r>
-            <a:r>
-              <a:rPr lang="en-US" sz="800" dirty="0">
-                <a:solidFill>
-                  <a:srgbClr val="7030A0"/>
-                </a:solidFill>
-              </a:rPr>
-              <a:t> Chosen: 3</a:t>
-            </a:r>
-          </a:p>
-          <a:p>
-            <a:r>
-              <a:rPr lang="en-US" sz="800" dirty="0">
-                <a:solidFill>
-                  <a:srgbClr val="7030A0"/>
-                </a:solidFill>
-              </a:rPr>
-              <a:t>Pilots Chosen: 15, 16</a:t>
-            </a:r>
-          </a:p>
-          <a:p>
-            <a:r>
-              <a:rPr lang="en-US" sz="800" dirty="0">
-                <a:solidFill>
-                  <a:srgbClr val="7030A0"/>
-                </a:solidFill>
-              </a:rPr>
-              <a:t>Number of Missiles Chosen: 1</a:t>
-            </a:r>
-          </a:p>
-          <a:p>
-            <a:r>
-              <a:rPr lang="en-US" sz="800" dirty="0">
-                <a:solidFill>
-                  <a:srgbClr val="7030A0"/>
-                </a:solidFill>
-              </a:rPr>
-              <a:t>Missiles Chosen: 9</a:t>
-            </a:r>
-          </a:p>
-          <a:p>
-            <a:r>
-              <a:rPr lang="en-US" sz="800" dirty="0">
-                <a:solidFill>
-                  <a:srgbClr val="7030A0"/>
-                </a:solidFill>
-              </a:rPr>
-              <a:t>Number of Missiles Needed: 1</a:t>
-            </a:r>
-          </a:p>
-          <a:p>
-            <a:r>
-              <a:rPr lang="en-US" sz="800" dirty="0">
-                <a:solidFill>
-                  <a:srgbClr val="7030A0"/>
-                </a:solidFill>
-              </a:rPr>
-              <a:t>Number of Missiles Remaining: 9</a:t>
+              <a:t>Number of Missiles Remaining: 7</a:t>
             </a:r>
           </a:p>
         </p:txBody>
@@ -9639,7 +10620,7 @@
         <p:spPr>
           <a:xfrm>
             <a:off x="5024847" y="2204273"/>
-            <a:ext cx="3262824" cy="584775"/>
+            <a:ext cx="3262824" cy="338554"/>
           </a:xfrm>
           <a:prstGeom prst="rect">
             <a:avLst/>
@@ -9660,23 +10641,34 @@
           <a:lstStyle/>
           <a:p>
             <a:r>
+              <a:rPr lang="en-US" sz="1600" dirty="0" smtClean="0">
+                <a:solidFill>
+                  <a:srgbClr val="7030A0"/>
+                </a:solidFill>
+              </a:rPr>
+              <a:t>Number </a:t>
+            </a:r>
+            <a:r>
               <a:rPr lang="en-US" sz="1600" dirty="0">
                 <a:solidFill>
                   <a:srgbClr val="7030A0"/>
                 </a:solidFill>
               </a:rPr>
-              <a:t>Number of Casualties: 1</a:t>
-            </a:r>
-          </a:p>
-          <a:p>
-            <a:r>
-              <a:rPr lang="en-US" sz="1600" dirty="0">
-                <a:solidFill>
-                  <a:srgbClr val="7030A0"/>
-                </a:solidFill>
-              </a:rPr>
-              <a:t>Number of Targets Accounted For: 6</a:t>
-            </a:r>
+              <a:t>of Targets Accounted For: </a:t>
+            </a:r>
+            <a:r>
+              <a:rPr lang="en-US" sz="1600" dirty="0" smtClean="0">
+                <a:solidFill>
+                  <a:srgbClr val="7030A0"/>
+                </a:solidFill>
+              </a:rPr>
+              <a:t>5</a:t>
+            </a:r>
+            <a:endParaRPr lang="en-US" sz="1600" dirty="0">
+              <a:solidFill>
+                <a:srgbClr val="7030A0"/>
+              </a:solidFill>
+            </a:endParaRPr>
           </a:p>
         </p:txBody>
       </p:sp>
@@ -9715,7 +10707,7 @@
           <p:cNvPr id="2" name="Title 1">
             <a:extLst>
               <a:ext uri="{FF2B5EF4-FFF2-40B4-BE49-F238E27FC236}">
-                <a16:creationId xmlns:a16="http://schemas.microsoft.com/office/drawing/2014/main" xmlns="" id="{E29B01D6-A7CA-4A3E-9C66-C2AA33322F12}"/>
+                <a16:creationId xmlns="" xmlns:a16="http://schemas.microsoft.com/office/drawing/2014/main" id="{E29B01D6-A7CA-4A3E-9C66-C2AA33322F12}"/>
               </a:ext>
             </a:extLst>
           </p:cNvPr>
@@ -9743,7 +10735,7 @@
           <p:cNvPr id="3" name="Content Placeholder 2">
             <a:extLst>
               <a:ext uri="{FF2B5EF4-FFF2-40B4-BE49-F238E27FC236}">
-                <a16:creationId xmlns:a16="http://schemas.microsoft.com/office/drawing/2014/main" xmlns="" id="{F1842140-4ACB-41A9-BC7F-30570259E5D8}"/>
+                <a16:creationId xmlns="" xmlns:a16="http://schemas.microsoft.com/office/drawing/2014/main" id="{F1842140-4ACB-41A9-BC7F-30570259E5D8}"/>
               </a:ext>
             </a:extLst>
           </p:cNvPr>
@@ -9844,7 +10836,7 @@
           <p:cNvPr id="4" name="Footer Placeholder 3">
             <a:extLst>
               <a:ext uri="{FF2B5EF4-FFF2-40B4-BE49-F238E27FC236}">
-                <a16:creationId xmlns:a16="http://schemas.microsoft.com/office/drawing/2014/main" xmlns="" id="{C401FFE3-F414-4CF5-AD6A-9C2DE5116ED4}"/>
+                <a16:creationId xmlns="" xmlns:a16="http://schemas.microsoft.com/office/drawing/2014/main" id="{C401FFE3-F414-4CF5-AD6A-9C2DE5116ED4}"/>
               </a:ext>
             </a:extLst>
           </p:cNvPr>
@@ -9925,7 +10917,11 @@
             </a:r>
             <a:r>
               <a:rPr lang="en-US" dirty="0" smtClean="0"/>
-              <a:t>Page (1)</a:t>
+              <a:t>Page </a:t>
+            </a:r>
+            <a:r>
+              <a:rPr lang="en-US" dirty="0" smtClean="0"/>
+              <a:t>– Mission Set-Up</a:t>
             </a:r>
             <a:endParaRPr lang="en-US" dirty="0"/>
           </a:p>

</xml_diff>

<commit_message>
Changed button labels and power point changes
</commit_message>
<xml_diff>
--- a/TeamEJJ.pptx
+++ b/TeamEJJ.pptx
@@ -5,10 +5,10 @@
     <p:sldMasterId id="2147483660" r:id="rId1"/>
   </p:sldMasterIdLst>
   <p:notesMasterIdLst>
-    <p:notesMasterId r:id="rId28"/>
+    <p:notesMasterId r:id="rId25"/>
   </p:notesMasterIdLst>
   <p:handoutMasterIdLst>
-    <p:handoutMasterId r:id="rId29"/>
+    <p:handoutMasterId r:id="rId26"/>
   </p:handoutMasterIdLst>
   <p:sldIdLst>
     <p:sldId id="256" r:id="rId2"/>
@@ -24,19 +24,16 @@
     <p:sldId id="268" r:id="rId12"/>
     <p:sldId id="275" r:id="rId13"/>
     <p:sldId id="269" r:id="rId14"/>
-    <p:sldId id="284" r:id="rId15"/>
-    <p:sldId id="277" r:id="rId16"/>
-    <p:sldId id="278" r:id="rId17"/>
-    <p:sldId id="282" r:id="rId18"/>
-    <p:sldId id="283" r:id="rId19"/>
-    <p:sldId id="266" r:id="rId20"/>
-    <p:sldId id="259" r:id="rId21"/>
-    <p:sldId id="281" r:id="rId22"/>
-    <p:sldId id="280" r:id="rId23"/>
-    <p:sldId id="271" r:id="rId24"/>
-    <p:sldId id="270" r:id="rId25"/>
-    <p:sldId id="272" r:id="rId26"/>
-    <p:sldId id="273" r:id="rId27"/>
+    <p:sldId id="282" r:id="rId15"/>
+    <p:sldId id="283" r:id="rId16"/>
+    <p:sldId id="266" r:id="rId17"/>
+    <p:sldId id="259" r:id="rId18"/>
+    <p:sldId id="281" r:id="rId19"/>
+    <p:sldId id="280" r:id="rId20"/>
+    <p:sldId id="271" r:id="rId21"/>
+    <p:sldId id="270" r:id="rId22"/>
+    <p:sldId id="272" r:id="rId23"/>
+    <p:sldId id="273" r:id="rId24"/>
   </p:sldIdLst>
   <p:sldSz cx="12192000" cy="6858000"/>
   <p:notesSz cx="6858000" cy="9144000"/>
@@ -173,7 +170,7 @@
           <p:cNvPr id="2" name="Header Placeholder 1">
             <a:extLst>
               <a:ext uri="{FF2B5EF4-FFF2-40B4-BE49-F238E27FC236}">
-                <a16:creationId xmlns="" xmlns:a16="http://schemas.microsoft.com/office/drawing/2014/main" id="{4958D19B-78E4-413E-BC66-293646D7CD75}"/>
+                <a16:creationId xmlns:a16="http://schemas.microsoft.com/office/drawing/2014/main" id="{4958D19B-78E4-413E-BC66-293646D7CD75}"/>
               </a:ext>
             </a:extLst>
           </p:cNvPr>
@@ -210,7 +207,7 @@
           <p:cNvPr id="3" name="Date Placeholder 2">
             <a:extLst>
               <a:ext uri="{FF2B5EF4-FFF2-40B4-BE49-F238E27FC236}">
-                <a16:creationId xmlns="" xmlns:a16="http://schemas.microsoft.com/office/drawing/2014/main" id="{0969C5F0-82EE-47A5-8B10-9CE8E0B7BD22}"/>
+                <a16:creationId xmlns:a16="http://schemas.microsoft.com/office/drawing/2014/main" id="{0969C5F0-82EE-47A5-8B10-9CE8E0B7BD22}"/>
               </a:ext>
             </a:extLst>
           </p:cNvPr>
@@ -251,7 +248,7 @@
           <p:cNvPr id="4" name="Footer Placeholder 3">
             <a:extLst>
               <a:ext uri="{FF2B5EF4-FFF2-40B4-BE49-F238E27FC236}">
-                <a16:creationId xmlns="" xmlns:a16="http://schemas.microsoft.com/office/drawing/2014/main" id="{CD4B4307-B935-42D7-8F93-99E51A1CF54D}"/>
+                <a16:creationId xmlns:a16="http://schemas.microsoft.com/office/drawing/2014/main" id="{CD4B4307-B935-42D7-8F93-99E51A1CF54D}"/>
               </a:ext>
             </a:extLst>
           </p:cNvPr>
@@ -288,7 +285,7 @@
           <p:cNvPr id="5" name="Slide Number Placeholder 4">
             <a:extLst>
               <a:ext uri="{FF2B5EF4-FFF2-40B4-BE49-F238E27FC236}">
-                <a16:creationId xmlns="" xmlns:a16="http://schemas.microsoft.com/office/drawing/2014/main" id="{A9A5BBCE-64A3-4221-B231-485756321F03}"/>
+                <a16:creationId xmlns:a16="http://schemas.microsoft.com/office/drawing/2014/main" id="{A9A5BBCE-64A3-4221-B231-485756321F03}"/>
               </a:ext>
             </a:extLst>
           </p:cNvPr>
@@ -3590,7 +3587,7 @@
           <p:cNvPr id="2" name="Title 1">
             <a:extLst>
               <a:ext uri="{FF2B5EF4-FFF2-40B4-BE49-F238E27FC236}">
-                <a16:creationId xmlns="" xmlns:a16="http://schemas.microsoft.com/office/drawing/2014/main" id="{BA01E277-331D-47A2-8EA1-4BF83C281FCD}"/>
+                <a16:creationId xmlns:a16="http://schemas.microsoft.com/office/drawing/2014/main" id="{BA01E277-331D-47A2-8EA1-4BF83C281FCD}"/>
               </a:ext>
             </a:extLst>
           </p:cNvPr>
@@ -3662,7 +3659,7 @@
           <p:cNvPr id="5" name="Footer Placeholder 4">
             <a:extLst>
               <a:ext uri="{FF2B5EF4-FFF2-40B4-BE49-F238E27FC236}">
-                <a16:creationId xmlns="" xmlns:a16="http://schemas.microsoft.com/office/drawing/2014/main" id="{25C38D51-E1A2-4B23-AFC5-FC39CBEE7E5B}"/>
+                <a16:creationId xmlns:a16="http://schemas.microsoft.com/office/drawing/2014/main" id="{25C38D51-E1A2-4B23-AFC5-FC39CBEE7E5B}"/>
               </a:ext>
             </a:extLst>
           </p:cNvPr>
@@ -3693,7 +3690,7 @@
           <p:cNvPr id="1030" name="Picture 6" descr="Gypsy Curse">
             <a:extLst>
               <a:ext uri="{FF2B5EF4-FFF2-40B4-BE49-F238E27FC236}">
-                <a16:creationId xmlns="" xmlns:a16="http://schemas.microsoft.com/office/drawing/2014/main" id="{B8F9B0D6-6EDF-434B-B198-FE7ED42FDBD8}"/>
+                <a16:creationId xmlns:a16="http://schemas.microsoft.com/office/drawing/2014/main" id="{B8F9B0D6-6EDF-434B-B198-FE7ED42FDBD8}"/>
               </a:ext>
             </a:extLst>
           </p:cNvPr>
@@ -3770,7 +3767,7 @@
           <p:cNvPr id="2" name="Title 1">
             <a:extLst>
               <a:ext uri="{FF2B5EF4-FFF2-40B4-BE49-F238E27FC236}">
-                <a16:creationId xmlns="" xmlns:a16="http://schemas.microsoft.com/office/drawing/2014/main" id="{E29B01D6-A7CA-4A3E-9C66-C2AA33322F12}"/>
+                <a16:creationId xmlns:a16="http://schemas.microsoft.com/office/drawing/2014/main" id="{E29B01D6-A7CA-4A3E-9C66-C2AA33322F12}"/>
               </a:ext>
             </a:extLst>
           </p:cNvPr>
@@ -3798,7 +3795,7 @@
           <p:cNvPr id="3" name="Content Placeholder 2">
             <a:extLst>
               <a:ext uri="{FF2B5EF4-FFF2-40B4-BE49-F238E27FC236}">
-                <a16:creationId xmlns="" xmlns:a16="http://schemas.microsoft.com/office/drawing/2014/main" id="{F1842140-4ACB-41A9-BC7F-30570259E5D8}"/>
+                <a16:creationId xmlns:a16="http://schemas.microsoft.com/office/drawing/2014/main" id="{F1842140-4ACB-41A9-BC7F-30570259E5D8}"/>
               </a:ext>
             </a:extLst>
           </p:cNvPr>
@@ -3872,7 +3869,7 @@
           <p:cNvPr id="4" name="Footer Placeholder 3">
             <a:extLst>
               <a:ext uri="{FF2B5EF4-FFF2-40B4-BE49-F238E27FC236}">
-                <a16:creationId xmlns="" xmlns:a16="http://schemas.microsoft.com/office/drawing/2014/main" id="{C401FFE3-F414-4CF5-AD6A-9C2DE5116ED4}"/>
+                <a16:creationId xmlns:a16="http://schemas.microsoft.com/office/drawing/2014/main" id="{C401FFE3-F414-4CF5-AD6A-9C2DE5116ED4}"/>
               </a:ext>
             </a:extLst>
           </p:cNvPr>
@@ -3937,7 +3934,7 @@
           <p:cNvPr id="2" name="Title 1">
             <a:extLst>
               <a:ext uri="{FF2B5EF4-FFF2-40B4-BE49-F238E27FC236}">
-                <a16:creationId xmlns="" xmlns:a16="http://schemas.microsoft.com/office/drawing/2014/main" id="{E29B01D6-A7CA-4A3E-9C66-C2AA33322F12}"/>
+                <a16:creationId xmlns:a16="http://schemas.microsoft.com/office/drawing/2014/main" id="{E29B01D6-A7CA-4A3E-9C66-C2AA33322F12}"/>
               </a:ext>
             </a:extLst>
           </p:cNvPr>
@@ -3965,7 +3962,7 @@
           <p:cNvPr id="3" name="Content Placeholder 2">
             <a:extLst>
               <a:ext uri="{FF2B5EF4-FFF2-40B4-BE49-F238E27FC236}">
-                <a16:creationId xmlns="" xmlns:a16="http://schemas.microsoft.com/office/drawing/2014/main" id="{F1842140-4ACB-41A9-BC7F-30570259E5D8}"/>
+                <a16:creationId xmlns:a16="http://schemas.microsoft.com/office/drawing/2014/main" id="{F1842140-4ACB-41A9-BC7F-30570259E5D8}"/>
               </a:ext>
             </a:extLst>
           </p:cNvPr>
@@ -3979,7 +3976,7 @@
         <p:spPr/>
         <p:txBody>
           <a:bodyPr>
-            <a:normAutofit/>
+            <a:normAutofit lnSpcReduction="10000"/>
           </a:bodyPr>
           <a:lstStyle/>
           <a:p>
@@ -4020,6 +4017,20 @@
             <a:r>
               <a:rPr lang="en-US" dirty="0"/>
               <a:t>There are constraints for how much the bars can be dragged and extended/shortened</a:t>
+            </a:r>
+          </a:p>
+          <a:p>
+            <a:pPr lvl="2"/>
+            <a:r>
+              <a:rPr lang="en-US" dirty="0"/>
+              <a:t>Sortie time will be colored RED if it’s not valid given the constraints</a:t>
+            </a:r>
+          </a:p>
+          <a:p>
+            <a:pPr lvl="2"/>
+            <a:r>
+              <a:rPr lang="en-US" dirty="0"/>
+              <a:t>Chance of success updates automatically with each adjustment</a:t>
             </a:r>
           </a:p>
         </p:txBody>
@@ -4029,7 +4040,7 @@
           <p:cNvPr id="4" name="Footer Placeholder 3">
             <a:extLst>
               <a:ext uri="{FF2B5EF4-FFF2-40B4-BE49-F238E27FC236}">
-                <a16:creationId xmlns="" xmlns:a16="http://schemas.microsoft.com/office/drawing/2014/main" id="{C401FFE3-F414-4CF5-AD6A-9C2DE5116ED4}"/>
+                <a16:creationId xmlns:a16="http://schemas.microsoft.com/office/drawing/2014/main" id="{C401FFE3-F414-4CF5-AD6A-9C2DE5116ED4}"/>
               </a:ext>
             </a:extLst>
           </p:cNvPr>
@@ -4106,13 +4117,8 @@
           <a:p>
             <a:r>
               <a:rPr lang="en-US" dirty="0"/>
-              <a:t>EJJ Web Page </a:t>
-            </a:r>
-            <a:r>
-              <a:rPr lang="en-US" dirty="0" smtClean="0"/>
-              <a:t>– Output Schedule</a:t>
-            </a:r>
-            <a:endParaRPr lang="en-US" dirty="0"/>
+              <a:t>EJJ Web Page – Output Schedule</a:t>
+            </a:r>
           </a:p>
         </p:txBody>
       </p:sp>
@@ -4150,7 +4156,7 @@
           <p:cNvPr id="9" name="Picture 8">
             <a:extLst>
               <a:ext uri="{FF2B5EF4-FFF2-40B4-BE49-F238E27FC236}">
-                <a16:creationId xmlns="" xmlns:a16="http://schemas.microsoft.com/office/drawing/2014/main" id="{8FF5839C-26EA-45D4-A43D-5FDEE1086692}"/>
+                <a16:creationId xmlns:a16="http://schemas.microsoft.com/office/drawing/2014/main" id="{8FF5839C-26EA-45D4-A43D-5FDEE1086692}"/>
               </a:ext>
             </a:extLst>
           </p:cNvPr>
@@ -4159,16 +4165,15 @@
           </p:cNvPicPr>
           <p:nvPr/>
         </p:nvPicPr>
-        <p:blipFill>
+        <p:blipFill rotWithShape="1">
           <a:blip r:embed="rId2"/>
-          <a:stretch>
-            <a:fillRect/>
-          </a:stretch>
+          <a:srcRect b="11795"/>
+          <a:stretch/>
         </p:blipFill>
         <p:spPr>
           <a:xfrm>
-            <a:off x="2471966" y="1457060"/>
-            <a:ext cx="7248067" cy="4899290"/>
+            <a:off x="1797050" y="1331647"/>
+            <a:ext cx="8437333" cy="5030504"/>
           </a:xfrm>
           <a:prstGeom prst="rect">
             <a:avLst/>
@@ -4210,7 +4215,7 @@
           <p:cNvPr id="2" name="Title 1">
             <a:extLst>
               <a:ext uri="{FF2B5EF4-FFF2-40B4-BE49-F238E27FC236}">
-                <a16:creationId xmlns="" xmlns:a16="http://schemas.microsoft.com/office/drawing/2014/main" id="{E29B01D6-A7CA-4A3E-9C66-C2AA33322F12}"/>
+                <a16:creationId xmlns:a16="http://schemas.microsoft.com/office/drawing/2014/main" id="{E29B01D6-A7CA-4A3E-9C66-C2AA33322F12}"/>
               </a:ext>
             </a:extLst>
           </p:cNvPr>
@@ -4238,7 +4243,7 @@
           <p:cNvPr id="3" name="Content Placeholder 2">
             <a:extLst>
               <a:ext uri="{FF2B5EF4-FFF2-40B4-BE49-F238E27FC236}">
-                <a16:creationId xmlns="" xmlns:a16="http://schemas.microsoft.com/office/drawing/2014/main" id="{F1842140-4ACB-41A9-BC7F-30570259E5D8}"/>
+                <a16:creationId xmlns:a16="http://schemas.microsoft.com/office/drawing/2014/main" id="{F1842140-4ACB-41A9-BC7F-30570259E5D8}"/>
               </a:ext>
             </a:extLst>
           </p:cNvPr>
@@ -4353,7 +4358,7 @@
           <p:cNvPr id="4" name="Footer Placeholder 3">
             <a:extLst>
               <a:ext uri="{FF2B5EF4-FFF2-40B4-BE49-F238E27FC236}">
-                <a16:creationId xmlns="" xmlns:a16="http://schemas.microsoft.com/office/drawing/2014/main" id="{C401FFE3-F414-4CF5-AD6A-9C2DE5116ED4}"/>
+                <a16:creationId xmlns:a16="http://schemas.microsoft.com/office/drawing/2014/main" id="{C401FFE3-F414-4CF5-AD6A-9C2DE5116ED4}"/>
               </a:ext>
             </a:extLst>
           </p:cNvPr>
@@ -4413,1698 +4418,12 @@
           <a:chExt cx="0" cy="0"/>
         </a:xfrm>
       </p:grpSpPr>
-      <p:pic>
-        <p:nvPicPr>
-          <p:cNvPr id="11" name="Content Placeholder 10"/>
-          <p:cNvPicPr>
-            <a:picLocks noGrp="1" noChangeAspect="1"/>
-          </p:cNvPicPr>
-          <p:nvPr>
-            <p:ph idx="1"/>
-          </p:nvPr>
-        </p:nvPicPr>
-        <p:blipFill>
-          <a:blip r:embed="rId2"/>
-          <a:stretch>
-            <a:fillRect/>
-          </a:stretch>
-        </p:blipFill>
-        <p:spPr>
-          <a:xfrm>
-            <a:off x="307690" y="1709556"/>
-            <a:ext cx="8284780" cy="4351338"/>
-          </a:xfrm>
-          <a:prstGeom prst="rect">
-            <a:avLst/>
-          </a:prstGeom>
-        </p:spPr>
-      </p:pic>
-      <p:sp>
-        <p:nvSpPr>
-          <p:cNvPr id="2" name="Title 1"/>
-          <p:cNvSpPr>
-            <a:spLocks noGrp="1"/>
-          </p:cNvSpPr>
-          <p:nvPr>
-            <p:ph type="title"/>
-          </p:nvPr>
-        </p:nvSpPr>
-        <p:spPr/>
-        <p:txBody>
-          <a:bodyPr>
-            <a:normAutofit/>
-          </a:bodyPr>
-          <a:lstStyle/>
-          <a:p>
-            <a:r>
-              <a:rPr lang="en-US" dirty="0"/>
-              <a:t>EJJ Example Schedule </a:t>
-            </a:r>
-            <a:r>
-              <a:rPr lang="en-US" dirty="0" smtClean="0"/>
-              <a:t>Output</a:t>
-            </a:r>
-            <a:br>
-              <a:rPr lang="en-US" dirty="0" smtClean="0"/>
-            </a:br>
-            <a:r>
-              <a:rPr lang="en-US" sz="1400" dirty="0" smtClean="0"/>
-              <a:t>With additional info on </a:t>
-            </a:r>
-            <a:r>
-              <a:rPr lang="en-US" sz="1600" dirty="0"/>
-              <a:t>casualties, jet/</a:t>
-            </a:r>
-            <a:r>
-              <a:rPr lang="en-US" sz="1600" dirty="0" err="1"/>
-              <a:t>helo</a:t>
-            </a:r>
-            <a:r>
-              <a:rPr lang="en-US" sz="1600" dirty="0"/>
-              <a:t> down times, or successful target </a:t>
-            </a:r>
-            <a:r>
-              <a:rPr lang="en-US" sz="1600" dirty="0" smtClean="0"/>
-              <a:t>strikes</a:t>
-            </a:r>
-            <a:br>
-              <a:rPr lang="en-US" sz="1600" dirty="0" smtClean="0"/>
-            </a:br>
-            <a:r>
-              <a:rPr lang="en-US" sz="1200" dirty="0" smtClean="0"/>
-              <a:t>(Able to Disable </a:t>
-            </a:r>
-            <a:r>
-              <a:rPr lang="en-US" sz="1200" dirty="0"/>
-              <a:t>Target 2, 3, </a:t>
-            </a:r>
-            <a:r>
-              <a:rPr lang="en-US" sz="1200" dirty="0" smtClean="0"/>
-              <a:t>4, 5, 6; </a:t>
-            </a:r>
-            <a:r>
-              <a:rPr lang="en-US" sz="1200" dirty="0"/>
-              <a:t>Destroy Target </a:t>
-            </a:r>
-            <a:r>
-              <a:rPr lang="en-US" sz="1200" dirty="0" smtClean="0"/>
-              <a:t>1)</a:t>
-            </a:r>
-            <a:endParaRPr lang="en-US" sz="1200" dirty="0"/>
-          </a:p>
-        </p:txBody>
-      </p:sp>
-      <p:sp>
-        <p:nvSpPr>
-          <p:cNvPr id="4" name="Footer Placeholder 3"/>
-          <p:cNvSpPr>
-            <a:spLocks noGrp="1"/>
-          </p:cNvSpPr>
-          <p:nvPr>
-            <p:ph type="ftr" sz="quarter" idx="11"/>
-          </p:nvPr>
-        </p:nvSpPr>
-        <p:spPr/>
-        <p:txBody>
-          <a:bodyPr/>
-          <a:lstStyle/>
-          <a:p>
-            <a:r>
-              <a:rPr lang="en-US">
-                <a:latin typeface="Courier New" panose="02070309020205020404" pitchFamily="49" charset="0"/>
-                <a:cs typeface="Courier New" panose="02070309020205020404" pitchFamily="49" charset="0"/>
-              </a:rPr>
-              <a:t>Team EJJ</a:t>
-            </a:r>
-            <a:endParaRPr lang="en-US" dirty="0">
-              <a:latin typeface="Courier New" panose="02070309020205020404" pitchFamily="49" charset="0"/>
-              <a:cs typeface="Courier New" panose="02070309020205020404" pitchFamily="49" charset="0"/>
-            </a:endParaRPr>
-          </a:p>
-        </p:txBody>
-      </p:sp>
-      <p:pic>
-        <p:nvPicPr>
-          <p:cNvPr id="8" name="Picture 7"/>
-          <p:cNvPicPr>
-            <a:picLocks noChangeAspect="1"/>
-          </p:cNvPicPr>
-          <p:nvPr/>
-        </p:nvPicPr>
-        <p:blipFill>
-          <a:blip r:embed="rId3"/>
-          <a:stretch>
-            <a:fillRect/>
-          </a:stretch>
-        </p:blipFill>
-        <p:spPr>
-          <a:xfrm>
-            <a:off x="4524375" y="5062130"/>
-            <a:ext cx="1571625" cy="857250"/>
-          </a:xfrm>
-          <a:prstGeom prst="rect">
-            <a:avLst/>
-          </a:prstGeom>
-        </p:spPr>
-      </p:pic>
-      <p:sp>
-        <p:nvSpPr>
-          <p:cNvPr id="13" name="Rectangle 12"/>
-          <p:cNvSpPr/>
-          <p:nvPr/>
-        </p:nvSpPr>
-        <p:spPr>
-          <a:xfrm>
-            <a:off x="10312685" y="1782800"/>
-            <a:ext cx="1622683" cy="4278094"/>
-          </a:xfrm>
-          <a:prstGeom prst="rect">
-            <a:avLst/>
-          </a:prstGeom>
-          <a:solidFill>
-            <a:schemeClr val="bg1"/>
-          </a:solidFill>
-          <a:ln w="38100">
-            <a:solidFill>
-              <a:srgbClr val="00B050"/>
-            </a:solidFill>
-          </a:ln>
-        </p:spPr>
-        <p:txBody>
-          <a:bodyPr wrap="square">
-            <a:spAutoFit/>
-          </a:bodyPr>
-          <a:lstStyle/>
-          <a:p>
-            <a:r>
-              <a:rPr lang="en-US" sz="800" dirty="0">
-                <a:solidFill>
-                  <a:srgbClr val="7030A0"/>
-                </a:solidFill>
-              </a:rPr>
-              <a:t>Sortie 4 for Target: 3</a:t>
-            </a:r>
-          </a:p>
-          <a:p>
-            <a:r>
-              <a:rPr lang="en-US" sz="800" dirty="0">
-                <a:solidFill>
-                  <a:srgbClr val="7030A0"/>
-                </a:solidFill>
-              </a:rPr>
-              <a:t>Mission Start Time (</a:t>
-            </a:r>
-            <a:r>
-              <a:rPr lang="en-US" sz="800" dirty="0" err="1">
-                <a:solidFill>
-                  <a:srgbClr val="7030A0"/>
-                </a:solidFill>
-              </a:rPr>
-              <a:t>hrs</a:t>
-            </a:r>
-            <a:r>
-              <a:rPr lang="en-US" sz="800" dirty="0">
-                <a:solidFill>
-                  <a:srgbClr val="7030A0"/>
-                </a:solidFill>
-              </a:rPr>
-              <a:t>): 19</a:t>
-            </a:r>
-          </a:p>
-          <a:p>
-            <a:r>
-              <a:rPr lang="en-US" sz="800" dirty="0">
-                <a:solidFill>
-                  <a:srgbClr val="7030A0"/>
-                </a:solidFill>
-              </a:rPr>
-              <a:t>Carrier Chosen: 2</a:t>
-            </a:r>
-          </a:p>
-          <a:p>
-            <a:r>
-              <a:rPr lang="en-US" sz="800" dirty="0">
-                <a:solidFill>
-                  <a:srgbClr val="7030A0"/>
-                </a:solidFill>
-              </a:rPr>
-              <a:t>Jets Chosen: 14, 15, 16</a:t>
-            </a:r>
-          </a:p>
-          <a:p>
-            <a:r>
-              <a:rPr lang="en-US" sz="800" dirty="0" err="1">
-                <a:solidFill>
-                  <a:srgbClr val="7030A0"/>
-                </a:solidFill>
-              </a:rPr>
-              <a:t>Helo</a:t>
-            </a:r>
-            <a:r>
-              <a:rPr lang="en-US" sz="800" dirty="0">
-                <a:solidFill>
-                  <a:srgbClr val="7030A0"/>
-                </a:solidFill>
-              </a:rPr>
-              <a:t> Chosen: 4</a:t>
-            </a:r>
-          </a:p>
-          <a:p>
-            <a:r>
-              <a:rPr lang="en-US" sz="800" dirty="0">
-                <a:solidFill>
-                  <a:srgbClr val="7030A0"/>
-                </a:solidFill>
-              </a:rPr>
-              <a:t>Pilots Chosen: 17, 18</a:t>
-            </a:r>
-          </a:p>
-          <a:p>
-            <a:r>
-              <a:rPr lang="en-US" sz="800" dirty="0">
-                <a:solidFill>
-                  <a:srgbClr val="7030A0"/>
-                </a:solidFill>
-              </a:rPr>
-              <a:t>Number of Missiles Chosen: 3</a:t>
-            </a:r>
-          </a:p>
-          <a:p>
-            <a:r>
-              <a:rPr lang="en-US" sz="800" dirty="0">
-                <a:solidFill>
-                  <a:srgbClr val="7030A0"/>
-                </a:solidFill>
-              </a:rPr>
-              <a:t>Missiles Chosen: 10, 11, 12</a:t>
-            </a:r>
-          </a:p>
-          <a:p>
-            <a:r>
-              <a:rPr lang="en-US" sz="800" dirty="0">
-                <a:solidFill>
-                  <a:srgbClr val="7030A0"/>
-                </a:solidFill>
-              </a:rPr>
-              <a:t>Number of Missiles Needed: 3</a:t>
-            </a:r>
-          </a:p>
-          <a:p>
-            <a:r>
-              <a:rPr lang="en-US" sz="800" dirty="0">
-                <a:solidFill>
-                  <a:srgbClr val="7030A0"/>
-                </a:solidFill>
-              </a:rPr>
-              <a:t>Number of Missiles Remaining: 6</a:t>
-            </a:r>
-          </a:p>
-          <a:p>
-            <a:r>
-              <a:rPr lang="en-US" sz="800" dirty="0">
-                <a:solidFill>
-                  <a:srgbClr val="7030A0"/>
-                </a:solidFill>
-              </a:rPr>
-              <a:t>Jet 14 is killed!!!</a:t>
-            </a:r>
-          </a:p>
-          <a:p>
-            <a:r>
-              <a:rPr lang="en-US" sz="800" dirty="0">
-                <a:solidFill>
-                  <a:srgbClr val="7030A0"/>
-                </a:solidFill>
-              </a:rPr>
-              <a:t>Pilot 17 is killed!!!</a:t>
-            </a:r>
-          </a:p>
-          <a:p>
-            <a:endParaRPr lang="en-US" sz="800" dirty="0">
-              <a:solidFill>
-                <a:srgbClr val="7030A0"/>
-              </a:solidFill>
-            </a:endParaRPr>
-          </a:p>
-          <a:p>
-            <a:r>
-              <a:rPr lang="en-US" sz="800" dirty="0">
-                <a:solidFill>
-                  <a:srgbClr val="7030A0"/>
-                </a:solidFill>
-              </a:rPr>
-              <a:t>Sortie 5 for Target: 1</a:t>
-            </a:r>
-          </a:p>
-          <a:p>
-            <a:r>
-              <a:rPr lang="en-US" sz="800" dirty="0">
-                <a:solidFill>
-                  <a:srgbClr val="7030A0"/>
-                </a:solidFill>
-              </a:rPr>
-              <a:t>Mission Start Time (</a:t>
-            </a:r>
-            <a:r>
-              <a:rPr lang="en-US" sz="800" dirty="0" err="1">
-                <a:solidFill>
-                  <a:srgbClr val="7030A0"/>
-                </a:solidFill>
-              </a:rPr>
-              <a:t>hrs</a:t>
-            </a:r>
-            <a:r>
-              <a:rPr lang="en-US" sz="800" dirty="0">
-                <a:solidFill>
-                  <a:srgbClr val="7030A0"/>
-                </a:solidFill>
-              </a:rPr>
-              <a:t>): 28</a:t>
-            </a:r>
-          </a:p>
-          <a:p>
-            <a:r>
-              <a:rPr lang="en-US" sz="800" dirty="0">
-                <a:solidFill>
-                  <a:srgbClr val="7030A0"/>
-                </a:solidFill>
-              </a:rPr>
-              <a:t>Carrier Chosen: 1</a:t>
-            </a:r>
-          </a:p>
-          <a:p>
-            <a:r>
-              <a:rPr lang="en-US" sz="800" dirty="0">
-                <a:solidFill>
-                  <a:srgbClr val="7030A0"/>
-                </a:solidFill>
-              </a:rPr>
-              <a:t>Jets Chosen: 2, 3</a:t>
-            </a:r>
-          </a:p>
-          <a:p>
-            <a:r>
-              <a:rPr lang="en-US" sz="800" dirty="0" err="1">
-                <a:solidFill>
-                  <a:srgbClr val="7030A0"/>
-                </a:solidFill>
-              </a:rPr>
-              <a:t>Helo</a:t>
-            </a:r>
-            <a:r>
-              <a:rPr lang="en-US" sz="800" dirty="0">
-                <a:solidFill>
-                  <a:srgbClr val="7030A0"/>
-                </a:solidFill>
-              </a:rPr>
-              <a:t> Chosen: 2</a:t>
-            </a:r>
-          </a:p>
-          <a:p>
-            <a:r>
-              <a:rPr lang="en-US" sz="800" dirty="0">
-                <a:solidFill>
-                  <a:srgbClr val="7030A0"/>
-                </a:solidFill>
-              </a:rPr>
-              <a:t>Pilots Chosen: 1, 3</a:t>
-            </a:r>
-          </a:p>
-          <a:p>
-            <a:r>
-              <a:rPr lang="en-US" sz="800" dirty="0">
-                <a:solidFill>
-                  <a:srgbClr val="7030A0"/>
-                </a:solidFill>
-              </a:rPr>
-              <a:t>Number of Missiles Chosen: 2</a:t>
-            </a:r>
-          </a:p>
-          <a:p>
-            <a:r>
-              <a:rPr lang="en-US" sz="800" dirty="0">
-                <a:solidFill>
-                  <a:srgbClr val="7030A0"/>
-                </a:solidFill>
-              </a:rPr>
-              <a:t>Missiles Chosen: 4, 5</a:t>
-            </a:r>
-          </a:p>
-          <a:p>
-            <a:r>
-              <a:rPr lang="en-US" sz="800" dirty="0">
-                <a:solidFill>
-                  <a:srgbClr val="7030A0"/>
-                </a:solidFill>
-              </a:rPr>
-              <a:t>Number of Missiles Needed: 2</a:t>
-            </a:r>
-          </a:p>
-          <a:p>
-            <a:r>
-              <a:rPr lang="en-US" sz="800" dirty="0">
-                <a:solidFill>
-                  <a:srgbClr val="7030A0"/>
-                </a:solidFill>
-              </a:rPr>
-              <a:t>Number of Missiles Remaining: 4</a:t>
-            </a:r>
-          </a:p>
-          <a:p>
-            <a:endParaRPr lang="en-US" sz="800" dirty="0">
-              <a:solidFill>
-                <a:srgbClr val="7030A0"/>
-              </a:solidFill>
-            </a:endParaRPr>
-          </a:p>
-          <a:p>
-            <a:r>
-              <a:rPr lang="en-US" sz="800" dirty="0">
-                <a:solidFill>
-                  <a:srgbClr val="7030A0"/>
-                </a:solidFill>
-              </a:rPr>
-              <a:t>Sortie 6 for Target: 2</a:t>
-            </a:r>
-          </a:p>
-          <a:p>
-            <a:r>
-              <a:rPr lang="en-US" sz="800" dirty="0">
-                <a:solidFill>
-                  <a:srgbClr val="7030A0"/>
-                </a:solidFill>
-              </a:rPr>
-              <a:t>Mission Start Time (</a:t>
-            </a:r>
-            <a:r>
-              <a:rPr lang="en-US" sz="800" dirty="0" err="1">
-                <a:solidFill>
-                  <a:srgbClr val="7030A0"/>
-                </a:solidFill>
-              </a:rPr>
-              <a:t>hrs</a:t>
-            </a:r>
-            <a:r>
-              <a:rPr lang="en-US" sz="800" dirty="0">
-                <a:solidFill>
-                  <a:srgbClr val="7030A0"/>
-                </a:solidFill>
-              </a:rPr>
-              <a:t>): 51</a:t>
-            </a:r>
-          </a:p>
-          <a:p>
-            <a:r>
-              <a:rPr lang="en-US" sz="800" dirty="0">
-                <a:solidFill>
-                  <a:srgbClr val="7030A0"/>
-                </a:solidFill>
-              </a:rPr>
-              <a:t>Carrier Chosen: 2</a:t>
-            </a:r>
-          </a:p>
-          <a:p>
-            <a:r>
-              <a:rPr lang="en-US" sz="800" dirty="0">
-                <a:solidFill>
-                  <a:srgbClr val="7030A0"/>
-                </a:solidFill>
-              </a:rPr>
-              <a:t>Jets Chosen: 12, 13, 15</a:t>
-            </a:r>
-          </a:p>
-          <a:p>
-            <a:r>
-              <a:rPr lang="en-US" sz="800" dirty="0" err="1">
-                <a:solidFill>
-                  <a:srgbClr val="7030A0"/>
-                </a:solidFill>
-              </a:rPr>
-              <a:t>Helo</a:t>
-            </a:r>
-            <a:r>
-              <a:rPr lang="en-US" sz="800" dirty="0">
-                <a:solidFill>
-                  <a:srgbClr val="7030A0"/>
-                </a:solidFill>
-              </a:rPr>
-              <a:t> Chosen: 3</a:t>
-            </a:r>
-          </a:p>
-          <a:p>
-            <a:r>
-              <a:rPr lang="en-US" sz="800" dirty="0">
-                <a:solidFill>
-                  <a:srgbClr val="7030A0"/>
-                </a:solidFill>
-              </a:rPr>
-              <a:t>Pilots Chosen: 19, 20</a:t>
-            </a:r>
-          </a:p>
-          <a:p>
-            <a:r>
-              <a:rPr lang="en-US" sz="800" dirty="0">
-                <a:solidFill>
-                  <a:srgbClr val="7030A0"/>
-                </a:solidFill>
-              </a:rPr>
-              <a:t>Number of Missiles Chosen: 3</a:t>
-            </a:r>
-          </a:p>
-          <a:p>
-            <a:r>
-              <a:rPr lang="en-US" sz="800" dirty="0">
-                <a:solidFill>
-                  <a:srgbClr val="7030A0"/>
-                </a:solidFill>
-              </a:rPr>
-              <a:t>Missiles Chosen: 13, 6, 7</a:t>
-            </a:r>
-          </a:p>
-          <a:p>
-            <a:r>
-              <a:rPr lang="en-US" sz="800" dirty="0">
-                <a:solidFill>
-                  <a:srgbClr val="7030A0"/>
-                </a:solidFill>
-              </a:rPr>
-              <a:t>Number of Missiles Needed: 3</a:t>
-            </a:r>
-          </a:p>
-          <a:p>
-            <a:r>
-              <a:rPr lang="en-US" sz="800" dirty="0">
-                <a:solidFill>
-                  <a:srgbClr val="7030A0"/>
-                </a:solidFill>
-              </a:rPr>
-              <a:t>Number of Missiles Remaining: 1</a:t>
-            </a:r>
-          </a:p>
-        </p:txBody>
-      </p:sp>
-      <p:sp>
-        <p:nvSpPr>
-          <p:cNvPr id="14" name="Rectangle 13"/>
-          <p:cNvSpPr/>
-          <p:nvPr/>
-        </p:nvSpPr>
-        <p:spPr>
-          <a:xfrm>
-            <a:off x="8727726" y="767358"/>
-            <a:ext cx="3207642" cy="923330"/>
-          </a:xfrm>
-          <a:prstGeom prst="rect">
-            <a:avLst/>
-          </a:prstGeom>
-          <a:solidFill>
-            <a:schemeClr val="bg1"/>
-          </a:solidFill>
-          <a:ln w="38100">
-            <a:solidFill>
-              <a:srgbClr val="00B050"/>
-            </a:solidFill>
-          </a:ln>
-        </p:spPr>
-        <p:txBody>
-          <a:bodyPr wrap="square">
-            <a:spAutoFit/>
-          </a:bodyPr>
-          <a:lstStyle/>
-          <a:p>
-            <a:r>
-              <a:rPr lang="en-US" sz="900" dirty="0">
-                <a:solidFill>
-                  <a:srgbClr val="7030A0"/>
-                </a:solidFill>
-              </a:rPr>
-              <a:t>Target Strike Order: 5  6  4  3  1  2</a:t>
-            </a:r>
-          </a:p>
-          <a:p>
-            <a:r>
-              <a:rPr lang="en-US" sz="900" dirty="0" err="1">
-                <a:solidFill>
-                  <a:srgbClr val="7030A0"/>
-                </a:solidFill>
-              </a:rPr>
-              <a:t>Num</a:t>
-            </a:r>
-            <a:r>
-              <a:rPr lang="en-US" sz="900" dirty="0">
-                <a:solidFill>
-                  <a:srgbClr val="7030A0"/>
-                </a:solidFill>
-              </a:rPr>
-              <a:t> Missiles Needed for 90% Success Disabling Target: 3</a:t>
-            </a:r>
-          </a:p>
-          <a:p>
-            <a:r>
-              <a:rPr lang="en-US" sz="900" dirty="0" err="1">
-                <a:solidFill>
-                  <a:srgbClr val="7030A0"/>
-                </a:solidFill>
-              </a:rPr>
-              <a:t>Num</a:t>
-            </a:r>
-            <a:r>
-              <a:rPr lang="en-US" sz="900" dirty="0">
-                <a:solidFill>
-                  <a:srgbClr val="7030A0"/>
-                </a:solidFill>
-              </a:rPr>
-              <a:t> Missiles Needed for 90% Success Destroying Target: 7</a:t>
-            </a:r>
-          </a:p>
-          <a:p>
-            <a:endParaRPr lang="en-US" sz="900" dirty="0">
-              <a:solidFill>
-                <a:srgbClr val="7030A0"/>
-              </a:solidFill>
-            </a:endParaRPr>
-          </a:p>
-          <a:p>
-            <a:r>
-              <a:rPr lang="en-US" sz="900" dirty="0" err="1">
-                <a:solidFill>
-                  <a:srgbClr val="7030A0"/>
-                </a:solidFill>
-              </a:rPr>
-              <a:t>Num</a:t>
-            </a:r>
-            <a:r>
-              <a:rPr lang="en-US" sz="900" dirty="0">
-                <a:solidFill>
-                  <a:srgbClr val="7030A0"/>
-                </a:solidFill>
-              </a:rPr>
-              <a:t> Missiles Needed for each Target: 3  3  3  3  7  3</a:t>
-            </a:r>
-          </a:p>
-          <a:p>
-            <a:r>
-              <a:rPr lang="en-US" sz="900" dirty="0" err="1">
-                <a:solidFill>
-                  <a:srgbClr val="7030A0"/>
-                </a:solidFill>
-              </a:rPr>
-              <a:t>Num</a:t>
-            </a:r>
-            <a:r>
-              <a:rPr lang="en-US" sz="900" dirty="0">
-                <a:solidFill>
-                  <a:srgbClr val="7030A0"/>
-                </a:solidFill>
-              </a:rPr>
-              <a:t> Missiles Actually Used for each Target: 2  1  1  3  2  3</a:t>
-            </a:r>
-          </a:p>
-        </p:txBody>
-      </p:sp>
-      <p:sp>
-        <p:nvSpPr>
-          <p:cNvPr id="16" name="Rectangle 15"/>
-          <p:cNvSpPr/>
-          <p:nvPr/>
-        </p:nvSpPr>
-        <p:spPr>
-          <a:xfrm>
-            <a:off x="8727726" y="1782800"/>
-            <a:ext cx="1584959" cy="4278094"/>
-          </a:xfrm>
-          <a:prstGeom prst="rect">
-            <a:avLst/>
-          </a:prstGeom>
-          <a:solidFill>
-            <a:schemeClr val="bg1"/>
-          </a:solidFill>
-          <a:ln w="38100">
-            <a:solidFill>
-              <a:srgbClr val="00B050"/>
-            </a:solidFill>
-          </a:ln>
-        </p:spPr>
-        <p:txBody>
-          <a:bodyPr wrap="square">
-            <a:spAutoFit/>
-          </a:bodyPr>
-          <a:lstStyle/>
-          <a:p>
-            <a:r>
-              <a:rPr lang="en-US" sz="800" dirty="0">
-                <a:solidFill>
-                  <a:srgbClr val="7030A0"/>
-                </a:solidFill>
-              </a:rPr>
-              <a:t>Sortie 1 for Target: 5</a:t>
-            </a:r>
-          </a:p>
-          <a:p>
-            <a:r>
-              <a:rPr lang="en-US" sz="800" dirty="0">
-                <a:solidFill>
-                  <a:srgbClr val="7030A0"/>
-                </a:solidFill>
-              </a:rPr>
-              <a:t>Mission Start Time (</a:t>
-            </a:r>
-            <a:r>
-              <a:rPr lang="en-US" sz="800" dirty="0" err="1">
-                <a:solidFill>
-                  <a:srgbClr val="7030A0"/>
-                </a:solidFill>
-              </a:rPr>
-              <a:t>hrs</a:t>
-            </a:r>
-            <a:r>
-              <a:rPr lang="en-US" sz="800" dirty="0">
-                <a:solidFill>
-                  <a:srgbClr val="7030A0"/>
-                </a:solidFill>
-              </a:rPr>
-              <a:t>): 2</a:t>
-            </a:r>
-          </a:p>
-          <a:p>
-            <a:r>
-              <a:rPr lang="en-US" sz="800" dirty="0">
-                <a:solidFill>
-                  <a:srgbClr val="7030A0"/>
-                </a:solidFill>
-              </a:rPr>
-              <a:t>Carrier Chosen: 1</a:t>
-            </a:r>
-          </a:p>
-          <a:p>
-            <a:r>
-              <a:rPr lang="en-US" sz="800" dirty="0">
-                <a:solidFill>
-                  <a:srgbClr val="7030A0"/>
-                </a:solidFill>
-              </a:rPr>
-              <a:t>Jets Chosen: 2, 3</a:t>
-            </a:r>
-          </a:p>
-          <a:p>
-            <a:r>
-              <a:rPr lang="en-US" sz="800" dirty="0" err="1">
-                <a:solidFill>
-                  <a:srgbClr val="7030A0"/>
-                </a:solidFill>
-              </a:rPr>
-              <a:t>Helo</a:t>
-            </a:r>
-            <a:r>
-              <a:rPr lang="en-US" sz="800" dirty="0">
-                <a:solidFill>
-                  <a:srgbClr val="7030A0"/>
-                </a:solidFill>
-              </a:rPr>
-              <a:t> Chosen: 1</a:t>
-            </a:r>
-          </a:p>
-          <a:p>
-            <a:r>
-              <a:rPr lang="en-US" sz="800" dirty="0">
-                <a:solidFill>
-                  <a:srgbClr val="7030A0"/>
-                </a:solidFill>
-              </a:rPr>
-              <a:t>Pilots Chosen: 1, 3</a:t>
-            </a:r>
-          </a:p>
-          <a:p>
-            <a:r>
-              <a:rPr lang="en-US" sz="800" dirty="0">
-                <a:solidFill>
-                  <a:srgbClr val="7030A0"/>
-                </a:solidFill>
-              </a:rPr>
-              <a:t>Number of Missiles Chosen: 2</a:t>
-            </a:r>
-          </a:p>
-          <a:p>
-            <a:r>
-              <a:rPr lang="en-US" sz="800" dirty="0">
-                <a:solidFill>
-                  <a:srgbClr val="7030A0"/>
-                </a:solidFill>
-              </a:rPr>
-              <a:t>Missiles Chosen: 1, 2</a:t>
-            </a:r>
-          </a:p>
-          <a:p>
-            <a:r>
-              <a:rPr lang="en-US" sz="800" dirty="0">
-                <a:solidFill>
-                  <a:srgbClr val="7030A0"/>
-                </a:solidFill>
-              </a:rPr>
-              <a:t>Number of Missiles Needed: 2</a:t>
-            </a:r>
-          </a:p>
-          <a:p>
-            <a:r>
-              <a:rPr lang="en-US" sz="800" dirty="0">
-                <a:solidFill>
-                  <a:srgbClr val="7030A0"/>
-                </a:solidFill>
-              </a:rPr>
-              <a:t>Number of Missiles Remaining: 11</a:t>
-            </a:r>
-          </a:p>
-          <a:p>
-            <a:endParaRPr lang="en-US" sz="800" dirty="0">
-              <a:solidFill>
-                <a:srgbClr val="7030A0"/>
-              </a:solidFill>
-            </a:endParaRPr>
-          </a:p>
-          <a:p>
-            <a:r>
-              <a:rPr lang="en-US" sz="800" dirty="0">
-                <a:solidFill>
-                  <a:srgbClr val="7030A0"/>
-                </a:solidFill>
-              </a:rPr>
-              <a:t>Sortie 2 for Target: 6</a:t>
-            </a:r>
-          </a:p>
-          <a:p>
-            <a:r>
-              <a:rPr lang="en-US" sz="800" dirty="0">
-                <a:solidFill>
-                  <a:srgbClr val="7030A0"/>
-                </a:solidFill>
-              </a:rPr>
-              <a:t>Mission Start Time (</a:t>
-            </a:r>
-            <a:r>
-              <a:rPr lang="en-US" sz="800" dirty="0" err="1">
-                <a:solidFill>
-                  <a:srgbClr val="7030A0"/>
-                </a:solidFill>
-              </a:rPr>
-              <a:t>hrs</a:t>
-            </a:r>
-            <a:r>
-              <a:rPr lang="en-US" sz="800" dirty="0">
-                <a:solidFill>
-                  <a:srgbClr val="7030A0"/>
-                </a:solidFill>
-              </a:rPr>
-              <a:t>): 8</a:t>
-            </a:r>
-          </a:p>
-          <a:p>
-            <a:r>
-              <a:rPr lang="en-US" sz="800" dirty="0">
-                <a:solidFill>
-                  <a:srgbClr val="7030A0"/>
-                </a:solidFill>
-              </a:rPr>
-              <a:t>Carrier Chosen: 1</a:t>
-            </a:r>
-          </a:p>
-          <a:p>
-            <a:r>
-              <a:rPr lang="en-US" sz="800" dirty="0">
-                <a:solidFill>
-                  <a:srgbClr val="7030A0"/>
-                </a:solidFill>
-              </a:rPr>
-              <a:t>Jets Chosen: 4, 5</a:t>
-            </a:r>
-          </a:p>
-          <a:p>
-            <a:r>
-              <a:rPr lang="en-US" sz="800" dirty="0" err="1">
-                <a:solidFill>
-                  <a:srgbClr val="7030A0"/>
-                </a:solidFill>
-              </a:rPr>
-              <a:t>Helo</a:t>
-            </a:r>
-            <a:r>
-              <a:rPr lang="en-US" sz="800" dirty="0">
-                <a:solidFill>
-                  <a:srgbClr val="7030A0"/>
-                </a:solidFill>
-              </a:rPr>
-              <a:t> Chosen: 2</a:t>
-            </a:r>
-          </a:p>
-          <a:p>
-            <a:r>
-              <a:rPr lang="en-US" sz="800" dirty="0">
-                <a:solidFill>
-                  <a:srgbClr val="7030A0"/>
-                </a:solidFill>
-              </a:rPr>
-              <a:t>Pilots Chosen: 2, 4</a:t>
-            </a:r>
-          </a:p>
-          <a:p>
-            <a:r>
-              <a:rPr lang="en-US" sz="800" dirty="0">
-                <a:solidFill>
-                  <a:srgbClr val="7030A0"/>
-                </a:solidFill>
-              </a:rPr>
-              <a:t>Number of Missiles Chosen: 1</a:t>
-            </a:r>
-          </a:p>
-          <a:p>
-            <a:r>
-              <a:rPr lang="en-US" sz="800" dirty="0">
-                <a:solidFill>
-                  <a:srgbClr val="7030A0"/>
-                </a:solidFill>
-              </a:rPr>
-              <a:t>Missiles Chosen: 3</a:t>
-            </a:r>
-          </a:p>
-          <a:p>
-            <a:r>
-              <a:rPr lang="en-US" sz="800" dirty="0">
-                <a:solidFill>
-                  <a:srgbClr val="7030A0"/>
-                </a:solidFill>
-              </a:rPr>
-              <a:t>Number of Missiles Needed: 1</a:t>
-            </a:r>
-          </a:p>
-          <a:p>
-            <a:r>
-              <a:rPr lang="en-US" sz="800" dirty="0">
-                <a:solidFill>
-                  <a:srgbClr val="7030A0"/>
-                </a:solidFill>
-              </a:rPr>
-              <a:t>Number of Missiles Remaining: 10</a:t>
-            </a:r>
-          </a:p>
-          <a:p>
-            <a:endParaRPr lang="en-US" sz="800" dirty="0">
-              <a:solidFill>
-                <a:srgbClr val="7030A0"/>
-              </a:solidFill>
-            </a:endParaRPr>
-          </a:p>
-          <a:p>
-            <a:r>
-              <a:rPr lang="en-US" sz="800" dirty="0">
-                <a:solidFill>
-                  <a:srgbClr val="7030A0"/>
-                </a:solidFill>
-              </a:rPr>
-              <a:t>Sortie 3 for Target: 4</a:t>
-            </a:r>
-          </a:p>
-          <a:p>
-            <a:r>
-              <a:rPr lang="en-US" sz="800" dirty="0">
-                <a:solidFill>
-                  <a:srgbClr val="7030A0"/>
-                </a:solidFill>
-              </a:rPr>
-              <a:t>Mission Start Time (</a:t>
-            </a:r>
-            <a:r>
-              <a:rPr lang="en-US" sz="800" dirty="0" err="1">
-                <a:solidFill>
-                  <a:srgbClr val="7030A0"/>
-                </a:solidFill>
-              </a:rPr>
-              <a:t>hrs</a:t>
-            </a:r>
-            <a:r>
-              <a:rPr lang="en-US" sz="800" dirty="0">
-                <a:solidFill>
-                  <a:srgbClr val="7030A0"/>
-                </a:solidFill>
-              </a:rPr>
-              <a:t>): 14</a:t>
-            </a:r>
-          </a:p>
-          <a:p>
-            <a:r>
-              <a:rPr lang="en-US" sz="800" dirty="0">
-                <a:solidFill>
-                  <a:srgbClr val="7030A0"/>
-                </a:solidFill>
-              </a:rPr>
-              <a:t>Carrier Chosen: 2</a:t>
-            </a:r>
-          </a:p>
-          <a:p>
-            <a:r>
-              <a:rPr lang="en-US" sz="800" dirty="0">
-                <a:solidFill>
-                  <a:srgbClr val="7030A0"/>
-                </a:solidFill>
-              </a:rPr>
-              <a:t>Jets Chosen: 12, 13</a:t>
-            </a:r>
-          </a:p>
-          <a:p>
-            <a:r>
-              <a:rPr lang="en-US" sz="800" dirty="0" err="1">
-                <a:solidFill>
-                  <a:srgbClr val="7030A0"/>
-                </a:solidFill>
-              </a:rPr>
-              <a:t>Helo</a:t>
-            </a:r>
-            <a:r>
-              <a:rPr lang="en-US" sz="800" dirty="0">
-                <a:solidFill>
-                  <a:srgbClr val="7030A0"/>
-                </a:solidFill>
-              </a:rPr>
-              <a:t> Chosen: 3</a:t>
-            </a:r>
-          </a:p>
-          <a:p>
-            <a:r>
-              <a:rPr lang="en-US" sz="800" dirty="0">
-                <a:solidFill>
-                  <a:srgbClr val="7030A0"/>
-                </a:solidFill>
-              </a:rPr>
-              <a:t>Pilots Chosen: 15, 16</a:t>
-            </a:r>
-          </a:p>
-          <a:p>
-            <a:r>
-              <a:rPr lang="en-US" sz="800" dirty="0">
-                <a:solidFill>
-                  <a:srgbClr val="7030A0"/>
-                </a:solidFill>
-              </a:rPr>
-              <a:t>Number of Missiles Chosen: 1</a:t>
-            </a:r>
-          </a:p>
-          <a:p>
-            <a:r>
-              <a:rPr lang="en-US" sz="800" dirty="0">
-                <a:solidFill>
-                  <a:srgbClr val="7030A0"/>
-                </a:solidFill>
-              </a:rPr>
-              <a:t>Missiles Chosen: 9</a:t>
-            </a:r>
-          </a:p>
-          <a:p>
-            <a:r>
-              <a:rPr lang="en-US" sz="800" dirty="0">
-                <a:solidFill>
-                  <a:srgbClr val="7030A0"/>
-                </a:solidFill>
-              </a:rPr>
-              <a:t>Number of Missiles Needed: 1</a:t>
-            </a:r>
-          </a:p>
-          <a:p>
-            <a:r>
-              <a:rPr lang="en-US" sz="800" dirty="0">
-                <a:solidFill>
-                  <a:srgbClr val="7030A0"/>
-                </a:solidFill>
-              </a:rPr>
-              <a:t>Number of Missiles Remaining: 9</a:t>
-            </a:r>
-          </a:p>
-        </p:txBody>
-      </p:sp>
-      <p:sp>
-        <p:nvSpPr>
-          <p:cNvPr id="17" name="Rectangle 16"/>
-          <p:cNvSpPr/>
-          <p:nvPr/>
-        </p:nvSpPr>
-        <p:spPr>
-          <a:xfrm>
-            <a:off x="5024847" y="2204273"/>
-            <a:ext cx="3262824" cy="584775"/>
-          </a:xfrm>
-          <a:prstGeom prst="rect">
-            <a:avLst/>
-          </a:prstGeom>
-          <a:solidFill>
-            <a:schemeClr val="bg1"/>
-          </a:solidFill>
-          <a:ln w="38100">
-            <a:solidFill>
-              <a:srgbClr val="00B050"/>
-            </a:solidFill>
-          </a:ln>
-        </p:spPr>
-        <p:txBody>
-          <a:bodyPr wrap="square">
-            <a:spAutoFit/>
-          </a:bodyPr>
-          <a:lstStyle/>
-          <a:p>
-            <a:r>
-              <a:rPr lang="en-US" sz="1600" dirty="0">
-                <a:solidFill>
-                  <a:srgbClr val="7030A0"/>
-                </a:solidFill>
-              </a:rPr>
-              <a:t>Number of Casualties: 1</a:t>
-            </a:r>
-          </a:p>
-          <a:p>
-            <a:r>
-              <a:rPr lang="en-US" sz="1600" dirty="0">
-                <a:solidFill>
-                  <a:srgbClr val="7030A0"/>
-                </a:solidFill>
-              </a:rPr>
-              <a:t>Number of Targets Accounted For: 6</a:t>
-            </a:r>
-          </a:p>
-        </p:txBody>
-      </p:sp>
-    </p:spTree>
-    <p:extLst>
-      <p:ext uri="{BB962C8B-B14F-4D97-AF65-F5344CB8AC3E}">
-        <p14:creationId xmlns:p14="http://schemas.microsoft.com/office/powerpoint/2010/main" val="2745458709"/>
-      </p:ext>
-    </p:extLst>
-  </p:cSld>
-  <p:clrMapOvr>
-    <a:masterClrMapping/>
-  </p:clrMapOvr>
-</p:sld>
-</file>
-
-<file path=ppt/slides/slide15.xml><?xml version="1.0" encoding="utf-8"?>
-<p:sld xmlns:a="http://schemas.openxmlformats.org/drawingml/2006/main" xmlns:r="http://schemas.openxmlformats.org/officeDocument/2006/relationships" xmlns:p="http://schemas.openxmlformats.org/presentationml/2006/main">
-  <p:cSld>
-    <p:spTree>
-      <p:nvGrpSpPr>
-        <p:cNvPr id="1" name=""/>
-        <p:cNvGrpSpPr/>
-        <p:nvPr/>
-      </p:nvGrpSpPr>
-      <p:grpSpPr>
-        <a:xfrm>
-          <a:off x="0" y="0"/>
-          <a:ext cx="0" cy="0"/>
-          <a:chOff x="0" y="0"/>
-          <a:chExt cx="0" cy="0"/>
-        </a:xfrm>
-      </p:grpSpPr>
-      <p:sp>
-        <p:nvSpPr>
-          <p:cNvPr id="2" name="Title 1"/>
-          <p:cNvSpPr>
-            <a:spLocks noGrp="1"/>
-          </p:cNvSpPr>
-          <p:nvPr>
-            <p:ph type="title"/>
-          </p:nvPr>
-        </p:nvSpPr>
-        <p:spPr/>
-        <p:txBody>
-          <a:bodyPr/>
-          <a:lstStyle/>
-          <a:p>
-            <a:r>
-              <a:rPr lang="en-US" dirty="0"/>
-              <a:t>EJJ Web Page </a:t>
-            </a:r>
-            <a:r>
-              <a:rPr lang="en-US" dirty="0" smtClean="0"/>
-              <a:t>– User Can Interact With/Update the Output Schedule</a:t>
-            </a:r>
-            <a:endParaRPr lang="en-US" dirty="0"/>
-          </a:p>
-        </p:txBody>
-      </p:sp>
-      <p:sp>
-        <p:nvSpPr>
-          <p:cNvPr id="4" name="Footer Placeholder 3"/>
-          <p:cNvSpPr>
-            <a:spLocks noGrp="1"/>
-          </p:cNvSpPr>
-          <p:nvPr>
-            <p:ph type="ftr" sz="quarter" idx="11"/>
-          </p:nvPr>
-        </p:nvSpPr>
-        <p:spPr/>
-        <p:txBody>
-          <a:bodyPr/>
-          <a:lstStyle/>
-          <a:p>
-            <a:r>
-              <a:rPr lang="en-US">
-                <a:latin typeface="Courier New" panose="02070309020205020404" pitchFamily="49" charset="0"/>
-                <a:cs typeface="Courier New" panose="02070309020205020404" pitchFamily="49" charset="0"/>
-              </a:rPr>
-              <a:t>Team EJJ</a:t>
-            </a:r>
-            <a:endParaRPr lang="en-US" dirty="0">
-              <a:latin typeface="Courier New" panose="02070309020205020404" pitchFamily="49" charset="0"/>
-              <a:cs typeface="Courier New" panose="02070309020205020404" pitchFamily="49" charset="0"/>
-            </a:endParaRPr>
-          </a:p>
-        </p:txBody>
-      </p:sp>
-      <p:sp>
-        <p:nvSpPr>
-          <p:cNvPr id="7" name="TextBox 6">
-            <a:extLst>
-              <a:ext uri="{FF2B5EF4-FFF2-40B4-BE49-F238E27FC236}">
-                <a16:creationId xmlns="" xmlns:a16="http://schemas.microsoft.com/office/drawing/2014/main" id="{227070AC-AE43-48DC-BDCB-577F4AABD8B1}"/>
-              </a:ext>
-            </a:extLst>
-          </p:cNvPr>
-          <p:cNvSpPr txBox="1"/>
-          <p:nvPr/>
-        </p:nvSpPr>
-        <p:spPr>
-          <a:xfrm>
-            <a:off x="689759" y="4104472"/>
-            <a:ext cx="10306792" cy="2585323"/>
-          </a:xfrm>
-          <a:prstGeom prst="rect">
-            <a:avLst/>
-          </a:prstGeom>
-          <a:noFill/>
-        </p:spPr>
-        <p:txBody>
-          <a:bodyPr wrap="square" rtlCol="0">
-            <a:spAutoFit/>
-          </a:bodyPr>
-          <a:lstStyle/>
-          <a:p>
-            <a:r>
-              <a:rPr lang="en-US" dirty="0">
-                <a:solidFill>
-                  <a:srgbClr val="7030A0"/>
-                </a:solidFill>
-              </a:rPr>
-              <a:t>Situational Awareness </a:t>
-            </a:r>
-          </a:p>
-          <a:p>
-            <a:pPr marL="285750" indent="-285750">
-              <a:buFontTx/>
-              <a:buChar char="-"/>
-            </a:pPr>
-            <a:r>
-              <a:rPr lang="en-US" dirty="0">
-                <a:solidFill>
-                  <a:srgbClr val="7030A0"/>
-                </a:solidFill>
-              </a:rPr>
-              <a:t>See the sortie timeline for each of the players for this target</a:t>
-            </a:r>
-          </a:p>
-          <a:p>
-            <a:r>
-              <a:rPr lang="en-US" dirty="0">
-                <a:solidFill>
-                  <a:srgbClr val="7030A0"/>
-                </a:solidFill>
-              </a:rPr>
-              <a:t>Ease of planning </a:t>
-            </a:r>
-          </a:p>
-          <a:p>
-            <a:pPr marL="285750" indent="-285750">
-              <a:buFontTx/>
-              <a:buChar char="-"/>
-            </a:pPr>
-            <a:r>
-              <a:rPr lang="en-US" dirty="0">
-                <a:solidFill>
-                  <a:srgbClr val="7030A0"/>
-                </a:solidFill>
-              </a:rPr>
-              <a:t>Drag any part of the colored section to plan earlier or later </a:t>
-            </a:r>
-          </a:p>
-          <a:p>
-            <a:pPr marL="285750" indent="-285750">
-              <a:buFontTx/>
-              <a:buChar char="-"/>
-            </a:pPr>
-            <a:r>
-              <a:rPr lang="en-US" dirty="0">
-                <a:solidFill>
-                  <a:srgbClr val="7030A0"/>
-                </a:solidFill>
-              </a:rPr>
-              <a:t>Drag the edges to extend or shorten the duration of the sortie</a:t>
-            </a:r>
-          </a:p>
-          <a:p>
-            <a:pPr marL="285750" indent="-285750">
-              <a:buFontTx/>
-              <a:buChar char="-"/>
-            </a:pPr>
-            <a:r>
-              <a:rPr lang="en-US" dirty="0">
-                <a:solidFill>
-                  <a:srgbClr val="7030A0"/>
-                </a:solidFill>
-              </a:rPr>
-              <a:t>Rest time after the sortie displayed as well</a:t>
-            </a:r>
-          </a:p>
-          <a:p>
-            <a:endParaRPr lang="en-US" dirty="0">
-              <a:solidFill>
-                <a:srgbClr val="00B050"/>
-              </a:solidFill>
-            </a:endParaRPr>
-          </a:p>
-          <a:p>
-            <a:pPr marL="285750" indent="-285750">
-              <a:buFontTx/>
-              <a:buChar char="-"/>
-            </a:pPr>
-            <a:endParaRPr lang="en-US" dirty="0">
-              <a:solidFill>
-                <a:srgbClr val="FF0000"/>
-              </a:solidFill>
-            </a:endParaRPr>
-          </a:p>
-          <a:p>
-            <a:endParaRPr lang="en-US" dirty="0">
-              <a:solidFill>
-                <a:srgbClr val="FF0000"/>
-              </a:solidFill>
-            </a:endParaRPr>
-          </a:p>
-        </p:txBody>
-      </p:sp>
-      <p:sp>
-        <p:nvSpPr>
-          <p:cNvPr id="6" name="Rectangle 5">
-            <a:extLst>
-              <a:ext uri="{FF2B5EF4-FFF2-40B4-BE49-F238E27FC236}">
-                <a16:creationId xmlns="" xmlns:a16="http://schemas.microsoft.com/office/drawing/2014/main" id="{A8FC2D7F-4AD5-4B53-A18A-1E6F60559076}"/>
-              </a:ext>
-            </a:extLst>
-          </p:cNvPr>
-          <p:cNvSpPr/>
-          <p:nvPr/>
-        </p:nvSpPr>
-        <p:spPr>
-          <a:xfrm>
-            <a:off x="546443" y="1799113"/>
-            <a:ext cx="8158170" cy="1989116"/>
-          </a:xfrm>
-          <a:prstGeom prst="rect">
-            <a:avLst/>
-          </a:prstGeom>
-          <a:noFill/>
-          <a:ln w="38100">
-            <a:solidFill>
-              <a:srgbClr val="7030A0"/>
-            </a:solidFill>
-          </a:ln>
-        </p:spPr>
-        <p:style>
-          <a:lnRef idx="2">
-            <a:schemeClr val="accent1">
-              <a:shade val="50000"/>
-            </a:schemeClr>
-          </a:lnRef>
-          <a:fillRef idx="1">
-            <a:schemeClr val="accent1"/>
-          </a:fillRef>
-          <a:effectRef idx="0">
-            <a:schemeClr val="accent1"/>
-          </a:effectRef>
-          <a:fontRef idx="minor">
-            <a:schemeClr val="lt1"/>
-          </a:fontRef>
-        </p:style>
-        <p:txBody>
-          <a:bodyPr rtlCol="0" anchor="ctr"/>
-          <a:lstStyle/>
-          <a:p>
-            <a:pPr algn="ctr"/>
-            <a:endParaRPr lang="en-US"/>
-          </a:p>
-        </p:txBody>
-      </p:sp>
-      <p:sp>
-        <p:nvSpPr>
-          <p:cNvPr id="10" name="Rectangle 9">
-            <a:extLst>
-              <a:ext uri="{FF2B5EF4-FFF2-40B4-BE49-F238E27FC236}">
-                <a16:creationId xmlns="" xmlns:a16="http://schemas.microsoft.com/office/drawing/2014/main" id="{DF8BD097-76C6-4176-A414-B0E0751655CC}"/>
-              </a:ext>
-            </a:extLst>
-          </p:cNvPr>
-          <p:cNvSpPr/>
-          <p:nvPr/>
-        </p:nvSpPr>
-        <p:spPr>
-          <a:xfrm>
-            <a:off x="8829303" y="3429000"/>
-            <a:ext cx="938151" cy="467654"/>
-          </a:xfrm>
-          <a:prstGeom prst="rect">
-            <a:avLst/>
-          </a:prstGeom>
-          <a:noFill/>
-          <a:ln w="38100">
-            <a:solidFill>
-              <a:srgbClr val="FF0000"/>
-            </a:solidFill>
-          </a:ln>
-        </p:spPr>
-        <p:style>
-          <a:lnRef idx="2">
-            <a:schemeClr val="accent1">
-              <a:shade val="50000"/>
-            </a:schemeClr>
-          </a:lnRef>
-          <a:fillRef idx="1">
-            <a:schemeClr val="accent1"/>
-          </a:fillRef>
-          <a:effectRef idx="0">
-            <a:schemeClr val="accent1"/>
-          </a:effectRef>
-          <a:fontRef idx="minor">
-            <a:schemeClr val="lt1"/>
-          </a:fontRef>
-        </p:style>
-        <p:txBody>
-          <a:bodyPr rtlCol="0" anchor="ctr"/>
-          <a:lstStyle/>
-          <a:p>
-            <a:pPr algn="ctr"/>
-            <a:endParaRPr lang="en-US"/>
-          </a:p>
-        </p:txBody>
-      </p:sp>
-    </p:spTree>
-    <p:extLst>
-      <p:ext uri="{BB962C8B-B14F-4D97-AF65-F5344CB8AC3E}">
-        <p14:creationId xmlns:p14="http://schemas.microsoft.com/office/powerpoint/2010/main" val="3987016139"/>
-      </p:ext>
-    </p:extLst>
-  </p:cSld>
-  <p:clrMapOvr>
-    <a:masterClrMapping/>
-  </p:clrMapOvr>
-</p:sld>
-</file>
-
-<file path=ppt/slides/slide16.xml><?xml version="1.0" encoding="utf-8"?>
-<p:sld xmlns:a="http://schemas.openxmlformats.org/drawingml/2006/main" xmlns:r="http://schemas.openxmlformats.org/officeDocument/2006/relationships" xmlns:p="http://schemas.openxmlformats.org/presentationml/2006/main">
-  <p:cSld>
-    <p:spTree>
-      <p:nvGrpSpPr>
-        <p:cNvPr id="1" name=""/>
-        <p:cNvGrpSpPr/>
-        <p:nvPr/>
-      </p:nvGrpSpPr>
-      <p:grpSpPr>
-        <a:xfrm>
-          <a:off x="0" y="0"/>
-          <a:ext cx="0" cy="0"/>
-          <a:chOff x="0" y="0"/>
-          <a:chExt cx="0" cy="0"/>
-        </a:xfrm>
-      </p:grpSpPr>
-      <p:sp>
-        <p:nvSpPr>
-          <p:cNvPr id="2" name="Title 1"/>
-          <p:cNvSpPr>
-            <a:spLocks noGrp="1"/>
-          </p:cNvSpPr>
-          <p:nvPr>
-            <p:ph type="title"/>
-          </p:nvPr>
-        </p:nvSpPr>
-        <p:spPr>
-          <a:xfrm>
-            <a:off x="838199" y="365125"/>
-            <a:ext cx="10995561" cy="1325563"/>
-          </a:xfrm>
-        </p:spPr>
-        <p:txBody>
-          <a:bodyPr/>
-          <a:lstStyle/>
-          <a:p>
-            <a:r>
-              <a:rPr lang="en-US" dirty="0"/>
-              <a:t>EJJ Web </a:t>
-            </a:r>
-            <a:r>
-              <a:rPr lang="en-US" dirty="0" smtClean="0"/>
-              <a:t>Page </a:t>
-            </a:r>
-            <a:r>
-              <a:rPr lang="en-US" dirty="0"/>
-              <a:t>– Other Target Info &amp; Options</a:t>
-            </a:r>
-          </a:p>
-        </p:txBody>
-      </p:sp>
-      <p:sp>
-        <p:nvSpPr>
-          <p:cNvPr id="4" name="Footer Placeholder 3"/>
-          <p:cNvSpPr>
-            <a:spLocks noGrp="1"/>
-          </p:cNvSpPr>
-          <p:nvPr>
-            <p:ph type="ftr" sz="quarter" idx="11"/>
-          </p:nvPr>
-        </p:nvSpPr>
-        <p:spPr/>
-        <p:txBody>
-          <a:bodyPr/>
-          <a:lstStyle/>
-          <a:p>
-            <a:r>
-              <a:rPr lang="en-US">
-                <a:latin typeface="Courier New" panose="02070309020205020404" pitchFamily="49" charset="0"/>
-                <a:cs typeface="Courier New" panose="02070309020205020404" pitchFamily="49" charset="0"/>
-              </a:rPr>
-              <a:t>Team EJJ</a:t>
-            </a:r>
-            <a:endParaRPr lang="en-US" dirty="0">
-              <a:latin typeface="Courier New" panose="02070309020205020404" pitchFamily="49" charset="0"/>
-              <a:cs typeface="Courier New" panose="02070309020205020404" pitchFamily="49" charset="0"/>
-            </a:endParaRPr>
-          </a:p>
-        </p:txBody>
-      </p:sp>
-      <p:sp>
-        <p:nvSpPr>
-          <p:cNvPr id="7" name="TextBox 6">
-            <a:extLst>
-              <a:ext uri="{FF2B5EF4-FFF2-40B4-BE49-F238E27FC236}">
-                <a16:creationId xmlns="" xmlns:a16="http://schemas.microsoft.com/office/drawing/2014/main" id="{57CAA007-58FD-4C65-A417-13DA1B87CF7E}"/>
-              </a:ext>
-            </a:extLst>
-          </p:cNvPr>
-          <p:cNvSpPr txBox="1"/>
-          <p:nvPr/>
-        </p:nvSpPr>
-        <p:spPr>
-          <a:xfrm>
-            <a:off x="7992473" y="1601901"/>
-            <a:ext cx="3271271" cy="1200329"/>
-          </a:xfrm>
-          <a:prstGeom prst="rect">
-            <a:avLst/>
-          </a:prstGeom>
-          <a:noFill/>
-        </p:spPr>
-        <p:txBody>
-          <a:bodyPr wrap="square" rtlCol="0">
-            <a:spAutoFit/>
-          </a:bodyPr>
-          <a:lstStyle/>
-          <a:p>
-            <a:r>
-              <a:rPr lang="en-US" dirty="0">
-                <a:solidFill>
-                  <a:srgbClr val="7030A0"/>
-                </a:solidFill>
-              </a:rPr>
-              <a:t>Quickly see important target info:</a:t>
-            </a:r>
-          </a:p>
-          <a:p>
-            <a:pPr marL="285750" indent="-285750">
-              <a:buFontTx/>
-              <a:buChar char="-"/>
-            </a:pPr>
-            <a:r>
-              <a:rPr lang="en-US" dirty="0">
-                <a:solidFill>
-                  <a:srgbClr val="7030A0"/>
-                </a:solidFill>
-              </a:rPr>
-              <a:t>Latitude, Longitude, Elevation</a:t>
-            </a:r>
-          </a:p>
-          <a:p>
-            <a:pPr marL="285750" indent="-285750">
-              <a:buFontTx/>
-              <a:buChar char="-"/>
-            </a:pPr>
-            <a:r>
-              <a:rPr lang="en-US" dirty="0">
-                <a:solidFill>
-                  <a:srgbClr val="7030A0"/>
-                </a:solidFill>
-              </a:rPr>
-              <a:t>Image of </a:t>
-            </a:r>
-          </a:p>
-        </p:txBody>
-      </p:sp>
-    </p:spTree>
-    <p:extLst>
-      <p:ext uri="{BB962C8B-B14F-4D97-AF65-F5344CB8AC3E}">
-        <p14:creationId xmlns:p14="http://schemas.microsoft.com/office/powerpoint/2010/main" val="3704891831"/>
-      </p:ext>
-    </p:extLst>
-  </p:cSld>
-  <p:clrMapOvr>
-    <a:masterClrMapping/>
-  </p:clrMapOvr>
-</p:sld>
-</file>
-
-<file path=ppt/slides/slide17.xml><?xml version="1.0" encoding="utf-8"?>
-<p:sld xmlns:a="http://schemas.openxmlformats.org/drawingml/2006/main" xmlns:r="http://schemas.openxmlformats.org/officeDocument/2006/relationships" xmlns:p="http://schemas.openxmlformats.org/presentationml/2006/main">
-  <p:cSld>
-    <p:spTree>
-      <p:nvGrpSpPr>
-        <p:cNvPr id="1" name=""/>
-        <p:cNvGrpSpPr/>
-        <p:nvPr/>
-      </p:nvGrpSpPr>
-      <p:grpSpPr>
-        <a:xfrm>
-          <a:off x="0" y="0"/>
-          <a:ext cx="0" cy="0"/>
-          <a:chOff x="0" y="0"/>
-          <a:chExt cx="0" cy="0"/>
-        </a:xfrm>
-      </p:grpSpPr>
       <p:sp>
         <p:nvSpPr>
           <p:cNvPr id="2" name="Title 1">
             <a:extLst>
               <a:ext uri="{FF2B5EF4-FFF2-40B4-BE49-F238E27FC236}">
-                <a16:creationId xmlns="" xmlns:a16="http://schemas.microsoft.com/office/drawing/2014/main" id="{F957234A-F1A3-453E-8A2C-61F082D663C1}"/>
+                <a16:creationId xmlns:a16="http://schemas.microsoft.com/office/drawing/2014/main" id="{F957234A-F1A3-453E-8A2C-61F082D663C1}"/>
               </a:ext>
             </a:extLst>
           </p:cNvPr>
@@ -6127,21 +4446,8 @@
           <a:p>
             <a:r>
               <a:rPr lang="en-US" dirty="0"/>
-              <a:t>Collaboration </a:t>
-            </a:r>
-            <a:r>
-              <a:rPr lang="en-US" dirty="0" smtClean="0"/>
-              <a:t>During </a:t>
-            </a:r>
-            <a:r>
-              <a:rPr lang="en-US" dirty="0"/>
-              <a:t>Mission </a:t>
-            </a:r>
-            <a:r>
-              <a:rPr lang="en-US" dirty="0" smtClean="0"/>
-              <a:t>Planning (1)</a:t>
-            </a:r>
-            <a:endParaRPr lang="en-US" dirty="0"/>
+              <a:t>Collaboration During Mission Planning (1)</a:t>
+            </a:r>
           </a:p>
         </p:txBody>
       </p:sp>
@@ -6150,7 +4456,7 @@
           <p:cNvPr id="4" name="Footer Placeholder 3">
             <a:extLst>
               <a:ext uri="{FF2B5EF4-FFF2-40B4-BE49-F238E27FC236}">
-                <a16:creationId xmlns="" xmlns:a16="http://schemas.microsoft.com/office/drawing/2014/main" id="{169FFFA7-9B2C-49FC-AC49-66B5B7B7C039}"/>
+                <a16:creationId xmlns:a16="http://schemas.microsoft.com/office/drawing/2014/main" id="{169FFFA7-9B2C-49FC-AC49-66B5B7B7C039}"/>
               </a:ext>
             </a:extLst>
           </p:cNvPr>
@@ -6185,7 +4491,7 @@
           <p:cNvPr id="8" name="Content Placeholder 7">
             <a:extLst>
               <a:ext uri="{FF2B5EF4-FFF2-40B4-BE49-F238E27FC236}">
-                <a16:creationId xmlns="" xmlns:a16="http://schemas.microsoft.com/office/drawing/2014/main" id="{2E7707F0-D0DA-4C8D-B2BA-9A55BACB9F14}"/>
+                <a16:creationId xmlns:a16="http://schemas.microsoft.com/office/drawing/2014/main" id="{2E7707F0-D0DA-4C8D-B2BA-9A55BACB9F14}"/>
               </a:ext>
             </a:extLst>
           </p:cNvPr>
@@ -6208,7 +4514,7 @@
           <a:p>
             <a:r>
               <a:rPr lang="en-US" dirty="0"/>
-              <a:t>Set the active mission or the mission session to plan with</a:t>
+              <a:t>Join or create an active mission plan session</a:t>
             </a:r>
           </a:p>
           <a:p>
@@ -6219,8 +4525,32 @@
           </a:p>
           <a:p>
             <a:r>
-              <a:rPr lang="en-US" dirty="0"/>
+              <a:rPr lang="en-US" dirty="0">
+                <a:solidFill>
+                  <a:srgbClr val="00B0F0"/>
+                </a:solidFill>
+              </a:rPr>
               <a:t>Active mission displayed on the top right</a:t>
+            </a:r>
+          </a:p>
+          <a:p>
+            <a:r>
+              <a:rPr lang="en-US" dirty="0">
+                <a:solidFill>
+                  <a:srgbClr val="FFC000"/>
+                </a:solidFill>
+              </a:rPr>
+              <a:t>Available active missions displayed in the drop down</a:t>
+            </a:r>
+          </a:p>
+          <a:p>
+            <a:r>
+              <a:rPr lang="en-US" dirty="0">
+                <a:solidFill>
+                  <a:srgbClr val="FF0000"/>
+                </a:solidFill>
+              </a:rPr>
+              <a:t>Button to create a new mission planning session</a:t>
             </a:r>
           </a:p>
         </p:txBody>
@@ -6230,7 +4560,7 @@
           <p:cNvPr id="12" name="Picture 11">
             <a:extLst>
               <a:ext uri="{FF2B5EF4-FFF2-40B4-BE49-F238E27FC236}">
-                <a16:creationId xmlns="" xmlns:a16="http://schemas.microsoft.com/office/drawing/2014/main" id="{0F2C8AFF-C8FC-4837-8C61-15D24392CD73}"/>
+                <a16:creationId xmlns:a16="http://schemas.microsoft.com/office/drawing/2014/main" id="{0F2C8AFF-C8FC-4837-8C61-15D24392CD73}"/>
               </a:ext>
             </a:extLst>
           </p:cNvPr>
@@ -6268,6 +4598,481 @@
 </p:sld>
 </file>
 
+<file path=ppt/slides/slide15.xml><?xml version="1.0" encoding="utf-8"?>
+<p:sld xmlns:a="http://schemas.openxmlformats.org/drawingml/2006/main" xmlns:r="http://schemas.openxmlformats.org/officeDocument/2006/relationships" xmlns:p="http://schemas.openxmlformats.org/presentationml/2006/main">
+  <p:cSld>
+    <p:spTree>
+      <p:nvGrpSpPr>
+        <p:cNvPr id="1" name=""/>
+        <p:cNvGrpSpPr/>
+        <p:nvPr/>
+      </p:nvGrpSpPr>
+      <p:grpSpPr>
+        <a:xfrm>
+          <a:off x="0" y="0"/>
+          <a:ext cx="0" cy="0"/>
+          <a:chOff x="0" y="0"/>
+          <a:chExt cx="0" cy="0"/>
+        </a:xfrm>
+      </p:grpSpPr>
+      <p:sp>
+        <p:nvSpPr>
+          <p:cNvPr id="2" name="Title 1">
+            <a:extLst>
+              <a:ext uri="{FF2B5EF4-FFF2-40B4-BE49-F238E27FC236}">
+                <a16:creationId xmlns:a16="http://schemas.microsoft.com/office/drawing/2014/main" id="{F957234A-F1A3-453E-8A2C-61F082D663C1}"/>
+              </a:ext>
+            </a:extLst>
+          </p:cNvPr>
+          <p:cNvSpPr>
+            <a:spLocks noGrp="1"/>
+          </p:cNvSpPr>
+          <p:nvPr>
+            <p:ph type="title"/>
+          </p:nvPr>
+        </p:nvSpPr>
+        <p:spPr>
+          <a:xfrm>
+            <a:off x="838200" y="365126"/>
+            <a:ext cx="10515600" cy="1095540"/>
+          </a:xfrm>
+        </p:spPr>
+        <p:txBody>
+          <a:bodyPr/>
+          <a:lstStyle/>
+          <a:p>
+            <a:r>
+              <a:rPr lang="en-US" dirty="0"/>
+              <a:t>Collaboration during Mission Planning (2)</a:t>
+            </a:r>
+          </a:p>
+        </p:txBody>
+      </p:sp>
+      <p:sp>
+        <p:nvSpPr>
+          <p:cNvPr id="4" name="Footer Placeholder 3">
+            <a:extLst>
+              <a:ext uri="{FF2B5EF4-FFF2-40B4-BE49-F238E27FC236}">
+                <a16:creationId xmlns:a16="http://schemas.microsoft.com/office/drawing/2014/main" id="{169FFFA7-9B2C-49FC-AC49-66B5B7B7C039}"/>
+              </a:ext>
+            </a:extLst>
+          </p:cNvPr>
+          <p:cNvSpPr>
+            <a:spLocks noGrp="1"/>
+          </p:cNvSpPr>
+          <p:nvPr>
+            <p:ph type="ftr" sz="quarter" idx="11"/>
+          </p:nvPr>
+        </p:nvSpPr>
+        <p:spPr/>
+        <p:txBody>
+          <a:bodyPr/>
+          <a:lstStyle/>
+          <a:p>
+            <a:r>
+              <a:rPr lang="en-US">
+                <a:latin typeface="Courier New" panose="02070309020205020404" pitchFamily="49" charset="0"/>
+                <a:cs typeface="Courier New" panose="02070309020205020404" pitchFamily="49" charset="0"/>
+              </a:rPr>
+              <a:t>Team EJJ</a:t>
+            </a:r>
+            <a:endParaRPr lang="en-US" dirty="0">
+              <a:latin typeface="Courier New" panose="02070309020205020404" pitchFamily="49" charset="0"/>
+              <a:cs typeface="Courier New" panose="02070309020205020404" pitchFamily="49" charset="0"/>
+            </a:endParaRPr>
+          </a:p>
+        </p:txBody>
+      </p:sp>
+      <p:sp>
+        <p:nvSpPr>
+          <p:cNvPr id="8" name="Content Placeholder 7">
+            <a:extLst>
+              <a:ext uri="{FF2B5EF4-FFF2-40B4-BE49-F238E27FC236}">
+                <a16:creationId xmlns:a16="http://schemas.microsoft.com/office/drawing/2014/main" id="{2E7707F0-D0DA-4C8D-B2BA-9A55BACB9F14}"/>
+              </a:ext>
+            </a:extLst>
+          </p:cNvPr>
+          <p:cNvSpPr>
+            <a:spLocks noGrp="1"/>
+          </p:cNvSpPr>
+          <p:nvPr>
+            <p:ph idx="1"/>
+          </p:nvPr>
+        </p:nvSpPr>
+        <p:spPr>
+          <a:xfrm>
+            <a:off x="836221" y="1395351"/>
+            <a:ext cx="10515600" cy="4781612"/>
+          </a:xfrm>
+        </p:spPr>
+        <p:txBody>
+          <a:bodyPr/>
+          <a:lstStyle/>
+          <a:p>
+            <a:r>
+              <a:rPr lang="en-US" dirty="0"/>
+              <a:t>Mission planners can collaboratively adjust, verify, and plan routes on targets</a:t>
+            </a:r>
+          </a:p>
+          <a:p>
+            <a:r>
+              <a:rPr lang="en-US" dirty="0"/>
+              <a:t>See progress of target planning in real time</a:t>
+            </a:r>
+          </a:p>
+          <a:p>
+            <a:pPr lvl="1"/>
+            <a:r>
+              <a:rPr lang="en-US" dirty="0"/>
+              <a:t>The sortie plan</a:t>
+            </a:r>
+          </a:p>
+          <a:p>
+            <a:pPr lvl="1"/>
+            <a:r>
+              <a:rPr lang="en-US" dirty="0"/>
+              <a:t>The weapon plan</a:t>
+            </a:r>
+          </a:p>
+          <a:p>
+            <a:pPr lvl="1"/>
+            <a:r>
+              <a:rPr lang="en-US" dirty="0"/>
+              <a:t>Any tanker routes</a:t>
+            </a:r>
+          </a:p>
+          <a:p>
+            <a:r>
+              <a:rPr lang="en-US" dirty="0"/>
+              <a:t>Send messages to the ships/</a:t>
+            </a:r>
+            <a:r>
+              <a:rPr lang="en-US" dirty="0" err="1"/>
+              <a:t>helos</a:t>
+            </a:r>
+            <a:r>
+              <a:rPr lang="en-US" dirty="0"/>
+              <a:t>/pilots when </a:t>
+            </a:r>
+            <a:r>
+              <a:rPr lang="en-US"/>
+              <a:t>the mission plan </a:t>
+            </a:r>
+            <a:r>
+              <a:rPr lang="en-US" dirty="0"/>
+              <a:t>is ready</a:t>
+            </a:r>
+          </a:p>
+        </p:txBody>
+      </p:sp>
+    </p:spTree>
+    <p:extLst>
+      <p:ext uri="{BB962C8B-B14F-4D97-AF65-F5344CB8AC3E}">
+        <p14:creationId xmlns:p14="http://schemas.microsoft.com/office/powerpoint/2010/main" val="3603947618"/>
+      </p:ext>
+    </p:extLst>
+  </p:cSld>
+  <p:clrMapOvr>
+    <a:masterClrMapping/>
+  </p:clrMapOvr>
+</p:sld>
+</file>
+
+<file path=ppt/slides/slide16.xml><?xml version="1.0" encoding="utf-8"?>
+<p:sld xmlns:a="http://schemas.openxmlformats.org/drawingml/2006/main" xmlns:r="http://schemas.openxmlformats.org/officeDocument/2006/relationships" xmlns:p="http://schemas.openxmlformats.org/presentationml/2006/main">
+  <p:cSld>
+    <p:spTree>
+      <p:nvGrpSpPr>
+        <p:cNvPr id="1" name=""/>
+        <p:cNvGrpSpPr/>
+        <p:nvPr/>
+      </p:nvGrpSpPr>
+      <p:grpSpPr>
+        <a:xfrm>
+          <a:off x="0" y="0"/>
+          <a:ext cx="0" cy="0"/>
+          <a:chOff x="0" y="0"/>
+          <a:chExt cx="0" cy="0"/>
+        </a:xfrm>
+      </p:grpSpPr>
+      <p:sp>
+        <p:nvSpPr>
+          <p:cNvPr id="2" name="Title 1">
+            <a:extLst>
+              <a:ext uri="{FF2B5EF4-FFF2-40B4-BE49-F238E27FC236}">
+                <a16:creationId xmlns:a16="http://schemas.microsoft.com/office/drawing/2014/main" id="{E29B01D6-A7CA-4A3E-9C66-C2AA33322F12}"/>
+              </a:ext>
+            </a:extLst>
+          </p:cNvPr>
+          <p:cNvSpPr>
+            <a:spLocks noGrp="1"/>
+          </p:cNvSpPr>
+          <p:nvPr>
+            <p:ph type="title"/>
+          </p:nvPr>
+        </p:nvSpPr>
+        <p:spPr/>
+        <p:txBody>
+          <a:bodyPr/>
+          <a:lstStyle/>
+          <a:p>
+            <a:r>
+              <a:rPr lang="en-US" dirty="0"/>
+              <a:t>Improvements to Mission Planning/Mission Execution Processes</a:t>
+            </a:r>
+          </a:p>
+        </p:txBody>
+      </p:sp>
+      <p:sp>
+        <p:nvSpPr>
+          <p:cNvPr id="3" name="Content Placeholder 2">
+            <a:extLst>
+              <a:ext uri="{FF2B5EF4-FFF2-40B4-BE49-F238E27FC236}">
+                <a16:creationId xmlns:a16="http://schemas.microsoft.com/office/drawing/2014/main" id="{F1842140-4ACB-41A9-BC7F-30570259E5D8}"/>
+              </a:ext>
+            </a:extLst>
+          </p:cNvPr>
+          <p:cNvSpPr>
+            <a:spLocks noGrp="1"/>
+          </p:cNvSpPr>
+          <p:nvPr>
+            <p:ph idx="1"/>
+          </p:nvPr>
+        </p:nvSpPr>
+        <p:spPr/>
+        <p:txBody>
+          <a:bodyPr>
+            <a:normAutofit lnSpcReduction="10000"/>
+          </a:bodyPr>
+          <a:lstStyle/>
+          <a:p>
+            <a:r>
+              <a:rPr lang="en-US" dirty="0"/>
+              <a:t>Reduced user clicks by dragging and dropping target tasking onto the web page</a:t>
+            </a:r>
+          </a:p>
+          <a:p>
+            <a:pPr lvl="1"/>
+            <a:r>
+              <a:rPr lang="en-US" dirty="0"/>
+              <a:t>1 click vs. 7+ clicks when importing ATO/ACO through Task View and porting over the targets/</a:t>
+            </a:r>
+            <a:r>
+              <a:rPr lang="en-US" dirty="0" err="1"/>
+              <a:t>GeoZones</a:t>
+            </a:r>
+            <a:r>
+              <a:rPr lang="en-US" dirty="0"/>
+              <a:t> into JMPS</a:t>
+            </a:r>
+          </a:p>
+          <a:p>
+            <a:r>
+              <a:rPr lang="en-US" dirty="0"/>
+              <a:t>Automated task scheduling based on survivability</a:t>
+            </a:r>
+          </a:p>
+          <a:p>
+            <a:r>
+              <a:rPr lang="en-US" dirty="0"/>
+              <a:t>Automated sortie scheduling given constraints/restraints</a:t>
+            </a:r>
+          </a:p>
+          <a:p>
+            <a:r>
+              <a:rPr lang="en-US" dirty="0"/>
+              <a:t>Dynamic sortie </a:t>
+            </a:r>
+            <a:r>
+              <a:rPr lang="en-US" dirty="0" err="1"/>
+              <a:t>replan</a:t>
+            </a:r>
+            <a:r>
+              <a:rPr lang="en-US" dirty="0"/>
+              <a:t> capability during Mission Execution</a:t>
+            </a:r>
+          </a:p>
+          <a:p>
+            <a:r>
+              <a:rPr lang="en-US" dirty="0"/>
+              <a:t>User-friendly drag and drop capability to create a friendly force laydown</a:t>
+            </a:r>
+          </a:p>
+          <a:p>
+            <a:pPr lvl="1"/>
+            <a:r>
+              <a:rPr lang="en-US" dirty="0"/>
+              <a:t>Once created, this can be saved and reloaded</a:t>
+            </a:r>
+          </a:p>
+          <a:p>
+            <a:pPr marL="914400" lvl="2" indent="0">
+              <a:buNone/>
+            </a:pPr>
+            <a:endParaRPr lang="en-US" dirty="0"/>
+          </a:p>
+          <a:p>
+            <a:pPr lvl="1"/>
+            <a:endParaRPr lang="en-US" dirty="0"/>
+          </a:p>
+        </p:txBody>
+      </p:sp>
+      <p:sp>
+        <p:nvSpPr>
+          <p:cNvPr id="4" name="Footer Placeholder 3">
+            <a:extLst>
+              <a:ext uri="{FF2B5EF4-FFF2-40B4-BE49-F238E27FC236}">
+                <a16:creationId xmlns:a16="http://schemas.microsoft.com/office/drawing/2014/main" id="{C401FFE3-F414-4CF5-AD6A-9C2DE5116ED4}"/>
+              </a:ext>
+            </a:extLst>
+          </p:cNvPr>
+          <p:cNvSpPr>
+            <a:spLocks noGrp="1"/>
+          </p:cNvSpPr>
+          <p:nvPr>
+            <p:ph type="ftr" sz="quarter" idx="11"/>
+          </p:nvPr>
+        </p:nvSpPr>
+        <p:spPr/>
+        <p:txBody>
+          <a:bodyPr/>
+          <a:lstStyle/>
+          <a:p>
+            <a:r>
+              <a:rPr lang="en-US">
+                <a:latin typeface="Courier New" panose="02070309020205020404" pitchFamily="49" charset="0"/>
+                <a:cs typeface="Courier New" panose="02070309020205020404" pitchFamily="49" charset="0"/>
+              </a:rPr>
+              <a:t>Team EJJ</a:t>
+            </a:r>
+            <a:endParaRPr lang="en-US" dirty="0">
+              <a:latin typeface="Courier New" panose="02070309020205020404" pitchFamily="49" charset="0"/>
+              <a:cs typeface="Courier New" panose="02070309020205020404" pitchFamily="49" charset="0"/>
+            </a:endParaRPr>
+          </a:p>
+        </p:txBody>
+      </p:sp>
+    </p:spTree>
+    <p:extLst>
+      <p:ext uri="{BB962C8B-B14F-4D97-AF65-F5344CB8AC3E}">
+        <p14:creationId xmlns:p14="http://schemas.microsoft.com/office/powerpoint/2010/main" val="3129570609"/>
+      </p:ext>
+    </p:extLst>
+  </p:cSld>
+  <p:clrMapOvr>
+    <a:masterClrMapping/>
+  </p:clrMapOvr>
+</p:sld>
+</file>
+
+<file path=ppt/slides/slide17.xml><?xml version="1.0" encoding="utf-8"?>
+<p:sld xmlns:a="http://schemas.openxmlformats.org/drawingml/2006/main" xmlns:r="http://schemas.openxmlformats.org/officeDocument/2006/relationships" xmlns:p="http://schemas.openxmlformats.org/presentationml/2006/main">
+  <p:cSld>
+    <p:spTree>
+      <p:nvGrpSpPr>
+        <p:cNvPr id="1" name=""/>
+        <p:cNvGrpSpPr/>
+        <p:nvPr/>
+      </p:nvGrpSpPr>
+      <p:grpSpPr>
+        <a:xfrm>
+          <a:off x="0" y="0"/>
+          <a:ext cx="0" cy="0"/>
+          <a:chOff x="0" y="0"/>
+          <a:chExt cx="0" cy="0"/>
+        </a:xfrm>
+      </p:grpSpPr>
+      <p:sp>
+        <p:nvSpPr>
+          <p:cNvPr id="4" name="Footer Placeholder 3">
+            <a:extLst>
+              <a:ext uri="{FF2B5EF4-FFF2-40B4-BE49-F238E27FC236}">
+                <a16:creationId xmlns:a16="http://schemas.microsoft.com/office/drawing/2014/main" id="{7B57FAC7-9A78-418C-B807-48ECCF0BCB6C}"/>
+              </a:ext>
+            </a:extLst>
+          </p:cNvPr>
+          <p:cNvSpPr>
+            <a:spLocks noGrp="1"/>
+          </p:cNvSpPr>
+          <p:nvPr>
+            <p:ph type="ftr" sz="quarter" idx="11"/>
+          </p:nvPr>
+        </p:nvSpPr>
+        <p:spPr/>
+        <p:txBody>
+          <a:bodyPr/>
+          <a:lstStyle/>
+          <a:p>
+            <a:r>
+              <a:rPr lang="en-US" dirty="0">
+                <a:latin typeface="Courier New" panose="02070309020205020404" pitchFamily="49" charset="0"/>
+                <a:cs typeface="Courier New" panose="02070309020205020404" pitchFamily="49" charset="0"/>
+              </a:rPr>
+              <a:t>Team EJJ</a:t>
+            </a:r>
+          </a:p>
+        </p:txBody>
+      </p:sp>
+      <p:pic>
+        <p:nvPicPr>
+          <p:cNvPr id="2050" name="Picture 2" descr="Gypsy Curse">
+            <a:extLst>
+              <a:ext uri="{FF2B5EF4-FFF2-40B4-BE49-F238E27FC236}">
+                <a16:creationId xmlns:a16="http://schemas.microsoft.com/office/drawing/2014/main" id="{7173D12A-5393-4EF8-B04F-3F560643558C}"/>
+              </a:ext>
+            </a:extLst>
+          </p:cNvPr>
+          <p:cNvPicPr>
+            <a:picLocks noChangeAspect="1" noChangeArrowheads="1"/>
+          </p:cNvPicPr>
+          <p:nvPr/>
+        </p:nvPicPr>
+        <p:blipFill>
+          <a:blip r:embed="rId2">
+            <a:extLst>
+              <a:ext uri="{28A0092B-C50C-407E-A947-70E740481C1C}">
+                <a14:useLocalDpi xmlns:a14="http://schemas.microsoft.com/office/drawing/2010/main" val="0"/>
+              </a:ext>
+            </a:extLst>
+          </a:blip>
+          <a:srcRect/>
+          <a:stretch>
+            <a:fillRect/>
+          </a:stretch>
+        </p:blipFill>
+        <p:spPr bwMode="auto">
+          <a:xfrm>
+            <a:off x="2250930" y="2440380"/>
+            <a:ext cx="7901631" cy="1831645"/>
+          </a:xfrm>
+          <a:prstGeom prst="rect">
+            <a:avLst/>
+          </a:prstGeom>
+          <a:noFill/>
+          <a:extLst>
+            <a:ext uri="{909E8E84-426E-40DD-AFC4-6F175D3DCCD1}">
+              <a14:hiddenFill xmlns:a14="http://schemas.microsoft.com/office/drawing/2010/main">
+                <a:solidFill>
+                  <a:srgbClr val="FFFFFF"/>
+                </a:solidFill>
+              </a14:hiddenFill>
+            </a:ext>
+          </a:extLst>
+        </p:spPr>
+      </p:pic>
+    </p:spTree>
+    <p:extLst>
+      <p:ext uri="{BB962C8B-B14F-4D97-AF65-F5344CB8AC3E}">
+        <p14:creationId xmlns:p14="http://schemas.microsoft.com/office/powerpoint/2010/main" val="935959818"/>
+      </p:ext>
+    </p:extLst>
+  </p:cSld>
+  <p:clrMapOvr>
+    <a:masterClrMapping/>
+  </p:clrMapOvr>
+</p:sld>
+</file>
+
 <file path=ppt/slides/slide18.xml><?xml version="1.0" encoding="utf-8"?>
 <p:sld xmlns:a="http://schemas.openxmlformats.org/drawingml/2006/main" xmlns:r="http://schemas.openxmlformats.org/officeDocument/2006/relationships" xmlns:p="http://schemas.openxmlformats.org/presentationml/2006/main">
   <p:cSld>
@@ -6285,50 +5090,59 @@
           <a:chExt cx="0" cy="0"/>
         </a:xfrm>
       </p:grpSpPr>
-      <p:sp>
-        <p:nvSpPr>
-          <p:cNvPr id="2" name="Title 1">
+      <p:pic>
+        <p:nvPicPr>
+          <p:cNvPr id="5" name="Picture 2" descr="352,927 Evil Stock Photos, Pictures &amp;amp; Royalty-Free Images - iStock">
             <a:extLst>
               <a:ext uri="{FF2B5EF4-FFF2-40B4-BE49-F238E27FC236}">
-                <a16:creationId xmlns="" xmlns:a16="http://schemas.microsoft.com/office/drawing/2014/main" id="{F957234A-F1A3-453E-8A2C-61F082D663C1}"/>
+                <a16:creationId xmlns:a16="http://schemas.microsoft.com/office/drawing/2014/main" id="{5F600820-50C2-44A6-A5E4-7D4D85DCC460}"/>
               </a:ext>
             </a:extLst>
           </p:cNvPr>
-          <p:cNvSpPr>
-            <a:spLocks noGrp="1"/>
-          </p:cNvSpPr>
-          <p:nvPr>
-            <p:ph type="title"/>
-          </p:nvPr>
-        </p:nvSpPr>
-        <p:spPr>
+          <p:cNvPicPr>
+            <a:picLocks noChangeAspect="1" noChangeArrowheads="1"/>
+          </p:cNvPicPr>
+          <p:nvPr/>
+        </p:nvPicPr>
+        <p:blipFill>
+          <a:blip r:embed="rId2">
+            <a:extLst>
+              <a:ext uri="{28A0092B-C50C-407E-A947-70E740481C1C}">
+                <a14:useLocalDpi xmlns:a14="http://schemas.microsoft.com/office/drawing/2010/main" val="0"/>
+              </a:ext>
+            </a:extLst>
+          </a:blip>
+          <a:srcRect/>
+          <a:stretch>
+            <a:fillRect/>
+          </a:stretch>
+        </p:blipFill>
+        <p:spPr bwMode="auto">
           <a:xfrm>
-            <a:off x="838200" y="365126"/>
-            <a:ext cx="10515600" cy="1095540"/>
+            <a:off x="1964229" y="136525"/>
+            <a:ext cx="8263542" cy="4334309"/>
           </a:xfrm>
+          <a:prstGeom prst="rect">
+            <a:avLst/>
+          </a:prstGeom>
+          <a:noFill/>
+          <a:extLst>
+            <a:ext uri="{909E8E84-426E-40DD-AFC4-6F175D3DCCD1}">
+              <a14:hiddenFill xmlns:a14="http://schemas.microsoft.com/office/drawing/2010/main">
+                <a:solidFill>
+                  <a:srgbClr val="FFFFFF"/>
+                </a:solidFill>
+              </a14:hiddenFill>
+            </a:ext>
+          </a:extLst>
         </p:spPr>
-        <p:txBody>
-          <a:bodyPr/>
-          <a:lstStyle/>
-          <a:p>
-            <a:r>
-              <a:rPr lang="en-US" dirty="0"/>
-              <a:t>Collaboration during Mission </a:t>
-            </a:r>
-            <a:r>
-              <a:rPr lang="en-US" dirty="0" smtClean="0"/>
-              <a:t>Planning (2)</a:t>
-            </a:r>
-            <a:endParaRPr lang="en-US" dirty="0"/>
-          </a:p>
-        </p:txBody>
-      </p:sp>
+      </p:pic>
       <p:sp>
         <p:nvSpPr>
           <p:cNvPr id="4" name="Footer Placeholder 3">
             <a:extLst>
               <a:ext uri="{FF2B5EF4-FFF2-40B4-BE49-F238E27FC236}">
-                <a16:creationId xmlns="" xmlns:a16="http://schemas.microsoft.com/office/drawing/2014/main" id="{169FFFA7-9B2C-49FC-AC49-66B5B7B7C039}"/>
+                <a16:creationId xmlns:a16="http://schemas.microsoft.com/office/drawing/2014/main" id="{7B57FAC7-9A78-418C-B807-48ECCF0BCB6C}"/>
               </a:ext>
             </a:extLst>
           </p:cNvPr>
@@ -6345,54 +5159,46 @@
           <a:lstStyle/>
           <a:p>
             <a:r>
-              <a:rPr lang="en-US">
+              <a:rPr lang="en-US" dirty="0">
                 <a:latin typeface="Courier New" panose="02070309020205020404" pitchFamily="49" charset="0"/>
                 <a:cs typeface="Courier New" panose="02070309020205020404" pitchFamily="49" charset="0"/>
               </a:rPr>
               <a:t>Team EJJ</a:t>
             </a:r>
-            <a:endParaRPr lang="en-US" dirty="0">
-              <a:latin typeface="Courier New" panose="02070309020205020404" pitchFamily="49" charset="0"/>
-              <a:cs typeface="Courier New" panose="02070309020205020404" pitchFamily="49" charset="0"/>
-            </a:endParaRPr>
-          </a:p>
-        </p:txBody>
-      </p:sp>
-      <p:sp>
-        <p:nvSpPr>
-          <p:cNvPr id="8" name="Content Placeholder 7">
+          </a:p>
+        </p:txBody>
+      </p:sp>
+      <p:sp>
+        <p:nvSpPr>
+          <p:cNvPr id="2" name="TextBox 1">
             <a:extLst>
               <a:ext uri="{FF2B5EF4-FFF2-40B4-BE49-F238E27FC236}">
-                <a16:creationId xmlns="" xmlns:a16="http://schemas.microsoft.com/office/drawing/2014/main" id="{2E7707F0-D0DA-4C8D-B2BA-9A55BACB9F14}"/>
+                <a16:creationId xmlns:a16="http://schemas.microsoft.com/office/drawing/2014/main" id="{ABD7F561-60CD-490C-A66A-7874934A3F0A}"/>
               </a:ext>
             </a:extLst>
           </p:cNvPr>
-          <p:cNvSpPr>
-            <a:spLocks noGrp="1"/>
-          </p:cNvSpPr>
-          <p:nvPr>
-            <p:ph idx="1"/>
-          </p:nvPr>
+          <p:cNvSpPr txBox="1"/>
+          <p:nvPr/>
         </p:nvSpPr>
         <p:spPr>
           <a:xfrm>
-            <a:off x="836221" y="1395351"/>
-            <a:ext cx="10515600" cy="4781612"/>
+            <a:off x="3090553" y="3580409"/>
+            <a:ext cx="7858496" cy="1107996"/>
           </a:xfrm>
+          <a:prstGeom prst="rect">
+            <a:avLst/>
+          </a:prstGeom>
+          <a:noFill/>
         </p:spPr>
         <p:txBody>
-          <a:bodyPr/>
-          <a:lstStyle/>
-          <a:p>
-            <a:r>
-              <a:rPr lang="en-US" dirty="0"/>
-              <a:t>Mission planners can collaboratively adjust, verify, and plan routes on targets</a:t>
-            </a:r>
-          </a:p>
-          <a:p>
-            <a:r>
-              <a:rPr lang="en-US" dirty="0"/>
-              <a:t>See progress of targets in real time </a:t>
+          <a:bodyPr wrap="square" rtlCol="0">
+            <a:spAutoFit/>
+          </a:bodyPr>
+          <a:lstStyle/>
+          <a:p>
+            <a:r>
+              <a:rPr lang="en-US" sz="6600" dirty="0"/>
+              <a:t>To be continued….</a:t>
             </a:r>
           </a:p>
         </p:txBody>
@@ -6400,7 +5206,7 @@
     </p:spTree>
     <p:extLst>
       <p:ext uri="{BB962C8B-B14F-4D97-AF65-F5344CB8AC3E}">
-        <p14:creationId xmlns:p14="http://schemas.microsoft.com/office/powerpoint/2010/main" val="3603947618"/>
+        <p14:creationId xmlns:p14="http://schemas.microsoft.com/office/powerpoint/2010/main" val="669830058"/>
       </p:ext>
     </p:extLst>
   </p:cSld>
@@ -6429,10 +5235,10 @@
       </p:grpSpPr>
       <p:sp>
         <p:nvSpPr>
-          <p:cNvPr id="2" name="Title 1">
+          <p:cNvPr id="4" name="Footer Placeholder 3">
             <a:extLst>
               <a:ext uri="{FF2B5EF4-FFF2-40B4-BE49-F238E27FC236}">
-                <a16:creationId xmlns="" xmlns:a16="http://schemas.microsoft.com/office/drawing/2014/main" id="{E29B01D6-A7CA-4A3E-9C66-C2AA33322F12}"/>
+                <a16:creationId xmlns:a16="http://schemas.microsoft.com/office/drawing/2014/main" id="{7B57FAC7-9A78-418C-B807-48ECCF0BCB6C}"/>
               </a:ext>
             </a:extLst>
           </p:cNvPr>
@@ -6440,7 +5246,7 @@
             <a:spLocks noGrp="1"/>
           </p:cNvSpPr>
           <p:nvPr>
-            <p:ph type="title"/>
+            <p:ph type="ftr" sz="quarter" idx="11"/>
           </p:nvPr>
         </p:nvSpPr>
         <p:spPr/>
@@ -6449,145 +5255,54 @@
           <a:lstStyle/>
           <a:p>
             <a:r>
-              <a:rPr lang="en-US" dirty="0"/>
-              <a:t>Improvements to Mission Planning/Mission Execution Processes</a:t>
-            </a:r>
-          </a:p>
-        </p:txBody>
-      </p:sp>
-      <p:sp>
-        <p:nvSpPr>
-          <p:cNvPr id="3" name="Content Placeholder 2">
+              <a:rPr lang="en-US" dirty="0">
+                <a:latin typeface="Courier New" panose="02070309020205020404" pitchFamily="49" charset="0"/>
+                <a:cs typeface="Courier New" panose="02070309020205020404" pitchFamily="49" charset="0"/>
+              </a:rPr>
+              <a:t>Team EJJ</a:t>
+            </a:r>
+          </a:p>
+        </p:txBody>
+      </p:sp>
+      <p:sp>
+        <p:nvSpPr>
+          <p:cNvPr id="2" name="TextBox 1">
             <a:extLst>
               <a:ext uri="{FF2B5EF4-FFF2-40B4-BE49-F238E27FC236}">
-                <a16:creationId xmlns="" xmlns:a16="http://schemas.microsoft.com/office/drawing/2014/main" id="{F1842140-4ACB-41A9-BC7F-30570259E5D8}"/>
+                <a16:creationId xmlns:a16="http://schemas.microsoft.com/office/drawing/2014/main" id="{ABD7F561-60CD-490C-A66A-7874934A3F0A}"/>
               </a:ext>
             </a:extLst>
           </p:cNvPr>
-          <p:cNvSpPr>
-            <a:spLocks noGrp="1"/>
-          </p:cNvSpPr>
-          <p:nvPr>
-            <p:ph idx="1"/>
-          </p:nvPr>
-        </p:nvSpPr>
-        <p:spPr/>
-        <p:txBody>
-          <a:bodyPr>
-            <a:normAutofit lnSpcReduction="10000"/>
+          <p:cNvSpPr txBox="1"/>
+          <p:nvPr/>
+        </p:nvSpPr>
+        <p:spPr>
+          <a:xfrm>
+            <a:off x="3642756" y="2689760"/>
+            <a:ext cx="7858496" cy="1107996"/>
+          </a:xfrm>
+          <a:prstGeom prst="rect">
+            <a:avLst/>
+          </a:prstGeom>
+          <a:noFill/>
+        </p:spPr>
+        <p:txBody>
+          <a:bodyPr wrap="square" rtlCol="0">
+            <a:spAutoFit/>
           </a:bodyPr>
           <a:lstStyle/>
           <a:p>
             <a:r>
-              <a:rPr lang="en-US" dirty="0"/>
-              <a:t>Reduced user clicks by dragging and dropping target tasking onto the web page</a:t>
-            </a:r>
-          </a:p>
-          <a:p>
-            <a:pPr lvl="1"/>
-            <a:r>
-              <a:rPr lang="en-US" dirty="0"/>
-              <a:t>1 click vs. 7+ clicks when importing ATO/ACO through Task View and porting over the targets/</a:t>
-            </a:r>
-            <a:r>
-              <a:rPr lang="en-US" dirty="0" err="1"/>
-              <a:t>GeoZones</a:t>
-            </a:r>
-            <a:r>
-              <a:rPr lang="en-US" dirty="0"/>
-              <a:t> into JMPS</a:t>
-            </a:r>
-          </a:p>
-          <a:p>
-            <a:r>
-              <a:rPr lang="en-US" dirty="0"/>
-              <a:t>Automated task scheduling based on survivability</a:t>
-            </a:r>
-          </a:p>
-          <a:p>
-            <a:r>
-              <a:rPr lang="en-US" dirty="0"/>
-              <a:t>Automated sortie scheduling given constraints/restraints</a:t>
-            </a:r>
-          </a:p>
-          <a:p>
-            <a:r>
-              <a:rPr lang="en-US" dirty="0"/>
-              <a:t>Dynamic sortie </a:t>
-            </a:r>
-            <a:r>
-              <a:rPr lang="en-US" dirty="0" err="1"/>
-              <a:t>replan</a:t>
-            </a:r>
-            <a:r>
-              <a:rPr lang="en-US" dirty="0"/>
-              <a:t> capability during Mission Execution</a:t>
-            </a:r>
-          </a:p>
-          <a:p>
-            <a:r>
-              <a:rPr lang="en-US" dirty="0"/>
-              <a:t>User-friendly drag and drop capability to create a friendly force laydown</a:t>
-            </a:r>
-          </a:p>
-          <a:p>
-            <a:pPr lvl="1"/>
-            <a:r>
-              <a:rPr lang="en-US" dirty="0"/>
-              <a:t>Once created, this can be saved and reloaded</a:t>
-            </a:r>
-          </a:p>
-          <a:p>
-            <a:pPr marL="914400" lvl="2" indent="0">
-              <a:buNone/>
-            </a:pPr>
-            <a:endParaRPr lang="en-US" dirty="0"/>
-          </a:p>
-          <a:p>
-            <a:pPr lvl="1"/>
-            <a:endParaRPr lang="en-US" dirty="0"/>
-          </a:p>
-        </p:txBody>
-      </p:sp>
-      <p:sp>
-        <p:nvSpPr>
-          <p:cNvPr id="4" name="Footer Placeholder 3">
-            <a:extLst>
-              <a:ext uri="{FF2B5EF4-FFF2-40B4-BE49-F238E27FC236}">
-                <a16:creationId xmlns="" xmlns:a16="http://schemas.microsoft.com/office/drawing/2014/main" id="{C401FFE3-F414-4CF5-AD6A-9C2DE5116ED4}"/>
-              </a:ext>
-            </a:extLst>
-          </p:cNvPr>
-          <p:cNvSpPr>
-            <a:spLocks noGrp="1"/>
-          </p:cNvSpPr>
-          <p:nvPr>
-            <p:ph type="ftr" sz="quarter" idx="11"/>
-          </p:nvPr>
-        </p:nvSpPr>
-        <p:spPr/>
-        <p:txBody>
-          <a:bodyPr/>
-          <a:lstStyle/>
-          <a:p>
-            <a:r>
-              <a:rPr lang="en-US">
-                <a:latin typeface="Courier New" panose="02070309020205020404" pitchFamily="49" charset="0"/>
-                <a:cs typeface="Courier New" panose="02070309020205020404" pitchFamily="49" charset="0"/>
-              </a:rPr>
-              <a:t>Team EJJ</a:t>
-            </a:r>
-            <a:endParaRPr lang="en-US" dirty="0">
-              <a:latin typeface="Courier New" panose="02070309020205020404" pitchFamily="49" charset="0"/>
-              <a:cs typeface="Courier New" panose="02070309020205020404" pitchFamily="49" charset="0"/>
-            </a:endParaRPr>
+              <a:rPr lang="en-US" sz="6600" dirty="0"/>
+              <a:t>Back up slides</a:t>
+            </a:r>
           </a:p>
         </p:txBody>
       </p:sp>
     </p:spTree>
     <p:extLst>
       <p:ext uri="{BB962C8B-B14F-4D97-AF65-F5344CB8AC3E}">
-        <p14:creationId xmlns:p14="http://schemas.microsoft.com/office/powerpoint/2010/main" val="3129570609"/>
+        <p14:creationId xmlns:p14="http://schemas.microsoft.com/office/powerpoint/2010/main" val="2167628825"/>
       </p:ext>
     </p:extLst>
   </p:cSld>
@@ -6619,7 +5334,7 @@
           <p:cNvPr id="2" name="Title 1">
             <a:extLst>
               <a:ext uri="{FF2B5EF4-FFF2-40B4-BE49-F238E27FC236}">
-                <a16:creationId xmlns="" xmlns:a16="http://schemas.microsoft.com/office/drawing/2014/main" id="{943DCFC8-26A0-4B2E-87F6-0E00BE3F7F5E}"/>
+                <a16:creationId xmlns:a16="http://schemas.microsoft.com/office/drawing/2014/main" id="{943DCFC8-26A0-4B2E-87F6-0E00BE3F7F5E}"/>
               </a:ext>
             </a:extLst>
           </p:cNvPr>
@@ -6655,7 +5370,7 @@
           <p:cNvPr id="4" name="Footer Placeholder 3">
             <a:extLst>
               <a:ext uri="{FF2B5EF4-FFF2-40B4-BE49-F238E27FC236}">
-                <a16:creationId xmlns="" xmlns:a16="http://schemas.microsoft.com/office/drawing/2014/main" id="{6280CF32-9815-4EEB-889D-75232A4BA741}"/>
+                <a16:creationId xmlns:a16="http://schemas.microsoft.com/office/drawing/2014/main" id="{6280CF32-9815-4EEB-889D-75232A4BA741}"/>
               </a:ext>
             </a:extLst>
           </p:cNvPr>
@@ -6686,7 +5401,7 @@
           <p:cNvPr id="6" name="Group 5">
             <a:extLst>
               <a:ext uri="{FF2B5EF4-FFF2-40B4-BE49-F238E27FC236}">
-                <a16:creationId xmlns="" xmlns:a16="http://schemas.microsoft.com/office/drawing/2014/main" id="{141E14CB-BF28-4A1A-8DAB-6FDD0BCD224C}"/>
+                <a16:creationId xmlns:a16="http://schemas.microsoft.com/office/drawing/2014/main" id="{141E14CB-BF28-4A1A-8DAB-6FDD0BCD224C}"/>
               </a:ext>
             </a:extLst>
           </p:cNvPr>
@@ -6706,7 +5421,7 @@
             <p:cNvPr id="3074" name="Picture 2" descr="A Double Date With Leatherface – Texas Monthly">
               <a:extLst>
                 <a:ext uri="{FF2B5EF4-FFF2-40B4-BE49-F238E27FC236}">
-                  <a16:creationId xmlns="" xmlns:a16="http://schemas.microsoft.com/office/drawing/2014/main" id="{22020642-5868-4C46-8AE5-DC542E41254C}"/>
+                  <a16:creationId xmlns:a16="http://schemas.microsoft.com/office/drawing/2014/main" id="{22020642-5868-4C46-8AE5-DC542E41254C}"/>
                 </a:ext>
               </a:extLst>
             </p:cNvPr>
@@ -6751,7 +5466,7 @@
             <p:cNvPr id="7" name="TextBox 6">
               <a:extLst>
                 <a:ext uri="{FF2B5EF4-FFF2-40B4-BE49-F238E27FC236}">
-                  <a16:creationId xmlns="" xmlns:a16="http://schemas.microsoft.com/office/drawing/2014/main" id="{0708C8B9-A3AB-450B-81C4-A103DD3FC083}"/>
+                  <a16:creationId xmlns:a16="http://schemas.microsoft.com/office/drawing/2014/main" id="{0708C8B9-A3AB-450B-81C4-A103DD3FC083}"/>
                 </a:ext>
               </a:extLst>
             </p:cNvPr>
@@ -6799,7 +5514,7 @@
           <p:cNvPr id="9" name="TextBox 8">
             <a:extLst>
               <a:ext uri="{FF2B5EF4-FFF2-40B4-BE49-F238E27FC236}">
-                <a16:creationId xmlns="" xmlns:a16="http://schemas.microsoft.com/office/drawing/2014/main" id="{7F019BA2-3C4B-4F8D-A2EA-AB79D8D7B61B}"/>
+                <a16:creationId xmlns:a16="http://schemas.microsoft.com/office/drawing/2014/main" id="{7F019BA2-3C4B-4F8D-A2EA-AB79D8D7B61B}"/>
               </a:ext>
             </a:extLst>
           </p:cNvPr>
@@ -6889,7 +5604,7 @@
           <p:cNvPr id="10" name="TextBox 9">
             <a:extLst>
               <a:ext uri="{FF2B5EF4-FFF2-40B4-BE49-F238E27FC236}">
-                <a16:creationId xmlns="" xmlns:a16="http://schemas.microsoft.com/office/drawing/2014/main" id="{8418428D-5EA6-4972-8C73-2F7AA4740CBC}"/>
+                <a16:creationId xmlns:a16="http://schemas.microsoft.com/office/drawing/2014/main" id="{8418428D-5EA6-4972-8C73-2F7AA4740CBC}"/>
               </a:ext>
             </a:extLst>
           </p:cNvPr>
@@ -6936,7 +5651,7 @@
           <p:cNvPr id="3080" name="Picture 8" descr="In his new book, &amp;#39;Cabinet of Curiosities,&amp;#39; director Guillermo del Toro  reveals the inspiration behind his monstrous creations - New York Daily News">
             <a:extLst>
               <a:ext uri="{FF2B5EF4-FFF2-40B4-BE49-F238E27FC236}">
-                <a16:creationId xmlns="" xmlns:a16="http://schemas.microsoft.com/office/drawing/2014/main" id="{0D4F2247-B974-4A2A-86D2-A0F7662B0C85}"/>
+                <a16:creationId xmlns:a16="http://schemas.microsoft.com/office/drawing/2014/main" id="{0D4F2247-B974-4A2A-86D2-A0F7662B0C85}"/>
               </a:ext>
             </a:extLst>
           </p:cNvPr>
@@ -6983,7 +5698,7 @@
           <p:cNvPr id="3082" name="Picture 10" descr="Michael Myers | Villains Wiki | Fandom">
             <a:extLst>
               <a:ext uri="{FF2B5EF4-FFF2-40B4-BE49-F238E27FC236}">
-                <a16:creationId xmlns="" xmlns:a16="http://schemas.microsoft.com/office/drawing/2014/main" id="{B503C72F-E6FB-4C72-B77E-F21080370CEE}"/>
+                <a16:creationId xmlns:a16="http://schemas.microsoft.com/office/drawing/2014/main" id="{B503C72F-E6FB-4C72-B77E-F21080370CEE}"/>
               </a:ext>
             </a:extLst>
           </p:cNvPr>
@@ -7030,7 +5745,7 @@
           <p:cNvPr id="14" name="Picture 13">
             <a:extLst>
               <a:ext uri="{FF2B5EF4-FFF2-40B4-BE49-F238E27FC236}">
-                <a16:creationId xmlns="" xmlns:a16="http://schemas.microsoft.com/office/drawing/2014/main" id="{AA5F475A-5677-4D61-ACA5-D6FF94854F8B}"/>
+                <a16:creationId xmlns:a16="http://schemas.microsoft.com/office/drawing/2014/main" id="{AA5F475A-5677-4D61-ACA5-D6FF94854F8B}"/>
               </a:ext>
             </a:extLst>
           </p:cNvPr>
@@ -7087,13 +5802,117 @@
       </p:grpSpPr>
       <p:sp>
         <p:nvSpPr>
-          <p:cNvPr id="4" name="Footer Placeholder 3">
-            <a:extLst>
-              <a:ext uri="{FF2B5EF4-FFF2-40B4-BE49-F238E27FC236}">
-                <a16:creationId xmlns="" xmlns:a16="http://schemas.microsoft.com/office/drawing/2014/main" id="{7B57FAC7-9A78-418C-B807-48ECCF0BCB6C}"/>
-              </a:ext>
-            </a:extLst>
-          </p:cNvPr>
+          <p:cNvPr id="2" name="Title 1"/>
+          <p:cNvSpPr>
+            <a:spLocks noGrp="1"/>
+          </p:cNvSpPr>
+          <p:nvPr>
+            <p:ph type="title"/>
+          </p:nvPr>
+        </p:nvSpPr>
+        <p:spPr>
+          <a:xfrm>
+            <a:off x="838200" y="298623"/>
+            <a:ext cx="10515600" cy="1325563"/>
+          </a:xfrm>
+        </p:spPr>
+        <p:txBody>
+          <a:bodyPr/>
+          <a:lstStyle/>
+          <a:p>
+            <a:r>
+              <a:rPr lang="en-US" dirty="0"/>
+              <a:t>EJJ Scheduling Algorithm Details (1)</a:t>
+            </a:r>
+          </a:p>
+        </p:txBody>
+      </p:sp>
+      <p:sp>
+        <p:nvSpPr>
+          <p:cNvPr id="3" name="Content Placeholder 2"/>
+          <p:cNvSpPr>
+            <a:spLocks noGrp="1"/>
+          </p:cNvSpPr>
+          <p:nvPr>
+            <p:ph idx="1"/>
+          </p:nvPr>
+        </p:nvSpPr>
+        <p:spPr/>
+        <p:txBody>
+          <a:bodyPr>
+            <a:normAutofit fontScale="92500" lnSpcReduction="10000"/>
+          </a:bodyPr>
+          <a:lstStyle/>
+          <a:p>
+            <a:r>
+              <a:rPr lang="en-US" dirty="0"/>
+              <a:t>Inputs:</a:t>
+            </a:r>
+          </a:p>
+          <a:p>
+            <a:pPr lvl="1"/>
+            <a:r>
+              <a:rPr lang="en-US" dirty="0"/>
+              <a:t>Constraints/Restraints, Inventory, Maximum Sortie Length, Earliest Start Time</a:t>
+            </a:r>
+          </a:p>
+          <a:p>
+            <a:pPr marL="457200" lvl="1" indent="0">
+              <a:buNone/>
+            </a:pPr>
+            <a:endParaRPr lang="en-US" dirty="0"/>
+          </a:p>
+          <a:p>
+            <a:r>
+              <a:rPr lang="en-US" dirty="0"/>
+              <a:t>Start by finding a carrier with more jets and pilots to be the carrier to start the sortie from</a:t>
+            </a:r>
+          </a:p>
+          <a:p>
+            <a:pPr lvl="1"/>
+            <a:r>
+              <a:rPr lang="en-US" dirty="0"/>
+              <a:t>Also try to find a carrier with available </a:t>
+            </a:r>
+            <a:r>
+              <a:rPr lang="en-US" dirty="0" err="1"/>
+              <a:t>helos</a:t>
+            </a:r>
+            <a:endParaRPr lang="en-US" dirty="0"/>
+          </a:p>
+          <a:p>
+            <a:r>
+              <a:rPr lang="en-US" dirty="0"/>
+              <a:t>The number of jets/pilots needed is determined by the number of missiles needed for 90% probability of success at striking the target depending on the requirement (i.e. disable or destroy)</a:t>
+            </a:r>
+          </a:p>
+          <a:p>
+            <a:pPr lvl="1"/>
+            <a:r>
+              <a:rPr lang="en-US" dirty="0"/>
+              <a:t>Also depends on the chosen </a:t>
+            </a:r>
+            <a:r>
+              <a:rPr lang="en-US" dirty="0" err="1"/>
+              <a:t>jets’s</a:t>
+            </a:r>
+            <a:r>
+              <a:rPr lang="en-US" dirty="0"/>
+              <a:t> missile carriage capacity</a:t>
+            </a:r>
+          </a:p>
+          <a:p>
+            <a:pPr lvl="1"/>
+            <a:r>
+              <a:rPr lang="en-US" dirty="0"/>
+              <a:t>Assuming that each jet can carry only 1 missile at first; Will have more jets/pilots to choose the final set from</a:t>
+            </a:r>
+          </a:p>
+        </p:txBody>
+      </p:sp>
+      <p:sp>
+        <p:nvSpPr>
+          <p:cNvPr id="4" name="Footer Placeholder 3"/>
           <p:cNvSpPr>
             <a:spLocks noGrp="1"/>
           </p:cNvSpPr>
@@ -7107,66 +5926,23 @@
           <a:lstStyle/>
           <a:p>
             <a:r>
-              <a:rPr lang="en-US" dirty="0">
+              <a:rPr lang="en-US">
                 <a:latin typeface="Courier New" panose="02070309020205020404" pitchFamily="49" charset="0"/>
                 <a:cs typeface="Courier New" panose="02070309020205020404" pitchFamily="49" charset="0"/>
               </a:rPr>
               <a:t>Team EJJ</a:t>
             </a:r>
-          </a:p>
-        </p:txBody>
-      </p:sp>
-      <p:pic>
-        <p:nvPicPr>
-          <p:cNvPr id="2050" name="Picture 2" descr="Gypsy Curse">
-            <a:extLst>
-              <a:ext uri="{FF2B5EF4-FFF2-40B4-BE49-F238E27FC236}">
-                <a16:creationId xmlns="" xmlns:a16="http://schemas.microsoft.com/office/drawing/2014/main" id="{7173D12A-5393-4EF8-B04F-3F560643558C}"/>
-              </a:ext>
-            </a:extLst>
-          </p:cNvPr>
-          <p:cNvPicPr>
-            <a:picLocks noChangeAspect="1" noChangeArrowheads="1"/>
-          </p:cNvPicPr>
-          <p:nvPr/>
-        </p:nvPicPr>
-        <p:blipFill>
-          <a:blip r:embed="rId2">
-            <a:extLst>
-              <a:ext uri="{28A0092B-C50C-407E-A947-70E740481C1C}">
-                <a14:useLocalDpi xmlns:a14="http://schemas.microsoft.com/office/drawing/2010/main" val="0"/>
-              </a:ext>
-            </a:extLst>
-          </a:blip>
-          <a:srcRect/>
-          <a:stretch>
-            <a:fillRect/>
-          </a:stretch>
-        </p:blipFill>
-        <p:spPr bwMode="auto">
-          <a:xfrm>
-            <a:off x="2250930" y="2440380"/>
-            <a:ext cx="7901631" cy="1831645"/>
-          </a:xfrm>
-          <a:prstGeom prst="rect">
-            <a:avLst/>
-          </a:prstGeom>
-          <a:noFill/>
-          <a:extLst>
-            <a:ext uri="{909E8E84-426E-40DD-AFC4-6F175D3DCCD1}">
-              <a14:hiddenFill xmlns:a14="http://schemas.microsoft.com/office/drawing/2010/main">
-                <a:solidFill>
-                  <a:srgbClr val="FFFFFF"/>
-                </a:solidFill>
-              </a14:hiddenFill>
-            </a:ext>
-          </a:extLst>
-        </p:spPr>
-      </p:pic>
+            <a:endParaRPr lang="en-US" dirty="0">
+              <a:latin typeface="Courier New" panose="02070309020205020404" pitchFamily="49" charset="0"/>
+              <a:cs typeface="Courier New" panose="02070309020205020404" pitchFamily="49" charset="0"/>
+            </a:endParaRPr>
+          </a:p>
+        </p:txBody>
+      </p:sp>
     </p:spTree>
     <p:extLst>
       <p:ext uri="{BB962C8B-B14F-4D97-AF65-F5344CB8AC3E}">
-        <p14:creationId xmlns:p14="http://schemas.microsoft.com/office/powerpoint/2010/main" val="935959818"/>
+        <p14:creationId xmlns:p14="http://schemas.microsoft.com/office/powerpoint/2010/main" val="1567541983"/>
       </p:ext>
     </p:extLst>
   </p:cSld>
@@ -7193,62 +5969,116 @@
           <a:chExt cx="0" cy="0"/>
         </a:xfrm>
       </p:grpSpPr>
-      <p:pic>
-        <p:nvPicPr>
-          <p:cNvPr id="5" name="Picture 2" descr="352,927 Evil Stock Photos, Pictures &amp;amp; Royalty-Free Images - iStock">
-            <a:extLst>
-              <a:ext uri="{FF2B5EF4-FFF2-40B4-BE49-F238E27FC236}">
-                <a16:creationId xmlns="" xmlns:a16="http://schemas.microsoft.com/office/drawing/2014/main" id="{5F600820-50C2-44A6-A5E4-7D4D85DCC460}"/>
-              </a:ext>
-            </a:extLst>
-          </p:cNvPr>
-          <p:cNvPicPr>
-            <a:picLocks noChangeAspect="1" noChangeArrowheads="1"/>
-          </p:cNvPicPr>
-          <p:nvPr/>
-        </p:nvPicPr>
-        <p:blipFill>
-          <a:blip r:embed="rId2">
-            <a:extLst>
-              <a:ext uri="{28A0092B-C50C-407E-A947-70E740481C1C}">
-                <a14:useLocalDpi xmlns:a14="http://schemas.microsoft.com/office/drawing/2010/main" val="0"/>
-              </a:ext>
-            </a:extLst>
-          </a:blip>
-          <a:srcRect/>
-          <a:stretch>
-            <a:fillRect/>
-          </a:stretch>
-        </p:blipFill>
-        <p:spPr bwMode="auto">
+      <p:sp>
+        <p:nvSpPr>
+          <p:cNvPr id="2" name="Title 1"/>
+          <p:cNvSpPr>
+            <a:spLocks noGrp="1"/>
+          </p:cNvSpPr>
+          <p:nvPr>
+            <p:ph type="title"/>
+          </p:nvPr>
+        </p:nvSpPr>
+        <p:spPr>
           <a:xfrm>
-            <a:off x="1964229" y="136525"/>
-            <a:ext cx="8263542" cy="4334309"/>
+            <a:off x="838200" y="298623"/>
+            <a:ext cx="10515600" cy="1325563"/>
           </a:xfrm>
-          <a:prstGeom prst="rect">
-            <a:avLst/>
-          </a:prstGeom>
-          <a:noFill/>
-          <a:extLst>
-            <a:ext uri="{909E8E84-426E-40DD-AFC4-6F175D3DCCD1}">
-              <a14:hiddenFill xmlns:a14="http://schemas.microsoft.com/office/drawing/2010/main">
-                <a:solidFill>
-                  <a:srgbClr val="FFFFFF"/>
-                </a:solidFill>
-              </a14:hiddenFill>
-            </a:ext>
-          </a:extLst>
         </p:spPr>
-      </p:pic>
-      <p:sp>
-        <p:nvSpPr>
-          <p:cNvPr id="4" name="Footer Placeholder 3">
-            <a:extLst>
-              <a:ext uri="{FF2B5EF4-FFF2-40B4-BE49-F238E27FC236}">
-                <a16:creationId xmlns="" xmlns:a16="http://schemas.microsoft.com/office/drawing/2014/main" id="{7B57FAC7-9A78-418C-B807-48ECCF0BCB6C}"/>
-              </a:ext>
-            </a:extLst>
-          </p:cNvPr>
+        <p:txBody>
+          <a:bodyPr/>
+          <a:lstStyle/>
+          <a:p>
+            <a:r>
+              <a:rPr lang="en-US" dirty="0"/>
+              <a:t>EJJ Scheduling Algorithm Details (2)</a:t>
+            </a:r>
+          </a:p>
+        </p:txBody>
+      </p:sp>
+      <p:sp>
+        <p:nvSpPr>
+          <p:cNvPr id="3" name="Content Placeholder 2"/>
+          <p:cNvSpPr>
+            <a:spLocks noGrp="1"/>
+          </p:cNvSpPr>
+          <p:nvPr>
+            <p:ph idx="1"/>
+          </p:nvPr>
+        </p:nvSpPr>
+        <p:spPr/>
+        <p:txBody>
+          <a:bodyPr>
+            <a:normAutofit fontScale="92500" lnSpcReduction="10000"/>
+          </a:bodyPr>
+          <a:lstStyle/>
+          <a:p>
+            <a:r>
+              <a:rPr lang="en-US" dirty="0"/>
+              <a:t>If there aren’t enough jets, pilots, and/or </a:t>
+            </a:r>
+            <a:r>
+              <a:rPr lang="en-US" dirty="0" err="1"/>
+              <a:t>helos</a:t>
+            </a:r>
+            <a:r>
+              <a:rPr lang="en-US" dirty="0"/>
+              <a:t> on that carrier, store possible repositions of the least  amount of jets/pilots/</a:t>
+            </a:r>
+            <a:r>
+              <a:rPr lang="en-US" dirty="0" err="1"/>
+              <a:t>helos</a:t>
+            </a:r>
+            <a:r>
+              <a:rPr lang="en-US" dirty="0"/>
+              <a:t> to the carrier possible</a:t>
+            </a:r>
+          </a:p>
+          <a:p>
+            <a:pPr lvl="1"/>
+            <a:r>
+              <a:rPr lang="en-US" dirty="0"/>
+              <a:t>Use what we can on the carrier already</a:t>
+            </a:r>
+          </a:p>
+          <a:p>
+            <a:r>
+              <a:rPr lang="en-US" dirty="0"/>
+              <a:t>Given the available subset of the jets on a carrier (after possible repositions, if necessary), find the first set of jets that can fly together</a:t>
+            </a:r>
+          </a:p>
+          <a:p>
+            <a:pPr lvl="1"/>
+            <a:r>
+              <a:rPr lang="en-US" dirty="0"/>
+              <a:t>The number of jets chosen is based on their missile carriage capacity and the number of missiles needed</a:t>
+            </a:r>
+          </a:p>
+          <a:p>
+            <a:r>
+              <a:rPr lang="en-US" dirty="0"/>
+              <a:t>Once the jets are found, then that determines the number of pilots needed</a:t>
+            </a:r>
+          </a:p>
+          <a:p>
+            <a:pPr lvl="1"/>
+            <a:r>
+              <a:rPr lang="en-US" dirty="0"/>
+              <a:t>Find the first set of pilots that can fly with each other, and most importantly has a pilot that can fly with each jet</a:t>
+            </a:r>
+          </a:p>
+          <a:p>
+            <a:pPr lvl="1"/>
+            <a:r>
+              <a:rPr lang="en-US" dirty="0"/>
+              <a:t>Map the pilots to the jets</a:t>
+            </a:r>
+          </a:p>
+        </p:txBody>
+      </p:sp>
+      <p:sp>
+        <p:nvSpPr>
+          <p:cNvPr id="4" name="Footer Placeholder 3"/>
           <p:cNvSpPr>
             <a:spLocks noGrp="1"/>
           </p:cNvSpPr>
@@ -7262,54 +6092,23 @@
           <a:lstStyle/>
           <a:p>
             <a:r>
-              <a:rPr lang="en-US" dirty="0">
+              <a:rPr lang="en-US">
                 <a:latin typeface="Courier New" panose="02070309020205020404" pitchFamily="49" charset="0"/>
                 <a:cs typeface="Courier New" panose="02070309020205020404" pitchFamily="49" charset="0"/>
               </a:rPr>
               <a:t>Team EJJ</a:t>
             </a:r>
-          </a:p>
-        </p:txBody>
-      </p:sp>
-      <p:sp>
-        <p:nvSpPr>
-          <p:cNvPr id="2" name="TextBox 1">
-            <a:extLst>
-              <a:ext uri="{FF2B5EF4-FFF2-40B4-BE49-F238E27FC236}">
-                <a16:creationId xmlns="" xmlns:a16="http://schemas.microsoft.com/office/drawing/2014/main" id="{ABD7F561-60CD-490C-A66A-7874934A3F0A}"/>
-              </a:ext>
-            </a:extLst>
-          </p:cNvPr>
-          <p:cNvSpPr txBox="1"/>
-          <p:nvPr/>
-        </p:nvSpPr>
-        <p:spPr>
-          <a:xfrm>
-            <a:off x="3090553" y="3580409"/>
-            <a:ext cx="7858496" cy="1107996"/>
-          </a:xfrm>
-          <a:prstGeom prst="rect">
-            <a:avLst/>
-          </a:prstGeom>
-          <a:noFill/>
-        </p:spPr>
-        <p:txBody>
-          <a:bodyPr wrap="square" rtlCol="0">
-            <a:spAutoFit/>
-          </a:bodyPr>
-          <a:lstStyle/>
-          <a:p>
-            <a:r>
-              <a:rPr lang="en-US" sz="6600" dirty="0"/>
-              <a:t>To be continued….</a:t>
-            </a:r>
+            <a:endParaRPr lang="en-US" dirty="0">
+              <a:latin typeface="Courier New" panose="02070309020205020404" pitchFamily="49" charset="0"/>
+              <a:cs typeface="Courier New" panose="02070309020205020404" pitchFamily="49" charset="0"/>
+            </a:endParaRPr>
           </a:p>
         </p:txBody>
       </p:sp>
     </p:spTree>
     <p:extLst>
       <p:ext uri="{BB962C8B-B14F-4D97-AF65-F5344CB8AC3E}">
-        <p14:creationId xmlns:p14="http://schemas.microsoft.com/office/powerpoint/2010/main" val="669830058"/>
+        <p14:creationId xmlns:p14="http://schemas.microsoft.com/office/powerpoint/2010/main" val="1878794731"/>
       </p:ext>
     </p:extLst>
   </p:cSld>
@@ -7338,437 +6137,6 @@
       </p:grpSpPr>
       <p:sp>
         <p:nvSpPr>
-          <p:cNvPr id="4" name="Footer Placeholder 3">
-            <a:extLst>
-              <a:ext uri="{FF2B5EF4-FFF2-40B4-BE49-F238E27FC236}">
-                <a16:creationId xmlns="" xmlns:a16="http://schemas.microsoft.com/office/drawing/2014/main" id="{7B57FAC7-9A78-418C-B807-48ECCF0BCB6C}"/>
-              </a:ext>
-            </a:extLst>
-          </p:cNvPr>
-          <p:cNvSpPr>
-            <a:spLocks noGrp="1"/>
-          </p:cNvSpPr>
-          <p:nvPr>
-            <p:ph type="ftr" sz="quarter" idx="11"/>
-          </p:nvPr>
-        </p:nvSpPr>
-        <p:spPr/>
-        <p:txBody>
-          <a:bodyPr/>
-          <a:lstStyle/>
-          <a:p>
-            <a:r>
-              <a:rPr lang="en-US" dirty="0">
-                <a:latin typeface="Courier New" panose="02070309020205020404" pitchFamily="49" charset="0"/>
-                <a:cs typeface="Courier New" panose="02070309020205020404" pitchFamily="49" charset="0"/>
-              </a:rPr>
-              <a:t>Team EJJ</a:t>
-            </a:r>
-          </a:p>
-        </p:txBody>
-      </p:sp>
-      <p:sp>
-        <p:nvSpPr>
-          <p:cNvPr id="2" name="TextBox 1">
-            <a:extLst>
-              <a:ext uri="{FF2B5EF4-FFF2-40B4-BE49-F238E27FC236}">
-                <a16:creationId xmlns="" xmlns:a16="http://schemas.microsoft.com/office/drawing/2014/main" id="{ABD7F561-60CD-490C-A66A-7874934A3F0A}"/>
-              </a:ext>
-            </a:extLst>
-          </p:cNvPr>
-          <p:cNvSpPr txBox="1"/>
-          <p:nvPr/>
-        </p:nvSpPr>
-        <p:spPr>
-          <a:xfrm>
-            <a:off x="3642756" y="2689760"/>
-            <a:ext cx="7858496" cy="1107996"/>
-          </a:xfrm>
-          <a:prstGeom prst="rect">
-            <a:avLst/>
-          </a:prstGeom>
-          <a:noFill/>
-        </p:spPr>
-        <p:txBody>
-          <a:bodyPr wrap="square" rtlCol="0">
-            <a:spAutoFit/>
-          </a:bodyPr>
-          <a:lstStyle/>
-          <a:p>
-            <a:r>
-              <a:rPr lang="en-US" sz="6600" dirty="0"/>
-              <a:t>Back up slides</a:t>
-            </a:r>
-          </a:p>
-        </p:txBody>
-      </p:sp>
-    </p:spTree>
-    <p:extLst>
-      <p:ext uri="{BB962C8B-B14F-4D97-AF65-F5344CB8AC3E}">
-        <p14:creationId xmlns:p14="http://schemas.microsoft.com/office/powerpoint/2010/main" val="2167628825"/>
-      </p:ext>
-    </p:extLst>
-  </p:cSld>
-  <p:clrMapOvr>
-    <a:masterClrMapping/>
-  </p:clrMapOvr>
-</p:sld>
-</file>
-
-<file path=ppt/slides/slide23.xml><?xml version="1.0" encoding="utf-8"?>
-<p:sld xmlns:a="http://schemas.openxmlformats.org/drawingml/2006/main" xmlns:r="http://schemas.openxmlformats.org/officeDocument/2006/relationships" xmlns:p="http://schemas.openxmlformats.org/presentationml/2006/main">
-  <p:cSld>
-    <p:spTree>
-      <p:nvGrpSpPr>
-        <p:cNvPr id="1" name=""/>
-        <p:cNvGrpSpPr/>
-        <p:nvPr/>
-      </p:nvGrpSpPr>
-      <p:grpSpPr>
-        <a:xfrm>
-          <a:off x="0" y="0"/>
-          <a:ext cx="0" cy="0"/>
-          <a:chOff x="0" y="0"/>
-          <a:chExt cx="0" cy="0"/>
-        </a:xfrm>
-      </p:grpSpPr>
-      <p:sp>
-        <p:nvSpPr>
-          <p:cNvPr id="2" name="Title 1"/>
-          <p:cNvSpPr>
-            <a:spLocks noGrp="1"/>
-          </p:cNvSpPr>
-          <p:nvPr>
-            <p:ph type="title"/>
-          </p:nvPr>
-        </p:nvSpPr>
-        <p:spPr>
-          <a:xfrm>
-            <a:off x="838200" y="298623"/>
-            <a:ext cx="10515600" cy="1325563"/>
-          </a:xfrm>
-        </p:spPr>
-        <p:txBody>
-          <a:bodyPr/>
-          <a:lstStyle/>
-          <a:p>
-            <a:r>
-              <a:rPr lang="en-US" dirty="0"/>
-              <a:t>EJJ Scheduling Algorithm Details (1)</a:t>
-            </a:r>
-          </a:p>
-        </p:txBody>
-      </p:sp>
-      <p:sp>
-        <p:nvSpPr>
-          <p:cNvPr id="3" name="Content Placeholder 2"/>
-          <p:cNvSpPr>
-            <a:spLocks noGrp="1"/>
-          </p:cNvSpPr>
-          <p:nvPr>
-            <p:ph idx="1"/>
-          </p:nvPr>
-        </p:nvSpPr>
-        <p:spPr/>
-        <p:txBody>
-          <a:bodyPr>
-            <a:normAutofit fontScale="92500" lnSpcReduction="10000"/>
-          </a:bodyPr>
-          <a:lstStyle/>
-          <a:p>
-            <a:r>
-              <a:rPr lang="en-US" dirty="0"/>
-              <a:t>Inputs:</a:t>
-            </a:r>
-          </a:p>
-          <a:p>
-            <a:pPr lvl="1"/>
-            <a:r>
-              <a:rPr lang="en-US" dirty="0"/>
-              <a:t>Constraints/Restraints, Inventory, Maximum Sortie Length, Earliest Start Time</a:t>
-            </a:r>
-          </a:p>
-          <a:p>
-            <a:pPr marL="457200" lvl="1" indent="0">
-              <a:buNone/>
-            </a:pPr>
-            <a:endParaRPr lang="en-US" dirty="0"/>
-          </a:p>
-          <a:p>
-            <a:r>
-              <a:rPr lang="en-US" dirty="0"/>
-              <a:t>Start by finding a carrier with more jets and pilots to be the carrier to start the sortie from</a:t>
-            </a:r>
-          </a:p>
-          <a:p>
-            <a:pPr lvl="1"/>
-            <a:r>
-              <a:rPr lang="en-US" dirty="0"/>
-              <a:t>Also try to find a carrier with available </a:t>
-            </a:r>
-            <a:r>
-              <a:rPr lang="en-US" dirty="0" err="1"/>
-              <a:t>helos</a:t>
-            </a:r>
-            <a:endParaRPr lang="en-US" dirty="0"/>
-          </a:p>
-          <a:p>
-            <a:r>
-              <a:rPr lang="en-US" dirty="0"/>
-              <a:t>The number of jets/pilots needed is determined by the number of missiles needed for 90% probability of success at striking the target depending on the requirement (i.e. disable or destroy)</a:t>
-            </a:r>
-          </a:p>
-          <a:p>
-            <a:pPr lvl="1"/>
-            <a:r>
-              <a:rPr lang="en-US" dirty="0"/>
-              <a:t>Also depends on the chosen </a:t>
-            </a:r>
-            <a:r>
-              <a:rPr lang="en-US" dirty="0" err="1"/>
-              <a:t>jets’s</a:t>
-            </a:r>
-            <a:r>
-              <a:rPr lang="en-US" dirty="0"/>
-              <a:t> missile carriage capacity</a:t>
-            </a:r>
-          </a:p>
-          <a:p>
-            <a:pPr lvl="1"/>
-            <a:r>
-              <a:rPr lang="en-US" dirty="0"/>
-              <a:t>Assuming that each jet can carry only 1 missile at first; Will have more jets/pilots to choose the final set from</a:t>
-            </a:r>
-          </a:p>
-        </p:txBody>
-      </p:sp>
-      <p:sp>
-        <p:nvSpPr>
-          <p:cNvPr id="4" name="Footer Placeholder 3"/>
-          <p:cNvSpPr>
-            <a:spLocks noGrp="1"/>
-          </p:cNvSpPr>
-          <p:nvPr>
-            <p:ph type="ftr" sz="quarter" idx="11"/>
-          </p:nvPr>
-        </p:nvSpPr>
-        <p:spPr/>
-        <p:txBody>
-          <a:bodyPr/>
-          <a:lstStyle/>
-          <a:p>
-            <a:r>
-              <a:rPr lang="en-US">
-                <a:latin typeface="Courier New" panose="02070309020205020404" pitchFamily="49" charset="0"/>
-                <a:cs typeface="Courier New" panose="02070309020205020404" pitchFamily="49" charset="0"/>
-              </a:rPr>
-              <a:t>Team EJJ</a:t>
-            </a:r>
-            <a:endParaRPr lang="en-US" dirty="0">
-              <a:latin typeface="Courier New" panose="02070309020205020404" pitchFamily="49" charset="0"/>
-              <a:cs typeface="Courier New" panose="02070309020205020404" pitchFamily="49" charset="0"/>
-            </a:endParaRPr>
-          </a:p>
-        </p:txBody>
-      </p:sp>
-    </p:spTree>
-    <p:extLst>
-      <p:ext uri="{BB962C8B-B14F-4D97-AF65-F5344CB8AC3E}">
-        <p14:creationId xmlns:p14="http://schemas.microsoft.com/office/powerpoint/2010/main" val="1567541983"/>
-      </p:ext>
-    </p:extLst>
-  </p:cSld>
-  <p:clrMapOvr>
-    <a:masterClrMapping/>
-  </p:clrMapOvr>
-</p:sld>
-</file>
-
-<file path=ppt/slides/slide24.xml><?xml version="1.0" encoding="utf-8"?>
-<p:sld xmlns:a="http://schemas.openxmlformats.org/drawingml/2006/main" xmlns:r="http://schemas.openxmlformats.org/officeDocument/2006/relationships" xmlns:p="http://schemas.openxmlformats.org/presentationml/2006/main">
-  <p:cSld>
-    <p:spTree>
-      <p:nvGrpSpPr>
-        <p:cNvPr id="1" name=""/>
-        <p:cNvGrpSpPr/>
-        <p:nvPr/>
-      </p:nvGrpSpPr>
-      <p:grpSpPr>
-        <a:xfrm>
-          <a:off x="0" y="0"/>
-          <a:ext cx="0" cy="0"/>
-          <a:chOff x="0" y="0"/>
-          <a:chExt cx="0" cy="0"/>
-        </a:xfrm>
-      </p:grpSpPr>
-      <p:sp>
-        <p:nvSpPr>
-          <p:cNvPr id="2" name="Title 1"/>
-          <p:cNvSpPr>
-            <a:spLocks noGrp="1"/>
-          </p:cNvSpPr>
-          <p:nvPr>
-            <p:ph type="title"/>
-          </p:nvPr>
-        </p:nvSpPr>
-        <p:spPr>
-          <a:xfrm>
-            <a:off x="838200" y="298623"/>
-            <a:ext cx="10515600" cy="1325563"/>
-          </a:xfrm>
-        </p:spPr>
-        <p:txBody>
-          <a:bodyPr/>
-          <a:lstStyle/>
-          <a:p>
-            <a:r>
-              <a:rPr lang="en-US" dirty="0"/>
-              <a:t>EJJ Scheduling Algorithm Details (2)</a:t>
-            </a:r>
-          </a:p>
-        </p:txBody>
-      </p:sp>
-      <p:sp>
-        <p:nvSpPr>
-          <p:cNvPr id="3" name="Content Placeholder 2"/>
-          <p:cNvSpPr>
-            <a:spLocks noGrp="1"/>
-          </p:cNvSpPr>
-          <p:nvPr>
-            <p:ph idx="1"/>
-          </p:nvPr>
-        </p:nvSpPr>
-        <p:spPr/>
-        <p:txBody>
-          <a:bodyPr>
-            <a:normAutofit fontScale="92500" lnSpcReduction="10000"/>
-          </a:bodyPr>
-          <a:lstStyle/>
-          <a:p>
-            <a:r>
-              <a:rPr lang="en-US" dirty="0"/>
-              <a:t>If there aren’t enough jets, pilots, and/or </a:t>
-            </a:r>
-            <a:r>
-              <a:rPr lang="en-US" dirty="0" err="1"/>
-              <a:t>helos</a:t>
-            </a:r>
-            <a:r>
-              <a:rPr lang="en-US" dirty="0"/>
-              <a:t> on that carrier, store possible repositions of the least  amount of jets/pilots/</a:t>
-            </a:r>
-            <a:r>
-              <a:rPr lang="en-US" dirty="0" err="1"/>
-              <a:t>helos</a:t>
-            </a:r>
-            <a:r>
-              <a:rPr lang="en-US" dirty="0"/>
-              <a:t> to the carrier possible</a:t>
-            </a:r>
-          </a:p>
-          <a:p>
-            <a:pPr lvl="1"/>
-            <a:r>
-              <a:rPr lang="en-US" dirty="0"/>
-              <a:t>Use what we can on the carrier already</a:t>
-            </a:r>
-          </a:p>
-          <a:p>
-            <a:r>
-              <a:rPr lang="en-US" dirty="0"/>
-              <a:t>Given the available subset of the jets on a carrier (after possible repositions, if necessary), find the first set of jets that can fly together</a:t>
-            </a:r>
-          </a:p>
-          <a:p>
-            <a:pPr lvl="1"/>
-            <a:r>
-              <a:rPr lang="en-US" dirty="0"/>
-              <a:t>The number of jets chosen is based on their missile carriage capacity and the number of missiles needed</a:t>
-            </a:r>
-          </a:p>
-          <a:p>
-            <a:r>
-              <a:rPr lang="en-US" dirty="0"/>
-              <a:t>Once the jets are found, then that determines the number of pilots needed</a:t>
-            </a:r>
-          </a:p>
-          <a:p>
-            <a:pPr lvl="1"/>
-            <a:r>
-              <a:rPr lang="en-US" dirty="0"/>
-              <a:t>Find the first set of pilots that can fly with each other, and most importantly has a pilot that can fly with each jet</a:t>
-            </a:r>
-          </a:p>
-          <a:p>
-            <a:pPr lvl="1"/>
-            <a:r>
-              <a:rPr lang="en-US" dirty="0"/>
-              <a:t>Map the pilots to the jets</a:t>
-            </a:r>
-          </a:p>
-        </p:txBody>
-      </p:sp>
-      <p:sp>
-        <p:nvSpPr>
-          <p:cNvPr id="4" name="Footer Placeholder 3"/>
-          <p:cNvSpPr>
-            <a:spLocks noGrp="1"/>
-          </p:cNvSpPr>
-          <p:nvPr>
-            <p:ph type="ftr" sz="quarter" idx="11"/>
-          </p:nvPr>
-        </p:nvSpPr>
-        <p:spPr/>
-        <p:txBody>
-          <a:bodyPr/>
-          <a:lstStyle/>
-          <a:p>
-            <a:r>
-              <a:rPr lang="en-US">
-                <a:latin typeface="Courier New" panose="02070309020205020404" pitchFamily="49" charset="0"/>
-                <a:cs typeface="Courier New" panose="02070309020205020404" pitchFamily="49" charset="0"/>
-              </a:rPr>
-              <a:t>Team EJJ</a:t>
-            </a:r>
-            <a:endParaRPr lang="en-US" dirty="0">
-              <a:latin typeface="Courier New" panose="02070309020205020404" pitchFamily="49" charset="0"/>
-              <a:cs typeface="Courier New" panose="02070309020205020404" pitchFamily="49" charset="0"/>
-            </a:endParaRPr>
-          </a:p>
-        </p:txBody>
-      </p:sp>
-    </p:spTree>
-    <p:extLst>
-      <p:ext uri="{BB962C8B-B14F-4D97-AF65-F5344CB8AC3E}">
-        <p14:creationId xmlns:p14="http://schemas.microsoft.com/office/powerpoint/2010/main" val="1878794731"/>
-      </p:ext>
-    </p:extLst>
-  </p:cSld>
-  <p:clrMapOvr>
-    <a:masterClrMapping/>
-  </p:clrMapOvr>
-</p:sld>
-</file>
-
-<file path=ppt/slides/slide25.xml><?xml version="1.0" encoding="utf-8"?>
-<p:sld xmlns:a="http://schemas.openxmlformats.org/drawingml/2006/main" xmlns:r="http://schemas.openxmlformats.org/officeDocument/2006/relationships" xmlns:p="http://schemas.openxmlformats.org/presentationml/2006/main">
-  <p:cSld>
-    <p:spTree>
-      <p:nvGrpSpPr>
-        <p:cNvPr id="1" name=""/>
-        <p:cNvGrpSpPr/>
-        <p:nvPr/>
-      </p:nvGrpSpPr>
-      <p:grpSpPr>
-        <a:xfrm>
-          <a:off x="0" y="0"/>
-          <a:ext cx="0" cy="0"/>
-          <a:chOff x="0" y="0"/>
-          <a:chExt cx="0" cy="0"/>
-        </a:xfrm>
-      </p:grpSpPr>
-      <p:sp>
-        <p:nvSpPr>
           <p:cNvPr id="2" name="Title 1"/>
           <p:cNvSpPr>
             <a:spLocks noGrp="1"/>
@@ -7928,7 +6296,7 @@
 </p:sld>
 </file>
 
-<file path=ppt/slides/slide26.xml><?xml version="1.0" encoding="utf-8"?>
+<file path=ppt/slides/slide23.xml><?xml version="1.0" encoding="utf-8"?>
 <p:sld xmlns:a="http://schemas.openxmlformats.org/drawingml/2006/main" xmlns:r="http://schemas.openxmlformats.org/officeDocument/2006/relationships" xmlns:p="http://schemas.openxmlformats.org/presentationml/2006/main">
   <p:cSld>
     <p:spTree>
@@ -8091,7 +6459,7 @@
           <p:cNvPr id="2" name="Title 1">
             <a:extLst>
               <a:ext uri="{FF2B5EF4-FFF2-40B4-BE49-F238E27FC236}">
-                <a16:creationId xmlns="" xmlns:a16="http://schemas.microsoft.com/office/drawing/2014/main" id="{F2E87793-C400-4D49-AC42-F6C78A28B67D}"/>
+                <a16:creationId xmlns:a16="http://schemas.microsoft.com/office/drawing/2014/main" id="{F2E87793-C400-4D49-AC42-F6C78A28B67D}"/>
               </a:ext>
             </a:extLst>
           </p:cNvPr>
@@ -8119,7 +6487,7 @@
           <p:cNvPr id="3" name="Content Placeholder 2">
             <a:extLst>
               <a:ext uri="{FF2B5EF4-FFF2-40B4-BE49-F238E27FC236}">
-                <a16:creationId xmlns="" xmlns:a16="http://schemas.microsoft.com/office/drawing/2014/main" id="{E29D20E0-73E2-4C61-AF58-2EC3D1B5237C}"/>
+                <a16:creationId xmlns:a16="http://schemas.microsoft.com/office/drawing/2014/main" id="{E29D20E0-73E2-4C61-AF58-2EC3D1B5237C}"/>
               </a:ext>
             </a:extLst>
           </p:cNvPr>
@@ -8172,7 +6540,7 @@
           <p:cNvPr id="4" name="Footer Placeholder 3">
             <a:extLst>
               <a:ext uri="{FF2B5EF4-FFF2-40B4-BE49-F238E27FC236}">
-                <a16:creationId xmlns="" xmlns:a16="http://schemas.microsoft.com/office/drawing/2014/main" id="{C246C6AC-EE9C-4B9F-8926-F862296227DD}"/>
+                <a16:creationId xmlns:a16="http://schemas.microsoft.com/office/drawing/2014/main" id="{C246C6AC-EE9C-4B9F-8926-F862296227DD}"/>
               </a:ext>
             </a:extLst>
           </p:cNvPr>
@@ -8233,7 +6601,7 @@
           <p:cNvPr id="2" name="Title 1">
             <a:extLst>
               <a:ext uri="{FF2B5EF4-FFF2-40B4-BE49-F238E27FC236}">
-                <a16:creationId xmlns="" xmlns:a16="http://schemas.microsoft.com/office/drawing/2014/main" id="{E3B7ADCA-8719-4128-8B4D-881B76C12927}"/>
+                <a16:creationId xmlns:a16="http://schemas.microsoft.com/office/drawing/2014/main" id="{E3B7ADCA-8719-4128-8B4D-881B76C12927}"/>
               </a:ext>
             </a:extLst>
           </p:cNvPr>
@@ -8261,7 +6629,7 @@
           <p:cNvPr id="3" name="Content Placeholder 2">
             <a:extLst>
               <a:ext uri="{FF2B5EF4-FFF2-40B4-BE49-F238E27FC236}">
-                <a16:creationId xmlns="" xmlns:a16="http://schemas.microsoft.com/office/drawing/2014/main" id="{3EC12B63-2CE0-48D4-A136-ADE12373C800}"/>
+                <a16:creationId xmlns:a16="http://schemas.microsoft.com/office/drawing/2014/main" id="{3EC12B63-2CE0-48D4-A136-ADE12373C800}"/>
               </a:ext>
             </a:extLst>
           </p:cNvPr>
@@ -8379,7 +6747,7 @@
           <p:cNvPr id="4" name="Footer Placeholder 3">
             <a:extLst>
               <a:ext uri="{FF2B5EF4-FFF2-40B4-BE49-F238E27FC236}">
-                <a16:creationId xmlns="" xmlns:a16="http://schemas.microsoft.com/office/drawing/2014/main" id="{693782FF-7ED5-4192-A01F-660E4D3EEAB0}"/>
+                <a16:creationId xmlns:a16="http://schemas.microsoft.com/office/drawing/2014/main" id="{693782FF-7ED5-4192-A01F-660E4D3EEAB0}"/>
               </a:ext>
             </a:extLst>
           </p:cNvPr>
@@ -8440,7 +6808,7 @@
           <p:cNvPr id="3" name="Content Placeholder 2">
             <a:extLst>
               <a:ext uri="{FF2B5EF4-FFF2-40B4-BE49-F238E27FC236}">
-                <a16:creationId xmlns="" xmlns:a16="http://schemas.microsoft.com/office/drawing/2014/main" id="{22DDF42D-3D90-4D39-8593-9FBBFEB2E97E}"/>
+                <a16:creationId xmlns:a16="http://schemas.microsoft.com/office/drawing/2014/main" id="{22DDF42D-3D90-4D39-8593-9FBBFEB2E97E}"/>
               </a:ext>
             </a:extLst>
           </p:cNvPr>
@@ -8813,7 +7181,7 @@
           <p:cNvPr id="4" name="Footer Placeholder 3">
             <a:extLst>
               <a:ext uri="{FF2B5EF4-FFF2-40B4-BE49-F238E27FC236}">
-                <a16:creationId xmlns="" xmlns:a16="http://schemas.microsoft.com/office/drawing/2014/main" id="{A002CB46-3E82-46AE-AE99-4D885792F48B}"/>
+                <a16:creationId xmlns:a16="http://schemas.microsoft.com/office/drawing/2014/main" id="{A002CB46-3E82-46AE-AE99-4D885792F48B}"/>
               </a:ext>
             </a:extLst>
           </p:cNvPr>
@@ -8844,7 +7212,7 @@
           <p:cNvPr id="8" name="TextBox 7">
             <a:extLst>
               <a:ext uri="{FF2B5EF4-FFF2-40B4-BE49-F238E27FC236}">
-                <a16:creationId xmlns="" xmlns:a16="http://schemas.microsoft.com/office/drawing/2014/main" id="{CDF35B94-B09E-4223-A496-D1AE1FFA9173}"/>
+                <a16:creationId xmlns:a16="http://schemas.microsoft.com/office/drawing/2014/main" id="{CDF35B94-B09E-4223-A496-D1AE1FFA9173}"/>
               </a:ext>
             </a:extLst>
           </p:cNvPr>
@@ -9067,7 +7435,7 @@
           <p:cNvPr id="3" name="Content Placeholder 2">
             <a:extLst>
               <a:ext uri="{FF2B5EF4-FFF2-40B4-BE49-F238E27FC236}">
-                <a16:creationId xmlns="" xmlns:a16="http://schemas.microsoft.com/office/drawing/2014/main" id="{B23BDF39-9DE8-4B5D-B2E9-28254D0A839C}"/>
+                <a16:creationId xmlns:a16="http://schemas.microsoft.com/office/drawing/2014/main" id="{B23BDF39-9DE8-4B5D-B2E9-28254D0A839C}"/>
               </a:ext>
             </a:extLst>
           </p:cNvPr>
@@ -9376,7 +7744,7 @@
           <p:cNvPr id="4" name="Footer Placeholder 3">
             <a:extLst>
               <a:ext uri="{FF2B5EF4-FFF2-40B4-BE49-F238E27FC236}">
-                <a16:creationId xmlns="" xmlns:a16="http://schemas.microsoft.com/office/drawing/2014/main" id="{CD510718-CD20-420D-9B74-298783B40D42}"/>
+                <a16:creationId xmlns:a16="http://schemas.microsoft.com/office/drawing/2014/main" id="{CD510718-CD20-420D-9B74-298783B40D42}"/>
               </a:ext>
             </a:extLst>
           </p:cNvPr>
@@ -9416,7 +7784,7 @@
           <p:cNvPr id="6" name="TextBox 5">
             <a:extLst>
               <a:ext uri="{FF2B5EF4-FFF2-40B4-BE49-F238E27FC236}">
-                <a16:creationId xmlns="" xmlns:a16="http://schemas.microsoft.com/office/drawing/2014/main" id="{EB3CB662-3D24-4DC7-869F-8ACB83720D30}"/>
+                <a16:creationId xmlns:a16="http://schemas.microsoft.com/office/drawing/2014/main" id="{EB3CB662-3D24-4DC7-869F-8ACB83720D30}"/>
               </a:ext>
             </a:extLst>
           </p:cNvPr>
@@ -9827,45 +8195,29 @@
           <a:p>
             <a:r>
               <a:rPr lang="en-US" dirty="0"/>
-              <a:t>EJJ Example Schedule </a:t>
-            </a:r>
-            <a:r>
-              <a:rPr lang="en-US" dirty="0" smtClean="0"/>
-              <a:t>Output</a:t>
+              <a:t>EJJ Example Schedule Output</a:t>
             </a:r>
             <a:br>
-              <a:rPr lang="en-US" dirty="0" smtClean="0"/>
+              <a:rPr lang="en-US" dirty="0"/>
             </a:br>
             <a:r>
-              <a:rPr lang="en-US" sz="1400" dirty="0" smtClean="0"/>
+              <a:rPr lang="en-US" sz="1400" dirty="0"/>
               <a:t>With 90% probability of disabling/destroying targets</a:t>
             </a:r>
-            <a:r>
-              <a:rPr lang="en-US" dirty="0" smtClean="0"/>
-              <a:t/>
-            </a:r>
             <a:br>
-              <a:rPr lang="en-US" dirty="0" smtClean="0"/>
+              <a:rPr lang="en-US" dirty="0"/>
             </a:br>
             <a:r>
-              <a:rPr lang="en-US" sz="1200" dirty="0" smtClean="0"/>
+              <a:rPr lang="en-US" sz="1200" dirty="0"/>
               <a:t>(Able to Disable Target 2, 3, 4; </a:t>
             </a:r>
             <a:r>
-              <a:rPr lang="en-US" sz="1200" dirty="0" err="1" smtClean="0"/>
+              <a:rPr lang="en-US" sz="1200" dirty="0" err="1"/>
               <a:t>Unharm</a:t>
             </a:r>
             <a:r>
-              <a:rPr lang="en-US" sz="1200" dirty="0" smtClean="0"/>
-              <a:t> Targets 5, 6; Disable and Attempt to Destroy </a:t>
-            </a:r>
-            <a:r>
               <a:rPr lang="en-US" sz="1200" dirty="0"/>
-              <a:t>Target </a:t>
-            </a:r>
-            <a:r>
-              <a:rPr lang="en-US" sz="1200" dirty="0" smtClean="0"/>
-              <a:t>1 – may not have enough missiles )</a:t>
+              <a:t> Targets 5, 6; Disable and Attempt to Destroy Target 1 – may not have enough missiles )</a:t>
             </a:r>
             <a:endParaRPr lang="en-US" dirty="0"/>
           </a:p>
@@ -10244,33 +8596,17 @@
                   <a:srgbClr val="7030A0"/>
                 </a:solidFill>
               </a:rPr>
-              <a:t>Target Strike Order: 3  4  2  1  5  </a:t>
-            </a:r>
-            <a:r>
-              <a:rPr lang="en-US" sz="900" dirty="0" smtClean="0">
+              <a:t>Target Strike Order: 3  4  2  1  5  6</a:t>
+            </a:r>
+          </a:p>
+          <a:p>
+            <a:r>
+              <a:rPr lang="en-US" sz="900" dirty="0" err="1">
                 <a:solidFill>
                   <a:srgbClr val="7030A0"/>
                 </a:solidFill>
               </a:rPr>
-              <a:t>6</a:t>
-            </a:r>
-          </a:p>
-          <a:p>
-            <a:r>
-              <a:rPr lang="en-US" sz="900" dirty="0" err="1" smtClean="0">
-                <a:solidFill>
-                  <a:srgbClr val="7030A0"/>
-                </a:solidFill>
-              </a:rPr>
               <a:t>Num</a:t>
-            </a:r>
-            <a:r>
-              <a:rPr lang="en-US" sz="900" dirty="0" smtClean="0">
-                <a:solidFill>
-                  <a:srgbClr val="7030A0"/>
-                </a:solidFill>
-              </a:rPr>
-              <a:t> </a:t>
             </a:r>
             <a:r>
               <a:rPr lang="en-US" sz="900" dirty="0">
@@ -10278,7 +8614,7 @@
                   <a:srgbClr val="7030A0"/>
                 </a:solidFill>
               </a:rPr>
-              <a:t>Missiles Needed for 90% Success Disabling Target: 3</a:t>
+              <a:t> Missiles Needed for 90% Success Disabling Target: 3</a:t>
             </a:r>
           </a:p>
           <a:p>
@@ -10641,34 +8977,13 @@
           <a:lstStyle/>
           <a:p>
             <a:r>
-              <a:rPr lang="en-US" sz="1600" dirty="0" smtClean="0">
-                <a:solidFill>
-                  <a:srgbClr val="7030A0"/>
-                </a:solidFill>
-              </a:rPr>
-              <a:t>Number </a:t>
-            </a:r>
-            <a:r>
               <a:rPr lang="en-US" sz="1600" dirty="0">
                 <a:solidFill>
                   <a:srgbClr val="7030A0"/>
                 </a:solidFill>
               </a:rPr>
-              <a:t>of Targets Accounted For: </a:t>
-            </a:r>
-            <a:r>
-              <a:rPr lang="en-US" sz="1600" dirty="0" smtClean="0">
-                <a:solidFill>
-                  <a:srgbClr val="7030A0"/>
-                </a:solidFill>
-              </a:rPr>
-              <a:t>5</a:t>
-            </a:r>
-            <a:endParaRPr lang="en-US" sz="1600" dirty="0">
-              <a:solidFill>
-                <a:srgbClr val="7030A0"/>
-              </a:solidFill>
-            </a:endParaRPr>
+              <a:t>Number of Targets Accounted For: 5</a:t>
+            </a:r>
           </a:p>
         </p:txBody>
       </p:sp>
@@ -10707,7 +9022,7 @@
           <p:cNvPr id="2" name="Title 1">
             <a:extLst>
               <a:ext uri="{FF2B5EF4-FFF2-40B4-BE49-F238E27FC236}">
-                <a16:creationId xmlns="" xmlns:a16="http://schemas.microsoft.com/office/drawing/2014/main" id="{E29B01D6-A7CA-4A3E-9C66-C2AA33322F12}"/>
+                <a16:creationId xmlns:a16="http://schemas.microsoft.com/office/drawing/2014/main" id="{E29B01D6-A7CA-4A3E-9C66-C2AA33322F12}"/>
               </a:ext>
             </a:extLst>
           </p:cNvPr>
@@ -10735,7 +9050,7 @@
           <p:cNvPr id="3" name="Content Placeholder 2">
             <a:extLst>
               <a:ext uri="{FF2B5EF4-FFF2-40B4-BE49-F238E27FC236}">
-                <a16:creationId xmlns="" xmlns:a16="http://schemas.microsoft.com/office/drawing/2014/main" id="{F1842140-4ACB-41A9-BC7F-30570259E5D8}"/>
+                <a16:creationId xmlns:a16="http://schemas.microsoft.com/office/drawing/2014/main" id="{F1842140-4ACB-41A9-BC7F-30570259E5D8}"/>
               </a:ext>
             </a:extLst>
           </p:cNvPr>
@@ -10836,7 +9151,7 @@
           <p:cNvPr id="4" name="Footer Placeholder 3">
             <a:extLst>
               <a:ext uri="{FF2B5EF4-FFF2-40B4-BE49-F238E27FC236}">
-                <a16:creationId xmlns="" xmlns:a16="http://schemas.microsoft.com/office/drawing/2014/main" id="{C401FFE3-F414-4CF5-AD6A-9C2DE5116ED4}"/>
+                <a16:creationId xmlns:a16="http://schemas.microsoft.com/office/drawing/2014/main" id="{C401FFE3-F414-4CF5-AD6A-9C2DE5116ED4}"/>
               </a:ext>
             </a:extLst>
           </p:cNvPr>
@@ -10913,17 +9228,8 @@
           <a:p>
             <a:r>
               <a:rPr lang="en-US" dirty="0"/>
-              <a:t>EJJ Web </a:t>
-            </a:r>
-            <a:r>
-              <a:rPr lang="en-US" dirty="0" smtClean="0"/>
-              <a:t>Page </a:t>
-            </a:r>
-            <a:r>
-              <a:rPr lang="en-US" dirty="0" smtClean="0"/>
-              <a:t>– Mission Set-Up</a:t>
-            </a:r>
-            <a:endParaRPr lang="en-US" dirty="0"/>
+              <a:t>EJJ Web Page – Mission Set-Up</a:t>
+            </a:r>
           </a:p>
         </p:txBody>
       </p:sp>

</xml_diff>

<commit_message>
Rearranged ATO section and then renamed text
</commit_message>
<xml_diff>
--- a/TeamEJJ.pptx
+++ b/TeamEJJ.pptx
@@ -28,7 +28,7 @@
     <p:sldId id="283" r:id="rId16"/>
     <p:sldId id="266" r:id="rId17"/>
     <p:sldId id="259" r:id="rId18"/>
-    <p:sldId id="281" r:id="rId19"/>
+    <p:sldId id="284" r:id="rId19"/>
     <p:sldId id="280" r:id="rId20"/>
     <p:sldId id="271" r:id="rId21"/>
     <p:sldId id="270" r:id="rId22"/>
@@ -4752,15 +4752,7 @@
             </a:r>
             <a:r>
               <a:rPr lang="en-US" dirty="0"/>
-              <a:t>/pilots when </a:t>
-            </a:r>
-            <a:r>
-              <a:rPr lang="en-US"/>
-              <a:t>the mission plan </a:t>
-            </a:r>
-            <a:r>
-              <a:rPr lang="en-US" dirty="0"/>
-              <a:t>is ready</a:t>
+              <a:t>/pilots when the mission plan is ready</a:t>
             </a:r>
           </a:p>
         </p:txBody>
@@ -5090,59 +5082,86 @@
           <a:chExt cx="0" cy="0"/>
         </a:xfrm>
       </p:grpSpPr>
-      <p:pic>
-        <p:nvPicPr>
-          <p:cNvPr id="5" name="Picture 2" descr="352,927 Evil Stock Photos, Pictures &amp;amp; Royalty-Free Images - iStock">
+      <p:sp>
+        <p:nvSpPr>
+          <p:cNvPr id="2" name="Title 1">
             <a:extLst>
               <a:ext uri="{FF2B5EF4-FFF2-40B4-BE49-F238E27FC236}">
-                <a16:creationId xmlns:a16="http://schemas.microsoft.com/office/drawing/2014/main" id="{5F600820-50C2-44A6-A5E4-7D4D85DCC460}"/>
+                <a16:creationId xmlns:a16="http://schemas.microsoft.com/office/drawing/2014/main" id="{034B0929-2940-4F4E-80B5-CD5F671448EF}"/>
               </a:ext>
             </a:extLst>
           </p:cNvPr>
-          <p:cNvPicPr>
-            <a:picLocks noChangeAspect="1" noChangeArrowheads="1"/>
-          </p:cNvPicPr>
-          <p:nvPr/>
-        </p:nvPicPr>
-        <p:blipFill>
-          <a:blip r:embed="rId2">
+          <p:cNvSpPr>
+            <a:spLocks noGrp="1"/>
+          </p:cNvSpPr>
+          <p:nvPr>
+            <p:ph type="title"/>
+          </p:nvPr>
+        </p:nvSpPr>
+        <p:spPr/>
+        <p:txBody>
+          <a:bodyPr/>
+          <a:lstStyle/>
+          <a:p>
+            <a:r>
+              <a:rPr lang="en-US" dirty="0"/>
+              <a:t>Vision and future updates (The Sequel)</a:t>
+            </a:r>
+          </a:p>
+        </p:txBody>
+      </p:sp>
+      <p:sp>
+        <p:nvSpPr>
+          <p:cNvPr id="3" name="Content Placeholder 2">
             <a:extLst>
-              <a:ext uri="{28A0092B-C50C-407E-A947-70E740481C1C}">
-                <a14:useLocalDpi xmlns:a14="http://schemas.microsoft.com/office/drawing/2010/main" val="0"/>
+              <a:ext uri="{FF2B5EF4-FFF2-40B4-BE49-F238E27FC236}">
+                <a16:creationId xmlns:a16="http://schemas.microsoft.com/office/drawing/2014/main" id="{80E85B16-9519-480B-9444-A9B27FC3D9A1}"/>
               </a:ext>
             </a:extLst>
-          </a:blip>
-          <a:srcRect/>
-          <a:stretch>
-            <a:fillRect/>
-          </a:stretch>
-        </p:blipFill>
-        <p:spPr bwMode="auto">
-          <a:xfrm>
-            <a:off x="1964229" y="136525"/>
-            <a:ext cx="8263542" cy="4334309"/>
-          </a:xfrm>
-          <a:prstGeom prst="rect">
-            <a:avLst/>
-          </a:prstGeom>
-          <a:noFill/>
-          <a:extLst>
-            <a:ext uri="{909E8E84-426E-40DD-AFC4-6F175D3DCCD1}">
-              <a14:hiddenFill xmlns:a14="http://schemas.microsoft.com/office/drawing/2010/main">
-                <a:solidFill>
-                  <a:srgbClr val="FFFFFF"/>
-                </a:solidFill>
-              </a14:hiddenFill>
-            </a:ext>
-          </a:extLst>
-        </p:spPr>
-      </p:pic>
+          </p:cNvPr>
+          <p:cNvSpPr>
+            <a:spLocks noGrp="1"/>
+          </p:cNvSpPr>
+          <p:nvPr>
+            <p:ph idx="1"/>
+          </p:nvPr>
+        </p:nvSpPr>
+        <p:spPr/>
+        <p:txBody>
+          <a:bodyPr/>
+          <a:lstStyle/>
+          <a:p>
+            <a:r>
+              <a:rPr lang="en-US" dirty="0"/>
+              <a:t>Integrate algorithm with the web page</a:t>
+            </a:r>
+          </a:p>
+          <a:p>
+            <a:r>
+              <a:rPr lang="en-US" dirty="0"/>
+              <a:t>Integrate a messaging/notification pub sub service to collaborate with other planners</a:t>
+            </a:r>
+          </a:p>
+          <a:p>
+            <a:r>
+              <a:rPr lang="en-US" dirty="0"/>
+              <a:t>Actually parse an ATO</a:t>
+            </a:r>
+          </a:p>
+          <a:p>
+            <a:r>
+              <a:rPr lang="en-US" dirty="0"/>
+              <a:t>Integrate a map to visualize and edit a auto-generated route</a:t>
+            </a:r>
+          </a:p>
+        </p:txBody>
+      </p:sp>
       <p:sp>
         <p:nvSpPr>
           <p:cNvPr id="4" name="Footer Placeholder 3">
             <a:extLst>
               <a:ext uri="{FF2B5EF4-FFF2-40B4-BE49-F238E27FC236}">
-                <a16:creationId xmlns:a16="http://schemas.microsoft.com/office/drawing/2014/main" id="{7B57FAC7-9A78-418C-B807-48ECCF0BCB6C}"/>
+                <a16:creationId xmlns:a16="http://schemas.microsoft.com/office/drawing/2014/main" id="{6CF63984-9220-46C8-AC45-7CBD3B725772}"/>
               </a:ext>
             </a:extLst>
           </p:cNvPr>
@@ -5159,54 +5178,23 @@
           <a:lstStyle/>
           <a:p>
             <a:r>
-              <a:rPr lang="en-US" dirty="0">
+              <a:rPr lang="en-US">
                 <a:latin typeface="Courier New" panose="02070309020205020404" pitchFamily="49" charset="0"/>
                 <a:cs typeface="Courier New" panose="02070309020205020404" pitchFamily="49" charset="0"/>
               </a:rPr>
               <a:t>Team EJJ</a:t>
             </a:r>
-          </a:p>
-        </p:txBody>
-      </p:sp>
-      <p:sp>
-        <p:nvSpPr>
-          <p:cNvPr id="2" name="TextBox 1">
-            <a:extLst>
-              <a:ext uri="{FF2B5EF4-FFF2-40B4-BE49-F238E27FC236}">
-                <a16:creationId xmlns:a16="http://schemas.microsoft.com/office/drawing/2014/main" id="{ABD7F561-60CD-490C-A66A-7874934A3F0A}"/>
-              </a:ext>
-            </a:extLst>
-          </p:cNvPr>
-          <p:cNvSpPr txBox="1"/>
-          <p:nvPr/>
-        </p:nvSpPr>
-        <p:spPr>
-          <a:xfrm>
-            <a:off x="3090553" y="3580409"/>
-            <a:ext cx="7858496" cy="1107996"/>
-          </a:xfrm>
-          <a:prstGeom prst="rect">
-            <a:avLst/>
-          </a:prstGeom>
-          <a:noFill/>
-        </p:spPr>
-        <p:txBody>
-          <a:bodyPr wrap="square" rtlCol="0">
-            <a:spAutoFit/>
-          </a:bodyPr>
-          <a:lstStyle/>
-          <a:p>
-            <a:r>
-              <a:rPr lang="en-US" sz="6600" dirty="0"/>
-              <a:t>To be continued….</a:t>
-            </a:r>
+            <a:endParaRPr lang="en-US" dirty="0">
+              <a:latin typeface="Courier New" panose="02070309020205020404" pitchFamily="49" charset="0"/>
+              <a:cs typeface="Courier New" panose="02070309020205020404" pitchFamily="49" charset="0"/>
+            </a:endParaRPr>
           </a:p>
         </p:txBody>
       </p:sp>
     </p:spTree>
     <p:extLst>
       <p:ext uri="{BB962C8B-B14F-4D97-AF65-F5344CB8AC3E}">
-        <p14:creationId xmlns:p14="http://schemas.microsoft.com/office/powerpoint/2010/main" val="669830058"/>
+        <p14:creationId xmlns:p14="http://schemas.microsoft.com/office/powerpoint/2010/main" val="1724479845"/>
       </p:ext>
     </p:extLst>
   </p:cSld>

</xml_diff>

<commit_message>
removed sample button and updated power point
</commit_message>
<xml_diff>
--- a/TeamEJJ.pptx
+++ b/TeamEJJ.pptx
@@ -18,18 +18,18 @@
     <p:sldId id="262" r:id="rId6"/>
     <p:sldId id="263" r:id="rId7"/>
     <p:sldId id="276" r:id="rId8"/>
-    <p:sldId id="265" r:id="rId9"/>
-    <p:sldId id="274" r:id="rId10"/>
-    <p:sldId id="285" r:id="rId11"/>
-    <p:sldId id="267" r:id="rId12"/>
-    <p:sldId id="268" r:id="rId13"/>
+    <p:sldId id="285" r:id="rId9"/>
+    <p:sldId id="265" r:id="rId10"/>
+    <p:sldId id="267" r:id="rId11"/>
+    <p:sldId id="268" r:id="rId12"/>
+    <p:sldId id="274" r:id="rId13"/>
     <p:sldId id="275" r:id="rId14"/>
     <p:sldId id="269" r:id="rId15"/>
     <p:sldId id="282" r:id="rId16"/>
-    <p:sldId id="283" r:id="rId17"/>
-    <p:sldId id="266" r:id="rId18"/>
-    <p:sldId id="259" r:id="rId19"/>
-    <p:sldId id="284" r:id="rId20"/>
+    <p:sldId id="266" r:id="rId17"/>
+    <p:sldId id="259" r:id="rId18"/>
+    <p:sldId id="284" r:id="rId19"/>
+    <p:sldId id="286" r:id="rId20"/>
     <p:sldId id="280" r:id="rId21"/>
     <p:sldId id="271" r:id="rId22"/>
     <p:sldId id="270" r:id="rId23"/>
@@ -238,7 +238,7 @@
           <a:p>
             <a:fld id="{43711186-8B14-4681-A637-AA132258072E}" type="datetimeFigureOut">
               <a:rPr lang="en-US" smtClean="0"/>
-              <a:t>10/30/21</a:t>
+              <a:t>10/30/2021</a:t>
             </a:fld>
             <a:endParaRPr lang="en-US"/>
           </a:p>
@@ -415,7 +415,7 @@
           <a:p>
             <a:fld id="{99DC0056-C103-4B33-8E11-3CD948A15D15}" type="datetimeFigureOut">
               <a:rPr lang="en-US" smtClean="0"/>
-              <a:t>10/30/21</a:t>
+              <a:t>10/30/2021</a:t>
             </a:fld>
             <a:endParaRPr lang="en-US"/>
           </a:p>
@@ -813,7 +813,7 @@
           <a:p>
             <a:fld id="{F0715040-4006-4B81-8E7B-98276F4064AC}" type="datetime1">
               <a:rPr lang="en-US" smtClean="0"/>
-              <a:t>10/30/21</a:t>
+              <a:t>10/30/2021</a:t>
             </a:fld>
             <a:endParaRPr lang="en-US"/>
           </a:p>
@@ -986,7 +986,7 @@
           <a:p>
             <a:fld id="{1D5F618A-0BD2-4BB4-99EA-CFB1AAE03AA9}" type="datetime1">
               <a:rPr lang="en-US" smtClean="0"/>
-              <a:t>10/30/21</a:t>
+              <a:t>10/30/2021</a:t>
             </a:fld>
             <a:endParaRPr lang="en-US"/>
           </a:p>
@@ -1169,7 +1169,7 @@
           <a:p>
             <a:fld id="{100A5BE7-7F58-4107-8ADC-D927EA1D52A7}" type="datetime1">
               <a:rPr lang="en-US" smtClean="0"/>
-              <a:t>10/30/21</a:t>
+              <a:t>10/30/2021</a:t>
             </a:fld>
             <a:endParaRPr lang="en-US"/>
           </a:p>
@@ -1342,7 +1342,7 @@
           <a:p>
             <a:fld id="{79D8393E-8AF1-4411-9688-0598DD3997B2}" type="datetime1">
               <a:rPr lang="en-US" smtClean="0"/>
-              <a:t>10/30/21</a:t>
+              <a:t>10/30/2021</a:t>
             </a:fld>
             <a:endParaRPr lang="en-US"/>
           </a:p>
@@ -1594,7 +1594,7 @@
           <a:p>
             <a:fld id="{4494A84D-3866-4936-BBE1-CBE8033237A1}" type="datetime1">
               <a:rPr lang="en-US" smtClean="0"/>
-              <a:t>10/30/21</a:t>
+              <a:t>10/30/2021</a:t>
             </a:fld>
             <a:endParaRPr lang="en-US"/>
           </a:p>
@@ -1829,7 +1829,7 @@
           <a:p>
             <a:fld id="{42EB40C8-0DE5-4916-914B-DE2D9D0DC05C}" type="datetime1">
               <a:rPr lang="en-US" smtClean="0"/>
-              <a:t>10/30/21</a:t>
+              <a:t>10/30/2021</a:t>
             </a:fld>
             <a:endParaRPr lang="en-US"/>
           </a:p>
@@ -2199,7 +2199,7 @@
           <a:p>
             <a:fld id="{5AD917D3-0AC6-4233-B19C-676F66E35DF8}" type="datetime1">
               <a:rPr lang="en-US" smtClean="0"/>
-              <a:t>10/30/21</a:t>
+              <a:t>10/30/2021</a:t>
             </a:fld>
             <a:endParaRPr lang="en-US"/>
           </a:p>
@@ -2320,7 +2320,7 @@
           <a:p>
             <a:fld id="{BF6DD421-6F06-402A-9506-A9FC723F6691}" type="datetime1">
               <a:rPr lang="en-US" smtClean="0"/>
-              <a:t>10/30/21</a:t>
+              <a:t>10/30/2021</a:t>
             </a:fld>
             <a:endParaRPr lang="en-US"/>
           </a:p>
@@ -2418,7 +2418,7 @@
           <a:p>
             <a:fld id="{401633C5-CC45-438A-9A97-49500611ADB4}" type="datetime1">
               <a:rPr lang="en-US" smtClean="0"/>
-              <a:t>10/30/21</a:t>
+              <a:t>10/30/2021</a:t>
             </a:fld>
             <a:endParaRPr lang="en-US"/>
           </a:p>
@@ -2698,7 +2698,7 @@
           <a:p>
             <a:fld id="{A55CBFFA-D9FC-4C62-8D59-B905B682E156}" type="datetime1">
               <a:rPr lang="en-US" smtClean="0"/>
-              <a:t>10/30/21</a:t>
+              <a:t>10/30/2021</a:t>
             </a:fld>
             <a:endParaRPr lang="en-US"/>
           </a:p>
@@ -2958,7 +2958,7 @@
           <a:p>
             <a:fld id="{AB188B3F-697A-499E-B335-ABB5D5A4EFC7}" type="datetime1">
               <a:rPr lang="en-US" smtClean="0"/>
-              <a:t>10/30/21</a:t>
+              <a:t>10/30/2021</a:t>
             </a:fld>
             <a:endParaRPr lang="en-US"/>
           </a:p>
@@ -3174,7 +3174,7 @@
           <a:p>
             <a:fld id="{5FA30516-2700-45A6-8956-A98456AA1844}" type="datetime1">
               <a:rPr lang="en-US" smtClean="0"/>
-              <a:t>10/30/21</a:t>
+              <a:t>10/30/2021</a:t>
             </a:fld>
             <a:endParaRPr lang="en-US"/>
           </a:p>
@@ -3765,62 +3765,38 @@
       </p:grpSpPr>
       <p:sp>
         <p:nvSpPr>
-          <p:cNvPr id="21" name="Rectangle 20">
+          <p:cNvPr id="2" name="Title 1">
             <a:extLst>
               <a:ext uri="{FF2B5EF4-FFF2-40B4-BE49-F238E27FC236}">
-                <a16:creationId xmlns:a16="http://schemas.microsoft.com/office/drawing/2014/main" id="{1BBC93F8-9A88-7D43-809A-08817DFA32CD}"/>
+                <a16:creationId xmlns:a16="http://schemas.microsoft.com/office/drawing/2014/main" id="{E29B01D6-A7CA-4A3E-9C66-C2AA33322F12}"/>
               </a:ext>
             </a:extLst>
           </p:cNvPr>
-          <p:cNvSpPr/>
-          <p:nvPr/>
-        </p:nvSpPr>
-        <p:spPr>
-          <a:xfrm>
-            <a:off x="233679" y="1084027"/>
-            <a:ext cx="5760721" cy="892602"/>
-          </a:xfrm>
-          <a:prstGeom prst="rect">
-            <a:avLst/>
-          </a:prstGeom>
-          <a:noFill/>
-          <a:ln>
-            <a:solidFill>
-              <a:schemeClr val="tx1"/>
-            </a:solidFill>
-          </a:ln>
-        </p:spPr>
-        <p:style>
-          <a:lnRef idx="2">
-            <a:schemeClr val="accent1">
-              <a:shade val="50000"/>
-            </a:schemeClr>
-          </a:lnRef>
-          <a:fillRef idx="1">
-            <a:schemeClr val="accent1"/>
-          </a:fillRef>
-          <a:effectRef idx="0">
-            <a:schemeClr val="accent1"/>
-          </a:effectRef>
-          <a:fontRef idx="minor">
-            <a:schemeClr val="lt1"/>
-          </a:fontRef>
-        </p:style>
-        <p:txBody>
-          <a:bodyPr rtlCol="0" anchor="ctr"/>
-          <a:lstStyle/>
-          <a:p>
-            <a:pPr algn="ctr"/>
-            <a:endParaRPr lang="en-US"/>
-          </a:p>
-        </p:txBody>
-      </p:sp>
-      <p:sp>
-        <p:nvSpPr>
-          <p:cNvPr id="2" name="Title 1">
+          <p:cNvSpPr>
+            <a:spLocks noGrp="1"/>
+          </p:cNvSpPr>
+          <p:nvPr>
+            <p:ph type="title"/>
+          </p:nvPr>
+        </p:nvSpPr>
+        <p:spPr/>
+        <p:txBody>
+          <a:bodyPr/>
+          <a:lstStyle/>
+          <a:p>
+            <a:r>
+              <a:rPr lang="en-US" dirty="0"/>
+              <a:t>EJJ Mission Planning Flow (2)	</a:t>
+            </a:r>
+          </a:p>
+        </p:txBody>
+      </p:sp>
+      <p:sp>
+        <p:nvSpPr>
+          <p:cNvPr id="3" name="Content Placeholder 2">
             <a:extLst>
               <a:ext uri="{FF2B5EF4-FFF2-40B4-BE49-F238E27FC236}">
-                <a16:creationId xmlns:a16="http://schemas.microsoft.com/office/drawing/2014/main" id="{C10B98E8-DF30-424F-9AA4-2CF603E51BE2}"/>
+                <a16:creationId xmlns:a16="http://schemas.microsoft.com/office/drawing/2014/main" id="{F1842140-4ACB-41A9-BC7F-30570259E5D8}"/>
               </a:ext>
             </a:extLst>
           </p:cNvPr>
@@ -3828,15 +3804,10 @@
             <a:spLocks noGrp="1"/>
           </p:cNvSpPr>
           <p:nvPr>
-            <p:ph type="title"/>
-          </p:nvPr>
-        </p:nvSpPr>
-        <p:spPr>
-          <a:xfrm>
-            <a:off x="2516043" y="17396"/>
-            <a:ext cx="5995464" cy="950565"/>
-          </a:xfrm>
-        </p:spPr>
+            <p:ph idx="1"/>
+          </p:nvPr>
+        </p:nvSpPr>
+        <p:spPr/>
         <p:txBody>
           <a:bodyPr>
             <a:normAutofit/>
@@ -3845,8 +3816,52 @@
           <a:p>
             <a:r>
               <a:rPr lang="en-US" dirty="0"/>
-              <a:t>Frontend/Backend Design</a:t>
-            </a:r>
+              <a:t>Drag in any constraints/restraints and the information is stored</a:t>
+            </a:r>
+          </a:p>
+          <a:p>
+            <a:pPr lvl="1"/>
+            <a:r>
+              <a:rPr lang="en-US" dirty="0"/>
+              <a:t>i.e. max flight times, rest times, reposition times, missile carriage, pilot restrictions with other pilots or aircraft, jet restrictions with other jets, time restrictions, missile probabilities of hit/disabling/destroying, etc.</a:t>
+            </a:r>
+          </a:p>
+          <a:p>
+            <a:pPr lvl="1"/>
+            <a:r>
+              <a:rPr lang="en-US" dirty="0"/>
+              <a:t>Does not initially assume any casualties during striking targets and jet/</a:t>
+            </a:r>
+            <a:r>
+              <a:rPr lang="en-US" dirty="0" err="1"/>
+              <a:t>helo</a:t>
+            </a:r>
+            <a:r>
+              <a:rPr lang="en-US" dirty="0"/>
+              <a:t> downtime chances</a:t>
+            </a:r>
+          </a:p>
+          <a:p>
+            <a:r>
+              <a:rPr lang="en-US" dirty="0"/>
+              <a:t>Make the mission the Active Mission and set mission start/end times</a:t>
+            </a:r>
+          </a:p>
+          <a:p>
+            <a:r>
+              <a:rPr lang="en-US" dirty="0"/>
+              <a:t>An algorithm runs to calculate the maximum number of sorties needed for each target tasking</a:t>
+            </a:r>
+          </a:p>
+          <a:p>
+            <a:pPr lvl="1"/>
+            <a:r>
+              <a:rPr lang="en-US" dirty="0"/>
+              <a:t>90% probability to disable and/or destroy based on the target requirements</a:t>
+            </a:r>
+          </a:p>
+          <a:p>
+            <a:endParaRPr lang="en-US" dirty="0"/>
           </a:p>
         </p:txBody>
       </p:sp>
@@ -3855,7 +3870,7 @@
           <p:cNvPr id="4" name="Footer Placeholder 3">
             <a:extLst>
               <a:ext uri="{FF2B5EF4-FFF2-40B4-BE49-F238E27FC236}">
-                <a16:creationId xmlns:a16="http://schemas.microsoft.com/office/drawing/2014/main" id="{93AC8D42-FC61-0C4D-AC08-ACE91912D646}"/>
+                <a16:creationId xmlns:a16="http://schemas.microsoft.com/office/drawing/2014/main" id="{C401FFE3-F414-4CF5-AD6A-9C2DE5116ED4}"/>
               </a:ext>
             </a:extLst>
           </p:cNvPr>
@@ -3885,1161 +3900,10 @@
           </a:p>
         </p:txBody>
       </p:sp>
-      <p:sp>
-        <p:nvSpPr>
-          <p:cNvPr id="5" name="Rectangle 4">
-            <a:extLst>
-              <a:ext uri="{FF2B5EF4-FFF2-40B4-BE49-F238E27FC236}">
-                <a16:creationId xmlns:a16="http://schemas.microsoft.com/office/drawing/2014/main" id="{B88EF572-7D1A-F140-B419-449B31211CC7}"/>
-              </a:ext>
-            </a:extLst>
-          </p:cNvPr>
-          <p:cNvSpPr/>
-          <p:nvPr/>
-        </p:nvSpPr>
-        <p:spPr>
-          <a:xfrm>
-            <a:off x="2359076" y="2854459"/>
-            <a:ext cx="1509925" cy="579529"/>
-          </a:xfrm>
-          <a:prstGeom prst="rect">
-            <a:avLst/>
-          </a:prstGeom>
-        </p:spPr>
-        <p:style>
-          <a:lnRef idx="2">
-            <a:schemeClr val="accent1">
-              <a:shade val="50000"/>
-            </a:schemeClr>
-          </a:lnRef>
-          <a:fillRef idx="1">
-            <a:schemeClr val="accent1"/>
-          </a:fillRef>
-          <a:effectRef idx="0">
-            <a:schemeClr val="accent1"/>
-          </a:effectRef>
-          <a:fontRef idx="minor">
-            <a:schemeClr val="lt1"/>
-          </a:fontRef>
-        </p:style>
-        <p:txBody>
-          <a:bodyPr rtlCol="0" anchor="ctr"/>
-          <a:lstStyle/>
-          <a:p>
-            <a:pPr algn="ctr"/>
-            <a:r>
-              <a:rPr lang="en-US" dirty="0"/>
-              <a:t>Mission</a:t>
-            </a:r>
-          </a:p>
-        </p:txBody>
-      </p:sp>
-      <p:sp>
-        <p:nvSpPr>
-          <p:cNvPr id="6" name="Rectangle 5">
-            <a:extLst>
-              <a:ext uri="{FF2B5EF4-FFF2-40B4-BE49-F238E27FC236}">
-                <a16:creationId xmlns:a16="http://schemas.microsoft.com/office/drawing/2014/main" id="{93D4011A-CB18-EE46-A3D4-0C33E088F611}"/>
-              </a:ext>
-            </a:extLst>
-          </p:cNvPr>
-          <p:cNvSpPr/>
-          <p:nvPr/>
-        </p:nvSpPr>
-        <p:spPr>
-          <a:xfrm>
-            <a:off x="404919" y="1268035"/>
-            <a:ext cx="1391478" cy="476042"/>
-          </a:xfrm>
-          <a:prstGeom prst="rect">
-            <a:avLst/>
-          </a:prstGeom>
-        </p:spPr>
-        <p:style>
-          <a:lnRef idx="2">
-            <a:schemeClr val="accent1">
-              <a:shade val="50000"/>
-            </a:schemeClr>
-          </a:lnRef>
-          <a:fillRef idx="1">
-            <a:schemeClr val="accent1"/>
-          </a:fillRef>
-          <a:effectRef idx="0">
-            <a:schemeClr val="accent1"/>
-          </a:effectRef>
-          <a:fontRef idx="minor">
-            <a:schemeClr val="lt1"/>
-          </a:fontRef>
-        </p:style>
-        <p:txBody>
-          <a:bodyPr rtlCol="0" anchor="ctr"/>
-          <a:lstStyle/>
-          <a:p>
-            <a:pPr algn="ctr"/>
-            <a:r>
-              <a:rPr lang="en-US" dirty="0"/>
-              <a:t>Target 1</a:t>
-            </a:r>
-          </a:p>
-        </p:txBody>
-      </p:sp>
-      <p:sp>
-        <p:nvSpPr>
-          <p:cNvPr id="9" name="Rectangle 8">
-            <a:extLst>
-              <a:ext uri="{FF2B5EF4-FFF2-40B4-BE49-F238E27FC236}">
-                <a16:creationId xmlns:a16="http://schemas.microsoft.com/office/drawing/2014/main" id="{5CE55A7B-07C8-9244-8402-30F8109A0DD2}"/>
-              </a:ext>
-            </a:extLst>
-          </p:cNvPr>
-          <p:cNvSpPr/>
-          <p:nvPr/>
-        </p:nvSpPr>
-        <p:spPr>
-          <a:xfrm>
-            <a:off x="1967637" y="1262566"/>
-            <a:ext cx="1391478" cy="476042"/>
-          </a:xfrm>
-          <a:prstGeom prst="rect">
-            <a:avLst/>
-          </a:prstGeom>
-        </p:spPr>
-        <p:style>
-          <a:lnRef idx="2">
-            <a:schemeClr val="accent1">
-              <a:shade val="50000"/>
-            </a:schemeClr>
-          </a:lnRef>
-          <a:fillRef idx="1">
-            <a:schemeClr val="accent1"/>
-          </a:fillRef>
-          <a:effectRef idx="0">
-            <a:schemeClr val="accent1"/>
-          </a:effectRef>
-          <a:fontRef idx="minor">
-            <a:schemeClr val="lt1"/>
-          </a:fontRef>
-        </p:style>
-        <p:txBody>
-          <a:bodyPr rtlCol="0" anchor="ctr"/>
-          <a:lstStyle/>
-          <a:p>
-            <a:pPr algn="ctr"/>
-            <a:r>
-              <a:rPr lang="en-US" dirty="0"/>
-              <a:t>Target 2</a:t>
-            </a:r>
-          </a:p>
-        </p:txBody>
-      </p:sp>
-      <p:sp>
-        <p:nvSpPr>
-          <p:cNvPr id="10" name="Rectangle 9">
-            <a:extLst>
-              <a:ext uri="{FF2B5EF4-FFF2-40B4-BE49-F238E27FC236}">
-                <a16:creationId xmlns:a16="http://schemas.microsoft.com/office/drawing/2014/main" id="{9BD5EF10-EE9A-824B-A36B-92B57FA62FBA}"/>
-              </a:ext>
-            </a:extLst>
-          </p:cNvPr>
-          <p:cNvSpPr/>
-          <p:nvPr/>
-        </p:nvSpPr>
-        <p:spPr>
-          <a:xfrm>
-            <a:off x="3952968" y="1268035"/>
-            <a:ext cx="1391478" cy="476042"/>
-          </a:xfrm>
-          <a:prstGeom prst="rect">
-            <a:avLst/>
-          </a:prstGeom>
-        </p:spPr>
-        <p:style>
-          <a:lnRef idx="2">
-            <a:schemeClr val="accent1">
-              <a:shade val="50000"/>
-            </a:schemeClr>
-          </a:lnRef>
-          <a:fillRef idx="1">
-            <a:schemeClr val="accent1"/>
-          </a:fillRef>
-          <a:effectRef idx="0">
-            <a:schemeClr val="accent1"/>
-          </a:effectRef>
-          <a:fontRef idx="minor">
-            <a:schemeClr val="lt1"/>
-          </a:fontRef>
-        </p:style>
-        <p:txBody>
-          <a:bodyPr rtlCol="0" anchor="ctr"/>
-          <a:lstStyle/>
-          <a:p>
-            <a:pPr algn="ctr"/>
-            <a:r>
-              <a:rPr lang="en-US" dirty="0"/>
-              <a:t>Target n</a:t>
-            </a:r>
-          </a:p>
-        </p:txBody>
-      </p:sp>
-      <p:sp>
-        <p:nvSpPr>
-          <p:cNvPr id="16" name="TextBox 15">
-            <a:extLst>
-              <a:ext uri="{FF2B5EF4-FFF2-40B4-BE49-F238E27FC236}">
-                <a16:creationId xmlns:a16="http://schemas.microsoft.com/office/drawing/2014/main" id="{29764E28-5AC0-E348-8375-24DCFD11AB51}"/>
-              </a:ext>
-            </a:extLst>
-          </p:cNvPr>
-          <p:cNvSpPr txBox="1"/>
-          <p:nvPr/>
-        </p:nvSpPr>
-        <p:spPr>
-          <a:xfrm>
-            <a:off x="3450685" y="1260717"/>
-            <a:ext cx="1210755" cy="369332"/>
-          </a:xfrm>
-          <a:prstGeom prst="rect">
-            <a:avLst/>
-          </a:prstGeom>
-          <a:noFill/>
-        </p:spPr>
-        <p:txBody>
-          <a:bodyPr wrap="square" rtlCol="0">
-            <a:spAutoFit/>
-          </a:bodyPr>
-          <a:lstStyle/>
-          <a:p>
-            <a:r>
-              <a:rPr lang="en-US" dirty="0"/>
-              <a:t>…</a:t>
-            </a:r>
-          </a:p>
-        </p:txBody>
-      </p:sp>
-      <p:sp>
-        <p:nvSpPr>
-          <p:cNvPr id="17" name="Rectangle 16">
-            <a:extLst>
-              <a:ext uri="{FF2B5EF4-FFF2-40B4-BE49-F238E27FC236}">
-                <a16:creationId xmlns:a16="http://schemas.microsoft.com/office/drawing/2014/main" id="{145F70D7-0AC1-AF46-83A4-B57B7DD63472}"/>
-              </a:ext>
-            </a:extLst>
-          </p:cNvPr>
-          <p:cNvSpPr/>
-          <p:nvPr/>
-        </p:nvSpPr>
-        <p:spPr>
-          <a:xfrm>
-            <a:off x="6955349" y="1288481"/>
-            <a:ext cx="5046150" cy="3804446"/>
-          </a:xfrm>
-          <a:prstGeom prst="rect">
-            <a:avLst/>
-          </a:prstGeom>
-        </p:spPr>
-        <p:style>
-          <a:lnRef idx="2">
-            <a:schemeClr val="accent1">
-              <a:shade val="50000"/>
-            </a:schemeClr>
-          </a:lnRef>
-          <a:fillRef idx="1">
-            <a:schemeClr val="accent1"/>
-          </a:fillRef>
-          <a:effectRef idx="0">
-            <a:schemeClr val="accent1"/>
-          </a:effectRef>
-          <a:fontRef idx="minor">
-            <a:schemeClr val="lt1"/>
-          </a:fontRef>
-        </p:style>
-        <p:txBody>
-          <a:bodyPr rtlCol="0" anchor="t"/>
-          <a:lstStyle/>
-          <a:p>
-            <a:pPr algn="ctr"/>
-            <a:r>
-              <a:rPr lang="en-US" dirty="0"/>
-              <a:t>REACT Frontend</a:t>
-            </a:r>
-          </a:p>
-        </p:txBody>
-      </p:sp>
-      <p:sp>
-        <p:nvSpPr>
-          <p:cNvPr id="18" name="Rectangle 17">
-            <a:extLst>
-              <a:ext uri="{FF2B5EF4-FFF2-40B4-BE49-F238E27FC236}">
-                <a16:creationId xmlns:a16="http://schemas.microsoft.com/office/drawing/2014/main" id="{6C107317-AE96-3E4B-9943-BA76EB4F5366}"/>
-              </a:ext>
-            </a:extLst>
-          </p:cNvPr>
-          <p:cNvSpPr/>
-          <p:nvPr/>
-        </p:nvSpPr>
-        <p:spPr>
-          <a:xfrm>
-            <a:off x="7163048" y="1836132"/>
-            <a:ext cx="1451967" cy="646977"/>
-          </a:xfrm>
-          <a:prstGeom prst="rect">
-            <a:avLst/>
-          </a:prstGeom>
-          <a:solidFill>
-            <a:schemeClr val="tx1"/>
-          </a:solidFill>
-        </p:spPr>
-        <p:style>
-          <a:lnRef idx="2">
-            <a:schemeClr val="accent1">
-              <a:shade val="50000"/>
-            </a:schemeClr>
-          </a:lnRef>
-          <a:fillRef idx="1">
-            <a:schemeClr val="accent1"/>
-          </a:fillRef>
-          <a:effectRef idx="0">
-            <a:schemeClr val="accent1"/>
-          </a:effectRef>
-          <a:fontRef idx="minor">
-            <a:schemeClr val="lt1"/>
-          </a:fontRef>
-        </p:style>
-        <p:txBody>
-          <a:bodyPr rtlCol="0" anchor="ctr"/>
-          <a:lstStyle/>
-          <a:p>
-            <a:pPr algn="ctr"/>
-            <a:r>
-              <a:rPr lang="en-US" dirty="0">
-                <a:solidFill>
-                  <a:srgbClr val="00B050"/>
-                </a:solidFill>
-              </a:rPr>
-              <a:t>Aircraft Constraints</a:t>
-            </a:r>
-          </a:p>
-        </p:txBody>
-      </p:sp>
-      <p:sp>
-        <p:nvSpPr>
-          <p:cNvPr id="19" name="Rectangle 18">
-            <a:extLst>
-              <a:ext uri="{FF2B5EF4-FFF2-40B4-BE49-F238E27FC236}">
-                <a16:creationId xmlns:a16="http://schemas.microsoft.com/office/drawing/2014/main" id="{BF7845A2-8B7D-5543-97A8-535B0123AA1E}"/>
-              </a:ext>
-            </a:extLst>
-          </p:cNvPr>
-          <p:cNvSpPr/>
-          <p:nvPr/>
-        </p:nvSpPr>
-        <p:spPr>
-          <a:xfrm>
-            <a:off x="8822714" y="1836132"/>
-            <a:ext cx="1451967" cy="646977"/>
-          </a:xfrm>
-          <a:prstGeom prst="rect">
-            <a:avLst/>
-          </a:prstGeom>
-          <a:solidFill>
-            <a:schemeClr val="tx1"/>
-          </a:solidFill>
-        </p:spPr>
-        <p:style>
-          <a:lnRef idx="2">
-            <a:schemeClr val="accent1">
-              <a:shade val="50000"/>
-            </a:schemeClr>
-          </a:lnRef>
-          <a:fillRef idx="1">
-            <a:schemeClr val="accent1"/>
-          </a:fillRef>
-          <a:effectRef idx="0">
-            <a:schemeClr val="accent1"/>
-          </a:effectRef>
-          <a:fontRef idx="minor">
-            <a:schemeClr val="lt1"/>
-          </a:fontRef>
-        </p:style>
-        <p:txBody>
-          <a:bodyPr rtlCol="0" anchor="ctr"/>
-          <a:lstStyle/>
-          <a:p>
-            <a:pPr algn="ctr"/>
-            <a:r>
-              <a:rPr lang="en-US" dirty="0">
-                <a:solidFill>
-                  <a:srgbClr val="00B050"/>
-                </a:solidFill>
-              </a:rPr>
-              <a:t>Target Constraints</a:t>
-            </a:r>
-          </a:p>
-        </p:txBody>
-      </p:sp>
-      <p:sp>
-        <p:nvSpPr>
-          <p:cNvPr id="20" name="Rectangle 19">
-            <a:extLst>
-              <a:ext uri="{FF2B5EF4-FFF2-40B4-BE49-F238E27FC236}">
-                <a16:creationId xmlns:a16="http://schemas.microsoft.com/office/drawing/2014/main" id="{06021E6A-9A2D-234E-B4A9-F807793173EB}"/>
-              </a:ext>
-            </a:extLst>
-          </p:cNvPr>
-          <p:cNvSpPr/>
-          <p:nvPr/>
-        </p:nvSpPr>
-        <p:spPr>
-          <a:xfrm>
-            <a:off x="576159" y="4668226"/>
-            <a:ext cx="1391478" cy="476042"/>
-          </a:xfrm>
-          <a:prstGeom prst="rect">
-            <a:avLst/>
-          </a:prstGeom>
-        </p:spPr>
-        <p:style>
-          <a:lnRef idx="2">
-            <a:schemeClr val="accent1">
-              <a:shade val="50000"/>
-            </a:schemeClr>
-          </a:lnRef>
-          <a:fillRef idx="1">
-            <a:schemeClr val="accent1"/>
-          </a:fillRef>
-          <a:effectRef idx="0">
-            <a:schemeClr val="accent1"/>
-          </a:effectRef>
-          <a:fontRef idx="minor">
-            <a:schemeClr val="lt1"/>
-          </a:fontRef>
-        </p:style>
-        <p:txBody>
-          <a:bodyPr rtlCol="0" anchor="ctr"/>
-          <a:lstStyle/>
-          <a:p>
-            <a:pPr algn="ctr"/>
-            <a:r>
-              <a:rPr lang="en-US" dirty="0"/>
-              <a:t>Air Vehicle 1</a:t>
-            </a:r>
-          </a:p>
-        </p:txBody>
-      </p:sp>
-      <p:sp>
-        <p:nvSpPr>
-          <p:cNvPr id="22" name="Rectangle 21">
-            <a:extLst>
-              <a:ext uri="{FF2B5EF4-FFF2-40B4-BE49-F238E27FC236}">
-                <a16:creationId xmlns:a16="http://schemas.microsoft.com/office/drawing/2014/main" id="{4195740A-F87C-8747-ADF5-7079F2FEC3CC}"/>
-              </a:ext>
-            </a:extLst>
-          </p:cNvPr>
-          <p:cNvSpPr/>
-          <p:nvPr/>
-        </p:nvSpPr>
-        <p:spPr>
-          <a:xfrm>
-            <a:off x="2189875" y="4674741"/>
-            <a:ext cx="1391478" cy="476042"/>
-          </a:xfrm>
-          <a:prstGeom prst="rect">
-            <a:avLst/>
-          </a:prstGeom>
-        </p:spPr>
-        <p:style>
-          <a:lnRef idx="2">
-            <a:schemeClr val="accent1">
-              <a:shade val="50000"/>
-            </a:schemeClr>
-          </a:lnRef>
-          <a:fillRef idx="1">
-            <a:schemeClr val="accent1"/>
-          </a:fillRef>
-          <a:effectRef idx="0">
-            <a:schemeClr val="accent1"/>
-          </a:effectRef>
-          <a:fontRef idx="minor">
-            <a:schemeClr val="lt1"/>
-          </a:fontRef>
-        </p:style>
-        <p:txBody>
-          <a:bodyPr rtlCol="0" anchor="ctr"/>
-          <a:lstStyle/>
-          <a:p>
-            <a:pPr algn="ctr"/>
-            <a:r>
-              <a:rPr lang="en-US" dirty="0"/>
-              <a:t>Air Vehicle 2</a:t>
-            </a:r>
-          </a:p>
-        </p:txBody>
-      </p:sp>
-      <p:sp>
-        <p:nvSpPr>
-          <p:cNvPr id="29" name="Rectangle 28">
-            <a:extLst>
-              <a:ext uri="{FF2B5EF4-FFF2-40B4-BE49-F238E27FC236}">
-                <a16:creationId xmlns:a16="http://schemas.microsoft.com/office/drawing/2014/main" id="{0127AA96-766F-394B-8FF4-48557EF98795}"/>
-              </a:ext>
-            </a:extLst>
-          </p:cNvPr>
-          <p:cNvSpPr/>
-          <p:nvPr/>
-        </p:nvSpPr>
-        <p:spPr>
-          <a:xfrm>
-            <a:off x="4197246" y="4674741"/>
-            <a:ext cx="1391478" cy="476042"/>
-          </a:xfrm>
-          <a:prstGeom prst="rect">
-            <a:avLst/>
-          </a:prstGeom>
-        </p:spPr>
-        <p:style>
-          <a:lnRef idx="2">
-            <a:schemeClr val="accent1">
-              <a:shade val="50000"/>
-            </a:schemeClr>
-          </a:lnRef>
-          <a:fillRef idx="1">
-            <a:schemeClr val="accent1"/>
-          </a:fillRef>
-          <a:effectRef idx="0">
-            <a:schemeClr val="accent1"/>
-          </a:effectRef>
-          <a:fontRef idx="minor">
-            <a:schemeClr val="lt1"/>
-          </a:fontRef>
-        </p:style>
-        <p:txBody>
-          <a:bodyPr rtlCol="0" anchor="ctr"/>
-          <a:lstStyle/>
-          <a:p>
-            <a:pPr algn="ctr"/>
-            <a:r>
-              <a:rPr lang="en-US" dirty="0"/>
-              <a:t>Air Vehicle 3</a:t>
-            </a:r>
-          </a:p>
-        </p:txBody>
-      </p:sp>
-      <p:sp>
-        <p:nvSpPr>
-          <p:cNvPr id="60" name="TextBox 59">
-            <a:extLst>
-              <a:ext uri="{FF2B5EF4-FFF2-40B4-BE49-F238E27FC236}">
-                <a16:creationId xmlns:a16="http://schemas.microsoft.com/office/drawing/2014/main" id="{7802B729-F4A0-2C48-B00C-80BD37B6349E}"/>
-              </a:ext>
-            </a:extLst>
-          </p:cNvPr>
-          <p:cNvSpPr txBox="1"/>
-          <p:nvPr/>
-        </p:nvSpPr>
-        <p:spPr>
-          <a:xfrm>
-            <a:off x="3703148" y="4686164"/>
-            <a:ext cx="1210755" cy="369332"/>
-          </a:xfrm>
-          <a:prstGeom prst="rect">
-            <a:avLst/>
-          </a:prstGeom>
-          <a:noFill/>
-        </p:spPr>
-        <p:txBody>
-          <a:bodyPr wrap="square" rtlCol="0">
-            <a:spAutoFit/>
-          </a:bodyPr>
-          <a:lstStyle/>
-          <a:p>
-            <a:r>
-              <a:rPr lang="en-US" dirty="0"/>
-              <a:t>…</a:t>
-            </a:r>
-          </a:p>
-        </p:txBody>
-      </p:sp>
-      <p:sp>
-        <p:nvSpPr>
-          <p:cNvPr id="61" name="Rectangle 60">
-            <a:extLst>
-              <a:ext uri="{FF2B5EF4-FFF2-40B4-BE49-F238E27FC236}">
-                <a16:creationId xmlns:a16="http://schemas.microsoft.com/office/drawing/2014/main" id="{48D60052-708E-C34F-84A7-1A882A25505C}"/>
-              </a:ext>
-            </a:extLst>
-          </p:cNvPr>
-          <p:cNvSpPr/>
-          <p:nvPr/>
-        </p:nvSpPr>
-        <p:spPr>
-          <a:xfrm>
-            <a:off x="242966" y="4455080"/>
-            <a:ext cx="5760721" cy="892602"/>
-          </a:xfrm>
-          <a:prstGeom prst="rect">
-            <a:avLst/>
-          </a:prstGeom>
-          <a:noFill/>
-          <a:ln>
-            <a:solidFill>
-              <a:schemeClr val="tx1"/>
-            </a:solidFill>
-          </a:ln>
-        </p:spPr>
-        <p:style>
-          <a:lnRef idx="2">
-            <a:schemeClr val="accent1">
-              <a:shade val="50000"/>
-            </a:schemeClr>
-          </a:lnRef>
-          <a:fillRef idx="1">
-            <a:schemeClr val="accent1"/>
-          </a:fillRef>
-          <a:effectRef idx="0">
-            <a:schemeClr val="accent1"/>
-          </a:effectRef>
-          <a:fontRef idx="minor">
-            <a:schemeClr val="lt1"/>
-          </a:fontRef>
-        </p:style>
-        <p:txBody>
-          <a:bodyPr rtlCol="0" anchor="ctr"/>
-          <a:lstStyle/>
-          <a:p>
-            <a:pPr algn="ctr"/>
-            <a:endParaRPr lang="en-US"/>
-          </a:p>
-        </p:txBody>
-      </p:sp>
-      <p:cxnSp>
-        <p:nvCxnSpPr>
-          <p:cNvPr id="66" name="Elbow Connector 65">
-            <a:extLst>
-              <a:ext uri="{FF2B5EF4-FFF2-40B4-BE49-F238E27FC236}">
-                <a16:creationId xmlns:a16="http://schemas.microsoft.com/office/drawing/2014/main" id="{E23DE534-EFF6-9F45-A704-A98E06E6EA85}"/>
-              </a:ext>
-            </a:extLst>
-          </p:cNvPr>
-          <p:cNvCxnSpPr>
-            <a:cxnSpLocks/>
-            <a:stCxn id="5" idx="3"/>
-            <a:endCxn id="17" idx="1"/>
-          </p:cNvCxnSpPr>
-          <p:nvPr/>
-        </p:nvCxnSpPr>
-        <p:spPr>
-          <a:xfrm>
-            <a:off x="3869001" y="3144224"/>
-            <a:ext cx="3086348" cy="46480"/>
-          </a:xfrm>
-          <a:prstGeom prst="bentConnector3">
-            <a:avLst/>
-          </a:prstGeom>
-          <a:ln>
-            <a:headEnd type="triangle"/>
-            <a:tailEnd type="triangle"/>
-          </a:ln>
-        </p:spPr>
-        <p:style>
-          <a:lnRef idx="1">
-            <a:schemeClr val="accent1"/>
-          </a:lnRef>
-          <a:fillRef idx="0">
-            <a:schemeClr val="accent1"/>
-          </a:fillRef>
-          <a:effectRef idx="0">
-            <a:schemeClr val="accent1"/>
-          </a:effectRef>
-          <a:fontRef idx="minor">
-            <a:schemeClr val="tx1"/>
-          </a:fontRef>
-        </p:style>
-      </p:cxnSp>
-      <p:cxnSp>
-        <p:nvCxnSpPr>
-          <p:cNvPr id="77" name="Elbow Connector 76">
-            <a:extLst>
-              <a:ext uri="{FF2B5EF4-FFF2-40B4-BE49-F238E27FC236}">
-                <a16:creationId xmlns:a16="http://schemas.microsoft.com/office/drawing/2014/main" id="{EA2FE1D0-C65F-5A45-97E4-C22CB497FDF4}"/>
-              </a:ext>
-            </a:extLst>
-          </p:cNvPr>
-          <p:cNvCxnSpPr>
-            <a:cxnSpLocks/>
-            <a:stCxn id="21" idx="2"/>
-            <a:endCxn id="5" idx="0"/>
-          </p:cNvCxnSpPr>
-          <p:nvPr/>
-        </p:nvCxnSpPr>
-        <p:spPr>
-          <a:xfrm rot="5400000">
-            <a:off x="2675125" y="2415544"/>
-            <a:ext cx="877830" cy="1"/>
-          </a:xfrm>
-          <a:prstGeom prst="bentConnector3">
-            <a:avLst>
-              <a:gd name="adj1" fmla="val 50000"/>
-            </a:avLst>
-          </a:prstGeom>
-          <a:ln>
-            <a:headEnd type="triangle"/>
-            <a:tailEnd type="triangle"/>
-          </a:ln>
-        </p:spPr>
-        <p:style>
-          <a:lnRef idx="1">
-            <a:schemeClr val="accent1"/>
-          </a:lnRef>
-          <a:fillRef idx="0">
-            <a:schemeClr val="accent1"/>
-          </a:fillRef>
-          <a:effectRef idx="0">
-            <a:schemeClr val="accent1"/>
-          </a:effectRef>
-          <a:fontRef idx="minor">
-            <a:schemeClr val="tx1"/>
-          </a:fontRef>
-        </p:style>
-      </p:cxnSp>
-      <p:cxnSp>
-        <p:nvCxnSpPr>
-          <p:cNvPr id="81" name="Elbow Connector 80">
-            <a:extLst>
-              <a:ext uri="{FF2B5EF4-FFF2-40B4-BE49-F238E27FC236}">
-                <a16:creationId xmlns:a16="http://schemas.microsoft.com/office/drawing/2014/main" id="{34C296A8-F58C-0540-956C-C16A4DD25E64}"/>
-              </a:ext>
-            </a:extLst>
-          </p:cNvPr>
-          <p:cNvCxnSpPr>
-            <a:cxnSpLocks/>
-            <a:stCxn id="5" idx="2"/>
-            <a:endCxn id="61" idx="0"/>
-          </p:cNvCxnSpPr>
-          <p:nvPr/>
-        </p:nvCxnSpPr>
-        <p:spPr>
-          <a:xfrm rot="16200000" flipH="1">
-            <a:off x="2608137" y="3939890"/>
-            <a:ext cx="1021092" cy="9288"/>
-          </a:xfrm>
-          <a:prstGeom prst="bentConnector3">
-            <a:avLst>
-              <a:gd name="adj1" fmla="val 50000"/>
-            </a:avLst>
-          </a:prstGeom>
-          <a:ln>
-            <a:headEnd type="triangle"/>
-            <a:tailEnd type="triangle"/>
-          </a:ln>
-        </p:spPr>
-        <p:style>
-          <a:lnRef idx="1">
-            <a:schemeClr val="accent1"/>
-          </a:lnRef>
-          <a:fillRef idx="0">
-            <a:schemeClr val="accent1"/>
-          </a:fillRef>
-          <a:effectRef idx="0">
-            <a:schemeClr val="accent1"/>
-          </a:effectRef>
-          <a:fontRef idx="minor">
-            <a:schemeClr val="tx1"/>
-          </a:fontRef>
-        </p:style>
-      </p:cxnSp>
-      <p:sp>
-        <p:nvSpPr>
-          <p:cNvPr id="85" name="Rectangle 84">
-            <a:extLst>
-              <a:ext uri="{FF2B5EF4-FFF2-40B4-BE49-F238E27FC236}">
-                <a16:creationId xmlns:a16="http://schemas.microsoft.com/office/drawing/2014/main" id="{30F14371-242C-6B45-A05D-F2D4ADCC4B76}"/>
-              </a:ext>
-            </a:extLst>
-          </p:cNvPr>
-          <p:cNvSpPr/>
-          <p:nvPr/>
-        </p:nvSpPr>
-        <p:spPr>
-          <a:xfrm>
-            <a:off x="8822713" y="2820736"/>
-            <a:ext cx="1451967" cy="646977"/>
-          </a:xfrm>
-          <a:prstGeom prst="rect">
-            <a:avLst/>
-          </a:prstGeom>
-          <a:solidFill>
-            <a:schemeClr val="tx1"/>
-          </a:solidFill>
-        </p:spPr>
-        <p:style>
-          <a:lnRef idx="2">
-            <a:schemeClr val="accent1">
-              <a:shade val="50000"/>
-            </a:schemeClr>
-          </a:lnRef>
-          <a:fillRef idx="1">
-            <a:schemeClr val="accent1"/>
-          </a:fillRef>
-          <a:effectRef idx="0">
-            <a:schemeClr val="accent1"/>
-          </a:effectRef>
-          <a:fontRef idx="minor">
-            <a:schemeClr val="lt1"/>
-          </a:fontRef>
-        </p:style>
-        <p:txBody>
-          <a:bodyPr rtlCol="0" anchor="ctr"/>
-          <a:lstStyle/>
-          <a:p>
-            <a:pPr algn="ctr"/>
-            <a:r>
-              <a:rPr lang="en-US" dirty="0">
-                <a:solidFill>
-                  <a:srgbClr val="00B050"/>
-                </a:solidFill>
-              </a:rPr>
-              <a:t>Target Modification</a:t>
-            </a:r>
-          </a:p>
-        </p:txBody>
-      </p:sp>
-      <p:sp>
-        <p:nvSpPr>
-          <p:cNvPr id="86" name="Rectangle 85">
-            <a:extLst>
-              <a:ext uri="{FF2B5EF4-FFF2-40B4-BE49-F238E27FC236}">
-                <a16:creationId xmlns:a16="http://schemas.microsoft.com/office/drawing/2014/main" id="{E52ACF4A-BE94-E544-9A38-718C09CB9074}"/>
-              </a:ext>
-            </a:extLst>
-          </p:cNvPr>
-          <p:cNvSpPr/>
-          <p:nvPr/>
-        </p:nvSpPr>
-        <p:spPr>
-          <a:xfrm>
-            <a:off x="8867959" y="3863351"/>
-            <a:ext cx="1451967" cy="646977"/>
-          </a:xfrm>
-          <a:prstGeom prst="rect">
-            <a:avLst/>
-          </a:prstGeom>
-          <a:solidFill>
-            <a:schemeClr val="tx1"/>
-          </a:solidFill>
-        </p:spPr>
-        <p:style>
-          <a:lnRef idx="2">
-            <a:schemeClr val="accent1">
-              <a:shade val="50000"/>
-            </a:schemeClr>
-          </a:lnRef>
-          <a:fillRef idx="1">
-            <a:schemeClr val="accent1"/>
-          </a:fillRef>
-          <a:effectRef idx="0">
-            <a:schemeClr val="accent1"/>
-          </a:effectRef>
-          <a:fontRef idx="minor">
-            <a:schemeClr val="lt1"/>
-          </a:fontRef>
-        </p:style>
-        <p:txBody>
-          <a:bodyPr rtlCol="0" anchor="ctr"/>
-          <a:lstStyle/>
-          <a:p>
-            <a:pPr algn="ctr"/>
-            <a:r>
-              <a:rPr lang="en-US" dirty="0">
-                <a:solidFill>
-                  <a:srgbClr val="00B050"/>
-                </a:solidFill>
-              </a:rPr>
-              <a:t>Push Notifications</a:t>
-            </a:r>
-          </a:p>
-        </p:txBody>
-      </p:sp>
-      <p:sp>
-        <p:nvSpPr>
-          <p:cNvPr id="87" name="Rectangle 86">
-            <a:extLst>
-              <a:ext uri="{FF2B5EF4-FFF2-40B4-BE49-F238E27FC236}">
-                <a16:creationId xmlns:a16="http://schemas.microsoft.com/office/drawing/2014/main" id="{4AE79B28-5F12-D149-B662-ABA275AC7830}"/>
-              </a:ext>
-            </a:extLst>
-          </p:cNvPr>
-          <p:cNvSpPr/>
-          <p:nvPr/>
-        </p:nvSpPr>
-        <p:spPr>
-          <a:xfrm>
-            <a:off x="7190314" y="3859159"/>
-            <a:ext cx="1451967" cy="646977"/>
-          </a:xfrm>
-          <a:prstGeom prst="rect">
-            <a:avLst/>
-          </a:prstGeom>
-          <a:solidFill>
-            <a:schemeClr val="tx1"/>
-          </a:solidFill>
-        </p:spPr>
-        <p:style>
-          <a:lnRef idx="2">
-            <a:schemeClr val="accent1">
-              <a:shade val="50000"/>
-            </a:schemeClr>
-          </a:lnRef>
-          <a:fillRef idx="1">
-            <a:schemeClr val="accent1"/>
-          </a:fillRef>
-          <a:effectRef idx="0">
-            <a:schemeClr val="accent1"/>
-          </a:effectRef>
-          <a:fontRef idx="minor">
-            <a:schemeClr val="lt1"/>
-          </a:fontRef>
-        </p:style>
-        <p:txBody>
-          <a:bodyPr rtlCol="0" anchor="ctr"/>
-          <a:lstStyle/>
-          <a:p>
-            <a:pPr algn="ctr"/>
-            <a:r>
-              <a:rPr lang="en-US" dirty="0">
-                <a:solidFill>
-                  <a:srgbClr val="00B050"/>
-                </a:solidFill>
-              </a:rPr>
-              <a:t>Algorithms</a:t>
-            </a:r>
-          </a:p>
-        </p:txBody>
-      </p:sp>
-      <p:sp>
-        <p:nvSpPr>
-          <p:cNvPr id="89" name="Rectangle 88">
-            <a:extLst>
-              <a:ext uri="{FF2B5EF4-FFF2-40B4-BE49-F238E27FC236}">
-                <a16:creationId xmlns:a16="http://schemas.microsoft.com/office/drawing/2014/main" id="{CF975997-9019-BC40-9E43-7EB374795C77}"/>
-              </a:ext>
-            </a:extLst>
-          </p:cNvPr>
-          <p:cNvSpPr/>
-          <p:nvPr/>
-        </p:nvSpPr>
-        <p:spPr>
-          <a:xfrm>
-            <a:off x="10412106" y="1836132"/>
-            <a:ext cx="1451967" cy="646977"/>
-          </a:xfrm>
-          <a:prstGeom prst="rect">
-            <a:avLst/>
-          </a:prstGeom>
-          <a:solidFill>
-            <a:schemeClr val="tx1"/>
-          </a:solidFill>
-        </p:spPr>
-        <p:style>
-          <a:lnRef idx="2">
-            <a:schemeClr val="accent1">
-              <a:shade val="50000"/>
-            </a:schemeClr>
-          </a:lnRef>
-          <a:fillRef idx="1">
-            <a:schemeClr val="accent1"/>
-          </a:fillRef>
-          <a:effectRef idx="0">
-            <a:schemeClr val="accent1"/>
-          </a:effectRef>
-          <a:fontRef idx="minor">
-            <a:schemeClr val="lt1"/>
-          </a:fontRef>
-        </p:style>
-        <p:txBody>
-          <a:bodyPr rtlCol="0" anchor="ctr"/>
-          <a:lstStyle/>
-          <a:p>
-            <a:pPr algn="ctr"/>
-            <a:r>
-              <a:rPr lang="en-US" dirty="0">
-                <a:solidFill>
-                  <a:srgbClr val="00B050"/>
-                </a:solidFill>
-              </a:rPr>
-              <a:t>Pilot</a:t>
-            </a:r>
-            <a:br>
-              <a:rPr lang="en-US" dirty="0">
-                <a:solidFill>
-                  <a:srgbClr val="00B050"/>
-                </a:solidFill>
-              </a:rPr>
-            </a:br>
-            <a:r>
-              <a:rPr lang="en-US" dirty="0">
-                <a:solidFill>
-                  <a:srgbClr val="00B050"/>
-                </a:solidFill>
-              </a:rPr>
-              <a:t>Constraints</a:t>
-            </a:r>
-          </a:p>
-        </p:txBody>
-      </p:sp>
-      <p:sp>
-        <p:nvSpPr>
-          <p:cNvPr id="90" name="TextBox 89">
-            <a:extLst>
-              <a:ext uri="{FF2B5EF4-FFF2-40B4-BE49-F238E27FC236}">
-                <a16:creationId xmlns:a16="http://schemas.microsoft.com/office/drawing/2014/main" id="{7BD3049A-68D9-B14E-9F65-5687DFE485B6}"/>
-              </a:ext>
-            </a:extLst>
-          </p:cNvPr>
-          <p:cNvSpPr txBox="1"/>
-          <p:nvPr/>
-        </p:nvSpPr>
-        <p:spPr>
-          <a:xfrm>
-            <a:off x="566642" y="2472063"/>
-            <a:ext cx="1613716" cy="1200329"/>
-          </a:xfrm>
-          <a:prstGeom prst="rect">
-            <a:avLst/>
-          </a:prstGeom>
-          <a:noFill/>
-        </p:spPr>
-        <p:txBody>
-          <a:bodyPr wrap="square" rtlCol="0">
-            <a:spAutoFit/>
-          </a:bodyPr>
-          <a:lstStyle/>
-          <a:p>
-            <a:br>
-              <a:rPr lang="en-US" dirty="0"/>
-            </a:br>
-            <a:r>
-              <a:rPr lang="en-US" dirty="0"/>
-              <a:t>Saved in individual user or team DB.</a:t>
-            </a:r>
-          </a:p>
-        </p:txBody>
-      </p:sp>
-      <p:sp>
-        <p:nvSpPr>
-          <p:cNvPr id="98" name="Rectangle 97">
-            <a:extLst>
-              <a:ext uri="{FF2B5EF4-FFF2-40B4-BE49-F238E27FC236}">
-                <a16:creationId xmlns:a16="http://schemas.microsoft.com/office/drawing/2014/main" id="{28FA50C8-5687-1D4B-886B-50D3BAE6824A}"/>
-              </a:ext>
-            </a:extLst>
-          </p:cNvPr>
-          <p:cNvSpPr/>
-          <p:nvPr/>
-        </p:nvSpPr>
-        <p:spPr>
-          <a:xfrm>
-            <a:off x="7181027" y="2825732"/>
-            <a:ext cx="1451967" cy="646977"/>
-          </a:xfrm>
-          <a:prstGeom prst="rect">
-            <a:avLst/>
-          </a:prstGeom>
-          <a:solidFill>
-            <a:schemeClr val="tx1"/>
-          </a:solidFill>
-        </p:spPr>
-        <p:style>
-          <a:lnRef idx="2">
-            <a:schemeClr val="accent1">
-              <a:shade val="50000"/>
-            </a:schemeClr>
-          </a:lnRef>
-          <a:fillRef idx="1">
-            <a:schemeClr val="accent1"/>
-          </a:fillRef>
-          <a:effectRef idx="0">
-            <a:schemeClr val="accent1"/>
-          </a:effectRef>
-          <a:fontRef idx="minor">
-            <a:schemeClr val="lt1"/>
-          </a:fontRef>
-        </p:style>
-        <p:txBody>
-          <a:bodyPr rtlCol="0" anchor="ctr"/>
-          <a:lstStyle/>
-          <a:p>
-            <a:pPr algn="ctr"/>
-            <a:r>
-              <a:rPr lang="en-US" dirty="0">
-                <a:solidFill>
-                  <a:srgbClr val="00B050"/>
-                </a:solidFill>
-              </a:rPr>
-              <a:t>Aircraft Modification</a:t>
-            </a:r>
-          </a:p>
-        </p:txBody>
-      </p:sp>
-      <p:sp>
-        <p:nvSpPr>
-          <p:cNvPr id="99" name="Rectangle 98">
-            <a:extLst>
-              <a:ext uri="{FF2B5EF4-FFF2-40B4-BE49-F238E27FC236}">
-                <a16:creationId xmlns:a16="http://schemas.microsoft.com/office/drawing/2014/main" id="{FE2C2A62-885F-8344-9E4B-C39D579D1132}"/>
-              </a:ext>
-            </a:extLst>
-          </p:cNvPr>
-          <p:cNvSpPr/>
-          <p:nvPr/>
-        </p:nvSpPr>
-        <p:spPr>
-          <a:xfrm>
-            <a:off x="10443015" y="2820736"/>
-            <a:ext cx="1451967" cy="646977"/>
-          </a:xfrm>
-          <a:prstGeom prst="rect">
-            <a:avLst/>
-          </a:prstGeom>
-          <a:solidFill>
-            <a:schemeClr val="tx1"/>
-          </a:solidFill>
-        </p:spPr>
-        <p:style>
-          <a:lnRef idx="2">
-            <a:schemeClr val="accent1">
-              <a:shade val="50000"/>
-            </a:schemeClr>
-          </a:lnRef>
-          <a:fillRef idx="1">
-            <a:schemeClr val="accent1"/>
-          </a:fillRef>
-          <a:effectRef idx="0">
-            <a:schemeClr val="accent1"/>
-          </a:effectRef>
-          <a:fontRef idx="minor">
-            <a:schemeClr val="lt1"/>
-          </a:fontRef>
-        </p:style>
-        <p:txBody>
-          <a:bodyPr rtlCol="0" anchor="ctr"/>
-          <a:lstStyle/>
-          <a:p>
-            <a:pPr algn="ctr"/>
-            <a:r>
-              <a:rPr lang="en-US" dirty="0">
-                <a:solidFill>
-                  <a:srgbClr val="00B050"/>
-                </a:solidFill>
-              </a:rPr>
-              <a:t>Pilot Modification</a:t>
-            </a:r>
-          </a:p>
-        </p:txBody>
-      </p:sp>
     </p:spTree>
     <p:extLst>
       <p:ext uri="{BB962C8B-B14F-4D97-AF65-F5344CB8AC3E}">
-        <p14:creationId xmlns:p14="http://schemas.microsoft.com/office/powerpoint/2010/main" val="480252819"/>
+        <p14:creationId xmlns:p14="http://schemas.microsoft.com/office/powerpoint/2010/main" val="266361055"/>
       </p:ext>
     </p:extLst>
   </p:cSld>
@@ -5089,7 +3953,7 @@
           <a:p>
             <a:r>
               <a:rPr lang="en-US" dirty="0"/>
-              <a:t>EJJ Mission Planning Flow (2)	</a:t>
+              <a:t>EJJ Mission Planning Flow (3)	</a:t>
             </a:r>
           </a:p>
         </p:txBody>
@@ -5113,58 +3977,62 @@
         <p:spPr/>
         <p:txBody>
           <a:bodyPr>
-            <a:normAutofit/>
+            <a:normAutofit lnSpcReduction="10000"/>
           </a:bodyPr>
           <a:lstStyle/>
           <a:p>
             <a:r>
               <a:rPr lang="en-US" dirty="0"/>
-              <a:t>Drag in any constraints/restraints and the information is stored</a:t>
+              <a:t>An algorithm runs to schedule all the sorties within the mission time period, including repositions and rest times</a:t>
+            </a:r>
+          </a:p>
+          <a:p>
+            <a:r>
+              <a:rPr lang="en-US" dirty="0"/>
+              <a:t>The sortie data for the jets, pilots, </a:t>
+            </a:r>
+            <a:r>
+              <a:rPr lang="en-US" dirty="0" err="1"/>
+              <a:t>helos</a:t>
+            </a:r>
+            <a:r>
+              <a:rPr lang="en-US" dirty="0"/>
+              <a:t>, and missiles, including reposition times and rest times, are displayed on the web page</a:t>
             </a:r>
           </a:p>
           <a:p>
             <a:pPr lvl="1"/>
             <a:r>
               <a:rPr lang="en-US" dirty="0"/>
-              <a:t>i.e. max flight times, rest times, reposition times, missile carriage, pilot restrictions with other pilots or aircraft, jet restrictions with other jets, time restrictions, missile probabilities of hit/disabling/destroying, etc.</a:t>
+              <a:t>Also, display the number of successful target strikes achieved</a:t>
+            </a:r>
+          </a:p>
+          <a:p>
+            <a:r>
+              <a:rPr lang="en-US" dirty="0"/>
+              <a:t>If desired, the user can manually drag the bars in the plots to extend/shorten sortie hours, shift sorties, etc.</a:t>
             </a:r>
           </a:p>
           <a:p>
             <a:pPr lvl="1"/>
             <a:r>
               <a:rPr lang="en-US" dirty="0"/>
-              <a:t>Does not initially assume any casualties during striking targets and jet/</a:t>
-            </a:r>
-            <a:r>
-              <a:rPr lang="en-US" dirty="0" err="1"/>
-              <a:t>helo</a:t>
-            </a:r>
-            <a:r>
-              <a:rPr lang="en-US" dirty="0"/>
-              <a:t> downtime chances</a:t>
-            </a:r>
-          </a:p>
-          <a:p>
-            <a:r>
-              <a:rPr lang="en-US" dirty="0"/>
-              <a:t>Make the mission the Active Mission and set mission start/end times</a:t>
-            </a:r>
-          </a:p>
-          <a:p>
-            <a:r>
-              <a:rPr lang="en-US" dirty="0"/>
-              <a:t>An algorithm runs to calculate the maximum number of sorties needed for each target tasking</a:t>
-            </a:r>
-          </a:p>
-          <a:p>
-            <a:pPr lvl="1"/>
-            <a:r>
-              <a:rPr lang="en-US" dirty="0"/>
-              <a:t>90% probability to disable and/or destroy based on the target requirements</a:t>
-            </a:r>
-          </a:p>
-          <a:p>
-            <a:endParaRPr lang="en-US" dirty="0"/>
+              <a:t>There are constraints for how much the bars can be dragged and extended/shortened</a:t>
+            </a:r>
+          </a:p>
+          <a:p>
+            <a:pPr lvl="2"/>
+            <a:r>
+              <a:rPr lang="en-US" dirty="0"/>
+              <a:t>Sortie time will be colored RED if it’s not valid given the constraints</a:t>
+            </a:r>
+          </a:p>
+          <a:p>
+            <a:pPr lvl="2"/>
+            <a:r>
+              <a:rPr lang="en-US" dirty="0"/>
+              <a:t>Chance of success updates automatically with each adjustment</a:t>
+            </a:r>
           </a:p>
         </p:txBody>
       </p:sp>
@@ -5206,7 +4074,7 @@
     </p:spTree>
     <p:extLst>
       <p:ext uri="{BB962C8B-B14F-4D97-AF65-F5344CB8AC3E}">
-        <p14:creationId xmlns:p14="http://schemas.microsoft.com/office/powerpoint/2010/main" val="266361055"/>
+        <p14:creationId xmlns:p14="http://schemas.microsoft.com/office/powerpoint/2010/main" val="113902029"/>
       </p:ext>
     </p:extLst>
   </p:cSld>
@@ -5235,13 +4103,7 @@
       </p:grpSpPr>
       <p:sp>
         <p:nvSpPr>
-          <p:cNvPr id="2" name="Title 1">
-            <a:extLst>
-              <a:ext uri="{FF2B5EF4-FFF2-40B4-BE49-F238E27FC236}">
-                <a16:creationId xmlns:a16="http://schemas.microsoft.com/office/drawing/2014/main" id="{E29B01D6-A7CA-4A3E-9C66-C2AA33322F12}"/>
-              </a:ext>
-            </a:extLst>
-          </p:cNvPr>
+          <p:cNvPr id="2" name="Title 1"/>
           <p:cNvSpPr>
             <a:spLocks noGrp="1"/>
           </p:cNvSpPr>
@@ -5249,105 +4111,26 @@
             <p:ph type="title"/>
           </p:nvPr>
         </p:nvSpPr>
-        <p:spPr/>
+        <p:spPr>
+          <a:xfrm>
+            <a:off x="385175" y="1"/>
+            <a:ext cx="10515600" cy="1083050"/>
+          </a:xfrm>
+        </p:spPr>
         <p:txBody>
           <a:bodyPr/>
           <a:lstStyle/>
           <a:p>
             <a:r>
               <a:rPr lang="en-US" dirty="0"/>
-              <a:t>EJJ Mission Planning Flow (3)	</a:t>
-            </a:r>
-          </a:p>
-        </p:txBody>
-      </p:sp>
-      <p:sp>
-        <p:nvSpPr>
-          <p:cNvPr id="3" name="Content Placeholder 2">
-            <a:extLst>
-              <a:ext uri="{FF2B5EF4-FFF2-40B4-BE49-F238E27FC236}">
-                <a16:creationId xmlns:a16="http://schemas.microsoft.com/office/drawing/2014/main" id="{F1842140-4ACB-41A9-BC7F-30570259E5D8}"/>
-              </a:ext>
-            </a:extLst>
-          </p:cNvPr>
-          <p:cNvSpPr>
-            <a:spLocks noGrp="1"/>
-          </p:cNvSpPr>
-          <p:nvPr>
-            <p:ph idx="1"/>
-          </p:nvPr>
-        </p:nvSpPr>
-        <p:spPr/>
-        <p:txBody>
-          <a:bodyPr>
-            <a:normAutofit lnSpcReduction="10000"/>
-          </a:bodyPr>
-          <a:lstStyle/>
-          <a:p>
-            <a:r>
-              <a:rPr lang="en-US" dirty="0"/>
-              <a:t>An algorithm runs to schedule all the sorties within the mission time period, including repositions and rest times</a:t>
-            </a:r>
-          </a:p>
-          <a:p>
-            <a:r>
-              <a:rPr lang="en-US" dirty="0"/>
-              <a:t>The sortie data for the jets, pilots, </a:t>
-            </a:r>
-            <a:r>
-              <a:rPr lang="en-US" dirty="0" err="1"/>
-              <a:t>helos</a:t>
-            </a:r>
-            <a:r>
-              <a:rPr lang="en-US" dirty="0"/>
-              <a:t>, and missiles, including reposition times and rest times, are displayed on the web page</a:t>
-            </a:r>
-          </a:p>
-          <a:p>
-            <a:pPr lvl="1"/>
-            <a:r>
-              <a:rPr lang="en-US" dirty="0"/>
-              <a:t>Also, display the number of successful target strikes achieved</a:t>
-            </a:r>
-          </a:p>
-          <a:p>
-            <a:r>
-              <a:rPr lang="en-US" dirty="0"/>
-              <a:t>If desired, the user can manually drag the bars in the plots to extend/shorten sortie hours, shift sorties, etc.</a:t>
-            </a:r>
-          </a:p>
-          <a:p>
-            <a:pPr lvl="1"/>
-            <a:r>
-              <a:rPr lang="en-US" dirty="0"/>
-              <a:t>There are constraints for how much the bars can be dragged and extended/shortened</a:t>
-            </a:r>
-          </a:p>
-          <a:p>
-            <a:pPr lvl="2"/>
-            <a:r>
-              <a:rPr lang="en-US" dirty="0"/>
-              <a:t>Sortie time will be colored RED if it’s not valid given the constraints</a:t>
-            </a:r>
-          </a:p>
-          <a:p>
-            <a:pPr lvl="2"/>
-            <a:r>
-              <a:rPr lang="en-US" dirty="0"/>
-              <a:t>Chance of success updates automatically with each adjustment</a:t>
-            </a:r>
-          </a:p>
-        </p:txBody>
-      </p:sp>
-      <p:sp>
-        <p:nvSpPr>
-          <p:cNvPr id="4" name="Footer Placeholder 3">
-            <a:extLst>
-              <a:ext uri="{FF2B5EF4-FFF2-40B4-BE49-F238E27FC236}">
-                <a16:creationId xmlns:a16="http://schemas.microsoft.com/office/drawing/2014/main" id="{C401FFE3-F414-4CF5-AD6A-9C2DE5116ED4}"/>
-              </a:ext>
-            </a:extLst>
-          </p:cNvPr>
+              <a:t>EJJ Web Page – Mission Set-Up</a:t>
+            </a:r>
+          </a:p>
+        </p:txBody>
+      </p:sp>
+      <p:sp>
+        <p:nvSpPr>
+          <p:cNvPr id="4" name="Footer Placeholder 3"/>
           <p:cNvSpPr>
             <a:spLocks noGrp="1"/>
           </p:cNvSpPr>
@@ -5374,10 +4157,40 @@
           </a:p>
         </p:txBody>
       </p:sp>
+      <p:pic>
+        <p:nvPicPr>
+          <p:cNvPr id="5" name="Picture 4">
+            <a:extLst>
+              <a:ext uri="{FF2B5EF4-FFF2-40B4-BE49-F238E27FC236}">
+                <a16:creationId xmlns:a16="http://schemas.microsoft.com/office/drawing/2014/main" id="{730A5ED8-C30C-4DFA-901F-9CC7956B4B70}"/>
+              </a:ext>
+            </a:extLst>
+          </p:cNvPr>
+          <p:cNvPicPr>
+            <a:picLocks noChangeAspect="1"/>
+          </p:cNvPicPr>
+          <p:nvPr/>
+        </p:nvPicPr>
+        <p:blipFill>
+          <a:blip r:embed="rId2"/>
+          <a:stretch>
+            <a:fillRect/>
+          </a:stretch>
+        </p:blipFill>
+        <p:spPr>
+          <a:xfrm>
+            <a:off x="902368" y="804232"/>
+            <a:ext cx="10744095" cy="5600826"/>
+          </a:xfrm>
+          <a:prstGeom prst="rect">
+            <a:avLst/>
+          </a:prstGeom>
+        </p:spPr>
+      </p:pic>
     </p:spTree>
     <p:extLst>
       <p:ext uri="{BB962C8B-B14F-4D97-AF65-F5344CB8AC3E}">
-        <p14:creationId xmlns:p14="http://schemas.microsoft.com/office/powerpoint/2010/main" val="113902029"/>
+        <p14:creationId xmlns:p14="http://schemas.microsoft.com/office/powerpoint/2010/main" val="3771904339"/>
       </p:ext>
     </p:extLst>
   </p:cSld>
@@ -5457,10 +4270,10 @@
       </p:sp>
       <p:pic>
         <p:nvPicPr>
-          <p:cNvPr id="9" name="Picture 8">
+          <p:cNvPr id="5" name="Picture 4">
             <a:extLst>
               <a:ext uri="{FF2B5EF4-FFF2-40B4-BE49-F238E27FC236}">
-                <a16:creationId xmlns:a16="http://schemas.microsoft.com/office/drawing/2014/main" id="{8FF5839C-26EA-45D4-A43D-5FDEE1086692}"/>
+                <a16:creationId xmlns:a16="http://schemas.microsoft.com/office/drawing/2014/main" id="{43626C92-7A10-4A79-BF1E-7254198DA7AC}"/>
               </a:ext>
             </a:extLst>
           </p:cNvPr>
@@ -5469,15 +4282,16 @@
           </p:cNvPicPr>
           <p:nvPr/>
         </p:nvPicPr>
-        <p:blipFill rotWithShape="1">
+        <p:blipFill>
           <a:blip r:embed="rId2"/>
-          <a:srcRect b="11795"/>
-          <a:stretch/>
+          <a:stretch>
+            <a:fillRect/>
+          </a:stretch>
         </p:blipFill>
         <p:spPr>
           <a:xfrm>
-            <a:off x="1797050" y="1331647"/>
-            <a:ext cx="8437333" cy="5030504"/>
+            <a:off x="2052829" y="1333420"/>
+            <a:ext cx="8086341" cy="4914646"/>
           </a:xfrm>
           <a:prstGeom prst="rect">
             <a:avLst/>
@@ -5924,178 +4738,6 @@
           <p:cNvPr id="2" name="Title 1">
             <a:extLst>
               <a:ext uri="{FF2B5EF4-FFF2-40B4-BE49-F238E27FC236}">
-                <a16:creationId xmlns:a16="http://schemas.microsoft.com/office/drawing/2014/main" id="{F957234A-F1A3-453E-8A2C-61F082D663C1}"/>
-              </a:ext>
-            </a:extLst>
-          </p:cNvPr>
-          <p:cNvSpPr>
-            <a:spLocks noGrp="1"/>
-          </p:cNvSpPr>
-          <p:nvPr>
-            <p:ph type="title"/>
-          </p:nvPr>
-        </p:nvSpPr>
-        <p:spPr>
-          <a:xfrm>
-            <a:off x="838200" y="365126"/>
-            <a:ext cx="10515600" cy="1095540"/>
-          </a:xfrm>
-        </p:spPr>
-        <p:txBody>
-          <a:bodyPr/>
-          <a:lstStyle/>
-          <a:p>
-            <a:r>
-              <a:rPr lang="en-US" dirty="0"/>
-              <a:t>Collaboration during Mission Planning (2)</a:t>
-            </a:r>
-          </a:p>
-        </p:txBody>
-      </p:sp>
-      <p:sp>
-        <p:nvSpPr>
-          <p:cNvPr id="4" name="Footer Placeholder 3">
-            <a:extLst>
-              <a:ext uri="{FF2B5EF4-FFF2-40B4-BE49-F238E27FC236}">
-                <a16:creationId xmlns:a16="http://schemas.microsoft.com/office/drawing/2014/main" id="{169FFFA7-9B2C-49FC-AC49-66B5B7B7C039}"/>
-              </a:ext>
-            </a:extLst>
-          </p:cNvPr>
-          <p:cNvSpPr>
-            <a:spLocks noGrp="1"/>
-          </p:cNvSpPr>
-          <p:nvPr>
-            <p:ph type="ftr" sz="quarter" idx="11"/>
-          </p:nvPr>
-        </p:nvSpPr>
-        <p:spPr/>
-        <p:txBody>
-          <a:bodyPr/>
-          <a:lstStyle/>
-          <a:p>
-            <a:r>
-              <a:rPr lang="en-US">
-                <a:latin typeface="Courier New" panose="02070309020205020404" pitchFamily="49" charset="0"/>
-                <a:cs typeface="Courier New" panose="02070309020205020404" pitchFamily="49" charset="0"/>
-              </a:rPr>
-              <a:t>Team EJJ</a:t>
-            </a:r>
-            <a:endParaRPr lang="en-US" dirty="0">
-              <a:latin typeface="Courier New" panose="02070309020205020404" pitchFamily="49" charset="0"/>
-              <a:cs typeface="Courier New" panose="02070309020205020404" pitchFamily="49" charset="0"/>
-            </a:endParaRPr>
-          </a:p>
-        </p:txBody>
-      </p:sp>
-      <p:sp>
-        <p:nvSpPr>
-          <p:cNvPr id="8" name="Content Placeholder 7">
-            <a:extLst>
-              <a:ext uri="{FF2B5EF4-FFF2-40B4-BE49-F238E27FC236}">
-                <a16:creationId xmlns:a16="http://schemas.microsoft.com/office/drawing/2014/main" id="{2E7707F0-D0DA-4C8D-B2BA-9A55BACB9F14}"/>
-              </a:ext>
-            </a:extLst>
-          </p:cNvPr>
-          <p:cNvSpPr>
-            <a:spLocks noGrp="1"/>
-          </p:cNvSpPr>
-          <p:nvPr>
-            <p:ph idx="1"/>
-          </p:nvPr>
-        </p:nvSpPr>
-        <p:spPr>
-          <a:xfrm>
-            <a:off x="836221" y="1395351"/>
-            <a:ext cx="10515600" cy="4781612"/>
-          </a:xfrm>
-        </p:spPr>
-        <p:txBody>
-          <a:bodyPr/>
-          <a:lstStyle/>
-          <a:p>
-            <a:r>
-              <a:rPr lang="en-US" dirty="0"/>
-              <a:t>Mission planners can collaboratively adjust, verify, and plan routes on targets</a:t>
-            </a:r>
-          </a:p>
-          <a:p>
-            <a:r>
-              <a:rPr lang="en-US" dirty="0"/>
-              <a:t>See progress of target planning in real time</a:t>
-            </a:r>
-          </a:p>
-          <a:p>
-            <a:pPr lvl="1"/>
-            <a:r>
-              <a:rPr lang="en-US" dirty="0"/>
-              <a:t>The sortie plan</a:t>
-            </a:r>
-          </a:p>
-          <a:p>
-            <a:pPr lvl="1"/>
-            <a:r>
-              <a:rPr lang="en-US" dirty="0"/>
-              <a:t>The weapon plan</a:t>
-            </a:r>
-          </a:p>
-          <a:p>
-            <a:pPr lvl="1"/>
-            <a:r>
-              <a:rPr lang="en-US" dirty="0"/>
-              <a:t>Any tanker routes</a:t>
-            </a:r>
-          </a:p>
-          <a:p>
-            <a:r>
-              <a:rPr lang="en-US" dirty="0"/>
-              <a:t>Send messages to the ships/</a:t>
-            </a:r>
-            <a:r>
-              <a:rPr lang="en-US" dirty="0" err="1"/>
-              <a:t>helos</a:t>
-            </a:r>
-            <a:r>
-              <a:rPr lang="en-US" dirty="0"/>
-              <a:t>/pilots when the mission plan is ready</a:t>
-            </a:r>
-          </a:p>
-        </p:txBody>
-      </p:sp>
-    </p:spTree>
-    <p:extLst>
-      <p:ext uri="{BB962C8B-B14F-4D97-AF65-F5344CB8AC3E}">
-        <p14:creationId xmlns:p14="http://schemas.microsoft.com/office/powerpoint/2010/main" val="3603947618"/>
-      </p:ext>
-    </p:extLst>
-  </p:cSld>
-  <p:clrMapOvr>
-    <a:masterClrMapping/>
-  </p:clrMapOvr>
-</p:sld>
-</file>
-
-<file path=ppt/slides/slide17.xml><?xml version="1.0" encoding="utf-8"?>
-<p:sld xmlns:a="http://schemas.openxmlformats.org/drawingml/2006/main" xmlns:r="http://schemas.openxmlformats.org/officeDocument/2006/relationships" xmlns:p="http://schemas.openxmlformats.org/presentationml/2006/main">
-  <p:cSld>
-    <p:spTree>
-      <p:nvGrpSpPr>
-        <p:cNvPr id="1" name=""/>
-        <p:cNvGrpSpPr/>
-        <p:nvPr/>
-      </p:nvGrpSpPr>
-      <p:grpSpPr>
-        <a:xfrm>
-          <a:off x="0" y="0"/>
-          <a:ext cx="0" cy="0"/>
-          <a:chOff x="0" y="0"/>
-          <a:chExt cx="0" cy="0"/>
-        </a:xfrm>
-      </p:grpSpPr>
-      <p:sp>
-        <p:nvSpPr>
-          <p:cNvPr id="2" name="Title 1">
-            <a:extLst>
-              <a:ext uri="{FF2B5EF4-FFF2-40B4-BE49-F238E27FC236}">
                 <a16:creationId xmlns:a16="http://schemas.microsoft.com/office/drawing/2014/main" id="{E29B01D6-A7CA-4A3E-9C66-C2AA33322F12}"/>
               </a:ext>
             </a:extLst>
@@ -6261,7 +4903,7 @@
 </p:sld>
 </file>
 
-<file path=ppt/slides/slide18.xml><?xml version="1.0" encoding="utf-8"?>
+<file path=ppt/slides/slide17.xml><?xml version="1.0" encoding="utf-8"?>
 <p:sld xmlns:a="http://schemas.openxmlformats.org/drawingml/2006/main" xmlns:r="http://schemas.openxmlformats.org/officeDocument/2006/relationships" xmlns:p="http://schemas.openxmlformats.org/presentationml/2006/main">
   <p:cSld>
     <p:spTree>
@@ -6369,6 +5011,145 @@
 </p:sld>
 </file>
 
+<file path=ppt/slides/slide18.xml><?xml version="1.0" encoding="utf-8"?>
+<p:sld xmlns:a="http://schemas.openxmlformats.org/drawingml/2006/main" xmlns:r="http://schemas.openxmlformats.org/officeDocument/2006/relationships" xmlns:p="http://schemas.openxmlformats.org/presentationml/2006/main">
+  <p:cSld>
+    <p:spTree>
+      <p:nvGrpSpPr>
+        <p:cNvPr id="1" name=""/>
+        <p:cNvGrpSpPr/>
+        <p:nvPr/>
+      </p:nvGrpSpPr>
+      <p:grpSpPr>
+        <a:xfrm>
+          <a:off x="0" y="0"/>
+          <a:ext cx="0" cy="0"/>
+          <a:chOff x="0" y="0"/>
+          <a:chExt cx="0" cy="0"/>
+        </a:xfrm>
+      </p:grpSpPr>
+      <p:sp>
+        <p:nvSpPr>
+          <p:cNvPr id="2" name="Title 1">
+            <a:extLst>
+              <a:ext uri="{FF2B5EF4-FFF2-40B4-BE49-F238E27FC236}">
+                <a16:creationId xmlns:a16="http://schemas.microsoft.com/office/drawing/2014/main" id="{034B0929-2940-4F4E-80B5-CD5F671448EF}"/>
+              </a:ext>
+            </a:extLst>
+          </p:cNvPr>
+          <p:cNvSpPr>
+            <a:spLocks noGrp="1"/>
+          </p:cNvSpPr>
+          <p:nvPr>
+            <p:ph type="title"/>
+          </p:nvPr>
+        </p:nvSpPr>
+        <p:spPr/>
+        <p:txBody>
+          <a:bodyPr/>
+          <a:lstStyle/>
+          <a:p>
+            <a:r>
+              <a:rPr lang="en-US" dirty="0"/>
+              <a:t>Vision and future updates (The Sequel)</a:t>
+            </a:r>
+          </a:p>
+        </p:txBody>
+      </p:sp>
+      <p:sp>
+        <p:nvSpPr>
+          <p:cNvPr id="3" name="Content Placeholder 2">
+            <a:extLst>
+              <a:ext uri="{FF2B5EF4-FFF2-40B4-BE49-F238E27FC236}">
+                <a16:creationId xmlns:a16="http://schemas.microsoft.com/office/drawing/2014/main" id="{80E85B16-9519-480B-9444-A9B27FC3D9A1}"/>
+              </a:ext>
+            </a:extLst>
+          </p:cNvPr>
+          <p:cNvSpPr>
+            <a:spLocks noGrp="1"/>
+          </p:cNvSpPr>
+          <p:nvPr>
+            <p:ph idx="1"/>
+          </p:nvPr>
+        </p:nvSpPr>
+        <p:spPr/>
+        <p:txBody>
+          <a:bodyPr/>
+          <a:lstStyle/>
+          <a:p>
+            <a:r>
+              <a:rPr lang="en-US" dirty="0"/>
+              <a:t>Integrate algorithm with the web page</a:t>
+            </a:r>
+          </a:p>
+          <a:p>
+            <a:r>
+              <a:rPr lang="en-US" dirty="0"/>
+              <a:t>Integrate a messaging/notification pub sub service to collaborate with other planners</a:t>
+            </a:r>
+          </a:p>
+          <a:p>
+            <a:r>
+              <a:rPr lang="en-US" dirty="0"/>
+              <a:t>Actually parse an ATO</a:t>
+            </a:r>
+          </a:p>
+          <a:p>
+            <a:r>
+              <a:rPr lang="en-US" dirty="0"/>
+              <a:t>Integrate a map to visualize and edit a auto-generated route</a:t>
+            </a:r>
+          </a:p>
+        </p:txBody>
+      </p:sp>
+      <p:sp>
+        <p:nvSpPr>
+          <p:cNvPr id="4" name="Footer Placeholder 3">
+            <a:extLst>
+              <a:ext uri="{FF2B5EF4-FFF2-40B4-BE49-F238E27FC236}">
+                <a16:creationId xmlns:a16="http://schemas.microsoft.com/office/drawing/2014/main" id="{6CF63984-9220-46C8-AC45-7CBD3B725772}"/>
+              </a:ext>
+            </a:extLst>
+          </p:cNvPr>
+          <p:cNvSpPr>
+            <a:spLocks noGrp="1"/>
+          </p:cNvSpPr>
+          <p:nvPr>
+            <p:ph type="ftr" sz="quarter" idx="11"/>
+          </p:nvPr>
+        </p:nvSpPr>
+        <p:spPr/>
+        <p:txBody>
+          <a:bodyPr/>
+          <a:lstStyle/>
+          <a:p>
+            <a:r>
+              <a:rPr lang="en-US">
+                <a:latin typeface="Courier New" panose="02070309020205020404" pitchFamily="49" charset="0"/>
+                <a:cs typeface="Courier New" panose="02070309020205020404" pitchFamily="49" charset="0"/>
+              </a:rPr>
+              <a:t>Team EJJ</a:t>
+            </a:r>
+            <a:endParaRPr lang="en-US" dirty="0">
+              <a:latin typeface="Courier New" panose="02070309020205020404" pitchFamily="49" charset="0"/>
+              <a:cs typeface="Courier New" panose="02070309020205020404" pitchFamily="49" charset="0"/>
+            </a:endParaRPr>
+          </a:p>
+        </p:txBody>
+      </p:sp>
+    </p:spTree>
+    <p:extLst>
+      <p:ext uri="{BB962C8B-B14F-4D97-AF65-F5344CB8AC3E}">
+        <p14:creationId xmlns:p14="http://schemas.microsoft.com/office/powerpoint/2010/main" val="1724479845"/>
+      </p:ext>
+    </p:extLst>
+  </p:cSld>
+  <p:clrMapOvr>
+    <a:masterClrMapping/>
+  </p:clrMapOvr>
+</p:sld>
+</file>
+
 <file path=ppt/slides/slide19.xml><?xml version="1.0" encoding="utf-8"?>
 <p:sld xmlns:a="http://schemas.openxmlformats.org/drawingml/2006/main" xmlns:r="http://schemas.openxmlformats.org/officeDocument/2006/relationships" xmlns:p="http://schemas.openxmlformats.org/presentationml/2006/main">
   <p:cSld>
@@ -6388,10 +5169,10 @@
       </p:grpSpPr>
       <p:sp>
         <p:nvSpPr>
-          <p:cNvPr id="2" name="Title 1">
+          <p:cNvPr id="4" name="Footer Placeholder 3">
             <a:extLst>
               <a:ext uri="{FF2B5EF4-FFF2-40B4-BE49-F238E27FC236}">
-                <a16:creationId xmlns:a16="http://schemas.microsoft.com/office/drawing/2014/main" id="{034B0929-2940-4F4E-80B5-CD5F671448EF}"/>
+                <a16:creationId xmlns:a16="http://schemas.microsoft.com/office/drawing/2014/main" id="{7B57FAC7-9A78-418C-B807-48ECCF0BCB6C}"/>
               </a:ext>
             </a:extLst>
           </p:cNvPr>
@@ -6399,7 +5180,7 @@
             <a:spLocks noGrp="1"/>
           </p:cNvSpPr>
           <p:nvPr>
-            <p:ph type="title"/>
+            <p:ph type="ftr" sz="quarter" idx="11"/>
           </p:nvPr>
         </p:nvSpPr>
         <p:spPr/>
@@ -6408,97 +5189,54 @@
           <a:lstStyle/>
           <a:p>
             <a:r>
-              <a:rPr lang="en-US" dirty="0"/>
-              <a:t>Vision and future updates (The Sequel)</a:t>
-            </a:r>
-          </a:p>
-        </p:txBody>
-      </p:sp>
-      <p:sp>
-        <p:nvSpPr>
-          <p:cNvPr id="3" name="Content Placeholder 2">
+              <a:rPr lang="en-US" dirty="0">
+                <a:latin typeface="Courier New" panose="02070309020205020404" pitchFamily="49" charset="0"/>
+                <a:cs typeface="Courier New" panose="02070309020205020404" pitchFamily="49" charset="0"/>
+              </a:rPr>
+              <a:t>Team EJJ</a:t>
+            </a:r>
+          </a:p>
+        </p:txBody>
+      </p:sp>
+      <p:sp>
+        <p:nvSpPr>
+          <p:cNvPr id="2" name="TextBox 1">
             <a:extLst>
               <a:ext uri="{FF2B5EF4-FFF2-40B4-BE49-F238E27FC236}">
-                <a16:creationId xmlns:a16="http://schemas.microsoft.com/office/drawing/2014/main" id="{80E85B16-9519-480B-9444-A9B27FC3D9A1}"/>
+                <a16:creationId xmlns:a16="http://schemas.microsoft.com/office/drawing/2014/main" id="{ABD7F561-60CD-490C-A66A-7874934A3F0A}"/>
               </a:ext>
             </a:extLst>
           </p:cNvPr>
-          <p:cNvSpPr>
-            <a:spLocks noGrp="1"/>
-          </p:cNvSpPr>
-          <p:nvPr>
-            <p:ph idx="1"/>
-          </p:nvPr>
-        </p:nvSpPr>
-        <p:spPr/>
-        <p:txBody>
-          <a:bodyPr/>
-          <a:lstStyle/>
-          <a:p>
-            <a:r>
-              <a:rPr lang="en-US" dirty="0"/>
-              <a:t>Integrate algorithm with the web page</a:t>
-            </a:r>
-          </a:p>
-          <a:p>
-            <a:r>
-              <a:rPr lang="en-US" dirty="0"/>
-              <a:t>Integrate a messaging/notification pub sub service to collaborate with other planners</a:t>
-            </a:r>
-          </a:p>
-          <a:p>
-            <a:r>
-              <a:rPr lang="en-US" dirty="0"/>
-              <a:t>Actually parse an ATO</a:t>
-            </a:r>
-          </a:p>
-          <a:p>
-            <a:r>
-              <a:rPr lang="en-US" dirty="0"/>
-              <a:t>Integrate a map to visualize and edit a auto-generated route</a:t>
-            </a:r>
-          </a:p>
-        </p:txBody>
-      </p:sp>
-      <p:sp>
-        <p:nvSpPr>
-          <p:cNvPr id="4" name="Footer Placeholder 3">
-            <a:extLst>
-              <a:ext uri="{FF2B5EF4-FFF2-40B4-BE49-F238E27FC236}">
-                <a16:creationId xmlns:a16="http://schemas.microsoft.com/office/drawing/2014/main" id="{6CF63984-9220-46C8-AC45-7CBD3B725772}"/>
-              </a:ext>
-            </a:extLst>
-          </p:cNvPr>
-          <p:cNvSpPr>
-            <a:spLocks noGrp="1"/>
-          </p:cNvSpPr>
-          <p:nvPr>
-            <p:ph type="ftr" sz="quarter" idx="11"/>
-          </p:nvPr>
-        </p:nvSpPr>
-        <p:spPr/>
-        <p:txBody>
-          <a:bodyPr/>
-          <a:lstStyle/>
-          <a:p>
-            <a:r>
-              <a:rPr lang="en-US">
-                <a:latin typeface="Courier New" panose="02070309020205020404" pitchFamily="49" charset="0"/>
-                <a:cs typeface="Courier New" panose="02070309020205020404" pitchFamily="49" charset="0"/>
-              </a:rPr>
-              <a:t>Team EJJ</a:t>
-            </a:r>
-            <a:endParaRPr lang="en-US" dirty="0">
-              <a:latin typeface="Courier New" panose="02070309020205020404" pitchFamily="49" charset="0"/>
-              <a:cs typeface="Courier New" panose="02070309020205020404" pitchFamily="49" charset="0"/>
-            </a:endParaRPr>
+          <p:cNvSpPr txBox="1"/>
+          <p:nvPr/>
+        </p:nvSpPr>
+        <p:spPr>
+          <a:xfrm>
+            <a:off x="4478951" y="2641634"/>
+            <a:ext cx="7858496" cy="1107996"/>
+          </a:xfrm>
+          <a:prstGeom prst="rect">
+            <a:avLst/>
+          </a:prstGeom>
+          <a:noFill/>
+        </p:spPr>
+        <p:txBody>
+          <a:bodyPr wrap="square" rtlCol="0">
+            <a:spAutoFit/>
+          </a:bodyPr>
+          <a:lstStyle/>
+          <a:p>
+            <a:r>
+              <a:rPr lang="en-US" sz="6600" dirty="0"/>
+              <a:t>The end</a:t>
+            </a:r>
           </a:p>
         </p:txBody>
       </p:sp>
     </p:spTree>
     <p:extLst>
       <p:ext uri="{BB962C8B-B14F-4D97-AF65-F5344CB8AC3E}">
-        <p14:creationId xmlns:p14="http://schemas.microsoft.com/office/powerpoint/2010/main" val="1724479845"/>
+        <p14:creationId xmlns:p14="http://schemas.microsoft.com/office/powerpoint/2010/main" val="4080512463"/>
       </p:ext>
     </p:extLst>
   </p:cSld>
@@ -7811,19 +6549,8 @@
             <a:pPr lvl="1"/>
             <a:r>
               <a:rPr lang="en-US" dirty="0"/>
-              <a:t>Web application </a:t>
-            </a:r>
-          </a:p>
-          <a:p>
-            <a:pPr lvl="2"/>
-            <a:r>
-              <a:rPr lang="en-US" sz="2400" dirty="0"/>
-              <a:t>a “fresh” look of mission planning</a:t>
-            </a:r>
-          </a:p>
-          <a:p>
-            <a:pPr lvl="1"/>
-            <a:endParaRPr lang="en-US" dirty="0"/>
+              <a:t>Web application</a:t>
+            </a:r>
           </a:p>
         </p:txBody>
       </p:sp>
@@ -10311,10 +9038,62 @@
       </p:grpSpPr>
       <p:sp>
         <p:nvSpPr>
+          <p:cNvPr id="21" name="Rectangle 20">
+            <a:extLst>
+              <a:ext uri="{FF2B5EF4-FFF2-40B4-BE49-F238E27FC236}">
+                <a16:creationId xmlns:a16="http://schemas.microsoft.com/office/drawing/2014/main" id="{1BBC93F8-9A88-7D43-809A-08817DFA32CD}"/>
+              </a:ext>
+            </a:extLst>
+          </p:cNvPr>
+          <p:cNvSpPr/>
+          <p:nvPr/>
+        </p:nvSpPr>
+        <p:spPr>
+          <a:xfrm>
+            <a:off x="317902" y="1084027"/>
+            <a:ext cx="5760721" cy="892602"/>
+          </a:xfrm>
+          <a:prstGeom prst="rect">
+            <a:avLst/>
+          </a:prstGeom>
+          <a:noFill/>
+          <a:ln>
+            <a:solidFill>
+              <a:schemeClr val="tx1"/>
+            </a:solidFill>
+          </a:ln>
+        </p:spPr>
+        <p:style>
+          <a:lnRef idx="2">
+            <a:schemeClr val="accent1">
+              <a:shade val="50000"/>
+            </a:schemeClr>
+          </a:lnRef>
+          <a:fillRef idx="1">
+            <a:schemeClr val="accent1"/>
+          </a:fillRef>
+          <a:effectRef idx="0">
+            <a:schemeClr val="accent1"/>
+          </a:effectRef>
+          <a:fontRef idx="minor">
+            <a:schemeClr val="lt1"/>
+          </a:fontRef>
+        </p:style>
+        <p:txBody>
+          <a:bodyPr rtlCol="0" anchor="ctr"/>
+          <a:lstStyle/>
+          <a:p>
+            <a:pPr algn="ctr"/>
+            <a:endParaRPr lang="en-US"/>
+          </a:p>
+        </p:txBody>
+      </p:sp>
+      <p:sp>
+        <p:nvSpPr>
           <p:cNvPr id="2" name="Title 1">
             <a:extLst>
               <a:ext uri="{FF2B5EF4-FFF2-40B4-BE49-F238E27FC236}">
-                <a16:creationId xmlns:a16="http://schemas.microsoft.com/office/drawing/2014/main" id="{E29B01D6-A7CA-4A3E-9C66-C2AA33322F12}"/>
+                <a16:creationId xmlns:a16="http://schemas.microsoft.com/office/drawing/2014/main" id="{C10B98E8-DF30-424F-9AA4-2CF603E51BE2}"/>
               </a:ext>
             </a:extLst>
           </p:cNvPr>
@@ -10325,115 +9104,21 @@
             <p:ph type="title"/>
           </p:nvPr>
         </p:nvSpPr>
-        <p:spPr/>
-        <p:txBody>
-          <a:bodyPr/>
-          <a:lstStyle/>
-          <a:p>
-            <a:r>
-              <a:rPr lang="en-US" dirty="0"/>
-              <a:t>EJJ Mission Planning Flow (1)	</a:t>
-            </a:r>
-          </a:p>
-        </p:txBody>
-      </p:sp>
-      <p:sp>
-        <p:nvSpPr>
-          <p:cNvPr id="3" name="Content Placeholder 2">
-            <a:extLst>
-              <a:ext uri="{FF2B5EF4-FFF2-40B4-BE49-F238E27FC236}">
-                <a16:creationId xmlns:a16="http://schemas.microsoft.com/office/drawing/2014/main" id="{F1842140-4ACB-41A9-BC7F-30570259E5D8}"/>
-              </a:ext>
-            </a:extLst>
-          </p:cNvPr>
-          <p:cNvSpPr>
-            <a:spLocks noGrp="1"/>
-          </p:cNvSpPr>
-          <p:nvPr>
-            <p:ph idx="1"/>
-          </p:nvPr>
-        </p:nvSpPr>
         <p:spPr>
           <a:xfrm>
-            <a:off x="838200" y="1807812"/>
-            <a:ext cx="10515600" cy="4351338"/>
+            <a:off x="2516043" y="17396"/>
+            <a:ext cx="5995464" cy="950565"/>
           </a:xfrm>
         </p:spPr>
         <p:txBody>
           <a:bodyPr>
-            <a:normAutofit fontScale="85000" lnSpcReduction="20000"/>
+            <a:normAutofit/>
           </a:bodyPr>
           <a:lstStyle/>
           <a:p>
             <a:r>
               <a:rPr lang="en-US" dirty="0"/>
-              <a:t>Open up the EJJ web page</a:t>
-            </a:r>
-          </a:p>
-          <a:p>
-            <a:r>
-              <a:rPr lang="en-US" dirty="0"/>
-              <a:t>Drag in the target information (ATO) and view target tasking details and target imagery immediately</a:t>
-            </a:r>
-          </a:p>
-          <a:p>
-            <a:pPr lvl="1"/>
-            <a:r>
-              <a:rPr lang="en-US" dirty="0"/>
-              <a:t>Contains the probabilities of casualties while striking certain targets</a:t>
-            </a:r>
-          </a:p>
-          <a:p>
-            <a:pPr lvl="1"/>
-            <a:r>
-              <a:rPr lang="en-US" dirty="0"/>
-              <a:t>Contains minimum/maximum sortie times against each target tasking</a:t>
-            </a:r>
-          </a:p>
-          <a:p>
-            <a:r>
-              <a:rPr lang="en-US" dirty="0"/>
-              <a:t>An algorithm runs to determines the target striking order and displays it to the user</a:t>
-            </a:r>
-          </a:p>
-          <a:p>
-            <a:pPr lvl="1"/>
-            <a:r>
-              <a:rPr lang="en-US" dirty="0"/>
-              <a:t>Minimizes the chance of casualties when striking all the targets in the tasking details</a:t>
-            </a:r>
-          </a:p>
-          <a:p>
-            <a:r>
-              <a:rPr lang="en-US" dirty="0"/>
-              <a:t>The available aircraft are displayed in the Inventory</a:t>
-            </a:r>
-          </a:p>
-          <a:p>
-            <a:r>
-              <a:rPr lang="en-US" dirty="0"/>
-              <a:t>Determine the number of each aircraft needed for the friendly force laydown and drag the aircraft to carriers in the Mission</a:t>
-            </a:r>
-          </a:p>
-          <a:p>
-            <a:r>
-              <a:rPr lang="en-US" dirty="0"/>
-              <a:t>Do the same for pilots, </a:t>
-            </a:r>
-            <a:r>
-              <a:rPr lang="en-US" dirty="0" err="1"/>
-              <a:t>helos</a:t>
-            </a:r>
-            <a:r>
-              <a:rPr lang="en-US" dirty="0"/>
-              <a:t>, and missiles</a:t>
-            </a:r>
-          </a:p>
-          <a:p>
-            <a:pPr lvl="1"/>
-            <a:r>
-              <a:rPr lang="en-US" dirty="0"/>
-              <a:t>The laydown can be saved and reloaded</a:t>
+              <a:t>Frontend/Backend Design</a:t>
             </a:r>
           </a:p>
         </p:txBody>
@@ -10443,7 +9128,7 @@
           <p:cNvPr id="4" name="Footer Placeholder 3">
             <a:extLst>
               <a:ext uri="{FF2B5EF4-FFF2-40B4-BE49-F238E27FC236}">
-                <a16:creationId xmlns:a16="http://schemas.microsoft.com/office/drawing/2014/main" id="{C401FFE3-F414-4CF5-AD6A-9C2DE5116ED4}"/>
+                <a16:creationId xmlns:a16="http://schemas.microsoft.com/office/drawing/2014/main" id="{93AC8D42-FC61-0C4D-AC08-ACE91912D646}"/>
               </a:ext>
             </a:extLst>
           </p:cNvPr>
@@ -10473,10 +9158,1271 @@
           </a:p>
         </p:txBody>
       </p:sp>
+      <p:sp>
+        <p:nvSpPr>
+          <p:cNvPr id="5" name="Rectangle 4">
+            <a:extLst>
+              <a:ext uri="{FF2B5EF4-FFF2-40B4-BE49-F238E27FC236}">
+                <a16:creationId xmlns:a16="http://schemas.microsoft.com/office/drawing/2014/main" id="{B88EF572-7D1A-F140-B419-449B31211CC7}"/>
+              </a:ext>
+            </a:extLst>
+          </p:cNvPr>
+          <p:cNvSpPr/>
+          <p:nvPr/>
+        </p:nvSpPr>
+        <p:spPr>
+          <a:xfrm>
+            <a:off x="2446480" y="2900939"/>
+            <a:ext cx="1509925" cy="579529"/>
+          </a:xfrm>
+          <a:prstGeom prst="rect">
+            <a:avLst/>
+          </a:prstGeom>
+        </p:spPr>
+        <p:style>
+          <a:lnRef idx="2">
+            <a:schemeClr val="accent1">
+              <a:shade val="50000"/>
+            </a:schemeClr>
+          </a:lnRef>
+          <a:fillRef idx="1">
+            <a:schemeClr val="accent1"/>
+          </a:fillRef>
+          <a:effectRef idx="0">
+            <a:schemeClr val="accent1"/>
+          </a:effectRef>
+          <a:fontRef idx="minor">
+            <a:schemeClr val="lt1"/>
+          </a:fontRef>
+        </p:style>
+        <p:txBody>
+          <a:bodyPr rtlCol="0" anchor="ctr"/>
+          <a:lstStyle/>
+          <a:p>
+            <a:pPr algn="ctr"/>
+            <a:r>
+              <a:rPr lang="en-US" dirty="0"/>
+              <a:t>Mission</a:t>
+            </a:r>
+          </a:p>
+        </p:txBody>
+      </p:sp>
+      <p:sp>
+        <p:nvSpPr>
+          <p:cNvPr id="6" name="Rectangle 5">
+            <a:extLst>
+              <a:ext uri="{FF2B5EF4-FFF2-40B4-BE49-F238E27FC236}">
+                <a16:creationId xmlns:a16="http://schemas.microsoft.com/office/drawing/2014/main" id="{93D4011A-CB18-EE46-A3D4-0C33E088F611}"/>
+              </a:ext>
+            </a:extLst>
+          </p:cNvPr>
+          <p:cNvSpPr/>
+          <p:nvPr/>
+        </p:nvSpPr>
+        <p:spPr>
+          <a:xfrm>
+            <a:off x="489142" y="1268035"/>
+            <a:ext cx="1391478" cy="476042"/>
+          </a:xfrm>
+          <a:prstGeom prst="rect">
+            <a:avLst/>
+          </a:prstGeom>
+        </p:spPr>
+        <p:style>
+          <a:lnRef idx="2">
+            <a:schemeClr val="accent1">
+              <a:shade val="50000"/>
+            </a:schemeClr>
+          </a:lnRef>
+          <a:fillRef idx="1">
+            <a:schemeClr val="accent1"/>
+          </a:fillRef>
+          <a:effectRef idx="0">
+            <a:schemeClr val="accent1"/>
+          </a:effectRef>
+          <a:fontRef idx="minor">
+            <a:schemeClr val="lt1"/>
+          </a:fontRef>
+        </p:style>
+        <p:txBody>
+          <a:bodyPr rtlCol="0" anchor="ctr"/>
+          <a:lstStyle/>
+          <a:p>
+            <a:pPr algn="ctr"/>
+            <a:r>
+              <a:rPr lang="en-US" dirty="0"/>
+              <a:t>Target 1</a:t>
+            </a:r>
+          </a:p>
+        </p:txBody>
+      </p:sp>
+      <p:sp>
+        <p:nvSpPr>
+          <p:cNvPr id="9" name="Rectangle 8">
+            <a:extLst>
+              <a:ext uri="{FF2B5EF4-FFF2-40B4-BE49-F238E27FC236}">
+                <a16:creationId xmlns:a16="http://schemas.microsoft.com/office/drawing/2014/main" id="{5CE55A7B-07C8-9244-8402-30F8109A0DD2}"/>
+              </a:ext>
+            </a:extLst>
+          </p:cNvPr>
+          <p:cNvSpPr/>
+          <p:nvPr/>
+        </p:nvSpPr>
+        <p:spPr>
+          <a:xfrm>
+            <a:off x="2051860" y="1262566"/>
+            <a:ext cx="1391478" cy="476042"/>
+          </a:xfrm>
+          <a:prstGeom prst="rect">
+            <a:avLst/>
+          </a:prstGeom>
+        </p:spPr>
+        <p:style>
+          <a:lnRef idx="2">
+            <a:schemeClr val="accent1">
+              <a:shade val="50000"/>
+            </a:schemeClr>
+          </a:lnRef>
+          <a:fillRef idx="1">
+            <a:schemeClr val="accent1"/>
+          </a:fillRef>
+          <a:effectRef idx="0">
+            <a:schemeClr val="accent1"/>
+          </a:effectRef>
+          <a:fontRef idx="minor">
+            <a:schemeClr val="lt1"/>
+          </a:fontRef>
+        </p:style>
+        <p:txBody>
+          <a:bodyPr rtlCol="0" anchor="ctr"/>
+          <a:lstStyle/>
+          <a:p>
+            <a:pPr algn="ctr"/>
+            <a:r>
+              <a:rPr lang="en-US" dirty="0"/>
+              <a:t>Target 2</a:t>
+            </a:r>
+          </a:p>
+        </p:txBody>
+      </p:sp>
+      <p:sp>
+        <p:nvSpPr>
+          <p:cNvPr id="10" name="Rectangle 9">
+            <a:extLst>
+              <a:ext uri="{FF2B5EF4-FFF2-40B4-BE49-F238E27FC236}">
+                <a16:creationId xmlns:a16="http://schemas.microsoft.com/office/drawing/2014/main" id="{9BD5EF10-EE9A-824B-A36B-92B57FA62FBA}"/>
+              </a:ext>
+            </a:extLst>
+          </p:cNvPr>
+          <p:cNvSpPr/>
+          <p:nvPr/>
+        </p:nvSpPr>
+        <p:spPr>
+          <a:xfrm>
+            <a:off x="4037191" y="1268035"/>
+            <a:ext cx="1391478" cy="476042"/>
+          </a:xfrm>
+          <a:prstGeom prst="rect">
+            <a:avLst/>
+          </a:prstGeom>
+        </p:spPr>
+        <p:style>
+          <a:lnRef idx="2">
+            <a:schemeClr val="accent1">
+              <a:shade val="50000"/>
+            </a:schemeClr>
+          </a:lnRef>
+          <a:fillRef idx="1">
+            <a:schemeClr val="accent1"/>
+          </a:fillRef>
+          <a:effectRef idx="0">
+            <a:schemeClr val="accent1"/>
+          </a:effectRef>
+          <a:fontRef idx="minor">
+            <a:schemeClr val="lt1"/>
+          </a:fontRef>
+        </p:style>
+        <p:txBody>
+          <a:bodyPr rtlCol="0" anchor="ctr"/>
+          <a:lstStyle/>
+          <a:p>
+            <a:pPr algn="ctr"/>
+            <a:r>
+              <a:rPr lang="en-US" dirty="0"/>
+              <a:t>Target n</a:t>
+            </a:r>
+          </a:p>
+        </p:txBody>
+      </p:sp>
+      <p:sp>
+        <p:nvSpPr>
+          <p:cNvPr id="16" name="TextBox 15">
+            <a:extLst>
+              <a:ext uri="{FF2B5EF4-FFF2-40B4-BE49-F238E27FC236}">
+                <a16:creationId xmlns:a16="http://schemas.microsoft.com/office/drawing/2014/main" id="{29764E28-5AC0-E348-8375-24DCFD11AB51}"/>
+              </a:ext>
+            </a:extLst>
+          </p:cNvPr>
+          <p:cNvSpPr txBox="1"/>
+          <p:nvPr/>
+        </p:nvSpPr>
+        <p:spPr>
+          <a:xfrm>
+            <a:off x="3534908" y="1260717"/>
+            <a:ext cx="1210755" cy="369332"/>
+          </a:xfrm>
+          <a:prstGeom prst="rect">
+            <a:avLst/>
+          </a:prstGeom>
+          <a:noFill/>
+        </p:spPr>
+        <p:txBody>
+          <a:bodyPr wrap="square" rtlCol="0">
+            <a:spAutoFit/>
+          </a:bodyPr>
+          <a:lstStyle/>
+          <a:p>
+            <a:r>
+              <a:rPr lang="en-US" dirty="0"/>
+              <a:t>…</a:t>
+            </a:r>
+          </a:p>
+        </p:txBody>
+      </p:sp>
+      <p:sp>
+        <p:nvSpPr>
+          <p:cNvPr id="17" name="Rectangle 16">
+            <a:extLst>
+              <a:ext uri="{FF2B5EF4-FFF2-40B4-BE49-F238E27FC236}">
+                <a16:creationId xmlns:a16="http://schemas.microsoft.com/office/drawing/2014/main" id="{145F70D7-0AC1-AF46-83A4-B57B7DD63472}"/>
+              </a:ext>
+            </a:extLst>
+          </p:cNvPr>
+          <p:cNvSpPr/>
+          <p:nvPr/>
+        </p:nvSpPr>
+        <p:spPr>
+          <a:xfrm>
+            <a:off x="6955349" y="1282465"/>
+            <a:ext cx="5046150" cy="3804446"/>
+          </a:xfrm>
+          <a:prstGeom prst="rect">
+            <a:avLst/>
+          </a:prstGeom>
+        </p:spPr>
+        <p:style>
+          <a:lnRef idx="2">
+            <a:schemeClr val="accent1">
+              <a:shade val="50000"/>
+            </a:schemeClr>
+          </a:lnRef>
+          <a:fillRef idx="1">
+            <a:schemeClr val="accent1"/>
+          </a:fillRef>
+          <a:effectRef idx="0">
+            <a:schemeClr val="accent1"/>
+          </a:effectRef>
+          <a:fontRef idx="minor">
+            <a:schemeClr val="lt1"/>
+          </a:fontRef>
+        </p:style>
+        <p:txBody>
+          <a:bodyPr rtlCol="0" anchor="t"/>
+          <a:lstStyle/>
+          <a:p>
+            <a:pPr algn="ctr"/>
+            <a:r>
+              <a:rPr lang="en-US" dirty="0"/>
+              <a:t>REACT Frontend</a:t>
+            </a:r>
+          </a:p>
+        </p:txBody>
+      </p:sp>
+      <p:sp>
+        <p:nvSpPr>
+          <p:cNvPr id="18" name="Rectangle 17">
+            <a:extLst>
+              <a:ext uri="{FF2B5EF4-FFF2-40B4-BE49-F238E27FC236}">
+                <a16:creationId xmlns:a16="http://schemas.microsoft.com/office/drawing/2014/main" id="{6C107317-AE96-3E4B-9943-BA76EB4F5366}"/>
+              </a:ext>
+            </a:extLst>
+          </p:cNvPr>
+          <p:cNvSpPr/>
+          <p:nvPr/>
+        </p:nvSpPr>
+        <p:spPr>
+          <a:xfrm>
+            <a:off x="7163048" y="1836132"/>
+            <a:ext cx="1451967" cy="646977"/>
+          </a:xfrm>
+          <a:prstGeom prst="rect">
+            <a:avLst/>
+          </a:prstGeom>
+          <a:solidFill>
+            <a:schemeClr val="tx1"/>
+          </a:solidFill>
+        </p:spPr>
+        <p:style>
+          <a:lnRef idx="2">
+            <a:schemeClr val="accent1">
+              <a:shade val="50000"/>
+            </a:schemeClr>
+          </a:lnRef>
+          <a:fillRef idx="1">
+            <a:schemeClr val="accent1"/>
+          </a:fillRef>
+          <a:effectRef idx="0">
+            <a:schemeClr val="accent1"/>
+          </a:effectRef>
+          <a:fontRef idx="minor">
+            <a:schemeClr val="lt1"/>
+          </a:fontRef>
+        </p:style>
+        <p:txBody>
+          <a:bodyPr rtlCol="0" anchor="ctr"/>
+          <a:lstStyle/>
+          <a:p>
+            <a:pPr algn="ctr"/>
+            <a:r>
+              <a:rPr lang="en-US" dirty="0">
+                <a:solidFill>
+                  <a:srgbClr val="00B050"/>
+                </a:solidFill>
+              </a:rPr>
+              <a:t>Aircraft Constraints</a:t>
+            </a:r>
+          </a:p>
+        </p:txBody>
+      </p:sp>
+      <p:sp>
+        <p:nvSpPr>
+          <p:cNvPr id="19" name="Rectangle 18">
+            <a:extLst>
+              <a:ext uri="{FF2B5EF4-FFF2-40B4-BE49-F238E27FC236}">
+                <a16:creationId xmlns:a16="http://schemas.microsoft.com/office/drawing/2014/main" id="{BF7845A2-8B7D-5543-97A8-535B0123AA1E}"/>
+              </a:ext>
+            </a:extLst>
+          </p:cNvPr>
+          <p:cNvSpPr/>
+          <p:nvPr/>
+        </p:nvSpPr>
+        <p:spPr>
+          <a:xfrm>
+            <a:off x="8822714" y="1836132"/>
+            <a:ext cx="1451967" cy="646977"/>
+          </a:xfrm>
+          <a:prstGeom prst="rect">
+            <a:avLst/>
+          </a:prstGeom>
+          <a:solidFill>
+            <a:schemeClr val="tx1"/>
+          </a:solidFill>
+        </p:spPr>
+        <p:style>
+          <a:lnRef idx="2">
+            <a:schemeClr val="accent1">
+              <a:shade val="50000"/>
+            </a:schemeClr>
+          </a:lnRef>
+          <a:fillRef idx="1">
+            <a:schemeClr val="accent1"/>
+          </a:fillRef>
+          <a:effectRef idx="0">
+            <a:schemeClr val="accent1"/>
+          </a:effectRef>
+          <a:fontRef idx="minor">
+            <a:schemeClr val="lt1"/>
+          </a:fontRef>
+        </p:style>
+        <p:txBody>
+          <a:bodyPr rtlCol="0" anchor="ctr"/>
+          <a:lstStyle/>
+          <a:p>
+            <a:pPr algn="ctr"/>
+            <a:r>
+              <a:rPr lang="en-US" dirty="0">
+                <a:solidFill>
+                  <a:srgbClr val="00B050"/>
+                </a:solidFill>
+              </a:rPr>
+              <a:t>Target Constraints</a:t>
+            </a:r>
+          </a:p>
+        </p:txBody>
+      </p:sp>
+      <p:sp>
+        <p:nvSpPr>
+          <p:cNvPr id="20" name="Rectangle 19">
+            <a:extLst>
+              <a:ext uri="{FF2B5EF4-FFF2-40B4-BE49-F238E27FC236}">
+                <a16:creationId xmlns:a16="http://schemas.microsoft.com/office/drawing/2014/main" id="{06021E6A-9A2D-234E-B4A9-F807793173EB}"/>
+              </a:ext>
+            </a:extLst>
+          </p:cNvPr>
+          <p:cNvSpPr/>
+          <p:nvPr/>
+        </p:nvSpPr>
+        <p:spPr>
+          <a:xfrm>
+            <a:off x="654366" y="4668226"/>
+            <a:ext cx="1391478" cy="476042"/>
+          </a:xfrm>
+          <a:prstGeom prst="rect">
+            <a:avLst/>
+          </a:prstGeom>
+        </p:spPr>
+        <p:style>
+          <a:lnRef idx="2">
+            <a:schemeClr val="accent1">
+              <a:shade val="50000"/>
+            </a:schemeClr>
+          </a:lnRef>
+          <a:fillRef idx="1">
+            <a:schemeClr val="accent1"/>
+          </a:fillRef>
+          <a:effectRef idx="0">
+            <a:schemeClr val="accent1"/>
+          </a:effectRef>
+          <a:fontRef idx="minor">
+            <a:schemeClr val="lt1"/>
+          </a:fontRef>
+        </p:style>
+        <p:txBody>
+          <a:bodyPr rtlCol="0" anchor="ctr"/>
+          <a:lstStyle/>
+          <a:p>
+            <a:pPr algn="ctr"/>
+            <a:r>
+              <a:rPr lang="en-US" dirty="0"/>
+              <a:t>Air Vehicle 1</a:t>
+            </a:r>
+          </a:p>
+        </p:txBody>
+      </p:sp>
+      <p:sp>
+        <p:nvSpPr>
+          <p:cNvPr id="22" name="Rectangle 21">
+            <a:extLst>
+              <a:ext uri="{FF2B5EF4-FFF2-40B4-BE49-F238E27FC236}">
+                <a16:creationId xmlns:a16="http://schemas.microsoft.com/office/drawing/2014/main" id="{4195740A-F87C-8747-ADF5-7079F2FEC3CC}"/>
+              </a:ext>
+            </a:extLst>
+          </p:cNvPr>
+          <p:cNvSpPr/>
+          <p:nvPr/>
+        </p:nvSpPr>
+        <p:spPr>
+          <a:xfrm>
+            <a:off x="2268082" y="4674741"/>
+            <a:ext cx="1391478" cy="476042"/>
+          </a:xfrm>
+          <a:prstGeom prst="rect">
+            <a:avLst/>
+          </a:prstGeom>
+        </p:spPr>
+        <p:style>
+          <a:lnRef idx="2">
+            <a:schemeClr val="accent1">
+              <a:shade val="50000"/>
+            </a:schemeClr>
+          </a:lnRef>
+          <a:fillRef idx="1">
+            <a:schemeClr val="accent1"/>
+          </a:fillRef>
+          <a:effectRef idx="0">
+            <a:schemeClr val="accent1"/>
+          </a:effectRef>
+          <a:fontRef idx="minor">
+            <a:schemeClr val="lt1"/>
+          </a:fontRef>
+        </p:style>
+        <p:txBody>
+          <a:bodyPr rtlCol="0" anchor="ctr"/>
+          <a:lstStyle/>
+          <a:p>
+            <a:pPr algn="ctr"/>
+            <a:r>
+              <a:rPr lang="en-US" dirty="0"/>
+              <a:t>Air Vehicle 2</a:t>
+            </a:r>
+          </a:p>
+        </p:txBody>
+      </p:sp>
+      <p:sp>
+        <p:nvSpPr>
+          <p:cNvPr id="29" name="Rectangle 28">
+            <a:extLst>
+              <a:ext uri="{FF2B5EF4-FFF2-40B4-BE49-F238E27FC236}">
+                <a16:creationId xmlns:a16="http://schemas.microsoft.com/office/drawing/2014/main" id="{0127AA96-766F-394B-8FF4-48557EF98795}"/>
+              </a:ext>
+            </a:extLst>
+          </p:cNvPr>
+          <p:cNvSpPr/>
+          <p:nvPr/>
+        </p:nvSpPr>
+        <p:spPr>
+          <a:xfrm>
+            <a:off x="4275453" y="4674741"/>
+            <a:ext cx="1391478" cy="476042"/>
+          </a:xfrm>
+          <a:prstGeom prst="rect">
+            <a:avLst/>
+          </a:prstGeom>
+        </p:spPr>
+        <p:style>
+          <a:lnRef idx="2">
+            <a:schemeClr val="accent1">
+              <a:shade val="50000"/>
+            </a:schemeClr>
+          </a:lnRef>
+          <a:fillRef idx="1">
+            <a:schemeClr val="accent1"/>
+          </a:fillRef>
+          <a:effectRef idx="0">
+            <a:schemeClr val="accent1"/>
+          </a:effectRef>
+          <a:fontRef idx="minor">
+            <a:schemeClr val="lt1"/>
+          </a:fontRef>
+        </p:style>
+        <p:txBody>
+          <a:bodyPr rtlCol="0" anchor="ctr"/>
+          <a:lstStyle/>
+          <a:p>
+            <a:pPr algn="ctr"/>
+            <a:r>
+              <a:rPr lang="en-US" dirty="0"/>
+              <a:t>Air Vehicle 3</a:t>
+            </a:r>
+          </a:p>
+        </p:txBody>
+      </p:sp>
+      <p:sp>
+        <p:nvSpPr>
+          <p:cNvPr id="60" name="TextBox 59">
+            <a:extLst>
+              <a:ext uri="{FF2B5EF4-FFF2-40B4-BE49-F238E27FC236}">
+                <a16:creationId xmlns:a16="http://schemas.microsoft.com/office/drawing/2014/main" id="{7802B729-F4A0-2C48-B00C-80BD37B6349E}"/>
+              </a:ext>
+            </a:extLst>
+          </p:cNvPr>
+          <p:cNvSpPr txBox="1"/>
+          <p:nvPr/>
+        </p:nvSpPr>
+        <p:spPr>
+          <a:xfrm>
+            <a:off x="3781355" y="4686164"/>
+            <a:ext cx="1210755" cy="369332"/>
+          </a:xfrm>
+          <a:prstGeom prst="rect">
+            <a:avLst/>
+          </a:prstGeom>
+          <a:noFill/>
+        </p:spPr>
+        <p:txBody>
+          <a:bodyPr wrap="square" rtlCol="0">
+            <a:spAutoFit/>
+          </a:bodyPr>
+          <a:lstStyle/>
+          <a:p>
+            <a:r>
+              <a:rPr lang="en-US" dirty="0"/>
+              <a:t>…</a:t>
+            </a:r>
+          </a:p>
+        </p:txBody>
+      </p:sp>
+      <p:sp>
+        <p:nvSpPr>
+          <p:cNvPr id="61" name="Rectangle 60">
+            <a:extLst>
+              <a:ext uri="{FF2B5EF4-FFF2-40B4-BE49-F238E27FC236}">
+                <a16:creationId xmlns:a16="http://schemas.microsoft.com/office/drawing/2014/main" id="{48D60052-708E-C34F-84A7-1A882A25505C}"/>
+              </a:ext>
+            </a:extLst>
+          </p:cNvPr>
+          <p:cNvSpPr/>
+          <p:nvPr/>
+        </p:nvSpPr>
+        <p:spPr>
+          <a:xfrm>
+            <a:off x="321173" y="4455080"/>
+            <a:ext cx="5760721" cy="892602"/>
+          </a:xfrm>
+          <a:prstGeom prst="rect">
+            <a:avLst/>
+          </a:prstGeom>
+          <a:noFill/>
+          <a:ln>
+            <a:solidFill>
+              <a:schemeClr val="tx1"/>
+            </a:solidFill>
+          </a:ln>
+        </p:spPr>
+        <p:style>
+          <a:lnRef idx="2">
+            <a:schemeClr val="accent1">
+              <a:shade val="50000"/>
+            </a:schemeClr>
+          </a:lnRef>
+          <a:fillRef idx="1">
+            <a:schemeClr val="accent1"/>
+          </a:fillRef>
+          <a:effectRef idx="0">
+            <a:schemeClr val="accent1"/>
+          </a:effectRef>
+          <a:fontRef idx="minor">
+            <a:schemeClr val="lt1"/>
+          </a:fontRef>
+        </p:style>
+        <p:txBody>
+          <a:bodyPr rtlCol="0" anchor="ctr"/>
+          <a:lstStyle/>
+          <a:p>
+            <a:pPr algn="ctr"/>
+            <a:endParaRPr lang="en-US"/>
+          </a:p>
+        </p:txBody>
+      </p:sp>
+      <p:cxnSp>
+        <p:nvCxnSpPr>
+          <p:cNvPr id="66" name="Elbow Connector 65">
+            <a:extLst>
+              <a:ext uri="{FF2B5EF4-FFF2-40B4-BE49-F238E27FC236}">
+                <a16:creationId xmlns:a16="http://schemas.microsoft.com/office/drawing/2014/main" id="{E23DE534-EFF6-9F45-A704-A98E06E6EA85}"/>
+              </a:ext>
+            </a:extLst>
+          </p:cNvPr>
+          <p:cNvCxnSpPr>
+            <a:cxnSpLocks/>
+            <a:stCxn id="5" idx="3"/>
+            <a:endCxn id="17" idx="1"/>
+          </p:cNvCxnSpPr>
+          <p:nvPr/>
+        </p:nvCxnSpPr>
+        <p:spPr>
+          <a:xfrm flipV="1">
+            <a:off x="3956405" y="3184688"/>
+            <a:ext cx="2998944" cy="6016"/>
+          </a:xfrm>
+          <a:prstGeom prst="bentConnector3">
+            <a:avLst/>
+          </a:prstGeom>
+          <a:ln>
+            <a:headEnd type="triangle"/>
+            <a:tailEnd type="triangle"/>
+          </a:ln>
+        </p:spPr>
+        <p:style>
+          <a:lnRef idx="1">
+            <a:schemeClr val="accent1"/>
+          </a:lnRef>
+          <a:fillRef idx="0">
+            <a:schemeClr val="accent1"/>
+          </a:fillRef>
+          <a:effectRef idx="0">
+            <a:schemeClr val="accent1"/>
+          </a:effectRef>
+          <a:fontRef idx="minor">
+            <a:schemeClr val="tx1"/>
+          </a:fontRef>
+        </p:style>
+      </p:cxnSp>
+      <p:cxnSp>
+        <p:nvCxnSpPr>
+          <p:cNvPr id="77" name="Elbow Connector 76">
+            <a:extLst>
+              <a:ext uri="{FF2B5EF4-FFF2-40B4-BE49-F238E27FC236}">
+                <a16:creationId xmlns:a16="http://schemas.microsoft.com/office/drawing/2014/main" id="{EA2FE1D0-C65F-5A45-97E4-C22CB497FDF4}"/>
+              </a:ext>
+            </a:extLst>
+          </p:cNvPr>
+          <p:cNvCxnSpPr>
+            <a:cxnSpLocks/>
+            <a:stCxn id="21" idx="2"/>
+            <a:endCxn id="5" idx="0"/>
+          </p:cNvCxnSpPr>
+          <p:nvPr/>
+        </p:nvCxnSpPr>
+        <p:spPr>
+          <a:xfrm rot="16200000" flipH="1">
+            <a:off x="2737698" y="2437194"/>
+            <a:ext cx="924310" cy="3180"/>
+          </a:xfrm>
+          <a:prstGeom prst="bentConnector3">
+            <a:avLst>
+              <a:gd name="adj1" fmla="val 50000"/>
+            </a:avLst>
+          </a:prstGeom>
+          <a:ln>
+            <a:headEnd type="triangle"/>
+            <a:tailEnd type="triangle"/>
+          </a:ln>
+        </p:spPr>
+        <p:style>
+          <a:lnRef idx="1">
+            <a:schemeClr val="accent1"/>
+          </a:lnRef>
+          <a:fillRef idx="0">
+            <a:schemeClr val="accent1"/>
+          </a:fillRef>
+          <a:effectRef idx="0">
+            <a:schemeClr val="accent1"/>
+          </a:effectRef>
+          <a:fontRef idx="minor">
+            <a:schemeClr val="tx1"/>
+          </a:fontRef>
+        </p:style>
+      </p:cxnSp>
+      <p:cxnSp>
+        <p:nvCxnSpPr>
+          <p:cNvPr id="81" name="Elbow Connector 80">
+            <a:extLst>
+              <a:ext uri="{FF2B5EF4-FFF2-40B4-BE49-F238E27FC236}">
+                <a16:creationId xmlns:a16="http://schemas.microsoft.com/office/drawing/2014/main" id="{34C296A8-F58C-0540-956C-C16A4DD25E64}"/>
+              </a:ext>
+            </a:extLst>
+          </p:cNvPr>
+          <p:cNvCxnSpPr>
+            <a:cxnSpLocks/>
+            <a:stCxn id="5" idx="2"/>
+            <a:endCxn id="61" idx="0"/>
+          </p:cNvCxnSpPr>
+          <p:nvPr/>
+        </p:nvCxnSpPr>
+        <p:spPr>
+          <a:xfrm rot="16200000" flipH="1">
+            <a:off x="2714182" y="3967728"/>
+            <a:ext cx="974612" cy="91"/>
+          </a:xfrm>
+          <a:prstGeom prst="bentConnector3">
+            <a:avLst>
+              <a:gd name="adj1" fmla="val 50000"/>
+            </a:avLst>
+          </a:prstGeom>
+          <a:ln>
+            <a:headEnd type="triangle"/>
+            <a:tailEnd type="triangle"/>
+          </a:ln>
+        </p:spPr>
+        <p:style>
+          <a:lnRef idx="1">
+            <a:schemeClr val="accent1"/>
+          </a:lnRef>
+          <a:fillRef idx="0">
+            <a:schemeClr val="accent1"/>
+          </a:fillRef>
+          <a:effectRef idx="0">
+            <a:schemeClr val="accent1"/>
+          </a:effectRef>
+          <a:fontRef idx="minor">
+            <a:schemeClr val="tx1"/>
+          </a:fontRef>
+        </p:style>
+      </p:cxnSp>
+      <p:sp>
+        <p:nvSpPr>
+          <p:cNvPr id="85" name="Rectangle 84">
+            <a:extLst>
+              <a:ext uri="{FF2B5EF4-FFF2-40B4-BE49-F238E27FC236}">
+                <a16:creationId xmlns:a16="http://schemas.microsoft.com/office/drawing/2014/main" id="{30F14371-242C-6B45-A05D-F2D4ADCC4B76}"/>
+              </a:ext>
+            </a:extLst>
+          </p:cNvPr>
+          <p:cNvSpPr/>
+          <p:nvPr/>
+        </p:nvSpPr>
+        <p:spPr>
+          <a:xfrm>
+            <a:off x="8822713" y="2820736"/>
+            <a:ext cx="1451967" cy="646977"/>
+          </a:xfrm>
+          <a:prstGeom prst="rect">
+            <a:avLst/>
+          </a:prstGeom>
+          <a:solidFill>
+            <a:schemeClr val="tx1"/>
+          </a:solidFill>
+        </p:spPr>
+        <p:style>
+          <a:lnRef idx="2">
+            <a:schemeClr val="accent1">
+              <a:shade val="50000"/>
+            </a:schemeClr>
+          </a:lnRef>
+          <a:fillRef idx="1">
+            <a:schemeClr val="accent1"/>
+          </a:fillRef>
+          <a:effectRef idx="0">
+            <a:schemeClr val="accent1"/>
+          </a:effectRef>
+          <a:fontRef idx="minor">
+            <a:schemeClr val="lt1"/>
+          </a:fontRef>
+        </p:style>
+        <p:txBody>
+          <a:bodyPr rtlCol="0" anchor="ctr"/>
+          <a:lstStyle/>
+          <a:p>
+            <a:pPr algn="ctr"/>
+            <a:r>
+              <a:rPr lang="en-US" dirty="0">
+                <a:solidFill>
+                  <a:srgbClr val="00B050"/>
+                </a:solidFill>
+              </a:rPr>
+              <a:t>Target Modification</a:t>
+            </a:r>
+          </a:p>
+        </p:txBody>
+      </p:sp>
+      <p:sp>
+        <p:nvSpPr>
+          <p:cNvPr id="86" name="Rectangle 85">
+            <a:extLst>
+              <a:ext uri="{FF2B5EF4-FFF2-40B4-BE49-F238E27FC236}">
+                <a16:creationId xmlns:a16="http://schemas.microsoft.com/office/drawing/2014/main" id="{E52ACF4A-BE94-E544-9A38-718C09CB9074}"/>
+              </a:ext>
+            </a:extLst>
+          </p:cNvPr>
+          <p:cNvSpPr/>
+          <p:nvPr/>
+        </p:nvSpPr>
+        <p:spPr>
+          <a:xfrm>
+            <a:off x="8867959" y="3863351"/>
+            <a:ext cx="1451967" cy="646977"/>
+          </a:xfrm>
+          <a:prstGeom prst="rect">
+            <a:avLst/>
+          </a:prstGeom>
+          <a:solidFill>
+            <a:schemeClr val="tx1"/>
+          </a:solidFill>
+        </p:spPr>
+        <p:style>
+          <a:lnRef idx="2">
+            <a:schemeClr val="accent1">
+              <a:shade val="50000"/>
+            </a:schemeClr>
+          </a:lnRef>
+          <a:fillRef idx="1">
+            <a:schemeClr val="accent1"/>
+          </a:fillRef>
+          <a:effectRef idx="0">
+            <a:schemeClr val="accent1"/>
+          </a:effectRef>
+          <a:fontRef idx="minor">
+            <a:schemeClr val="lt1"/>
+          </a:fontRef>
+        </p:style>
+        <p:txBody>
+          <a:bodyPr rtlCol="0" anchor="ctr"/>
+          <a:lstStyle/>
+          <a:p>
+            <a:pPr algn="ctr"/>
+            <a:r>
+              <a:rPr lang="en-US" dirty="0">
+                <a:solidFill>
+                  <a:srgbClr val="00B050"/>
+                </a:solidFill>
+              </a:rPr>
+              <a:t>Push Notifications</a:t>
+            </a:r>
+          </a:p>
+        </p:txBody>
+      </p:sp>
+      <p:sp>
+        <p:nvSpPr>
+          <p:cNvPr id="87" name="Rectangle 86">
+            <a:extLst>
+              <a:ext uri="{FF2B5EF4-FFF2-40B4-BE49-F238E27FC236}">
+                <a16:creationId xmlns:a16="http://schemas.microsoft.com/office/drawing/2014/main" id="{4AE79B28-5F12-D149-B662-ABA275AC7830}"/>
+              </a:ext>
+            </a:extLst>
+          </p:cNvPr>
+          <p:cNvSpPr/>
+          <p:nvPr/>
+        </p:nvSpPr>
+        <p:spPr>
+          <a:xfrm>
+            <a:off x="7190314" y="3859159"/>
+            <a:ext cx="1451967" cy="646977"/>
+          </a:xfrm>
+          <a:prstGeom prst="rect">
+            <a:avLst/>
+          </a:prstGeom>
+          <a:solidFill>
+            <a:schemeClr val="tx1"/>
+          </a:solidFill>
+        </p:spPr>
+        <p:style>
+          <a:lnRef idx="2">
+            <a:schemeClr val="accent1">
+              <a:shade val="50000"/>
+            </a:schemeClr>
+          </a:lnRef>
+          <a:fillRef idx="1">
+            <a:schemeClr val="accent1"/>
+          </a:fillRef>
+          <a:effectRef idx="0">
+            <a:schemeClr val="accent1"/>
+          </a:effectRef>
+          <a:fontRef idx="minor">
+            <a:schemeClr val="lt1"/>
+          </a:fontRef>
+        </p:style>
+        <p:txBody>
+          <a:bodyPr rtlCol="0" anchor="ctr"/>
+          <a:lstStyle/>
+          <a:p>
+            <a:pPr algn="ctr"/>
+            <a:r>
+              <a:rPr lang="en-US" dirty="0">
+                <a:solidFill>
+                  <a:srgbClr val="00B050"/>
+                </a:solidFill>
+              </a:rPr>
+              <a:t>Algorithms</a:t>
+            </a:r>
+          </a:p>
+        </p:txBody>
+      </p:sp>
+      <p:sp>
+        <p:nvSpPr>
+          <p:cNvPr id="89" name="Rectangle 88">
+            <a:extLst>
+              <a:ext uri="{FF2B5EF4-FFF2-40B4-BE49-F238E27FC236}">
+                <a16:creationId xmlns:a16="http://schemas.microsoft.com/office/drawing/2014/main" id="{CF975997-9019-BC40-9E43-7EB374795C77}"/>
+              </a:ext>
+            </a:extLst>
+          </p:cNvPr>
+          <p:cNvSpPr/>
+          <p:nvPr/>
+        </p:nvSpPr>
+        <p:spPr>
+          <a:xfrm>
+            <a:off x="10412106" y="1836132"/>
+            <a:ext cx="1451967" cy="646977"/>
+          </a:xfrm>
+          <a:prstGeom prst="rect">
+            <a:avLst/>
+          </a:prstGeom>
+          <a:solidFill>
+            <a:schemeClr val="tx1"/>
+          </a:solidFill>
+        </p:spPr>
+        <p:style>
+          <a:lnRef idx="2">
+            <a:schemeClr val="accent1">
+              <a:shade val="50000"/>
+            </a:schemeClr>
+          </a:lnRef>
+          <a:fillRef idx="1">
+            <a:schemeClr val="accent1"/>
+          </a:fillRef>
+          <a:effectRef idx="0">
+            <a:schemeClr val="accent1"/>
+          </a:effectRef>
+          <a:fontRef idx="minor">
+            <a:schemeClr val="lt1"/>
+          </a:fontRef>
+        </p:style>
+        <p:txBody>
+          <a:bodyPr rtlCol="0" anchor="ctr"/>
+          <a:lstStyle/>
+          <a:p>
+            <a:pPr algn="ctr"/>
+            <a:r>
+              <a:rPr lang="en-US" dirty="0">
+                <a:solidFill>
+                  <a:srgbClr val="00B050"/>
+                </a:solidFill>
+              </a:rPr>
+              <a:t>Pilot</a:t>
+            </a:r>
+            <a:br>
+              <a:rPr lang="en-US" dirty="0">
+                <a:solidFill>
+                  <a:srgbClr val="00B050"/>
+                </a:solidFill>
+              </a:rPr>
+            </a:br>
+            <a:r>
+              <a:rPr lang="en-US" dirty="0">
+                <a:solidFill>
+                  <a:srgbClr val="00B050"/>
+                </a:solidFill>
+              </a:rPr>
+              <a:t>Constraints</a:t>
+            </a:r>
+          </a:p>
+        </p:txBody>
+      </p:sp>
+      <p:sp>
+        <p:nvSpPr>
+          <p:cNvPr id="98" name="Rectangle 97">
+            <a:extLst>
+              <a:ext uri="{FF2B5EF4-FFF2-40B4-BE49-F238E27FC236}">
+                <a16:creationId xmlns:a16="http://schemas.microsoft.com/office/drawing/2014/main" id="{28FA50C8-5687-1D4B-886B-50D3BAE6824A}"/>
+              </a:ext>
+            </a:extLst>
+          </p:cNvPr>
+          <p:cNvSpPr/>
+          <p:nvPr/>
+        </p:nvSpPr>
+        <p:spPr>
+          <a:xfrm>
+            <a:off x="7181027" y="2825732"/>
+            <a:ext cx="1451967" cy="646977"/>
+          </a:xfrm>
+          <a:prstGeom prst="rect">
+            <a:avLst/>
+          </a:prstGeom>
+          <a:solidFill>
+            <a:schemeClr val="tx1"/>
+          </a:solidFill>
+        </p:spPr>
+        <p:style>
+          <a:lnRef idx="2">
+            <a:schemeClr val="accent1">
+              <a:shade val="50000"/>
+            </a:schemeClr>
+          </a:lnRef>
+          <a:fillRef idx="1">
+            <a:schemeClr val="accent1"/>
+          </a:fillRef>
+          <a:effectRef idx="0">
+            <a:schemeClr val="accent1"/>
+          </a:effectRef>
+          <a:fontRef idx="minor">
+            <a:schemeClr val="lt1"/>
+          </a:fontRef>
+        </p:style>
+        <p:txBody>
+          <a:bodyPr rtlCol="0" anchor="ctr"/>
+          <a:lstStyle/>
+          <a:p>
+            <a:pPr algn="ctr"/>
+            <a:r>
+              <a:rPr lang="en-US" dirty="0">
+                <a:solidFill>
+                  <a:srgbClr val="00B050"/>
+                </a:solidFill>
+              </a:rPr>
+              <a:t>Aircraft Modification</a:t>
+            </a:r>
+          </a:p>
+        </p:txBody>
+      </p:sp>
+      <p:sp>
+        <p:nvSpPr>
+          <p:cNvPr id="99" name="Rectangle 98">
+            <a:extLst>
+              <a:ext uri="{FF2B5EF4-FFF2-40B4-BE49-F238E27FC236}">
+                <a16:creationId xmlns:a16="http://schemas.microsoft.com/office/drawing/2014/main" id="{FE2C2A62-885F-8344-9E4B-C39D579D1132}"/>
+              </a:ext>
+            </a:extLst>
+          </p:cNvPr>
+          <p:cNvSpPr/>
+          <p:nvPr/>
+        </p:nvSpPr>
+        <p:spPr>
+          <a:xfrm>
+            <a:off x="10443015" y="2820736"/>
+            <a:ext cx="1451967" cy="646977"/>
+          </a:xfrm>
+          <a:prstGeom prst="rect">
+            <a:avLst/>
+          </a:prstGeom>
+          <a:solidFill>
+            <a:schemeClr val="tx1"/>
+          </a:solidFill>
+        </p:spPr>
+        <p:style>
+          <a:lnRef idx="2">
+            <a:schemeClr val="accent1">
+              <a:shade val="50000"/>
+            </a:schemeClr>
+          </a:lnRef>
+          <a:fillRef idx="1">
+            <a:schemeClr val="accent1"/>
+          </a:fillRef>
+          <a:effectRef idx="0">
+            <a:schemeClr val="accent1"/>
+          </a:effectRef>
+          <a:fontRef idx="minor">
+            <a:schemeClr val="lt1"/>
+          </a:fontRef>
+        </p:style>
+        <p:txBody>
+          <a:bodyPr rtlCol="0" anchor="ctr"/>
+          <a:lstStyle/>
+          <a:p>
+            <a:pPr algn="ctr"/>
+            <a:r>
+              <a:rPr lang="en-US" dirty="0">
+                <a:solidFill>
+                  <a:srgbClr val="00B050"/>
+                </a:solidFill>
+              </a:rPr>
+              <a:t>Pilot Modification</a:t>
+            </a:r>
+          </a:p>
+        </p:txBody>
+      </p:sp>
+      <p:sp>
+        <p:nvSpPr>
+          <p:cNvPr id="14" name="Flowchart: Magnetic Disk 13">
+            <a:extLst>
+              <a:ext uri="{FF2B5EF4-FFF2-40B4-BE49-F238E27FC236}">
+                <a16:creationId xmlns:a16="http://schemas.microsoft.com/office/drawing/2014/main" id="{BEDD0129-00FD-4D25-9E2F-6C2055EB2242}"/>
+              </a:ext>
+            </a:extLst>
+          </p:cNvPr>
+          <p:cNvSpPr/>
+          <p:nvPr/>
+        </p:nvSpPr>
+        <p:spPr>
+          <a:xfrm>
+            <a:off x="410934" y="2947738"/>
+            <a:ext cx="1401141" cy="499310"/>
+          </a:xfrm>
+          <a:prstGeom prst="flowChartMagneticDisk">
+            <a:avLst/>
+          </a:prstGeom>
+        </p:spPr>
+        <p:style>
+          <a:lnRef idx="2">
+            <a:schemeClr val="accent1">
+              <a:shade val="50000"/>
+            </a:schemeClr>
+          </a:lnRef>
+          <a:fillRef idx="1">
+            <a:schemeClr val="accent1"/>
+          </a:fillRef>
+          <a:effectRef idx="0">
+            <a:schemeClr val="accent1"/>
+          </a:effectRef>
+          <a:fontRef idx="minor">
+            <a:schemeClr val="lt1"/>
+          </a:fontRef>
+        </p:style>
+        <p:txBody>
+          <a:bodyPr rtlCol="0" anchor="ctr"/>
+          <a:lstStyle/>
+          <a:p>
+            <a:pPr algn="ctr"/>
+            <a:r>
+              <a:rPr lang="en-US" dirty="0"/>
+              <a:t>DB</a:t>
+            </a:r>
+          </a:p>
+        </p:txBody>
+      </p:sp>
+      <p:cxnSp>
+        <p:nvCxnSpPr>
+          <p:cNvPr id="23" name="Straight Arrow Connector 22">
+            <a:extLst>
+              <a:ext uri="{FF2B5EF4-FFF2-40B4-BE49-F238E27FC236}">
+                <a16:creationId xmlns:a16="http://schemas.microsoft.com/office/drawing/2014/main" id="{6706A756-8C84-43AE-A1ED-06AC41BAA32E}"/>
+              </a:ext>
+            </a:extLst>
+          </p:cNvPr>
+          <p:cNvCxnSpPr>
+            <a:stCxn id="14" idx="4"/>
+            <a:endCxn id="5" idx="1"/>
+          </p:cNvCxnSpPr>
+          <p:nvPr/>
+        </p:nvCxnSpPr>
+        <p:spPr>
+          <a:xfrm flipV="1">
+            <a:off x="1812075" y="3190704"/>
+            <a:ext cx="634405" cy="6689"/>
+          </a:xfrm>
+          <a:prstGeom prst="straightConnector1">
+            <a:avLst/>
+          </a:prstGeom>
+          <a:ln>
+            <a:headEnd type="triangle"/>
+            <a:tailEnd type="triangle"/>
+          </a:ln>
+        </p:spPr>
+        <p:style>
+          <a:lnRef idx="1">
+            <a:schemeClr val="accent1"/>
+          </a:lnRef>
+          <a:fillRef idx="0">
+            <a:schemeClr val="accent1"/>
+          </a:fillRef>
+          <a:effectRef idx="0">
+            <a:schemeClr val="accent1"/>
+          </a:effectRef>
+          <a:fontRef idx="minor">
+            <a:schemeClr val="tx1"/>
+          </a:fontRef>
+        </p:style>
+      </p:cxnSp>
+      <p:sp>
+        <p:nvSpPr>
+          <p:cNvPr id="42" name="Rectangle 41">
+            <a:extLst>
+              <a:ext uri="{FF2B5EF4-FFF2-40B4-BE49-F238E27FC236}">
+                <a16:creationId xmlns:a16="http://schemas.microsoft.com/office/drawing/2014/main" id="{50E3D0F9-7B4A-406C-ACDE-31C63D8C5AE9}"/>
+              </a:ext>
+            </a:extLst>
+          </p:cNvPr>
+          <p:cNvSpPr/>
+          <p:nvPr/>
+        </p:nvSpPr>
+        <p:spPr>
+          <a:xfrm>
+            <a:off x="10451551" y="3859159"/>
+            <a:ext cx="1451967" cy="646977"/>
+          </a:xfrm>
+          <a:prstGeom prst="rect">
+            <a:avLst/>
+          </a:prstGeom>
+          <a:solidFill>
+            <a:schemeClr val="tx1"/>
+          </a:solidFill>
+        </p:spPr>
+        <p:style>
+          <a:lnRef idx="2">
+            <a:schemeClr val="accent1">
+              <a:shade val="50000"/>
+            </a:schemeClr>
+          </a:lnRef>
+          <a:fillRef idx="1">
+            <a:schemeClr val="accent1"/>
+          </a:fillRef>
+          <a:effectRef idx="0">
+            <a:schemeClr val="accent1"/>
+          </a:effectRef>
+          <a:fontRef idx="minor">
+            <a:schemeClr val="lt1"/>
+          </a:fontRef>
+        </p:style>
+        <p:txBody>
+          <a:bodyPr rtlCol="0" anchor="ctr"/>
+          <a:lstStyle/>
+          <a:p>
+            <a:pPr algn="ctr"/>
+            <a:r>
+              <a:rPr lang="en-US" dirty="0">
+                <a:solidFill>
+                  <a:srgbClr val="00B050"/>
+                </a:solidFill>
+              </a:rPr>
+              <a:t>Live Chat/Voice</a:t>
+            </a:r>
+          </a:p>
+        </p:txBody>
+      </p:sp>
     </p:spTree>
     <p:extLst>
       <p:ext uri="{BB962C8B-B14F-4D97-AF65-F5344CB8AC3E}">
-        <p14:creationId xmlns:p14="http://schemas.microsoft.com/office/powerpoint/2010/main" val="1727388644"/>
+        <p14:creationId xmlns:p14="http://schemas.microsoft.com/office/powerpoint/2010/main" val="480252819"/>
       </p:ext>
     </p:extLst>
   </p:cSld>
@@ -10505,34 +10451,142 @@
       </p:grpSpPr>
       <p:sp>
         <p:nvSpPr>
-          <p:cNvPr id="2" name="Title 1"/>
+          <p:cNvPr id="2" name="Title 1">
+            <a:extLst>
+              <a:ext uri="{FF2B5EF4-FFF2-40B4-BE49-F238E27FC236}">
+                <a16:creationId xmlns:a16="http://schemas.microsoft.com/office/drawing/2014/main" id="{E29B01D6-A7CA-4A3E-9C66-C2AA33322F12}"/>
+              </a:ext>
+            </a:extLst>
+          </p:cNvPr>
           <p:cNvSpPr>
             <a:spLocks noGrp="1"/>
           </p:cNvSpPr>
           <p:nvPr>
             <p:ph type="title"/>
+          </p:nvPr>
+        </p:nvSpPr>
+        <p:spPr/>
+        <p:txBody>
+          <a:bodyPr/>
+          <a:lstStyle/>
+          <a:p>
+            <a:r>
+              <a:rPr lang="en-US" dirty="0"/>
+              <a:t>EJJ Mission Planning Flow (1)	</a:t>
+            </a:r>
+          </a:p>
+        </p:txBody>
+      </p:sp>
+      <p:sp>
+        <p:nvSpPr>
+          <p:cNvPr id="3" name="Content Placeholder 2">
+            <a:extLst>
+              <a:ext uri="{FF2B5EF4-FFF2-40B4-BE49-F238E27FC236}">
+                <a16:creationId xmlns:a16="http://schemas.microsoft.com/office/drawing/2014/main" id="{F1842140-4ACB-41A9-BC7F-30570259E5D8}"/>
+              </a:ext>
+            </a:extLst>
+          </p:cNvPr>
+          <p:cNvSpPr>
+            <a:spLocks noGrp="1"/>
+          </p:cNvSpPr>
+          <p:nvPr>
+            <p:ph idx="1"/>
           </p:nvPr>
         </p:nvSpPr>
         <p:spPr>
           <a:xfrm>
-            <a:off x="385175" y="1"/>
-            <a:ext cx="10515600" cy="1083050"/>
+            <a:off x="838200" y="1807812"/>
+            <a:ext cx="10515600" cy="4351338"/>
           </a:xfrm>
         </p:spPr>
         <p:txBody>
-          <a:bodyPr/>
-          <a:lstStyle/>
-          <a:p>
-            <a:r>
-              <a:rPr lang="en-US" dirty="0"/>
-              <a:t>EJJ Web Page – Mission Set-Up</a:t>
-            </a:r>
-          </a:p>
-        </p:txBody>
-      </p:sp>
-      <p:sp>
-        <p:nvSpPr>
-          <p:cNvPr id="4" name="Footer Placeholder 3"/>
+          <a:bodyPr>
+            <a:normAutofit fontScale="85000" lnSpcReduction="20000"/>
+          </a:bodyPr>
+          <a:lstStyle/>
+          <a:p>
+            <a:r>
+              <a:rPr lang="en-US" dirty="0"/>
+              <a:t>Open up the EJJ web page</a:t>
+            </a:r>
+          </a:p>
+          <a:p>
+            <a:r>
+              <a:rPr lang="en-US" dirty="0"/>
+              <a:t>Drag in the target information (ATO) and view target tasking details and target imagery immediately</a:t>
+            </a:r>
+          </a:p>
+          <a:p>
+            <a:pPr lvl="1"/>
+            <a:r>
+              <a:rPr lang="en-US" dirty="0"/>
+              <a:t>Contains the probabilities of casualties while striking certain targets</a:t>
+            </a:r>
+          </a:p>
+          <a:p>
+            <a:pPr lvl="1"/>
+            <a:r>
+              <a:rPr lang="en-US" dirty="0"/>
+              <a:t>Contains minimum/maximum sortie times against each target tasking</a:t>
+            </a:r>
+          </a:p>
+          <a:p>
+            <a:r>
+              <a:rPr lang="en-US" dirty="0"/>
+              <a:t>An algorithm runs to determines the target striking order and displays it to the user</a:t>
+            </a:r>
+          </a:p>
+          <a:p>
+            <a:pPr lvl="1"/>
+            <a:r>
+              <a:rPr lang="en-US" dirty="0"/>
+              <a:t>Minimizes the chance of casualties when striking all the targets in the tasking details</a:t>
+            </a:r>
+          </a:p>
+          <a:p>
+            <a:r>
+              <a:rPr lang="en-US" dirty="0"/>
+              <a:t>The available aircraft are displayed in the Inventory</a:t>
+            </a:r>
+          </a:p>
+          <a:p>
+            <a:r>
+              <a:rPr lang="en-US" dirty="0"/>
+              <a:t>Determine the number of each aircraft needed for the friendly force laydown and drag the aircraft to carriers in the Mission</a:t>
+            </a:r>
+          </a:p>
+          <a:p>
+            <a:r>
+              <a:rPr lang="en-US" dirty="0"/>
+              <a:t>Do the same for pilots, </a:t>
+            </a:r>
+            <a:r>
+              <a:rPr lang="en-US" dirty="0" err="1"/>
+              <a:t>helos</a:t>
+            </a:r>
+            <a:r>
+              <a:rPr lang="en-US" dirty="0"/>
+              <a:t>, and missiles</a:t>
+            </a:r>
+          </a:p>
+          <a:p>
+            <a:pPr lvl="1"/>
+            <a:r>
+              <a:rPr lang="en-US" dirty="0"/>
+              <a:t>The laydown can be saved and reloaded</a:t>
+            </a:r>
+          </a:p>
+        </p:txBody>
+      </p:sp>
+      <p:sp>
+        <p:nvSpPr>
+          <p:cNvPr id="4" name="Footer Placeholder 3">
+            <a:extLst>
+              <a:ext uri="{FF2B5EF4-FFF2-40B4-BE49-F238E27FC236}">
+                <a16:creationId xmlns:a16="http://schemas.microsoft.com/office/drawing/2014/main" id="{C401FFE3-F414-4CF5-AD6A-9C2DE5116ED4}"/>
+              </a:ext>
+            </a:extLst>
+          </p:cNvPr>
           <p:cNvSpPr>
             <a:spLocks noGrp="1"/>
           </p:cNvSpPr>
@@ -10559,46 +10613,10 @@
           </a:p>
         </p:txBody>
       </p:sp>
-      <p:pic>
-        <p:nvPicPr>
-          <p:cNvPr id="14" name="Picture 13" descr="Graphical user interface, application&#10;&#10;Description automatically generated">
-            <a:extLst>
-              <a:ext uri="{FF2B5EF4-FFF2-40B4-BE49-F238E27FC236}">
-                <a16:creationId xmlns:a16="http://schemas.microsoft.com/office/drawing/2014/main" id="{9B219437-130A-4B41-967F-F28D427AD7F0}"/>
-              </a:ext>
-            </a:extLst>
-          </p:cNvPr>
-          <p:cNvPicPr>
-            <a:picLocks noChangeAspect="1"/>
-          </p:cNvPicPr>
-          <p:nvPr/>
-        </p:nvPicPr>
-        <p:blipFill>
-          <a:blip r:embed="rId2">
-            <a:extLst>
-              <a:ext uri="{28A0092B-C50C-407E-A947-70E740481C1C}">
-                <a14:useLocalDpi xmlns:a14="http://schemas.microsoft.com/office/drawing/2010/main" val="0"/>
-              </a:ext>
-            </a:extLst>
-          </a:blip>
-          <a:stretch>
-            <a:fillRect/>
-          </a:stretch>
-        </p:blipFill>
-        <p:spPr>
-          <a:xfrm>
-            <a:off x="798845" y="995369"/>
-            <a:ext cx="10352451" cy="5273299"/>
-          </a:xfrm>
-          <a:prstGeom prst="rect">
-            <a:avLst/>
-          </a:prstGeom>
-        </p:spPr>
-      </p:pic>
     </p:spTree>
     <p:extLst>
       <p:ext uri="{BB962C8B-B14F-4D97-AF65-F5344CB8AC3E}">
-        <p14:creationId xmlns:p14="http://schemas.microsoft.com/office/powerpoint/2010/main" val="3771904339"/>
+        <p14:creationId xmlns:p14="http://schemas.microsoft.com/office/powerpoint/2010/main" val="1727388644"/>
       </p:ext>
     </p:extLst>
   </p:cSld>

</xml_diff>